<commit_message>
update diagrama de solução 1.2
</commit_message>
<xml_diff>
--- a/DOCs de T.I/Diagrama_de_Solucao/Presentation.pptx
+++ b/DOCs de T.I/Diagrama_de_Solucao/Presentation.pptx
@@ -104,6 +104,11 @@
       </a:defRPr>
     </a:lvl9pPr>
   </p:defaultTextStyle>
+  <p:extLst>
+    <p:ext uri="{EFAFB233-063F-42B5-8137-9DF3F51BA10A}">
+      <p15:sldGuideLst xmlns:p15="http://schemas.microsoft.com/office/powerpoint/2012/main"/>
+    </p:ext>
+  </p:extLst>
 </p:presentation>
 </file>
 
@@ -254,7 +259,7 @@
           <a:p>
             <a:fld id="{2FC3D184-0F2B-4D9D-BDB9-3409F15C70D5}" type="datetimeFigureOut">
               <a:rPr lang="pt-BR" smtClean="0"/>
-              <a:t>10/04/2022</a:t>
+              <a:t>11/04/2022</a:t>
             </a:fld>
             <a:endParaRPr lang="pt-BR"/>
           </a:p>
@@ -452,7 +457,7 @@
           <a:p>
             <a:fld id="{2FC3D184-0F2B-4D9D-BDB9-3409F15C70D5}" type="datetimeFigureOut">
               <a:rPr lang="pt-BR" smtClean="0"/>
-              <a:t>10/04/2022</a:t>
+              <a:t>11/04/2022</a:t>
             </a:fld>
             <a:endParaRPr lang="pt-BR"/>
           </a:p>
@@ -660,7 +665,7 @@
           <a:p>
             <a:fld id="{2FC3D184-0F2B-4D9D-BDB9-3409F15C70D5}" type="datetimeFigureOut">
               <a:rPr lang="pt-BR" smtClean="0"/>
-              <a:t>10/04/2022</a:t>
+              <a:t>11/04/2022</a:t>
             </a:fld>
             <a:endParaRPr lang="pt-BR"/>
           </a:p>
@@ -858,7 +863,7 @@
           <a:p>
             <a:fld id="{2FC3D184-0F2B-4D9D-BDB9-3409F15C70D5}" type="datetimeFigureOut">
               <a:rPr lang="pt-BR" smtClean="0"/>
-              <a:t>10/04/2022</a:t>
+              <a:t>11/04/2022</a:t>
             </a:fld>
             <a:endParaRPr lang="pt-BR"/>
           </a:p>
@@ -1133,7 +1138,7 @@
           <a:p>
             <a:fld id="{2FC3D184-0F2B-4D9D-BDB9-3409F15C70D5}" type="datetimeFigureOut">
               <a:rPr lang="pt-BR" smtClean="0"/>
-              <a:t>10/04/2022</a:t>
+              <a:t>11/04/2022</a:t>
             </a:fld>
             <a:endParaRPr lang="pt-BR"/>
           </a:p>
@@ -1398,7 +1403,7 @@
           <a:p>
             <a:fld id="{2FC3D184-0F2B-4D9D-BDB9-3409F15C70D5}" type="datetimeFigureOut">
               <a:rPr lang="pt-BR" smtClean="0"/>
-              <a:t>10/04/2022</a:t>
+              <a:t>11/04/2022</a:t>
             </a:fld>
             <a:endParaRPr lang="pt-BR"/>
           </a:p>
@@ -1810,7 +1815,7 @@
           <a:p>
             <a:fld id="{2FC3D184-0F2B-4D9D-BDB9-3409F15C70D5}" type="datetimeFigureOut">
               <a:rPr lang="pt-BR" smtClean="0"/>
-              <a:t>10/04/2022</a:t>
+              <a:t>11/04/2022</a:t>
             </a:fld>
             <a:endParaRPr lang="pt-BR"/>
           </a:p>
@@ -1951,7 +1956,7 @@
           <a:p>
             <a:fld id="{2FC3D184-0F2B-4D9D-BDB9-3409F15C70D5}" type="datetimeFigureOut">
               <a:rPr lang="pt-BR" smtClean="0"/>
-              <a:t>10/04/2022</a:t>
+              <a:t>11/04/2022</a:t>
             </a:fld>
             <a:endParaRPr lang="pt-BR"/>
           </a:p>
@@ -2064,7 +2069,7 @@
           <a:p>
             <a:fld id="{2FC3D184-0F2B-4D9D-BDB9-3409F15C70D5}" type="datetimeFigureOut">
               <a:rPr lang="pt-BR" smtClean="0"/>
-              <a:t>10/04/2022</a:t>
+              <a:t>11/04/2022</a:t>
             </a:fld>
             <a:endParaRPr lang="pt-BR"/>
           </a:p>
@@ -2375,7 +2380,7 @@
           <a:p>
             <a:fld id="{2FC3D184-0F2B-4D9D-BDB9-3409F15C70D5}" type="datetimeFigureOut">
               <a:rPr lang="pt-BR" smtClean="0"/>
-              <a:t>10/04/2022</a:t>
+              <a:t>11/04/2022</a:t>
             </a:fld>
             <a:endParaRPr lang="pt-BR"/>
           </a:p>
@@ -2663,7 +2668,7 @@
           <a:p>
             <a:fld id="{2FC3D184-0F2B-4D9D-BDB9-3409F15C70D5}" type="datetimeFigureOut">
               <a:rPr lang="pt-BR" smtClean="0"/>
-              <a:t>10/04/2022</a:t>
+              <a:t>11/04/2022</a:t>
             </a:fld>
             <a:endParaRPr lang="pt-BR"/>
           </a:p>
@@ -2904,7 +2909,7 @@
           <a:p>
             <a:fld id="{2FC3D184-0F2B-4D9D-BDB9-3409F15C70D5}" type="datetimeFigureOut">
               <a:rPr lang="pt-BR" smtClean="0"/>
-              <a:t>10/04/2022</a:t>
+              <a:t>11/04/2022</a:t>
             </a:fld>
             <a:endParaRPr lang="pt-BR"/>
           </a:p>
@@ -3330,12 +3335,14 @@
               </a:ext>
             </a:extLst>
           </p:cNvPr>
-          <p:cNvSpPr/>
+          <p:cNvSpPr>
+            <a:spLocks noGrp="1" noRot="1" noMove="1" noResize="1" noEditPoints="1" noAdjustHandles="1" noChangeArrowheads="1" noChangeShapeType="1"/>
+          </p:cNvSpPr>
           <p:nvPr/>
         </p:nvSpPr>
         <p:spPr>
           <a:xfrm>
-            <a:off x="-6032" y="1"/>
+            <a:off x="-6032" y="0"/>
             <a:ext cx="12198032" cy="6858000"/>
           </a:xfrm>
           <a:prstGeom prst="rect">
@@ -3385,9 +3392,9 @@
         <p:grpSpPr>
           <a:xfrm>
             <a:off x="3589306" y="642799"/>
-            <a:ext cx="8077931" cy="5925354"/>
+            <a:ext cx="8077931" cy="6111505"/>
             <a:chOff x="3589306" y="642799"/>
-            <a:chExt cx="8077931" cy="5925354"/>
+            <a:chExt cx="8077931" cy="6111505"/>
           </a:xfrm>
         </p:grpSpPr>
         <p:sp>
@@ -3566,7 +3573,7 @@
           <p:spPr>
             <a:xfrm>
               <a:off x="7522752" y="642799"/>
-              <a:ext cx="1115949" cy="1144929"/>
+              <a:ext cx="1115949" cy="1200329"/>
             </a:xfrm>
             <a:prstGeom prst="rect">
               <a:avLst/>
@@ -3584,11 +3591,7 @@
             </a:bodyPr>
             <a:lstStyle/>
             <a:p>
-              <a:pPr algn="ctr">
-                <a:lnSpc>
-                  <a:spcPct val="200000"/>
-                </a:lnSpc>
-              </a:pPr>
+              <a:pPr algn="ctr"/>
               <a:r>
                 <a:rPr lang="pt-BR" sz="1200" b="1" dirty="0">
                   <a:solidFill>
@@ -3600,11 +3603,7 @@
               </a:r>
             </a:p>
             <a:p>
-              <a:pPr algn="ctr">
-                <a:lnSpc>
-                  <a:spcPct val="200000"/>
-                </a:lnSpc>
-              </a:pPr>
+              <a:pPr algn="ctr"/>
               <a:r>
                 <a:rPr lang="pt-BR" sz="1200" b="1" dirty="0">
                   <a:solidFill>
@@ -3616,10 +3615,21 @@
               </a:r>
             </a:p>
             <a:p>
-              <a:pPr algn="ctr">
-                <a:lnSpc>
-                  <a:spcPct val="200000"/>
-                </a:lnSpc>
+              <a:pPr algn="ctr"/>
+              <a:r>
+                <a:rPr lang="pt-BR" sz="1200" b="1" dirty="0">
+                  <a:solidFill>
+                    <a:srgbClr val="7030A0"/>
+                  </a:solidFill>
+                  <a:latin typeface="Quicksand" panose="00000500000000000000" pitchFamily="2" charset="0"/>
+                </a:rPr>
+                <a:t>Site</a:t>
+              </a:r>
+            </a:p>
+            <a:p>
+              <a:pPr marL="171450" indent="-171450">
+                <a:buFont typeface="Arial" panose="020B0604020202020204" pitchFamily="34" charset="0"/>
+                <a:buChar char="•"/>
               </a:pPr>
               <a:r>
                 <a:rPr lang="pt-BR" sz="1200" b="1" dirty="0">
@@ -3628,7 +3638,37 @@
                   </a:solidFill>
                   <a:latin typeface="Quicksand" panose="00000500000000000000" pitchFamily="2" charset="0"/>
                 </a:rPr>
-                <a:t>Site</a:t>
+                <a:t>Javascript</a:t>
+              </a:r>
+            </a:p>
+            <a:p>
+              <a:pPr marL="171450" indent="-171450">
+                <a:buFont typeface="Arial" panose="020B0604020202020204" pitchFamily="34" charset="0"/>
+                <a:buChar char="•"/>
+              </a:pPr>
+              <a:r>
+                <a:rPr lang="pt-BR" sz="1200" b="1" dirty="0">
+                  <a:solidFill>
+                    <a:srgbClr val="7030A0"/>
+                  </a:solidFill>
+                  <a:latin typeface="Quicksand" panose="00000500000000000000" pitchFamily="2" charset="0"/>
+                </a:rPr>
+                <a:t>CSS</a:t>
+              </a:r>
+            </a:p>
+            <a:p>
+              <a:pPr marL="171450" indent="-171450">
+                <a:buFont typeface="Arial" panose="020B0604020202020204" pitchFamily="34" charset="0"/>
+                <a:buChar char="•"/>
+              </a:pPr>
+              <a:r>
+                <a:rPr lang="pt-BR" sz="1200" b="1" dirty="0">
+                  <a:solidFill>
+                    <a:srgbClr val="7030A0"/>
+                  </a:solidFill>
+                  <a:latin typeface="Quicksand" panose="00000500000000000000" pitchFamily="2" charset="0"/>
+                </a:rPr>
+                <a:t>HTML</a:t>
               </a:r>
             </a:p>
           </p:txBody>
@@ -3759,8 +3799,8 @@
           </p:nvSpPr>
           <p:spPr>
             <a:xfrm>
-              <a:off x="8839237" y="6291154"/>
-              <a:ext cx="651094" cy="276999"/>
+              <a:off x="8795617" y="6292639"/>
+              <a:ext cx="746452" cy="461665"/>
             </a:xfrm>
             <a:prstGeom prst="rect">
               <a:avLst/>
@@ -3789,6 +3829,18 @@
                 <a:t>sensor</a:t>
               </a:r>
             </a:p>
+            <a:p>
+              <a:pPr algn="ctr"/>
+              <a:r>
+                <a:rPr lang="pt-BR" sz="1200" b="1" dirty="0">
+                  <a:solidFill>
+                    <a:srgbClr val="7030A0"/>
+                  </a:solidFill>
+                  <a:latin typeface="Quicksand" panose="00000500000000000000" pitchFamily="2" charset="0"/>
+                </a:rPr>
+                <a:t>(DHT11)</a:t>
+              </a:r>
+            </a:p>
           </p:txBody>
         </p:sp>
         <p:sp>
@@ -3805,8 +3857,8 @@
           </p:nvSpPr>
           <p:spPr>
             <a:xfrm>
-              <a:off x="9677030" y="5522717"/>
-              <a:ext cx="1028108" cy="276999"/>
+              <a:off x="9677030" y="5318401"/>
+              <a:ext cx="1028108" cy="461665"/>
             </a:xfrm>
             <a:prstGeom prst="rect">
               <a:avLst/>
@@ -3835,6 +3887,18 @@
                 <a:t>protoboard</a:t>
               </a:r>
             </a:p>
+            <a:p>
+              <a:pPr algn="ctr"/>
+              <a:r>
+                <a:rPr lang="pt-BR" sz="1200" b="1" dirty="0">
+                  <a:solidFill>
+                    <a:srgbClr val="7030A0"/>
+                  </a:solidFill>
+                  <a:latin typeface="Quicksand" panose="00000500000000000000" pitchFamily="2" charset="0"/>
+                </a:rPr>
+                <a:t>(Mini 170)</a:t>
+              </a:r>
+            </a:p>
           </p:txBody>
         </p:sp>
         <p:sp>
@@ -3851,8 +3915,8 @@
           </p:nvSpPr>
           <p:spPr>
             <a:xfrm>
-              <a:off x="10844011" y="6261013"/>
-              <a:ext cx="746452" cy="276999"/>
+              <a:off x="10805627" y="6245761"/>
+              <a:ext cx="823219" cy="461665"/>
             </a:xfrm>
             <a:prstGeom prst="rect">
               <a:avLst/>
@@ -3886,6 +3950,18 @@
                 </a:solidFill>
                 <a:latin typeface="Quicksand" panose="00000500000000000000" pitchFamily="2" charset="0"/>
               </a:endParaRPr>
+            </a:p>
+            <a:p>
+              <a:pPr algn="ctr"/>
+              <a:r>
+                <a:rPr lang="pt-BR" sz="1200" b="1" dirty="0">
+                  <a:solidFill>
+                    <a:srgbClr val="7030A0"/>
+                  </a:solidFill>
+                  <a:latin typeface="Quicksand" panose="00000500000000000000" pitchFamily="2" charset="0"/>
+                </a:rPr>
+                <a:t>(Uno R3)</a:t>
+              </a:r>
             </a:p>
           </p:txBody>
         </p:sp>
@@ -5622,135 +5698,6 @@
       </p:grpSp>
       <p:sp>
         <p:nvSpPr>
-          <p:cNvPr id="325" name="names">
-            <a:extLst>
-              <a:ext uri="{FF2B5EF4-FFF2-40B4-BE49-F238E27FC236}">
-                <a16:creationId xmlns:a16="http://schemas.microsoft.com/office/drawing/2014/main" id="{B19ED814-80D0-4298-848E-74639C3A1BF3}"/>
-              </a:ext>
-            </a:extLst>
-          </p:cNvPr>
-          <p:cNvSpPr/>
-          <p:nvPr/>
-        </p:nvSpPr>
-        <p:spPr>
-          <a:xfrm>
-            <a:off x="-282666" y="968263"/>
-            <a:ext cx="2752190" cy="2048887"/>
-          </a:xfrm>
-          <a:prstGeom prst="roundRect">
-            <a:avLst/>
-          </a:prstGeom>
-          <a:solidFill>
-            <a:schemeClr val="bg1">
-              <a:alpha val="40000"/>
-            </a:schemeClr>
-          </a:solidFill>
-          <a:ln w="19050">
-            <a:solidFill>
-              <a:srgbClr val="8008FF"/>
-            </a:solidFill>
-          </a:ln>
-        </p:spPr>
-        <p:style>
-          <a:lnRef idx="2">
-            <a:schemeClr val="accent1">
-              <a:shade val="50000"/>
-            </a:schemeClr>
-          </a:lnRef>
-          <a:fillRef idx="1">
-            <a:schemeClr val="accent1"/>
-          </a:fillRef>
-          <a:effectRef idx="0">
-            <a:schemeClr val="accent1"/>
-          </a:effectRef>
-          <a:fontRef idx="minor">
-            <a:schemeClr val="lt1"/>
-          </a:fontRef>
-        </p:style>
-        <p:txBody>
-          <a:bodyPr rtlCol="0" anchor="ctr"/>
-          <a:lstStyle/>
-          <a:p>
-            <a:r>
-              <a:rPr lang="pt-BR" dirty="0">
-                <a:solidFill>
-                  <a:srgbClr val="8008FF"/>
-                </a:solidFill>
-                <a:latin typeface="Quicksand" panose="00000500000000000000" pitchFamily="2" charset="0"/>
-              </a:rPr>
-              <a:t>   </a:t>
-            </a:r>
-          </a:p>
-          <a:p>
-            <a:r>
-              <a:rPr lang="pt-BR" dirty="0">
-                <a:solidFill>
-                  <a:srgbClr val="8008FF"/>
-                </a:solidFill>
-                <a:latin typeface="Quicksand" panose="00000500000000000000" pitchFamily="2" charset="0"/>
-              </a:rPr>
-              <a:t>   - Eduarda Calixto </a:t>
-            </a:r>
-          </a:p>
-          <a:p>
-            <a:r>
-              <a:rPr lang="pt-BR" dirty="0">
-                <a:solidFill>
-                  <a:srgbClr val="8008FF"/>
-                </a:solidFill>
-                <a:latin typeface="Quicksand" panose="00000500000000000000" pitchFamily="2" charset="0"/>
-              </a:rPr>
-              <a:t>   - Fábio Ceslaki </a:t>
-            </a:r>
-          </a:p>
-          <a:p>
-            <a:r>
-              <a:rPr lang="pt-BR" dirty="0">
-                <a:solidFill>
-                  <a:srgbClr val="8008FF"/>
-                </a:solidFill>
-                <a:latin typeface="Quicksand" panose="00000500000000000000" pitchFamily="2" charset="0"/>
-              </a:rPr>
-              <a:t>   - Gabriel Martins </a:t>
-            </a:r>
-          </a:p>
-          <a:p>
-            <a:r>
-              <a:rPr lang="pt-BR" dirty="0">
-                <a:solidFill>
-                  <a:srgbClr val="8008FF"/>
-                </a:solidFill>
-                <a:latin typeface="Quicksand" panose="00000500000000000000" pitchFamily="2" charset="0"/>
-              </a:rPr>
-              <a:t>   - Thiago Ramos </a:t>
-            </a:r>
-          </a:p>
-          <a:p>
-            <a:r>
-              <a:rPr lang="pt-BR" dirty="0">
-                <a:solidFill>
-                  <a:srgbClr val="8008FF"/>
-                </a:solidFill>
-                <a:latin typeface="Quicksand" panose="00000500000000000000" pitchFamily="2" charset="0"/>
-              </a:rPr>
-              <a:t>   - Vitor Mendes </a:t>
-            </a:r>
-          </a:p>
-          <a:p>
-            <a:r>
-              <a:rPr lang="pt-BR" dirty="0">
-                <a:solidFill>
-                  <a:srgbClr val="8008FF"/>
-                </a:solidFill>
-                <a:latin typeface="Quicksand" panose="00000500000000000000" pitchFamily="2" charset="0"/>
-              </a:rPr>
-              <a:t>   - Wladimir Condori</a:t>
-            </a:r>
-          </a:p>
-        </p:txBody>
-      </p:sp>
-      <p:sp>
-        <p:nvSpPr>
           <p:cNvPr id="324" name="title">
             <a:extLst>
               <a:ext uri="{FF2B5EF4-FFF2-40B4-BE49-F238E27FC236}">
@@ -5862,6 +5809,42 @@
           </a:p>
         </p:txBody>
       </p:sp>
+      <p:pic>
+        <p:nvPicPr>
+          <p:cNvPr id="3" name="Imagem 2" descr="Uma imagem contendo estrela, vidro, cd&#10;&#10;Descrição gerada automaticamente">
+            <a:extLst>
+              <a:ext uri="{FF2B5EF4-FFF2-40B4-BE49-F238E27FC236}">
+                <a16:creationId xmlns:a16="http://schemas.microsoft.com/office/drawing/2014/main" id="{4A609B72-DA76-4D65-AFF7-98C375C94855}"/>
+              </a:ext>
+            </a:extLst>
+          </p:cNvPr>
+          <p:cNvPicPr>
+            <a:picLocks noChangeAspect="1"/>
+          </p:cNvPicPr>
+          <p:nvPr/>
+        </p:nvPicPr>
+        <p:blipFill>
+          <a:blip r:embed="rId19">
+            <a:extLst>
+              <a:ext uri="{28A0092B-C50C-407E-A947-70E740481C1C}">
+                <a14:useLocalDpi xmlns:a14="http://schemas.microsoft.com/office/drawing/2010/main" val="0"/>
+              </a:ext>
+            </a:extLst>
+          </a:blip>
+          <a:stretch>
+            <a:fillRect/>
+          </a:stretch>
+        </p:blipFill>
+        <p:spPr>
+          <a:xfrm>
+            <a:off x="1575699" y="5723888"/>
+            <a:ext cx="564869" cy="540000"/>
+          </a:xfrm>
+          <a:prstGeom prst="rect">
+            <a:avLst/>
+          </a:prstGeom>
+        </p:spPr>
+      </p:pic>
     </p:spTree>
     <p:extLst>
       <p:ext uri="{BB962C8B-B14F-4D97-AF65-F5344CB8AC3E}">

</xml_diff>

<commit_message>
diagrama de solução v4.0
</commit_message>
<xml_diff>
--- a/DOCs de T.I/Diagrama_de_Solucao/Presentation.pptx
+++ b/DOCs de T.I/Diagrama_de_Solucao/Presentation.pptx
@@ -243,7 +243,7 @@
           <a:p>
             <a:fld id="{2FC3D184-0F2B-4D9D-BDB9-3409F15C70D5}" type="datetimeFigureOut">
               <a:rPr lang="pt-BR" smtClean="0"/>
-              <a:t>13/04/2022</a:t>
+              <a:t>15/04/2022</a:t>
             </a:fld>
             <a:endParaRPr lang="pt-BR"/>
           </a:p>
@@ -413,7 +413,7 @@
           <a:p>
             <a:fld id="{2FC3D184-0F2B-4D9D-BDB9-3409F15C70D5}" type="datetimeFigureOut">
               <a:rPr lang="pt-BR" smtClean="0"/>
-              <a:t>13/04/2022</a:t>
+              <a:t>15/04/2022</a:t>
             </a:fld>
             <a:endParaRPr lang="pt-BR"/>
           </a:p>
@@ -593,7 +593,7 @@
           <a:p>
             <a:fld id="{2FC3D184-0F2B-4D9D-BDB9-3409F15C70D5}" type="datetimeFigureOut">
               <a:rPr lang="pt-BR" smtClean="0"/>
-              <a:t>13/04/2022</a:t>
+              <a:t>15/04/2022</a:t>
             </a:fld>
             <a:endParaRPr lang="pt-BR"/>
           </a:p>
@@ -763,7 +763,7 @@
           <a:p>
             <a:fld id="{2FC3D184-0F2B-4D9D-BDB9-3409F15C70D5}" type="datetimeFigureOut">
               <a:rPr lang="pt-BR" smtClean="0"/>
-              <a:t>13/04/2022</a:t>
+              <a:t>15/04/2022</a:t>
             </a:fld>
             <a:endParaRPr lang="pt-BR"/>
           </a:p>
@@ -1009,7 +1009,7 @@
           <a:p>
             <a:fld id="{2FC3D184-0F2B-4D9D-BDB9-3409F15C70D5}" type="datetimeFigureOut">
               <a:rPr lang="pt-BR" smtClean="0"/>
-              <a:t>13/04/2022</a:t>
+              <a:t>15/04/2022</a:t>
             </a:fld>
             <a:endParaRPr lang="pt-BR"/>
           </a:p>
@@ -1241,7 +1241,7 @@
           <a:p>
             <a:fld id="{2FC3D184-0F2B-4D9D-BDB9-3409F15C70D5}" type="datetimeFigureOut">
               <a:rPr lang="pt-BR" smtClean="0"/>
-              <a:t>13/04/2022</a:t>
+              <a:t>15/04/2022</a:t>
             </a:fld>
             <a:endParaRPr lang="pt-BR"/>
           </a:p>
@@ -1608,7 +1608,7 @@
           <a:p>
             <a:fld id="{2FC3D184-0F2B-4D9D-BDB9-3409F15C70D5}" type="datetimeFigureOut">
               <a:rPr lang="pt-BR" smtClean="0"/>
-              <a:t>13/04/2022</a:t>
+              <a:t>15/04/2022</a:t>
             </a:fld>
             <a:endParaRPr lang="pt-BR"/>
           </a:p>
@@ -1726,7 +1726,7 @@
           <a:p>
             <a:fld id="{2FC3D184-0F2B-4D9D-BDB9-3409F15C70D5}" type="datetimeFigureOut">
               <a:rPr lang="pt-BR" smtClean="0"/>
-              <a:t>13/04/2022</a:t>
+              <a:t>15/04/2022</a:t>
             </a:fld>
             <a:endParaRPr lang="pt-BR"/>
           </a:p>
@@ -1821,7 +1821,7 @@
           <a:p>
             <a:fld id="{2FC3D184-0F2B-4D9D-BDB9-3409F15C70D5}" type="datetimeFigureOut">
               <a:rPr lang="pt-BR" smtClean="0"/>
-              <a:t>13/04/2022</a:t>
+              <a:t>15/04/2022</a:t>
             </a:fld>
             <a:endParaRPr lang="pt-BR"/>
           </a:p>
@@ -2098,7 +2098,7 @@
           <a:p>
             <a:fld id="{2FC3D184-0F2B-4D9D-BDB9-3409F15C70D5}" type="datetimeFigureOut">
               <a:rPr lang="pt-BR" smtClean="0"/>
-              <a:t>13/04/2022</a:t>
+              <a:t>15/04/2022</a:t>
             </a:fld>
             <a:endParaRPr lang="pt-BR"/>
           </a:p>
@@ -2355,7 +2355,7 @@
           <a:p>
             <a:fld id="{2FC3D184-0F2B-4D9D-BDB9-3409F15C70D5}" type="datetimeFigureOut">
               <a:rPr lang="pt-BR" smtClean="0"/>
-              <a:t>13/04/2022</a:t>
+              <a:t>15/04/2022</a:t>
             </a:fld>
             <a:endParaRPr lang="pt-BR"/>
           </a:p>
@@ -2568,7 +2568,7 @@
           <a:p>
             <a:fld id="{2FC3D184-0F2B-4D9D-BDB9-3409F15C70D5}" type="datetimeFigureOut">
               <a:rPr lang="pt-BR" smtClean="0"/>
-              <a:t>13/04/2022</a:t>
+              <a:t>15/04/2022</a:t>
             </a:fld>
             <a:endParaRPr lang="pt-BR"/>
           </a:p>
@@ -3024,163 +3024,73 @@
           </a:p>
         </p:txBody>
       </p:sp>
-      <p:grpSp>
-        <p:nvGrpSpPr>
-          <p:cNvPr id="659" name="legenda">
+      <p:sp>
+        <p:nvSpPr>
+          <p:cNvPr id="658" name="nuvem">
             <a:extLst>
               <a:ext uri="{FF2B5EF4-FFF2-40B4-BE49-F238E27FC236}">
-                <a16:creationId xmlns:a16="http://schemas.microsoft.com/office/drawing/2014/main" id="{1161E2D4-EABB-472B-8E9E-07B54790FC32}"/>
+                <a16:creationId xmlns:a16="http://schemas.microsoft.com/office/drawing/2014/main" id="{882F54C8-6758-4C3C-AF65-6CE9D77F260D}"/>
               </a:ext>
             </a:extLst>
           </p:cNvPr>
-          <p:cNvGrpSpPr>
-            <a:grpSpLocks noGrp="1" noUngrp="1" noRot="1" noMove="1" noResize="1"/>
-          </p:cNvGrpSpPr>
+          <p:cNvSpPr>
+            <a:spLocks noGrp="1" noRot="1" noMove="1" noResize="1" noEditPoints="1" noAdjustHandles="1" noChangeArrowheads="1" noChangeShapeType="1"/>
+          </p:cNvSpPr>
           <p:nvPr/>
-        </p:nvGrpSpPr>
-        <p:grpSpPr>
+        </p:nvSpPr>
+        <p:spPr>
           <a:xfrm>
             <a:off x="4016257" y="-253711"/>
-            <a:ext cx="5584944" cy="5922808"/>
-            <a:chOff x="4016257" y="-253711"/>
-            <a:chExt cx="5584944" cy="5922808"/>
+            <a:ext cx="1520456" cy="520374"/>
           </a:xfrm>
-        </p:grpSpPr>
-        <p:sp>
-          <p:nvSpPr>
-            <p:cNvPr id="657" name="cliente">
-              <a:extLst>
-                <a:ext uri="{FF2B5EF4-FFF2-40B4-BE49-F238E27FC236}">
-                  <a16:creationId xmlns:a16="http://schemas.microsoft.com/office/drawing/2014/main" id="{468B58FE-C63E-42CF-9940-889624C8B670}"/>
-                </a:ext>
-              </a:extLst>
-            </p:cNvPr>
-            <p:cNvSpPr>
-              <a:spLocks noGrp="1" noRot="1" noMove="1" noResize="1" noEditPoints="1" noAdjustHandles="1" noChangeArrowheads="1" noChangeShapeType="1"/>
-            </p:cNvSpPr>
-            <p:nvPr/>
-          </p:nvSpPr>
-          <p:spPr>
-            <a:xfrm>
-              <a:off x="8080745" y="5148723"/>
-              <a:ext cx="1520456" cy="520374"/>
-            </a:xfrm>
-            <a:prstGeom prst="roundRect">
-              <a:avLst/>
-            </a:prstGeom>
-            <a:solidFill>
-              <a:srgbClr val="F56413">
-                <a:alpha val="45098"/>
-              </a:srgbClr>
-            </a:solidFill>
-            <a:ln>
-              <a:noFill/>
-            </a:ln>
-          </p:spPr>
-          <p:style>
-            <a:lnRef idx="2">
-              <a:schemeClr val="accent1">
-                <a:shade val="50000"/>
-              </a:schemeClr>
-            </a:lnRef>
-            <a:fillRef idx="1">
-              <a:schemeClr val="accent1"/>
-            </a:fillRef>
-            <a:effectRef idx="0">
-              <a:schemeClr val="accent1"/>
-            </a:effectRef>
-            <a:fontRef idx="minor">
-              <a:schemeClr val="lt1"/>
-            </a:fontRef>
-          </p:style>
-          <p:txBody>
-            <a:bodyPr rtlCol="0" anchor="ctr"/>
-            <a:lstStyle/>
-            <a:p>
-              <a:pPr algn="ctr"/>
-              <a:r>
-                <a:rPr lang="pt-BR" dirty="0">
-                  <a:latin typeface="Quicksand" panose="00000500000000000000" pitchFamily="2" charset="0"/>
-                </a:rPr>
-                <a:t>CLIENTE</a:t>
-              </a:r>
-            </a:p>
-            <a:p>
-              <a:pPr algn="ctr"/>
-              <a:endParaRPr lang="pt-BR" dirty="0">
+          <a:prstGeom prst="roundRect">
+            <a:avLst/>
+          </a:prstGeom>
+          <a:solidFill>
+            <a:srgbClr val="13C1F7">
+              <a:alpha val="45098"/>
+            </a:srgbClr>
+          </a:solidFill>
+          <a:ln>
+            <a:noFill/>
+          </a:ln>
+        </p:spPr>
+        <p:style>
+          <a:lnRef idx="2">
+            <a:schemeClr val="accent1">
+              <a:shade val="50000"/>
+            </a:schemeClr>
+          </a:lnRef>
+          <a:fillRef idx="1">
+            <a:schemeClr val="accent1"/>
+          </a:fillRef>
+          <a:effectRef idx="0">
+            <a:schemeClr val="accent1"/>
+          </a:effectRef>
+          <a:fontRef idx="minor">
+            <a:schemeClr val="lt1"/>
+          </a:fontRef>
+        </p:style>
+        <p:txBody>
+          <a:bodyPr rtlCol="0" anchor="ctr"/>
+          <a:lstStyle/>
+          <a:p>
+            <a:pPr algn="ctr"/>
+            <a:endParaRPr lang="pt-BR" dirty="0">
+              <a:latin typeface="Quicksand" panose="00000500000000000000" pitchFamily="2" charset="0"/>
+            </a:endParaRPr>
+          </a:p>
+          <a:p>
+            <a:pPr algn="ctr"/>
+            <a:r>
+              <a:rPr lang="pt-BR" dirty="0">
                 <a:latin typeface="Quicksand" panose="00000500000000000000" pitchFamily="2" charset="0"/>
-              </a:endParaRPr>
-            </a:p>
-          </p:txBody>
-        </p:sp>
-        <p:sp>
-          <p:nvSpPr>
-            <p:cNvPr id="658" name="nuvem">
-              <a:extLst>
-                <a:ext uri="{FF2B5EF4-FFF2-40B4-BE49-F238E27FC236}">
-                  <a16:creationId xmlns:a16="http://schemas.microsoft.com/office/drawing/2014/main" id="{882F54C8-6758-4C3C-AF65-6CE9D77F260D}"/>
-                </a:ext>
-              </a:extLst>
-            </p:cNvPr>
-            <p:cNvSpPr>
-              <a:spLocks noGrp="1" noRot="1" noMove="1" noResize="1" noEditPoints="1" noAdjustHandles="1" noChangeArrowheads="1" noChangeShapeType="1"/>
-            </p:cNvSpPr>
-            <p:nvPr/>
-          </p:nvSpPr>
-          <p:spPr>
-            <a:xfrm>
-              <a:off x="4016257" y="-253711"/>
-              <a:ext cx="1520456" cy="520374"/>
-            </a:xfrm>
-            <a:prstGeom prst="roundRect">
-              <a:avLst/>
-            </a:prstGeom>
-            <a:solidFill>
-              <a:srgbClr val="13C1F7">
-                <a:alpha val="45098"/>
-              </a:srgbClr>
-            </a:solidFill>
-            <a:ln>
-              <a:noFill/>
-            </a:ln>
-          </p:spPr>
-          <p:style>
-            <a:lnRef idx="2">
-              <a:schemeClr val="accent1">
-                <a:shade val="50000"/>
-              </a:schemeClr>
-            </a:lnRef>
-            <a:fillRef idx="1">
-              <a:schemeClr val="accent1"/>
-            </a:fillRef>
-            <a:effectRef idx="0">
-              <a:schemeClr val="accent1"/>
-            </a:effectRef>
-            <a:fontRef idx="minor">
-              <a:schemeClr val="lt1"/>
-            </a:fontRef>
-          </p:style>
-          <p:txBody>
-            <a:bodyPr rtlCol="0" anchor="ctr"/>
-            <a:lstStyle/>
-            <a:p>
-              <a:pPr algn="ctr"/>
-              <a:endParaRPr lang="pt-BR" dirty="0">
-                <a:latin typeface="Quicksand" panose="00000500000000000000" pitchFamily="2" charset="0"/>
-              </a:endParaRPr>
-            </a:p>
-            <a:p>
-              <a:pPr algn="ctr"/>
-              <a:r>
-                <a:rPr lang="pt-BR" dirty="0">
-                  <a:latin typeface="Quicksand" panose="00000500000000000000" pitchFamily="2" charset="0"/>
-                </a:rPr>
-                <a:t>NUVEM</a:t>
-              </a:r>
-            </a:p>
-          </p:txBody>
-        </p:sp>
-      </p:grpSp>
+              </a:rPr>
+              <a:t>NUVEM</a:t>
+            </a:r>
+          </a:p>
+        </p:txBody>
+      </p:sp>
       <p:sp>
         <p:nvSpPr>
           <p:cNvPr id="324" name="title">
@@ -3298,1695 +3208,1661 @@
           </a:p>
         </p:txBody>
       </p:sp>
-      <p:sp>
-        <p:nvSpPr>
-          <p:cNvPr id="317" name="info-text1">
+      <p:grpSp>
+        <p:nvGrpSpPr>
+          <p:cNvPr id="560" name="txts">
             <a:extLst>
               <a:ext uri="{FF2B5EF4-FFF2-40B4-BE49-F238E27FC236}">
-                <a16:creationId xmlns:a16="http://schemas.microsoft.com/office/drawing/2014/main" id="{B4226DF4-3AE2-4992-8A26-894CAC58EBA1}"/>
+                <a16:creationId xmlns:a16="http://schemas.microsoft.com/office/drawing/2014/main" id="{2B3182C8-9A71-407A-9930-89D8C3BFD923}"/>
               </a:ext>
             </a:extLst>
           </p:cNvPr>
-          <p:cNvSpPr txBox="1">
-            <a:spLocks/>
-          </p:cNvSpPr>
+          <p:cNvGrpSpPr>
+            <a:grpSpLocks noGrp="1" noUngrp="1" noRot="1" noMove="1" noResize="1"/>
+          </p:cNvGrpSpPr>
           <p:nvPr/>
-        </p:nvSpPr>
-        <p:spPr>
+        </p:nvGrpSpPr>
+        <p:grpSpPr>
           <a:xfrm>
-            <a:off x="6981292" y="234694"/>
-            <a:ext cx="1574599" cy="529889"/>
+            <a:off x="300842" y="330144"/>
+            <a:ext cx="8999516" cy="4919719"/>
+            <a:chOff x="300842" y="330144"/>
+            <a:chExt cx="8999516" cy="4919719"/>
           </a:xfrm>
-          <a:prstGeom prst="rect">
-            <a:avLst/>
-          </a:prstGeom>
-          <a:noFill/>
-          <a:ln w="19050">
-            <a:solidFill>
-              <a:srgbClr val="F56413"/>
-            </a:solidFill>
-          </a:ln>
-        </p:spPr>
-        <p:txBody>
-          <a:bodyPr wrap="square" rtlCol="0">
-            <a:spAutoFit/>
-          </a:bodyPr>
-          <a:lstStyle/>
-          <a:p>
-            <a:pPr marL="101630" indent="-101630">
-              <a:buFont typeface="Arial" panose="020B0604020202020204" pitchFamily="34" charset="0"/>
-              <a:buChar char="•"/>
-            </a:pPr>
-            <a:r>
-              <a:rPr lang="pt-BR" sz="711" b="1" dirty="0">
-                <a:solidFill>
-                  <a:srgbClr val="F56413"/>
-                </a:solidFill>
-                <a:latin typeface="Quicksand" panose="00000500000000000000" pitchFamily="2" charset="0"/>
-              </a:rPr>
-              <a:t>INTEL CORE I5–2400 @2.1GHz</a:t>
-            </a:r>
-          </a:p>
-          <a:p>
-            <a:pPr marL="101630" indent="-101630">
-              <a:buFont typeface="Arial" panose="020B0604020202020204" pitchFamily="34" charset="0"/>
-              <a:buChar char="•"/>
-            </a:pPr>
-            <a:r>
-              <a:rPr lang="pt-BR" sz="711" b="1" dirty="0">
-                <a:solidFill>
-                  <a:srgbClr val="F56413"/>
-                </a:solidFill>
-                <a:latin typeface="Quicksand" panose="00000500000000000000" pitchFamily="2" charset="0"/>
-              </a:rPr>
-              <a:t>8GB RAM</a:t>
-            </a:r>
-          </a:p>
-          <a:p>
-            <a:pPr marL="101630" indent="-101630">
-              <a:buFont typeface="Arial" panose="020B0604020202020204" pitchFamily="34" charset="0"/>
-              <a:buChar char="•"/>
-            </a:pPr>
-            <a:r>
-              <a:rPr lang="pt-BR" sz="711" b="1" dirty="0">
-                <a:solidFill>
-                  <a:srgbClr val="F56413"/>
-                </a:solidFill>
-                <a:latin typeface="Quicksand" panose="00000500000000000000" pitchFamily="2" charset="0"/>
-              </a:rPr>
-              <a:t>SSD/HD 120GB</a:t>
-            </a:r>
-          </a:p>
-          <a:p>
-            <a:pPr marL="101630" indent="-101630">
-              <a:buFont typeface="Arial" panose="020B0604020202020204" pitchFamily="34" charset="0"/>
-              <a:buChar char="•"/>
-            </a:pPr>
-            <a:r>
-              <a:rPr lang="pt-BR" sz="711" b="1" dirty="0">
-                <a:solidFill>
-                  <a:srgbClr val="F56413"/>
-                </a:solidFill>
-                <a:latin typeface="Quicksand" panose="00000500000000000000" pitchFamily="2" charset="0"/>
-              </a:rPr>
-              <a:t>WINDOWS 10</a:t>
-            </a:r>
-          </a:p>
-        </p:txBody>
-      </p:sp>
-      <p:sp>
-        <p:nvSpPr>
-          <p:cNvPr id="315" name="info-text2">
+        </p:grpSpPr>
+        <p:sp>
+          <p:nvSpPr>
+            <p:cNvPr id="317" name="info-text1">
+              <a:extLst>
+                <a:ext uri="{FF2B5EF4-FFF2-40B4-BE49-F238E27FC236}">
+                  <a16:creationId xmlns:a16="http://schemas.microsoft.com/office/drawing/2014/main" id="{B4226DF4-3AE2-4992-8A26-894CAC58EBA1}"/>
+                </a:ext>
+              </a:extLst>
+            </p:cNvPr>
+            <p:cNvSpPr txBox="1">
+              <a:spLocks noGrp="1" noRot="1" noMove="1" noResize="1" noEditPoints="1" noAdjustHandles="1" noChangeArrowheads="1" noChangeShapeType="1"/>
+            </p:cNvSpPr>
+            <p:nvPr/>
+          </p:nvSpPr>
+          <p:spPr>
+            <a:xfrm>
+              <a:off x="7323986" y="4421565"/>
+              <a:ext cx="1574599" cy="529889"/>
+            </a:xfrm>
+            <a:prstGeom prst="rect">
+              <a:avLst/>
+            </a:prstGeom>
+            <a:noFill/>
+            <a:ln w="19050">
+              <a:solidFill>
+                <a:srgbClr val="7030A0"/>
+              </a:solidFill>
+            </a:ln>
+          </p:spPr>
+          <p:txBody>
+            <a:bodyPr wrap="square" rtlCol="0">
+              <a:spAutoFit/>
+            </a:bodyPr>
+            <a:lstStyle/>
+            <a:p>
+              <a:pPr marL="101630" indent="-101630">
+                <a:buFont typeface="Arial" panose="020B0604020202020204" pitchFamily="34" charset="0"/>
+                <a:buChar char="•"/>
+              </a:pPr>
+              <a:r>
+                <a:rPr lang="pt-BR" sz="711" b="1" dirty="0">
+                  <a:solidFill>
+                    <a:srgbClr val="7030A0"/>
+                  </a:solidFill>
+                  <a:latin typeface="Quicksand" panose="00000500000000000000" pitchFamily="2" charset="0"/>
+                </a:rPr>
+                <a:t>INTEL CORE I5–2400 @2.1GHz</a:t>
+              </a:r>
+            </a:p>
+            <a:p>
+              <a:pPr marL="101630" indent="-101630">
+                <a:buFont typeface="Arial" panose="020B0604020202020204" pitchFamily="34" charset="0"/>
+                <a:buChar char="•"/>
+              </a:pPr>
+              <a:r>
+                <a:rPr lang="pt-BR" sz="711" b="1" dirty="0">
+                  <a:solidFill>
+                    <a:srgbClr val="7030A0"/>
+                  </a:solidFill>
+                  <a:latin typeface="Quicksand" panose="00000500000000000000" pitchFamily="2" charset="0"/>
+                </a:rPr>
+                <a:t>8GB RAM</a:t>
+              </a:r>
+            </a:p>
+            <a:p>
+              <a:pPr marL="101630" indent="-101630">
+                <a:buFont typeface="Arial" panose="020B0604020202020204" pitchFamily="34" charset="0"/>
+                <a:buChar char="•"/>
+              </a:pPr>
+              <a:r>
+                <a:rPr lang="pt-BR" sz="711" b="1" dirty="0">
+                  <a:solidFill>
+                    <a:srgbClr val="7030A0"/>
+                  </a:solidFill>
+                  <a:latin typeface="Quicksand" panose="00000500000000000000" pitchFamily="2" charset="0"/>
+                </a:rPr>
+                <a:t>SSD/HD 120GB</a:t>
+              </a:r>
+            </a:p>
+            <a:p>
+              <a:pPr marL="101630" indent="-101630">
+                <a:buFont typeface="Arial" panose="020B0604020202020204" pitchFamily="34" charset="0"/>
+                <a:buChar char="•"/>
+              </a:pPr>
+              <a:r>
+                <a:rPr lang="pt-BR" sz="711" b="1" dirty="0">
+                  <a:solidFill>
+                    <a:srgbClr val="7030A0"/>
+                  </a:solidFill>
+                  <a:latin typeface="Quicksand" panose="00000500000000000000" pitchFamily="2" charset="0"/>
+                </a:rPr>
+                <a:t>WINDOWS 10</a:t>
+              </a:r>
+            </a:p>
+          </p:txBody>
+        </p:sp>
+        <p:sp>
+          <p:nvSpPr>
+            <p:cNvPr id="315" name="info-text2">
+              <a:extLst>
+                <a:ext uri="{FF2B5EF4-FFF2-40B4-BE49-F238E27FC236}">
+                  <a16:creationId xmlns:a16="http://schemas.microsoft.com/office/drawing/2014/main" id="{B8F41526-869A-4CD4-B94C-8F850FE212AF}"/>
+                </a:ext>
+              </a:extLst>
+            </p:cNvPr>
+            <p:cNvSpPr txBox="1">
+              <a:spLocks noGrp="1" noRot="1" noMove="1" noResize="1" noEditPoints="1" noAdjustHandles="1" noChangeArrowheads="1" noChangeShapeType="1"/>
+            </p:cNvSpPr>
+            <p:nvPr/>
+          </p:nvSpPr>
+          <p:spPr>
+            <a:xfrm>
+              <a:off x="5505203" y="375346"/>
+              <a:ext cx="1190884" cy="311111"/>
+            </a:xfrm>
+            <a:prstGeom prst="rect">
+              <a:avLst/>
+            </a:prstGeom>
+            <a:noFill/>
+            <a:ln w="19050">
+              <a:solidFill>
+                <a:srgbClr val="13C1F7"/>
+              </a:solidFill>
+            </a:ln>
+          </p:spPr>
+          <p:txBody>
+            <a:bodyPr wrap="square" rtlCol="0">
+              <a:spAutoFit/>
+            </a:bodyPr>
+            <a:lstStyle/>
+            <a:p>
+              <a:pPr algn="ctr"/>
+              <a:r>
+                <a:rPr lang="pt-BR" sz="711" b="1" dirty="0">
+                  <a:solidFill>
+                    <a:srgbClr val="13C1F7"/>
+                  </a:solidFill>
+                  <a:latin typeface="Quicksand" panose="00000500000000000000" pitchFamily="2" charset="0"/>
+                </a:rPr>
+                <a:t>Banco de Dados</a:t>
+              </a:r>
+            </a:p>
+            <a:p>
+              <a:pPr algn="ctr"/>
+              <a:r>
+                <a:rPr lang="pt-BR" sz="711" b="1" dirty="0">
+                  <a:solidFill>
+                    <a:srgbClr val="13C1F7"/>
+                  </a:solidFill>
+                  <a:latin typeface="Quicksand" panose="00000500000000000000" pitchFamily="2" charset="0"/>
+                </a:rPr>
+                <a:t>Microsoft MYSQL Server</a:t>
+              </a:r>
+            </a:p>
+          </p:txBody>
+        </p:sp>
+        <p:sp>
+          <p:nvSpPr>
+            <p:cNvPr id="318" name="info-text3">
+              <a:extLst>
+                <a:ext uri="{FF2B5EF4-FFF2-40B4-BE49-F238E27FC236}">
+                  <a16:creationId xmlns:a16="http://schemas.microsoft.com/office/drawing/2014/main" id="{E68EE20D-7296-4145-A5CE-51F6D7337A07}"/>
+                </a:ext>
+              </a:extLst>
+            </p:cNvPr>
+            <p:cNvSpPr txBox="1">
+              <a:spLocks noGrp="1" noRot="1" noMove="1" noResize="1" noEditPoints="1" noAdjustHandles="1" noChangeArrowheads="1" noChangeShapeType="1"/>
+            </p:cNvSpPr>
+            <p:nvPr/>
+          </p:nvSpPr>
+          <p:spPr>
+            <a:xfrm>
+              <a:off x="2325141" y="330144"/>
+              <a:ext cx="772570" cy="748666"/>
+            </a:xfrm>
+            <a:prstGeom prst="rect">
+              <a:avLst/>
+            </a:prstGeom>
+            <a:noFill/>
+            <a:ln w="19050">
+              <a:solidFill>
+                <a:srgbClr val="13C1F7"/>
+              </a:solidFill>
+            </a:ln>
+          </p:spPr>
+          <p:txBody>
+            <a:bodyPr wrap="square" rtlCol="0">
+              <a:spAutoFit/>
+            </a:bodyPr>
+            <a:lstStyle/>
+            <a:p>
+              <a:pPr algn="ctr"/>
+              <a:r>
+                <a:rPr lang="pt-BR" sz="711" b="1" dirty="0">
+                  <a:solidFill>
+                    <a:srgbClr val="13C1F7"/>
+                  </a:solidFill>
+                  <a:latin typeface="Quicksand" panose="00000500000000000000" pitchFamily="2" charset="0"/>
+                </a:rPr>
+                <a:t>Tecnologias</a:t>
+              </a:r>
+            </a:p>
+            <a:p>
+              <a:pPr algn="ctr"/>
+              <a:r>
+                <a:rPr lang="pt-BR" sz="711" b="1" dirty="0">
+                  <a:solidFill>
+                    <a:srgbClr val="13C1F7"/>
+                  </a:solidFill>
+                  <a:latin typeface="Quicksand" panose="00000500000000000000" pitchFamily="2" charset="0"/>
+                </a:rPr>
+                <a:t>do</a:t>
+              </a:r>
+            </a:p>
+            <a:p>
+              <a:pPr algn="ctr"/>
+              <a:r>
+                <a:rPr lang="pt-BR" sz="711" b="1" dirty="0">
+                  <a:solidFill>
+                    <a:srgbClr val="13C1F7"/>
+                  </a:solidFill>
+                  <a:latin typeface="Quicksand" panose="00000500000000000000" pitchFamily="2" charset="0"/>
+                </a:rPr>
+                <a:t>Site</a:t>
+              </a:r>
+            </a:p>
+            <a:p>
+              <a:pPr marL="101630" indent="-101630">
+                <a:buFont typeface="Arial" panose="020B0604020202020204" pitchFamily="34" charset="0"/>
+                <a:buChar char="•"/>
+              </a:pPr>
+              <a:r>
+                <a:rPr lang="pt-BR" sz="711" b="1" dirty="0">
+                  <a:solidFill>
+                    <a:srgbClr val="13C1F7"/>
+                  </a:solidFill>
+                  <a:latin typeface="Quicksand" panose="00000500000000000000" pitchFamily="2" charset="0"/>
+                </a:rPr>
+                <a:t>Javascript</a:t>
+              </a:r>
+            </a:p>
+            <a:p>
+              <a:pPr marL="101630" indent="-101630">
+                <a:buFont typeface="Arial" panose="020B0604020202020204" pitchFamily="34" charset="0"/>
+                <a:buChar char="•"/>
+              </a:pPr>
+              <a:r>
+                <a:rPr lang="pt-BR" sz="711" b="1" dirty="0">
+                  <a:solidFill>
+                    <a:srgbClr val="13C1F7"/>
+                  </a:solidFill>
+                  <a:latin typeface="Quicksand" panose="00000500000000000000" pitchFamily="2" charset="0"/>
+                </a:rPr>
+                <a:t>CSS</a:t>
+              </a:r>
+            </a:p>
+            <a:p>
+              <a:pPr marL="101630" indent="-101630">
+                <a:buFont typeface="Arial" panose="020B0604020202020204" pitchFamily="34" charset="0"/>
+                <a:buChar char="•"/>
+              </a:pPr>
+              <a:r>
+                <a:rPr lang="pt-BR" sz="711" b="1" dirty="0">
+                  <a:solidFill>
+                    <a:srgbClr val="13C1F7"/>
+                  </a:solidFill>
+                  <a:latin typeface="Quicksand" panose="00000500000000000000" pitchFamily="2" charset="0"/>
+                </a:rPr>
+                <a:t>HTML</a:t>
+              </a:r>
+            </a:p>
+          </p:txBody>
+        </p:sp>
+        <p:sp>
+          <p:nvSpPr>
+            <p:cNvPr id="319" name="info-text4">
+              <a:extLst>
+                <a:ext uri="{FF2B5EF4-FFF2-40B4-BE49-F238E27FC236}">
+                  <a16:creationId xmlns:a16="http://schemas.microsoft.com/office/drawing/2014/main" id="{8E88B077-85D4-4988-B7B9-0491E64A339A}"/>
+                </a:ext>
+              </a:extLst>
+            </p:cNvPr>
+            <p:cNvSpPr txBox="1">
+              <a:spLocks noGrp="1" noRot="1" noMove="1" noResize="1" noEditPoints="1" noAdjustHandles="1" noChangeArrowheads="1" noChangeShapeType="1"/>
+            </p:cNvSpPr>
+            <p:nvPr/>
+          </p:nvSpPr>
+          <p:spPr>
+            <a:xfrm>
+              <a:off x="4118977" y="3600783"/>
+              <a:ext cx="1315017" cy="311111"/>
+            </a:xfrm>
+            <a:prstGeom prst="rect">
+              <a:avLst/>
+            </a:prstGeom>
+            <a:noFill/>
+            <a:ln w="19050">
+              <a:solidFill>
+                <a:srgbClr val="13C1F7"/>
+              </a:solidFill>
+            </a:ln>
+          </p:spPr>
+          <p:txBody>
+            <a:bodyPr wrap="square" rtlCol="0">
+              <a:spAutoFit/>
+            </a:bodyPr>
+            <a:lstStyle/>
+            <a:p>
+              <a:pPr algn="ctr"/>
+              <a:r>
+                <a:rPr lang="pt-BR" sz="711" b="1" dirty="0">
+                  <a:solidFill>
+                    <a:srgbClr val="13C1F7"/>
+                  </a:solidFill>
+                  <a:latin typeface="Quicksand" panose="00000500000000000000" pitchFamily="2" charset="0"/>
+                </a:rPr>
+                <a:t>Hospedagem em NUVEM</a:t>
+              </a:r>
+            </a:p>
+            <a:p>
+              <a:pPr algn="ctr"/>
+              <a:r>
+                <a:rPr lang="pt-BR" sz="711" b="1" dirty="0">
+                  <a:solidFill>
+                    <a:srgbClr val="13C1F7"/>
+                  </a:solidFill>
+                  <a:latin typeface="Quicksand" panose="00000500000000000000" pitchFamily="2" charset="0"/>
+                </a:rPr>
+                <a:t>(AZURE)</a:t>
+              </a:r>
+            </a:p>
+          </p:txBody>
+        </p:sp>
+        <p:sp>
+          <p:nvSpPr>
+            <p:cNvPr id="320" name="info-text5">
+              <a:extLst>
+                <a:ext uri="{FF2B5EF4-FFF2-40B4-BE49-F238E27FC236}">
+                  <a16:creationId xmlns:a16="http://schemas.microsoft.com/office/drawing/2014/main" id="{8D737546-B6CD-4562-B809-E724C01EAE60}"/>
+                </a:ext>
+              </a:extLst>
+            </p:cNvPr>
+            <p:cNvSpPr txBox="1">
+              <a:spLocks noGrp="1" noRot="1" noMove="1" noResize="1" noEditPoints="1" noAdjustHandles="1" noChangeArrowheads="1" noChangeShapeType="1"/>
+            </p:cNvSpPr>
+            <p:nvPr/>
+          </p:nvSpPr>
+          <p:spPr>
+            <a:xfrm>
+              <a:off x="526343" y="5048141"/>
+              <a:ext cx="586801" cy="201722"/>
+            </a:xfrm>
+            <a:prstGeom prst="rect">
+              <a:avLst/>
+            </a:prstGeom>
+            <a:noFill/>
+            <a:ln w="19050">
+              <a:solidFill>
+                <a:srgbClr val="7030A0"/>
+              </a:solidFill>
+            </a:ln>
+          </p:spPr>
+          <p:txBody>
+            <a:bodyPr wrap="square" rtlCol="0">
+              <a:spAutoFit/>
+            </a:bodyPr>
+            <a:lstStyle/>
+            <a:p>
+              <a:r>
+                <a:rPr lang="pt-BR" sz="711" b="1" dirty="0">
+                  <a:solidFill>
+                    <a:srgbClr val="7030A0"/>
+                  </a:solidFill>
+                  <a:latin typeface="Quicksand" panose="00000500000000000000" pitchFamily="2" charset="0"/>
+                </a:rPr>
+                <a:t>Unidade</a:t>
+              </a:r>
+            </a:p>
+          </p:txBody>
+        </p:sp>
+        <p:sp>
+          <p:nvSpPr>
+            <p:cNvPr id="321" name="info-text6">
+              <a:extLst>
+                <a:ext uri="{FF2B5EF4-FFF2-40B4-BE49-F238E27FC236}">
+                  <a16:creationId xmlns:a16="http://schemas.microsoft.com/office/drawing/2014/main" id="{B595522B-2544-4695-BBA3-3D9B2724361A}"/>
+                </a:ext>
+              </a:extLst>
+            </p:cNvPr>
+            <p:cNvSpPr txBox="1">
+              <a:spLocks noGrp="1" noRot="1" noMove="1" noResize="1" noEditPoints="1" noAdjustHandles="1" noChangeArrowheads="1" noChangeShapeType="1"/>
+            </p:cNvSpPr>
+            <p:nvPr/>
+          </p:nvSpPr>
+          <p:spPr>
+            <a:xfrm>
+              <a:off x="2325873" y="4529719"/>
+              <a:ext cx="513146" cy="311111"/>
+            </a:xfrm>
+            <a:prstGeom prst="rect">
+              <a:avLst/>
+            </a:prstGeom>
+            <a:noFill/>
+            <a:ln w="19050">
+              <a:solidFill>
+                <a:srgbClr val="7030A0"/>
+              </a:solidFill>
+            </a:ln>
+          </p:spPr>
+          <p:txBody>
+            <a:bodyPr wrap="square" rtlCol="0">
+              <a:spAutoFit/>
+            </a:bodyPr>
+            <a:lstStyle/>
+            <a:p>
+              <a:pPr algn="ctr"/>
+              <a:r>
+                <a:rPr lang="pt-BR" sz="711" b="1" dirty="0">
+                  <a:solidFill>
+                    <a:srgbClr val="7030A0"/>
+                  </a:solidFill>
+                  <a:latin typeface="Quicksand" panose="00000500000000000000" pitchFamily="2" charset="0"/>
+                </a:rPr>
+                <a:t>sensor</a:t>
+              </a:r>
+            </a:p>
+            <a:p>
+              <a:pPr algn="ctr"/>
+              <a:r>
+                <a:rPr lang="pt-BR" sz="711" b="1" dirty="0">
+                  <a:solidFill>
+                    <a:srgbClr val="7030A0"/>
+                  </a:solidFill>
+                  <a:latin typeface="Quicksand" panose="00000500000000000000" pitchFamily="2" charset="0"/>
+                </a:rPr>
+                <a:t>(DHT11)</a:t>
+              </a:r>
+            </a:p>
+          </p:txBody>
+        </p:sp>
+        <p:sp>
+          <p:nvSpPr>
+            <p:cNvPr id="322" name="info-text7">
+              <a:extLst>
+                <a:ext uri="{FF2B5EF4-FFF2-40B4-BE49-F238E27FC236}">
+                  <a16:creationId xmlns:a16="http://schemas.microsoft.com/office/drawing/2014/main" id="{74CAF260-E7E1-4BC1-8CCF-4B3DAD2014D5}"/>
+                </a:ext>
+              </a:extLst>
+            </p:cNvPr>
+            <p:cNvSpPr txBox="1">
+              <a:spLocks noGrp="1" noRot="1" noMove="1" noResize="1" noEditPoints="1" noAdjustHandles="1" noChangeArrowheads="1" noChangeShapeType="1"/>
+            </p:cNvSpPr>
+            <p:nvPr/>
+          </p:nvSpPr>
+          <p:spPr>
+            <a:xfrm>
+              <a:off x="1507634" y="4570050"/>
+              <a:ext cx="692338" cy="311111"/>
+            </a:xfrm>
+            <a:prstGeom prst="rect">
+              <a:avLst/>
+            </a:prstGeom>
+            <a:noFill/>
+            <a:ln w="19050">
+              <a:solidFill>
+                <a:srgbClr val="7030A0"/>
+              </a:solidFill>
+            </a:ln>
+          </p:spPr>
+          <p:txBody>
+            <a:bodyPr wrap="square" rtlCol="0">
+              <a:spAutoFit/>
+            </a:bodyPr>
+            <a:lstStyle/>
+            <a:p>
+              <a:pPr algn="ctr"/>
+              <a:r>
+                <a:rPr lang="pt-BR" sz="711" b="1" dirty="0">
+                  <a:solidFill>
+                    <a:srgbClr val="7030A0"/>
+                  </a:solidFill>
+                  <a:latin typeface="Quicksand" panose="00000500000000000000" pitchFamily="2" charset="0"/>
+                </a:rPr>
+                <a:t>protoboard</a:t>
+              </a:r>
+            </a:p>
+            <a:p>
+              <a:pPr algn="ctr"/>
+              <a:r>
+                <a:rPr lang="pt-BR" sz="711" b="1" dirty="0">
+                  <a:solidFill>
+                    <a:srgbClr val="7030A0"/>
+                  </a:solidFill>
+                  <a:latin typeface="Quicksand" panose="00000500000000000000" pitchFamily="2" charset="0"/>
+                </a:rPr>
+                <a:t>(Mini 170)</a:t>
+              </a:r>
+            </a:p>
+          </p:txBody>
+        </p:sp>
+        <p:sp>
+          <p:nvSpPr>
+            <p:cNvPr id="323" name="info-text8">
+              <a:extLst>
+                <a:ext uri="{FF2B5EF4-FFF2-40B4-BE49-F238E27FC236}">
+                  <a16:creationId xmlns:a16="http://schemas.microsoft.com/office/drawing/2014/main" id="{120560DC-27C3-43A3-8742-9A18D7822EDA}"/>
+                </a:ext>
+              </a:extLst>
+            </p:cNvPr>
+            <p:cNvSpPr txBox="1">
+              <a:spLocks noGrp="1" noRot="1" noMove="1" noResize="1" noEditPoints="1" noAdjustHandles="1" noChangeArrowheads="1" noChangeShapeType="1"/>
+            </p:cNvSpPr>
+            <p:nvPr/>
+          </p:nvSpPr>
+          <p:spPr>
+            <a:xfrm>
+              <a:off x="2959924" y="4581265"/>
+              <a:ext cx="595191" cy="311111"/>
+            </a:xfrm>
+            <a:prstGeom prst="rect">
+              <a:avLst/>
+            </a:prstGeom>
+            <a:noFill/>
+            <a:ln w="19050">
+              <a:solidFill>
+                <a:srgbClr val="7030A0"/>
+              </a:solidFill>
+            </a:ln>
+          </p:spPr>
+          <p:txBody>
+            <a:bodyPr wrap="square" rtlCol="0">
+              <a:spAutoFit/>
+            </a:bodyPr>
+            <a:lstStyle/>
+            <a:p>
+              <a:pPr algn="ctr"/>
+              <a:r>
+                <a:rPr lang="pt-BR" sz="711" b="1" dirty="0">
+                  <a:solidFill>
+                    <a:srgbClr val="7030A0"/>
+                  </a:solidFill>
+                  <a:latin typeface="Quicksand" panose="00000500000000000000" pitchFamily="2" charset="0"/>
+                </a:rPr>
+                <a:t>arduíno</a:t>
+              </a:r>
+            </a:p>
+            <a:p>
+              <a:pPr algn="ctr"/>
+              <a:r>
+                <a:rPr lang="pt-BR" sz="711" b="1" dirty="0">
+                  <a:solidFill>
+                    <a:srgbClr val="7030A0"/>
+                  </a:solidFill>
+                  <a:latin typeface="Quicksand" panose="00000500000000000000" pitchFamily="2" charset="0"/>
+                </a:rPr>
+                <a:t>(Uno R3)</a:t>
+              </a:r>
+            </a:p>
+          </p:txBody>
+        </p:sp>
+        <p:sp>
+          <p:nvSpPr>
+            <p:cNvPr id="139" name="info-text10">
+              <a:extLst>
+                <a:ext uri="{FF2B5EF4-FFF2-40B4-BE49-F238E27FC236}">
+                  <a16:creationId xmlns:a16="http://schemas.microsoft.com/office/drawing/2014/main" id="{2F1830D3-1919-48C0-AAB9-8D4D8DF47513}"/>
+                </a:ext>
+              </a:extLst>
+            </p:cNvPr>
+            <p:cNvSpPr txBox="1">
+              <a:spLocks noGrp="1" noRot="1" noMove="1" noResize="1" noEditPoints="1" noAdjustHandles="1" noChangeArrowheads="1" noChangeShapeType="1"/>
+            </p:cNvSpPr>
+            <p:nvPr/>
+          </p:nvSpPr>
+          <p:spPr>
+            <a:xfrm>
+              <a:off x="8325245" y="1590280"/>
+              <a:ext cx="975113" cy="420500"/>
+            </a:xfrm>
+            <a:prstGeom prst="rect">
+              <a:avLst/>
+            </a:prstGeom>
+            <a:noFill/>
+            <a:ln w="19050">
+              <a:solidFill>
+                <a:srgbClr val="7030A0"/>
+              </a:solidFill>
+            </a:ln>
+          </p:spPr>
+          <p:txBody>
+            <a:bodyPr wrap="square" rtlCol="0">
+              <a:spAutoFit/>
+            </a:bodyPr>
+            <a:lstStyle/>
+            <a:p>
+              <a:pPr marL="101630" indent="-101630">
+                <a:buFont typeface="Arial" panose="020B0604020202020204" pitchFamily="34" charset="0"/>
+                <a:buChar char="•"/>
+              </a:pPr>
+              <a:r>
+                <a:rPr lang="pt-BR" sz="711" b="1" dirty="0">
+                  <a:solidFill>
+                    <a:srgbClr val="7030A0"/>
+                  </a:solidFill>
+                  <a:latin typeface="Quicksand" panose="00000500000000000000" pitchFamily="2" charset="0"/>
+                </a:rPr>
+                <a:t>TP-Link Wireless</a:t>
+              </a:r>
+            </a:p>
+            <a:p>
+              <a:pPr marL="101630" indent="-101630">
+                <a:buFont typeface="Arial" panose="020B0604020202020204" pitchFamily="34" charset="0"/>
+                <a:buChar char="•"/>
+              </a:pPr>
+              <a:r>
+                <a:rPr lang="pt-BR" sz="711" b="1" dirty="0">
+                  <a:solidFill>
+                    <a:srgbClr val="7030A0"/>
+                  </a:solidFill>
+                  <a:latin typeface="Quicksand" panose="00000500000000000000" pitchFamily="2" charset="0"/>
+                </a:rPr>
+                <a:t>Archer C50</a:t>
+              </a:r>
+            </a:p>
+            <a:p>
+              <a:pPr marL="101630" indent="-101630">
+                <a:buFont typeface="Arial" panose="020B0604020202020204" pitchFamily="34" charset="0"/>
+                <a:buChar char="•"/>
+              </a:pPr>
+              <a:r>
+                <a:rPr lang="pt-BR" sz="711" b="1" dirty="0">
+                  <a:solidFill>
+                    <a:srgbClr val="7030A0"/>
+                  </a:solidFill>
+                  <a:latin typeface="Quicksand" panose="00000500000000000000" pitchFamily="2" charset="0"/>
+                </a:rPr>
+                <a:t>4 Portas</a:t>
+              </a:r>
+            </a:p>
+          </p:txBody>
+        </p:sp>
+        <p:sp>
+          <p:nvSpPr>
+            <p:cNvPr id="52" name="info-text10">
+              <a:extLst>
+                <a:ext uri="{FF2B5EF4-FFF2-40B4-BE49-F238E27FC236}">
+                  <a16:creationId xmlns:a16="http://schemas.microsoft.com/office/drawing/2014/main" id="{890FF03B-7D69-4862-A128-95309526DD2F}"/>
+                </a:ext>
+              </a:extLst>
+            </p:cNvPr>
+            <p:cNvSpPr txBox="1">
+              <a:spLocks noGrp="1" noRot="1" noMove="1" noResize="1" noEditPoints="1" noAdjustHandles="1" noChangeArrowheads="1" noChangeShapeType="1"/>
+            </p:cNvSpPr>
+            <p:nvPr/>
+          </p:nvSpPr>
+          <p:spPr>
+            <a:xfrm>
+              <a:off x="300842" y="1595890"/>
+              <a:ext cx="975113" cy="420500"/>
+            </a:xfrm>
+            <a:prstGeom prst="rect">
+              <a:avLst/>
+            </a:prstGeom>
+            <a:noFill/>
+            <a:ln w="19050">
+              <a:solidFill>
+                <a:srgbClr val="7030A0"/>
+              </a:solidFill>
+            </a:ln>
+          </p:spPr>
+          <p:txBody>
+            <a:bodyPr wrap="square" rtlCol="0">
+              <a:spAutoFit/>
+            </a:bodyPr>
+            <a:lstStyle/>
+            <a:p>
+              <a:pPr marL="101630" indent="-101630">
+                <a:buFont typeface="Arial" panose="020B0604020202020204" pitchFamily="34" charset="0"/>
+                <a:buChar char="•"/>
+              </a:pPr>
+              <a:r>
+                <a:rPr lang="pt-BR" sz="711" b="1" dirty="0">
+                  <a:solidFill>
+                    <a:srgbClr val="7030A0"/>
+                  </a:solidFill>
+                  <a:latin typeface="Quicksand" panose="00000500000000000000" pitchFamily="2" charset="0"/>
+                </a:rPr>
+                <a:t>TP-Link Wireless</a:t>
+              </a:r>
+            </a:p>
+            <a:p>
+              <a:pPr marL="101630" indent="-101630">
+                <a:buFont typeface="Arial" panose="020B0604020202020204" pitchFamily="34" charset="0"/>
+                <a:buChar char="•"/>
+              </a:pPr>
+              <a:r>
+                <a:rPr lang="pt-BR" sz="711" b="1" dirty="0">
+                  <a:solidFill>
+                    <a:srgbClr val="7030A0"/>
+                  </a:solidFill>
+                  <a:latin typeface="Quicksand" panose="00000500000000000000" pitchFamily="2" charset="0"/>
+                </a:rPr>
+                <a:t>Archer C6</a:t>
+              </a:r>
+            </a:p>
+            <a:p>
+              <a:pPr marL="101630" indent="-101630">
+                <a:buFont typeface="Arial" panose="020B0604020202020204" pitchFamily="34" charset="0"/>
+                <a:buChar char="•"/>
+              </a:pPr>
+              <a:r>
+                <a:rPr lang="pt-BR" sz="711" b="1" dirty="0">
+                  <a:solidFill>
+                    <a:srgbClr val="7030A0"/>
+                  </a:solidFill>
+                  <a:latin typeface="Quicksand" panose="00000500000000000000" pitchFamily="2" charset="0"/>
+                </a:rPr>
+                <a:t>4 Portas</a:t>
+              </a:r>
+            </a:p>
+          </p:txBody>
+        </p:sp>
+        <p:sp>
+          <p:nvSpPr>
+            <p:cNvPr id="143" name="info-text13">
+              <a:extLst>
+                <a:ext uri="{FF2B5EF4-FFF2-40B4-BE49-F238E27FC236}">
+                  <a16:creationId xmlns:a16="http://schemas.microsoft.com/office/drawing/2014/main" id="{8A48FDB2-DECE-438C-9069-6007FB31DAAE}"/>
+                </a:ext>
+              </a:extLst>
+            </p:cNvPr>
+            <p:cNvSpPr txBox="1">
+              <a:spLocks noGrp="1" noRot="1" noMove="1" noResize="1" noEditPoints="1" noAdjustHandles="1" noChangeArrowheads="1" noChangeShapeType="1"/>
+            </p:cNvSpPr>
+            <p:nvPr/>
+          </p:nvSpPr>
+          <p:spPr>
+            <a:xfrm>
+              <a:off x="8047048" y="2957393"/>
+              <a:ext cx="772570" cy="311111"/>
+            </a:xfrm>
+            <a:prstGeom prst="rect">
+              <a:avLst/>
+            </a:prstGeom>
+            <a:noFill/>
+            <a:ln w="19050">
+              <a:solidFill>
+                <a:srgbClr val="7030A0"/>
+              </a:solidFill>
+            </a:ln>
+          </p:spPr>
+          <p:txBody>
+            <a:bodyPr wrap="square" rtlCol="0">
+              <a:spAutoFit/>
+            </a:bodyPr>
+            <a:lstStyle/>
+            <a:p>
+              <a:pPr marL="101630" indent="-101630">
+                <a:buFont typeface="Arial" panose="020B0604020202020204" pitchFamily="34" charset="0"/>
+                <a:buChar char="•"/>
+              </a:pPr>
+              <a:r>
+                <a:rPr lang="pt-BR" sz="711" b="1" dirty="0">
+                  <a:solidFill>
+                    <a:srgbClr val="7030A0"/>
+                  </a:solidFill>
+                  <a:latin typeface="Quicksand" panose="00000500000000000000" pitchFamily="2" charset="0"/>
+                </a:rPr>
+                <a:t>300Mbps</a:t>
+              </a:r>
+            </a:p>
+            <a:p>
+              <a:pPr marL="101630" indent="-101630">
+                <a:buFont typeface="Arial" panose="020B0604020202020204" pitchFamily="34" charset="0"/>
+                <a:buChar char="•"/>
+              </a:pPr>
+              <a:r>
+                <a:rPr lang="pt-BR" sz="711" b="1" dirty="0">
+                  <a:solidFill>
+                    <a:srgbClr val="7030A0"/>
+                  </a:solidFill>
+                  <a:latin typeface="Quicksand" panose="00000500000000000000" pitchFamily="2" charset="0"/>
+                </a:rPr>
+                <a:t>2,4GHz</a:t>
+              </a:r>
+            </a:p>
+          </p:txBody>
+        </p:sp>
+        <p:sp>
+          <p:nvSpPr>
+            <p:cNvPr id="264" name="info-text14">
+              <a:extLst>
+                <a:ext uri="{FF2B5EF4-FFF2-40B4-BE49-F238E27FC236}">
+                  <a16:creationId xmlns:a16="http://schemas.microsoft.com/office/drawing/2014/main" id="{FF136DC3-C674-44FC-B552-554CA00DA44D}"/>
+                </a:ext>
+              </a:extLst>
+            </p:cNvPr>
+            <p:cNvSpPr txBox="1">
+              <a:spLocks noGrp="1" noRot="1" noMove="1" noResize="1" noEditPoints="1" noAdjustHandles="1" noChangeArrowheads="1" noChangeShapeType="1"/>
+            </p:cNvSpPr>
+            <p:nvPr/>
+          </p:nvSpPr>
+          <p:spPr>
+            <a:xfrm>
+              <a:off x="950613" y="2937784"/>
+              <a:ext cx="1379958" cy="529889"/>
+            </a:xfrm>
+            <a:prstGeom prst="rect">
+              <a:avLst/>
+            </a:prstGeom>
+            <a:noFill/>
+            <a:ln w="19050">
+              <a:solidFill>
+                <a:srgbClr val="7030A0"/>
+              </a:solidFill>
+            </a:ln>
+          </p:spPr>
+          <p:txBody>
+            <a:bodyPr wrap="square" rtlCol="0">
+              <a:spAutoFit/>
+            </a:bodyPr>
+            <a:lstStyle/>
+            <a:p>
+              <a:pPr marL="101630" indent="-101630">
+                <a:buFont typeface="Arial" panose="020B0604020202020204" pitchFamily="34" charset="0"/>
+                <a:buChar char="•"/>
+              </a:pPr>
+              <a:r>
+                <a:rPr lang="pt-BR" sz="711" b="1" dirty="0">
+                  <a:solidFill>
+                    <a:srgbClr val="7030A0"/>
+                  </a:solidFill>
+                  <a:latin typeface="Quicksand" panose="00000500000000000000" pitchFamily="2" charset="0"/>
+                </a:rPr>
+                <a:t>PowerEdge T150</a:t>
+              </a:r>
+            </a:p>
+            <a:p>
+              <a:pPr marL="101630" indent="-101630">
+                <a:buFont typeface="Arial" panose="020B0604020202020204" pitchFamily="34" charset="0"/>
+                <a:buChar char="•"/>
+              </a:pPr>
+              <a:r>
+                <a:rPr lang="pt-BR" sz="711" b="1" dirty="0">
+                  <a:solidFill>
+                    <a:srgbClr val="7030A0"/>
+                  </a:solidFill>
+                  <a:latin typeface="Quicksand" panose="00000500000000000000" pitchFamily="2" charset="0"/>
+                </a:rPr>
+                <a:t>Intel Pentium G6405T</a:t>
+              </a:r>
+            </a:p>
+            <a:p>
+              <a:pPr marL="101630" indent="-101630">
+                <a:buFont typeface="Arial" panose="020B0604020202020204" pitchFamily="34" charset="0"/>
+                <a:buChar char="•"/>
+              </a:pPr>
+              <a:r>
+                <a:rPr lang="pt-BR" sz="711" b="1" dirty="0">
+                  <a:solidFill>
+                    <a:srgbClr val="7030A0"/>
+                  </a:solidFill>
+                  <a:latin typeface="Quicksand" panose="00000500000000000000" pitchFamily="2" charset="0"/>
+                </a:rPr>
+                <a:t>8GB RAM DDR4 3200MHz</a:t>
+              </a:r>
+            </a:p>
+            <a:p>
+              <a:pPr marL="101630" indent="-101630">
+                <a:buFont typeface="Arial" panose="020B0604020202020204" pitchFamily="34" charset="0"/>
+                <a:buChar char="•"/>
+              </a:pPr>
+              <a:r>
+                <a:rPr lang="pt-BR" sz="711" b="1" dirty="0">
+                  <a:solidFill>
+                    <a:srgbClr val="7030A0"/>
+                  </a:solidFill>
+                  <a:latin typeface="Quicksand" panose="00000500000000000000" pitchFamily="2" charset="0"/>
+                </a:rPr>
+                <a:t>2TB HD SATA 6Gbps</a:t>
+              </a:r>
+            </a:p>
+          </p:txBody>
+        </p:sp>
+      </p:grpSp>
+      <p:grpSp>
+        <p:nvGrpSpPr>
+          <p:cNvPr id="556" name="imgs">
             <a:extLst>
               <a:ext uri="{FF2B5EF4-FFF2-40B4-BE49-F238E27FC236}">
-                <a16:creationId xmlns:a16="http://schemas.microsoft.com/office/drawing/2014/main" id="{B8F41526-869A-4CD4-B94C-8F850FE212AF}"/>
+                <a16:creationId xmlns:a16="http://schemas.microsoft.com/office/drawing/2014/main" id="{B28EB852-6999-4E0A-B4EE-981B21D99983}"/>
               </a:ext>
             </a:extLst>
           </p:cNvPr>
-          <p:cNvSpPr txBox="1">
-            <a:spLocks/>
-          </p:cNvSpPr>
+          <p:cNvGrpSpPr>
+            <a:grpSpLocks noGrp="1" noUngrp="1" noRot="1" noMove="1" noResize="1"/>
+          </p:cNvGrpSpPr>
           <p:nvPr/>
-        </p:nvSpPr>
-        <p:spPr>
+        </p:nvGrpSpPr>
+        <p:grpSpPr>
           <a:xfrm>
-            <a:off x="5505203" y="375068"/>
-            <a:ext cx="1190884" cy="311111"/>
+            <a:off x="456179" y="26513"/>
+            <a:ext cx="8683521" cy="5226296"/>
+            <a:chOff x="456179" y="26513"/>
+            <a:chExt cx="8683521" cy="5226296"/>
           </a:xfrm>
-          <a:prstGeom prst="rect">
-            <a:avLst/>
-          </a:prstGeom>
-          <a:noFill/>
-          <a:ln w="19050">
-            <a:solidFill>
-              <a:srgbClr val="13C1F7"/>
-            </a:solidFill>
-          </a:ln>
-        </p:spPr>
-        <p:txBody>
-          <a:bodyPr wrap="square" rtlCol="0">
-            <a:spAutoFit/>
-          </a:bodyPr>
-          <a:lstStyle/>
-          <a:p>
-            <a:pPr algn="ctr"/>
-            <a:r>
-              <a:rPr lang="pt-BR" sz="711" b="1" dirty="0">
-                <a:solidFill>
-                  <a:srgbClr val="13C1F7"/>
-                </a:solidFill>
-                <a:latin typeface="Quicksand" panose="00000500000000000000" pitchFamily="2" charset="0"/>
-              </a:rPr>
-              <a:t>Banco de Dados</a:t>
-            </a:r>
-          </a:p>
-          <a:p>
-            <a:pPr algn="ctr"/>
-            <a:r>
-              <a:rPr lang="pt-BR" sz="711" b="1" dirty="0">
-                <a:solidFill>
-                  <a:srgbClr val="13C1F7"/>
-                </a:solidFill>
-                <a:latin typeface="Quicksand" panose="00000500000000000000" pitchFamily="2" charset="0"/>
-              </a:rPr>
-              <a:t>Microsoft MYSQL Server</a:t>
-            </a:r>
-          </a:p>
-        </p:txBody>
-      </p:sp>
-      <p:sp>
-        <p:nvSpPr>
-          <p:cNvPr id="318" name="info-text3">
-            <a:extLst>
-              <a:ext uri="{FF2B5EF4-FFF2-40B4-BE49-F238E27FC236}">
-                <a16:creationId xmlns:a16="http://schemas.microsoft.com/office/drawing/2014/main" id="{E68EE20D-7296-4145-A5CE-51F6D7337A07}"/>
-              </a:ext>
-            </a:extLst>
-          </p:cNvPr>
-          <p:cNvSpPr txBox="1">
-            <a:spLocks/>
-          </p:cNvSpPr>
-          <p:nvPr/>
-        </p:nvSpPr>
-        <p:spPr>
-          <a:xfrm>
-            <a:off x="2325141" y="329866"/>
-            <a:ext cx="772570" cy="748666"/>
-          </a:xfrm>
-          <a:prstGeom prst="rect">
-            <a:avLst/>
-          </a:prstGeom>
-          <a:noFill/>
-          <a:ln w="19050">
-            <a:solidFill>
-              <a:srgbClr val="13C1F7"/>
-            </a:solidFill>
-          </a:ln>
-        </p:spPr>
-        <p:txBody>
-          <a:bodyPr wrap="square" rtlCol="0">
-            <a:spAutoFit/>
-          </a:bodyPr>
-          <a:lstStyle/>
-          <a:p>
-            <a:pPr algn="ctr"/>
-            <a:r>
-              <a:rPr lang="pt-BR" sz="711" b="1" dirty="0">
-                <a:solidFill>
-                  <a:srgbClr val="13C1F7"/>
-                </a:solidFill>
-                <a:latin typeface="Quicksand" panose="00000500000000000000" pitchFamily="2" charset="0"/>
-              </a:rPr>
-              <a:t>Tecnologias</a:t>
-            </a:r>
-          </a:p>
-          <a:p>
-            <a:pPr algn="ctr"/>
-            <a:r>
-              <a:rPr lang="pt-BR" sz="711" b="1" dirty="0">
-                <a:solidFill>
-                  <a:srgbClr val="13C1F7"/>
-                </a:solidFill>
-                <a:latin typeface="Quicksand" panose="00000500000000000000" pitchFamily="2" charset="0"/>
-              </a:rPr>
-              <a:t>do</a:t>
-            </a:r>
-          </a:p>
-          <a:p>
-            <a:pPr algn="ctr"/>
-            <a:r>
-              <a:rPr lang="pt-BR" sz="711" b="1" dirty="0">
-                <a:solidFill>
-                  <a:srgbClr val="13C1F7"/>
-                </a:solidFill>
-                <a:latin typeface="Quicksand" panose="00000500000000000000" pitchFamily="2" charset="0"/>
-              </a:rPr>
-              <a:t>Site</a:t>
-            </a:r>
-          </a:p>
-          <a:p>
-            <a:pPr marL="101630" indent="-101630">
-              <a:buFont typeface="Arial" panose="020B0604020202020204" pitchFamily="34" charset="0"/>
-              <a:buChar char="•"/>
-            </a:pPr>
-            <a:r>
-              <a:rPr lang="pt-BR" sz="711" b="1" dirty="0">
-                <a:solidFill>
-                  <a:srgbClr val="13C1F7"/>
-                </a:solidFill>
-                <a:latin typeface="Quicksand" panose="00000500000000000000" pitchFamily="2" charset="0"/>
-              </a:rPr>
-              <a:t>Javascript</a:t>
-            </a:r>
-          </a:p>
-          <a:p>
-            <a:pPr marL="101630" indent="-101630">
-              <a:buFont typeface="Arial" panose="020B0604020202020204" pitchFamily="34" charset="0"/>
-              <a:buChar char="•"/>
-            </a:pPr>
-            <a:r>
-              <a:rPr lang="pt-BR" sz="711" b="1" dirty="0">
-                <a:solidFill>
-                  <a:srgbClr val="13C1F7"/>
-                </a:solidFill>
-                <a:latin typeface="Quicksand" panose="00000500000000000000" pitchFamily="2" charset="0"/>
-              </a:rPr>
-              <a:t>CSS</a:t>
-            </a:r>
-          </a:p>
-          <a:p>
-            <a:pPr marL="101630" indent="-101630">
-              <a:buFont typeface="Arial" panose="020B0604020202020204" pitchFamily="34" charset="0"/>
-              <a:buChar char="•"/>
-            </a:pPr>
-            <a:r>
-              <a:rPr lang="pt-BR" sz="711" b="1" dirty="0">
-                <a:solidFill>
-                  <a:srgbClr val="13C1F7"/>
-                </a:solidFill>
-                <a:latin typeface="Quicksand" panose="00000500000000000000" pitchFamily="2" charset="0"/>
-              </a:rPr>
-              <a:t>HTML</a:t>
-            </a:r>
-          </a:p>
-        </p:txBody>
-      </p:sp>
-      <p:sp>
-        <p:nvSpPr>
-          <p:cNvPr id="319" name="info-text4">
-            <a:extLst>
-              <a:ext uri="{FF2B5EF4-FFF2-40B4-BE49-F238E27FC236}">
-                <a16:creationId xmlns:a16="http://schemas.microsoft.com/office/drawing/2014/main" id="{8E88B077-85D4-4988-B7B9-0491E64A339A}"/>
-              </a:ext>
-            </a:extLst>
-          </p:cNvPr>
-          <p:cNvSpPr txBox="1">
-            <a:spLocks/>
-          </p:cNvSpPr>
-          <p:nvPr/>
-        </p:nvSpPr>
-        <p:spPr>
-          <a:xfrm>
-            <a:off x="4118977" y="3600505"/>
-            <a:ext cx="1315017" cy="311111"/>
-          </a:xfrm>
-          <a:prstGeom prst="rect">
-            <a:avLst/>
-          </a:prstGeom>
-          <a:noFill/>
-          <a:ln w="19050">
-            <a:solidFill>
-              <a:srgbClr val="13C1F7"/>
-            </a:solidFill>
-          </a:ln>
-        </p:spPr>
-        <p:txBody>
-          <a:bodyPr wrap="square" rtlCol="0">
-            <a:spAutoFit/>
-          </a:bodyPr>
-          <a:lstStyle/>
-          <a:p>
-            <a:pPr algn="ctr"/>
-            <a:r>
-              <a:rPr lang="pt-BR" sz="711" b="1" dirty="0">
-                <a:solidFill>
-                  <a:srgbClr val="13C1F7"/>
-                </a:solidFill>
-                <a:latin typeface="Quicksand" panose="00000500000000000000" pitchFamily="2" charset="0"/>
-              </a:rPr>
-              <a:t>Hospedagem em NUVEM</a:t>
-            </a:r>
-          </a:p>
-          <a:p>
-            <a:pPr algn="ctr"/>
-            <a:r>
-              <a:rPr lang="pt-BR" sz="711" b="1" dirty="0">
-                <a:solidFill>
-                  <a:srgbClr val="13C1F7"/>
-                </a:solidFill>
-                <a:latin typeface="Quicksand" panose="00000500000000000000" pitchFamily="2" charset="0"/>
-              </a:rPr>
-              <a:t>(AZURE)</a:t>
-            </a:r>
-          </a:p>
-        </p:txBody>
-      </p:sp>
-      <p:sp>
-        <p:nvSpPr>
-          <p:cNvPr id="320" name="info-text5">
-            <a:extLst>
-              <a:ext uri="{FF2B5EF4-FFF2-40B4-BE49-F238E27FC236}">
-                <a16:creationId xmlns:a16="http://schemas.microsoft.com/office/drawing/2014/main" id="{8D737546-B6CD-4562-B809-E724C01EAE60}"/>
-              </a:ext>
-            </a:extLst>
-          </p:cNvPr>
-          <p:cNvSpPr txBox="1">
-            <a:spLocks/>
-          </p:cNvSpPr>
-          <p:nvPr/>
-        </p:nvSpPr>
-        <p:spPr>
-          <a:xfrm>
-            <a:off x="326104" y="5047862"/>
-            <a:ext cx="586801" cy="201722"/>
-          </a:xfrm>
-          <a:prstGeom prst="rect">
-            <a:avLst/>
-          </a:prstGeom>
-          <a:noFill/>
-          <a:ln w="19050">
-            <a:solidFill>
-              <a:srgbClr val="F56413"/>
-            </a:solidFill>
-          </a:ln>
-        </p:spPr>
-        <p:txBody>
-          <a:bodyPr wrap="square" rtlCol="0">
-            <a:spAutoFit/>
-          </a:bodyPr>
-          <a:lstStyle/>
-          <a:p>
-            <a:r>
-              <a:rPr lang="pt-BR" sz="711" b="1" dirty="0">
-                <a:solidFill>
-                  <a:srgbClr val="F56413"/>
-                </a:solidFill>
-                <a:latin typeface="Quicksand" panose="00000500000000000000" pitchFamily="2" charset="0"/>
-              </a:rPr>
-              <a:t>Unidade</a:t>
-            </a:r>
-          </a:p>
-        </p:txBody>
-      </p:sp>
-      <p:sp>
-        <p:nvSpPr>
-          <p:cNvPr id="321" name="info-text6">
-            <a:extLst>
-              <a:ext uri="{FF2B5EF4-FFF2-40B4-BE49-F238E27FC236}">
-                <a16:creationId xmlns:a16="http://schemas.microsoft.com/office/drawing/2014/main" id="{B595522B-2544-4695-BBA3-3D9B2724361A}"/>
-              </a:ext>
-            </a:extLst>
-          </p:cNvPr>
-          <p:cNvSpPr txBox="1">
-            <a:spLocks/>
-          </p:cNvSpPr>
-          <p:nvPr/>
-        </p:nvSpPr>
-        <p:spPr>
-          <a:xfrm>
-            <a:off x="2800265" y="4849476"/>
-            <a:ext cx="513146" cy="311111"/>
-          </a:xfrm>
-          <a:prstGeom prst="rect">
-            <a:avLst/>
-          </a:prstGeom>
-          <a:noFill/>
-          <a:ln w="19050">
-            <a:solidFill>
-              <a:srgbClr val="F56413"/>
-            </a:solidFill>
-          </a:ln>
-        </p:spPr>
-        <p:txBody>
-          <a:bodyPr wrap="square" rtlCol="0">
-            <a:spAutoFit/>
-          </a:bodyPr>
-          <a:lstStyle/>
-          <a:p>
-            <a:pPr algn="ctr"/>
-            <a:r>
-              <a:rPr lang="pt-BR" sz="711" b="1" dirty="0">
-                <a:solidFill>
-                  <a:srgbClr val="F56413"/>
-                </a:solidFill>
-                <a:latin typeface="Quicksand" panose="00000500000000000000" pitchFamily="2" charset="0"/>
-              </a:rPr>
-              <a:t>sensor</a:t>
-            </a:r>
-          </a:p>
-          <a:p>
-            <a:pPr algn="ctr"/>
-            <a:r>
-              <a:rPr lang="pt-BR" sz="711" b="1" dirty="0">
-                <a:solidFill>
-                  <a:srgbClr val="F56413"/>
-                </a:solidFill>
-                <a:latin typeface="Quicksand" panose="00000500000000000000" pitchFamily="2" charset="0"/>
-              </a:rPr>
-              <a:t>(DHT11)</a:t>
-            </a:r>
-          </a:p>
-        </p:txBody>
-      </p:sp>
-      <p:sp>
-        <p:nvSpPr>
-          <p:cNvPr id="322" name="info-text7">
-            <a:extLst>
-              <a:ext uri="{FF2B5EF4-FFF2-40B4-BE49-F238E27FC236}">
-                <a16:creationId xmlns:a16="http://schemas.microsoft.com/office/drawing/2014/main" id="{74CAF260-E7E1-4BC1-8CCF-4B3DAD2014D5}"/>
-              </a:ext>
-            </a:extLst>
-          </p:cNvPr>
-          <p:cNvSpPr txBox="1">
-            <a:spLocks/>
-          </p:cNvSpPr>
-          <p:nvPr/>
-        </p:nvSpPr>
-        <p:spPr>
-          <a:xfrm>
-            <a:off x="1749237" y="4849476"/>
-            <a:ext cx="660636" cy="420500"/>
-          </a:xfrm>
-          <a:prstGeom prst="rect">
-            <a:avLst/>
-          </a:prstGeom>
-          <a:noFill/>
-          <a:ln w="19050">
-            <a:solidFill>
-              <a:srgbClr val="F56413"/>
-            </a:solidFill>
-          </a:ln>
-        </p:spPr>
-        <p:txBody>
-          <a:bodyPr wrap="square" rtlCol="0">
-            <a:spAutoFit/>
-          </a:bodyPr>
-          <a:lstStyle/>
-          <a:p>
-            <a:pPr algn="ctr"/>
-            <a:r>
-              <a:rPr lang="pt-BR" sz="711" b="1" dirty="0">
-                <a:solidFill>
-                  <a:srgbClr val="F56413"/>
-                </a:solidFill>
-                <a:latin typeface="Quicksand" panose="00000500000000000000" pitchFamily="2" charset="0"/>
-              </a:rPr>
-              <a:t>protoboard</a:t>
-            </a:r>
-          </a:p>
-          <a:p>
-            <a:pPr algn="ctr"/>
-            <a:r>
-              <a:rPr lang="pt-BR" sz="711" b="1" dirty="0">
-                <a:solidFill>
-                  <a:srgbClr val="F56413"/>
-                </a:solidFill>
-                <a:latin typeface="Quicksand" panose="00000500000000000000" pitchFamily="2" charset="0"/>
-              </a:rPr>
-              <a:t>(Mini 170)</a:t>
-            </a:r>
-          </a:p>
-        </p:txBody>
-      </p:sp>
-      <p:sp>
-        <p:nvSpPr>
-          <p:cNvPr id="323" name="info-text8">
-            <a:extLst>
-              <a:ext uri="{FF2B5EF4-FFF2-40B4-BE49-F238E27FC236}">
-                <a16:creationId xmlns:a16="http://schemas.microsoft.com/office/drawing/2014/main" id="{120560DC-27C3-43A3-8742-9A18D7822EDA}"/>
-              </a:ext>
-            </a:extLst>
-          </p:cNvPr>
-          <p:cNvSpPr txBox="1">
-            <a:spLocks/>
-          </p:cNvSpPr>
-          <p:nvPr/>
-        </p:nvSpPr>
-        <p:spPr>
-          <a:xfrm>
-            <a:off x="3710835" y="4842792"/>
-            <a:ext cx="595191" cy="311111"/>
-          </a:xfrm>
-          <a:prstGeom prst="rect">
-            <a:avLst/>
-          </a:prstGeom>
-          <a:noFill/>
-          <a:ln w="19050">
-            <a:solidFill>
-              <a:srgbClr val="F56413"/>
-            </a:solidFill>
-          </a:ln>
-        </p:spPr>
-        <p:txBody>
-          <a:bodyPr wrap="square" rtlCol="0">
-            <a:spAutoFit/>
-          </a:bodyPr>
-          <a:lstStyle/>
-          <a:p>
-            <a:pPr algn="ctr"/>
-            <a:r>
-              <a:rPr lang="pt-BR" sz="711" b="1" dirty="0" err="1">
-                <a:solidFill>
-                  <a:srgbClr val="F56413"/>
-                </a:solidFill>
-                <a:latin typeface="Quicksand" panose="00000500000000000000" pitchFamily="2" charset="0"/>
-              </a:rPr>
-              <a:t>arduíno</a:t>
-            </a:r>
-            <a:endParaRPr lang="pt-BR" sz="711" b="1" dirty="0">
-              <a:solidFill>
-                <a:srgbClr val="F56413"/>
-              </a:solidFill>
-              <a:latin typeface="Quicksand" panose="00000500000000000000" pitchFamily="2" charset="0"/>
-            </a:endParaRPr>
-          </a:p>
-          <a:p>
-            <a:pPr algn="ctr"/>
-            <a:r>
-              <a:rPr lang="pt-BR" sz="711" b="1" dirty="0">
-                <a:solidFill>
-                  <a:srgbClr val="F56413"/>
-                </a:solidFill>
-                <a:latin typeface="Quicksand" panose="00000500000000000000" pitchFamily="2" charset="0"/>
-              </a:rPr>
-              <a:t>(Uno R3)</a:t>
-            </a:r>
-          </a:p>
-        </p:txBody>
-      </p:sp>
-      <p:sp>
-        <p:nvSpPr>
-          <p:cNvPr id="139" name="info-text10">
-            <a:extLst>
-              <a:ext uri="{FF2B5EF4-FFF2-40B4-BE49-F238E27FC236}">
-                <a16:creationId xmlns:a16="http://schemas.microsoft.com/office/drawing/2014/main" id="{2F1830D3-1919-48C0-AAB9-8D4D8DF47513}"/>
-              </a:ext>
-            </a:extLst>
-          </p:cNvPr>
-          <p:cNvSpPr txBox="1">
-            <a:spLocks/>
-          </p:cNvSpPr>
-          <p:nvPr/>
-        </p:nvSpPr>
-        <p:spPr>
-          <a:xfrm>
-            <a:off x="8616860" y="2291058"/>
-            <a:ext cx="975113" cy="420500"/>
-          </a:xfrm>
-          <a:prstGeom prst="rect">
-            <a:avLst/>
-          </a:prstGeom>
-          <a:noFill/>
-          <a:ln w="19050">
-            <a:solidFill>
-              <a:srgbClr val="F56413"/>
-            </a:solidFill>
-          </a:ln>
-        </p:spPr>
-        <p:txBody>
-          <a:bodyPr wrap="square" rtlCol="0">
-            <a:spAutoFit/>
-          </a:bodyPr>
-          <a:lstStyle/>
-          <a:p>
-            <a:pPr marL="101630" indent="-101630">
-              <a:buFont typeface="Arial" panose="020B0604020202020204" pitchFamily="34" charset="0"/>
-              <a:buChar char="•"/>
-            </a:pPr>
-            <a:r>
-              <a:rPr lang="pt-BR" sz="711" b="1" dirty="0">
-                <a:solidFill>
-                  <a:srgbClr val="F56413"/>
-                </a:solidFill>
-                <a:latin typeface="Quicksand" panose="00000500000000000000" pitchFamily="2" charset="0"/>
-              </a:rPr>
-              <a:t>TP-Link Wireless</a:t>
-            </a:r>
-          </a:p>
-          <a:p>
-            <a:pPr marL="101630" indent="-101630">
-              <a:buFont typeface="Arial" panose="020B0604020202020204" pitchFamily="34" charset="0"/>
-              <a:buChar char="•"/>
-            </a:pPr>
-            <a:r>
-              <a:rPr lang="pt-BR" sz="711" b="1" dirty="0">
-                <a:solidFill>
-                  <a:srgbClr val="F56413"/>
-                </a:solidFill>
-                <a:latin typeface="Quicksand" panose="00000500000000000000" pitchFamily="2" charset="0"/>
-              </a:rPr>
-              <a:t>Archer C50</a:t>
-            </a:r>
-          </a:p>
-          <a:p>
-            <a:pPr marL="101630" indent="-101630">
-              <a:buFont typeface="Arial" panose="020B0604020202020204" pitchFamily="34" charset="0"/>
-              <a:buChar char="•"/>
-            </a:pPr>
-            <a:r>
-              <a:rPr lang="pt-BR" sz="711" b="1" dirty="0">
-                <a:solidFill>
-                  <a:srgbClr val="F56413"/>
-                </a:solidFill>
-                <a:latin typeface="Quicksand" panose="00000500000000000000" pitchFamily="2" charset="0"/>
-              </a:rPr>
-              <a:t>4 Portas</a:t>
-            </a:r>
-          </a:p>
-        </p:txBody>
-      </p:sp>
-      <p:sp>
-        <p:nvSpPr>
-          <p:cNvPr id="143" name="info-text13">
-            <a:extLst>
-              <a:ext uri="{FF2B5EF4-FFF2-40B4-BE49-F238E27FC236}">
-                <a16:creationId xmlns:a16="http://schemas.microsoft.com/office/drawing/2014/main" id="{8A48FDB2-DECE-438C-9069-6007FB31DAAE}"/>
-              </a:ext>
-            </a:extLst>
-          </p:cNvPr>
-          <p:cNvSpPr txBox="1">
-            <a:spLocks/>
-          </p:cNvSpPr>
-          <p:nvPr/>
-        </p:nvSpPr>
-        <p:spPr>
-          <a:xfrm>
-            <a:off x="7702489" y="1792731"/>
-            <a:ext cx="772570" cy="311111"/>
-          </a:xfrm>
-          <a:prstGeom prst="rect">
-            <a:avLst/>
-          </a:prstGeom>
-          <a:noFill/>
-          <a:ln w="19050">
-            <a:solidFill>
-              <a:srgbClr val="F56413"/>
-            </a:solidFill>
-          </a:ln>
-        </p:spPr>
-        <p:txBody>
-          <a:bodyPr wrap="square" rtlCol="0">
-            <a:spAutoFit/>
-          </a:bodyPr>
-          <a:lstStyle/>
-          <a:p>
-            <a:pPr marL="101630" indent="-101630">
-              <a:buFont typeface="Arial" panose="020B0604020202020204" pitchFamily="34" charset="0"/>
-              <a:buChar char="•"/>
-            </a:pPr>
-            <a:r>
-              <a:rPr lang="pt-BR" sz="711" b="1" dirty="0">
-                <a:solidFill>
-                  <a:srgbClr val="F56413"/>
-                </a:solidFill>
-                <a:latin typeface="Quicksand" panose="00000500000000000000" pitchFamily="2" charset="0"/>
-              </a:rPr>
-              <a:t>300Mbps</a:t>
-            </a:r>
-          </a:p>
-          <a:p>
-            <a:pPr marL="101630" indent="-101630">
-              <a:buFont typeface="Arial" panose="020B0604020202020204" pitchFamily="34" charset="0"/>
-              <a:buChar char="•"/>
-            </a:pPr>
-            <a:r>
-              <a:rPr lang="pt-BR" sz="711" b="1" dirty="0">
-                <a:solidFill>
-                  <a:srgbClr val="F56413"/>
-                </a:solidFill>
-                <a:latin typeface="Quicksand" panose="00000500000000000000" pitchFamily="2" charset="0"/>
-              </a:rPr>
-              <a:t>2,4GHz</a:t>
-            </a:r>
-          </a:p>
-        </p:txBody>
-      </p:sp>
-      <p:sp>
-        <p:nvSpPr>
-          <p:cNvPr id="264" name="info-text14">
-            <a:extLst>
-              <a:ext uri="{FF2B5EF4-FFF2-40B4-BE49-F238E27FC236}">
-                <a16:creationId xmlns:a16="http://schemas.microsoft.com/office/drawing/2014/main" id="{FF136DC3-C674-44FC-B552-554CA00DA44D}"/>
-              </a:ext>
-            </a:extLst>
-          </p:cNvPr>
-          <p:cNvSpPr txBox="1">
-            <a:spLocks/>
-          </p:cNvSpPr>
-          <p:nvPr/>
-        </p:nvSpPr>
-        <p:spPr>
-          <a:xfrm>
-            <a:off x="750376" y="2987183"/>
-            <a:ext cx="1379958" cy="529889"/>
-          </a:xfrm>
-          <a:prstGeom prst="rect">
-            <a:avLst/>
-          </a:prstGeom>
-          <a:noFill/>
-          <a:ln w="19050">
-            <a:solidFill>
-              <a:srgbClr val="F56413"/>
-            </a:solidFill>
-          </a:ln>
-        </p:spPr>
-        <p:txBody>
-          <a:bodyPr wrap="square" rtlCol="0">
-            <a:spAutoFit/>
-          </a:bodyPr>
-          <a:lstStyle/>
-          <a:p>
-            <a:pPr marL="101630" indent="-101630">
-              <a:buFont typeface="Arial" panose="020B0604020202020204" pitchFamily="34" charset="0"/>
-              <a:buChar char="•"/>
-            </a:pPr>
-            <a:r>
-              <a:rPr lang="pt-BR" sz="711" b="1" dirty="0" err="1">
-                <a:solidFill>
-                  <a:srgbClr val="F56413"/>
-                </a:solidFill>
-                <a:latin typeface="Quicksand" panose="00000500000000000000" pitchFamily="2" charset="0"/>
-              </a:rPr>
-              <a:t>PowerEdge</a:t>
-            </a:r>
-            <a:r>
-              <a:rPr lang="pt-BR" sz="711" b="1" dirty="0">
-                <a:solidFill>
-                  <a:srgbClr val="F56413"/>
-                </a:solidFill>
-                <a:latin typeface="Quicksand" panose="00000500000000000000" pitchFamily="2" charset="0"/>
-              </a:rPr>
-              <a:t> T150</a:t>
-            </a:r>
-          </a:p>
-          <a:p>
-            <a:pPr marL="101630" indent="-101630">
-              <a:buFont typeface="Arial" panose="020B0604020202020204" pitchFamily="34" charset="0"/>
-              <a:buChar char="•"/>
-            </a:pPr>
-            <a:r>
-              <a:rPr lang="pt-BR" sz="711" b="1" dirty="0">
-                <a:solidFill>
-                  <a:srgbClr val="F56413"/>
-                </a:solidFill>
-                <a:latin typeface="Quicksand" panose="00000500000000000000" pitchFamily="2" charset="0"/>
-              </a:rPr>
-              <a:t>Intel Pentium G6405T</a:t>
-            </a:r>
-          </a:p>
-          <a:p>
-            <a:pPr marL="101630" indent="-101630">
-              <a:buFont typeface="Arial" panose="020B0604020202020204" pitchFamily="34" charset="0"/>
-              <a:buChar char="•"/>
-            </a:pPr>
-            <a:r>
-              <a:rPr lang="pt-BR" sz="711" b="1" dirty="0">
-                <a:solidFill>
-                  <a:srgbClr val="F56413"/>
-                </a:solidFill>
-                <a:latin typeface="Quicksand" panose="00000500000000000000" pitchFamily="2" charset="0"/>
-              </a:rPr>
-              <a:t>8GB RAM DDR4 3200MHz</a:t>
-            </a:r>
-          </a:p>
-          <a:p>
-            <a:pPr marL="101630" indent="-101630">
-              <a:buFont typeface="Arial" panose="020B0604020202020204" pitchFamily="34" charset="0"/>
-              <a:buChar char="•"/>
-            </a:pPr>
-            <a:r>
-              <a:rPr lang="pt-BR" sz="711" b="1" dirty="0">
-                <a:solidFill>
-                  <a:srgbClr val="F56413"/>
-                </a:solidFill>
-                <a:latin typeface="Quicksand" panose="00000500000000000000" pitchFamily="2" charset="0"/>
-              </a:rPr>
-              <a:t>2TB HD SATA 6Gbps</a:t>
-            </a:r>
-          </a:p>
-        </p:txBody>
-      </p:sp>
-      <p:pic>
-        <p:nvPicPr>
-          <p:cNvPr id="92" name="NUVEM" descr="Ícone&#10;&#10;Descrição gerada automaticamente">
-            <a:extLst>
-              <a:ext uri="{FF2B5EF4-FFF2-40B4-BE49-F238E27FC236}">
-                <a16:creationId xmlns:a16="http://schemas.microsoft.com/office/drawing/2014/main" id="{83D92FD9-FE57-4048-8DCC-AAC6A5187F31}"/>
-              </a:ext>
-            </a:extLst>
-          </p:cNvPr>
-          <p:cNvPicPr>
-            <a:picLocks noChangeAspect="1"/>
-          </p:cNvPicPr>
-          <p:nvPr/>
-        </p:nvPicPr>
-        <p:blipFill>
-          <a:blip r:embed="rId2">
-            <a:extLst>
-              <a:ext uri="{28A0092B-C50C-407E-A947-70E740481C1C}">
-                <a14:useLocalDpi xmlns:a14="http://schemas.microsoft.com/office/drawing/2010/main" val="0"/>
-              </a:ext>
-            </a:extLst>
-          </a:blip>
-          <a:stretch>
-            <a:fillRect/>
-          </a:stretch>
-        </p:blipFill>
-        <p:spPr>
-          <a:xfrm>
-            <a:off x="4260666" y="2504736"/>
-            <a:ext cx="1066941" cy="1066942"/>
-          </a:xfrm>
-          <a:prstGeom prst="rect">
-            <a:avLst/>
-          </a:prstGeom>
-        </p:spPr>
-      </p:pic>
-      <p:pic>
-        <p:nvPicPr>
-          <p:cNvPr id="54" name="azure logo" descr="Forma&#10;&#10;Descrição gerada automaticamente com confiança baixa">
-            <a:extLst>
-              <a:ext uri="{FF2B5EF4-FFF2-40B4-BE49-F238E27FC236}">
-                <a16:creationId xmlns:a16="http://schemas.microsoft.com/office/drawing/2014/main" id="{DD974875-B6B9-48C0-8CC6-1AD6F572DD2D}"/>
-              </a:ext>
-            </a:extLst>
-          </p:cNvPr>
-          <p:cNvPicPr>
-            <a:picLocks noChangeAspect="1"/>
-          </p:cNvPicPr>
-          <p:nvPr/>
-        </p:nvPicPr>
-        <p:blipFill>
-          <a:blip r:embed="rId3">
-            <a:extLst>
-              <a:ext uri="{28A0092B-C50C-407E-A947-70E740481C1C}">
-                <a14:useLocalDpi xmlns:a14="http://schemas.microsoft.com/office/drawing/2010/main" val="0"/>
-              </a:ext>
-            </a:extLst>
-          </a:blip>
-          <a:stretch>
-            <a:fillRect/>
-          </a:stretch>
-        </p:blipFill>
-        <p:spPr>
-          <a:xfrm>
-            <a:off x="4669067" y="2609127"/>
-            <a:ext cx="378056" cy="378056"/>
-          </a:xfrm>
-          <a:prstGeom prst="rect">
-            <a:avLst/>
-          </a:prstGeom>
-        </p:spPr>
-      </p:pic>
-      <p:pic>
-        <p:nvPicPr>
-          <p:cNvPr id="96" name="SaaS" descr="Ícone&#10;&#10;Descrição gerada automaticamente">
-            <a:extLst>
-              <a:ext uri="{FF2B5EF4-FFF2-40B4-BE49-F238E27FC236}">
-                <a16:creationId xmlns:a16="http://schemas.microsoft.com/office/drawing/2014/main" id="{F4C989F1-D793-4C69-AA43-39CDEC2CEA93}"/>
-              </a:ext>
-            </a:extLst>
-          </p:cNvPr>
-          <p:cNvPicPr>
-            <a:picLocks noChangeAspect="1"/>
-          </p:cNvPicPr>
-          <p:nvPr/>
-        </p:nvPicPr>
-        <p:blipFill>
-          <a:blip r:embed="rId4">
-            <a:extLst>
-              <a:ext uri="{28A0092B-C50C-407E-A947-70E740481C1C}">
-                <a14:useLocalDpi xmlns:a14="http://schemas.microsoft.com/office/drawing/2010/main" val="0"/>
-              </a:ext>
-            </a:extLst>
-          </a:blip>
-          <a:stretch>
-            <a:fillRect/>
-          </a:stretch>
-        </p:blipFill>
-        <p:spPr>
-          <a:xfrm>
-            <a:off x="4474053" y="1356063"/>
-            <a:ext cx="640164" cy="640165"/>
-          </a:xfrm>
-          <a:prstGeom prst="rect">
-            <a:avLst/>
-          </a:prstGeom>
-        </p:spPr>
-      </p:pic>
-      <p:pic>
-        <p:nvPicPr>
-          <p:cNvPr id="100" name="site" descr="Uma imagem contendo Forma&#10;&#10;Descrição gerada automaticamente">
-            <a:extLst>
-              <a:ext uri="{FF2B5EF4-FFF2-40B4-BE49-F238E27FC236}">
-                <a16:creationId xmlns:a16="http://schemas.microsoft.com/office/drawing/2014/main" id="{F95E5FAB-FA10-4CEF-8B0B-386ED11EB37F}"/>
-              </a:ext>
-            </a:extLst>
-          </p:cNvPr>
-          <p:cNvPicPr>
-            <a:picLocks noChangeAspect="1"/>
-          </p:cNvPicPr>
-          <p:nvPr/>
-        </p:nvPicPr>
-        <p:blipFill>
-          <a:blip r:embed="rId5">
-            <a:extLst>
-              <a:ext uri="{28A0092B-C50C-407E-A947-70E740481C1C}">
-                <a14:useLocalDpi xmlns:a14="http://schemas.microsoft.com/office/drawing/2010/main" val="0"/>
-              </a:ext>
-            </a:extLst>
-          </a:blip>
-          <a:stretch>
-            <a:fillRect/>
-          </a:stretch>
-        </p:blipFill>
-        <p:spPr>
-          <a:xfrm>
-            <a:off x="3858974" y="436358"/>
-            <a:ext cx="426777" cy="426777"/>
-          </a:xfrm>
-          <a:prstGeom prst="rect">
-            <a:avLst/>
-          </a:prstGeom>
-        </p:spPr>
-      </p:pic>
-      <p:pic>
-        <p:nvPicPr>
-          <p:cNvPr id="104" name="bd" descr="Ícone&#10;&#10;Descrição gerada automaticamente">
-            <a:extLst>
-              <a:ext uri="{FF2B5EF4-FFF2-40B4-BE49-F238E27FC236}">
-                <a16:creationId xmlns:a16="http://schemas.microsoft.com/office/drawing/2014/main" id="{607AB2CB-3D83-4480-A09B-6B6CB86FB629}"/>
-              </a:ext>
-            </a:extLst>
-          </p:cNvPr>
-          <p:cNvPicPr>
-            <a:picLocks noChangeAspect="1"/>
-          </p:cNvPicPr>
-          <p:nvPr/>
-        </p:nvPicPr>
-        <p:blipFill>
-          <a:blip r:embed="rId6">
-            <a:extLst>
-              <a:ext uri="{28A0092B-C50C-407E-A947-70E740481C1C}">
-                <a14:useLocalDpi xmlns:a14="http://schemas.microsoft.com/office/drawing/2010/main" val="0"/>
-              </a:ext>
-            </a:extLst>
-          </a:blip>
-          <a:stretch>
-            <a:fillRect/>
-          </a:stretch>
-        </p:blipFill>
-        <p:spPr>
-          <a:xfrm>
-            <a:off x="5220605" y="433252"/>
-            <a:ext cx="426777" cy="426777"/>
-          </a:xfrm>
-          <a:prstGeom prst="rect">
-            <a:avLst/>
-          </a:prstGeom>
-        </p:spPr>
-      </p:pic>
-      <p:pic>
-        <p:nvPicPr>
-          <p:cNvPr id="108" name="html" descr="Logotipo, Ícone&#10;&#10;Descrição gerada automaticamente">
-            <a:extLst>
-              <a:ext uri="{FF2B5EF4-FFF2-40B4-BE49-F238E27FC236}">
-                <a16:creationId xmlns:a16="http://schemas.microsoft.com/office/drawing/2014/main" id="{FD83FBF9-61B4-4EF5-B1A6-86F394321671}"/>
-              </a:ext>
-            </a:extLst>
-          </p:cNvPr>
-          <p:cNvPicPr>
-            <a:picLocks noChangeAspect="1"/>
-          </p:cNvPicPr>
-          <p:nvPr/>
-        </p:nvPicPr>
-        <p:blipFill>
-          <a:blip r:embed="rId7">
-            <a:extLst>
-              <a:ext uri="{28A0092B-C50C-407E-A947-70E740481C1C}">
-                <a14:useLocalDpi xmlns:a14="http://schemas.microsoft.com/office/drawing/2010/main" val="0"/>
-              </a:ext>
-            </a:extLst>
-          </a:blip>
-          <a:stretch>
-            <a:fillRect/>
-          </a:stretch>
-        </p:blipFill>
-        <p:spPr>
-          <a:xfrm>
-            <a:off x="3061884" y="489770"/>
-            <a:ext cx="320082" cy="320082"/>
-          </a:xfrm>
-          <a:prstGeom prst="rect">
-            <a:avLst/>
-          </a:prstGeom>
-        </p:spPr>
-      </p:pic>
-      <p:pic>
-        <p:nvPicPr>
-          <p:cNvPr id="116" name="css" descr="Ícone&#10;&#10;Descrição gerada automaticamente">
-            <a:extLst>
-              <a:ext uri="{FF2B5EF4-FFF2-40B4-BE49-F238E27FC236}">
-                <a16:creationId xmlns:a16="http://schemas.microsoft.com/office/drawing/2014/main" id="{E2BDC217-F524-4C89-9A13-7F69B3311B83}"/>
-              </a:ext>
-            </a:extLst>
-          </p:cNvPr>
-          <p:cNvPicPr>
-            <a:picLocks noChangeAspect="1"/>
-          </p:cNvPicPr>
-          <p:nvPr/>
-        </p:nvPicPr>
-        <p:blipFill>
-          <a:blip r:embed="rId8">
-            <a:extLst>
-              <a:ext uri="{28A0092B-C50C-407E-A947-70E740481C1C}">
-                <a14:useLocalDpi xmlns:a14="http://schemas.microsoft.com/office/drawing/2010/main" val="0"/>
-              </a:ext>
-            </a:extLst>
-          </a:blip>
-          <a:stretch>
-            <a:fillRect/>
-          </a:stretch>
-        </p:blipFill>
-        <p:spPr>
-          <a:xfrm>
-            <a:off x="3054718" y="972773"/>
-            <a:ext cx="320082" cy="320082"/>
-          </a:xfrm>
-          <a:prstGeom prst="rect">
-            <a:avLst/>
-          </a:prstGeom>
-        </p:spPr>
-      </p:pic>
-      <p:pic>
-        <p:nvPicPr>
-          <p:cNvPr id="112" name="js" descr="Logotipo&#10;&#10;Descrição gerada automaticamente">
-            <a:extLst>
-              <a:ext uri="{FF2B5EF4-FFF2-40B4-BE49-F238E27FC236}">
-                <a16:creationId xmlns:a16="http://schemas.microsoft.com/office/drawing/2014/main" id="{D5C5CED0-95D6-4ECD-AC20-151510096B8E}"/>
-              </a:ext>
-            </a:extLst>
-          </p:cNvPr>
-          <p:cNvPicPr>
-            <a:picLocks noChangeAspect="1"/>
-          </p:cNvPicPr>
-          <p:nvPr/>
-        </p:nvPicPr>
-        <p:blipFill>
-          <a:blip r:embed="rId9">
-            <a:extLst>
-              <a:ext uri="{28A0092B-C50C-407E-A947-70E740481C1C}">
-                <a14:useLocalDpi xmlns:a14="http://schemas.microsoft.com/office/drawing/2010/main" val="0"/>
-              </a:ext>
-            </a:extLst>
-          </a:blip>
-          <a:stretch>
-            <a:fillRect/>
-          </a:stretch>
-        </p:blipFill>
-        <p:spPr>
-          <a:xfrm>
-            <a:off x="3061653" y="26513"/>
-            <a:ext cx="320082" cy="320082"/>
-          </a:xfrm>
-          <a:prstGeom prst="rect">
-            <a:avLst/>
-          </a:prstGeom>
-        </p:spPr>
-      </p:pic>
-      <p:pic>
-        <p:nvPicPr>
-          <p:cNvPr id="103" name="firewall2" descr="Logotipo&#10;&#10;Descrição gerada automaticamente com confiança média">
-            <a:extLst>
-              <a:ext uri="{FF2B5EF4-FFF2-40B4-BE49-F238E27FC236}">
-                <a16:creationId xmlns:a16="http://schemas.microsoft.com/office/drawing/2014/main" id="{872ACEB3-B5AB-438D-9DCF-46C7A1D2FCA7}"/>
-              </a:ext>
-            </a:extLst>
-          </p:cNvPr>
-          <p:cNvPicPr>
-            <a:picLocks noChangeAspect="1"/>
-          </p:cNvPicPr>
-          <p:nvPr/>
-        </p:nvPicPr>
-        <p:blipFill>
-          <a:blip r:embed="rId10">
-            <a:extLst>
-              <a:ext uri="{28A0092B-C50C-407E-A947-70E740481C1C}">
-                <a14:useLocalDpi xmlns:a14="http://schemas.microsoft.com/office/drawing/2010/main" val="0"/>
-              </a:ext>
-            </a:extLst>
-          </a:blip>
-          <a:stretch>
-            <a:fillRect/>
-          </a:stretch>
-        </p:blipFill>
-        <p:spPr>
-          <a:xfrm>
-            <a:off x="6833893" y="2361599"/>
-            <a:ext cx="425031" cy="425031"/>
-          </a:xfrm>
-          <a:prstGeom prst="rect">
-            <a:avLst/>
-          </a:prstGeom>
-        </p:spPr>
-      </p:pic>
-      <p:pic>
-        <p:nvPicPr>
-          <p:cNvPr id="224" name="wifi_cliente" descr="Ícone&#10;&#10;Descrição gerada automaticamente">
-            <a:extLst>
-              <a:ext uri="{FF2B5EF4-FFF2-40B4-BE49-F238E27FC236}">
-                <a16:creationId xmlns:a16="http://schemas.microsoft.com/office/drawing/2014/main" id="{1002B21D-B4EE-473B-9D88-A48B15241FB6}"/>
-              </a:ext>
-            </a:extLst>
-          </p:cNvPr>
-          <p:cNvPicPr>
-            <a:picLocks noChangeAspect="1"/>
-          </p:cNvPicPr>
-          <p:nvPr/>
-        </p:nvPicPr>
-        <p:blipFill>
-          <a:blip r:embed="rId11">
-            <a:extLst>
-              <a:ext uri="{28A0092B-C50C-407E-A947-70E740481C1C}">
-                <a14:useLocalDpi xmlns:a14="http://schemas.microsoft.com/office/drawing/2010/main" val="0"/>
-              </a:ext>
-            </a:extLst>
-          </a:blip>
-          <a:stretch>
-            <a:fillRect/>
-          </a:stretch>
-        </p:blipFill>
-        <p:spPr>
-          <a:xfrm>
-            <a:off x="8278261" y="1578460"/>
-            <a:ext cx="426777" cy="426777"/>
-          </a:xfrm>
-          <a:prstGeom prst="rect">
-            <a:avLst/>
-          </a:prstGeom>
-        </p:spPr>
-      </p:pic>
-      <p:pic>
-        <p:nvPicPr>
-          <p:cNvPr id="226" name="pc_cliente" descr="Ícone&#10;&#10;Descrição gerada automaticamente">
-            <a:extLst>
-              <a:ext uri="{FF2B5EF4-FFF2-40B4-BE49-F238E27FC236}">
-                <a16:creationId xmlns:a16="http://schemas.microsoft.com/office/drawing/2014/main" id="{8D9172A7-DCFD-454E-966D-A64EFF128E2E}"/>
-              </a:ext>
-            </a:extLst>
-          </p:cNvPr>
-          <p:cNvPicPr>
-            <a:picLocks noChangeAspect="1"/>
-          </p:cNvPicPr>
-          <p:nvPr/>
-        </p:nvPicPr>
-        <p:blipFill>
-          <a:blip r:embed="rId12">
-            <a:extLst>
-              <a:ext uri="{28A0092B-C50C-407E-A947-70E740481C1C}">
-                <a14:useLocalDpi xmlns:a14="http://schemas.microsoft.com/office/drawing/2010/main" val="0"/>
-              </a:ext>
-            </a:extLst>
-          </a:blip>
-          <a:stretch>
-            <a:fillRect/>
-          </a:stretch>
-        </p:blipFill>
-        <p:spPr>
-          <a:xfrm>
-            <a:off x="8171569" y="429609"/>
-            <a:ext cx="640164" cy="640165"/>
-          </a:xfrm>
-          <a:prstGeom prst="rect">
-            <a:avLst/>
-          </a:prstGeom>
-        </p:spPr>
-      </p:pic>
-      <p:pic>
-        <p:nvPicPr>
-          <p:cNvPr id="230" name="servidor" descr="Uma imagem contendo Interface gráfica do usuário&#10;&#10;Descrição gerada automaticamente">
-            <a:extLst>
-              <a:ext uri="{FF2B5EF4-FFF2-40B4-BE49-F238E27FC236}">
-                <a16:creationId xmlns:a16="http://schemas.microsoft.com/office/drawing/2014/main" id="{90426419-7CCE-4786-93E0-CE58956138A4}"/>
-              </a:ext>
-            </a:extLst>
-          </p:cNvPr>
-          <p:cNvPicPr>
-            <a:picLocks noChangeAspect="1"/>
-          </p:cNvPicPr>
-          <p:nvPr/>
-        </p:nvPicPr>
-        <p:blipFill>
-          <a:blip r:embed="rId13">
-            <a:extLst>
-              <a:ext uri="{28A0092B-C50C-407E-A947-70E740481C1C}">
-                <a14:useLocalDpi xmlns:a14="http://schemas.microsoft.com/office/drawing/2010/main" val="0"/>
-              </a:ext>
-            </a:extLst>
-          </a:blip>
-          <a:stretch>
-            <a:fillRect/>
-          </a:stretch>
-        </p:blipFill>
-        <p:spPr>
-          <a:xfrm>
-            <a:off x="391669" y="3107031"/>
-            <a:ext cx="426777" cy="426777"/>
-          </a:xfrm>
-          <a:prstGeom prst="rect">
-            <a:avLst/>
-          </a:prstGeom>
-        </p:spPr>
-      </p:pic>
-      <p:pic>
-        <p:nvPicPr>
-          <p:cNvPr id="124" name="arduino" descr="Esquemático, Ícone, Código QR&#10;&#10;Descrição gerada automaticamente">
-            <a:extLst>
-              <a:ext uri="{FF2B5EF4-FFF2-40B4-BE49-F238E27FC236}">
-                <a16:creationId xmlns:a16="http://schemas.microsoft.com/office/drawing/2014/main" id="{56DB52C5-5EDE-492F-A762-45C863D66EA0}"/>
-              </a:ext>
-            </a:extLst>
-          </p:cNvPr>
-          <p:cNvPicPr>
-            <a:picLocks noChangeAspect="1"/>
-          </p:cNvPicPr>
-          <p:nvPr/>
-        </p:nvPicPr>
-        <p:blipFill>
-          <a:blip r:embed="rId14">
-            <a:extLst>
-              <a:ext uri="{28A0092B-C50C-407E-A947-70E740481C1C}">
-                <a14:useLocalDpi xmlns:a14="http://schemas.microsoft.com/office/drawing/2010/main" val="0"/>
-              </a:ext>
-            </a:extLst>
-          </a:blip>
-          <a:stretch>
-            <a:fillRect/>
-          </a:stretch>
-        </p:blipFill>
-        <p:spPr>
-          <a:xfrm>
-            <a:off x="1928524" y="4520863"/>
-            <a:ext cx="316096" cy="320082"/>
-          </a:xfrm>
-          <a:prstGeom prst="rect">
-            <a:avLst/>
-          </a:prstGeom>
-        </p:spPr>
-      </p:pic>
-      <p:pic>
-        <p:nvPicPr>
-          <p:cNvPr id="128" name="protoboard" descr="Ícone&#10;&#10;Descrição gerada automaticamente com confiança média">
-            <a:extLst>
-              <a:ext uri="{FF2B5EF4-FFF2-40B4-BE49-F238E27FC236}">
-                <a16:creationId xmlns:a16="http://schemas.microsoft.com/office/drawing/2014/main" id="{ECB0AD55-8383-481E-8FC3-BED6B4630C34}"/>
-              </a:ext>
-            </a:extLst>
-          </p:cNvPr>
-          <p:cNvPicPr>
-            <a:picLocks noChangeAspect="1"/>
-          </p:cNvPicPr>
-          <p:nvPr/>
-        </p:nvPicPr>
-        <p:blipFill>
-          <a:blip r:embed="rId15">
-            <a:extLst>
-              <a:ext uri="{28A0092B-C50C-407E-A947-70E740481C1C}">
-                <a14:useLocalDpi xmlns:a14="http://schemas.microsoft.com/office/drawing/2010/main" val="0"/>
-              </a:ext>
-            </a:extLst>
-          </a:blip>
-          <a:stretch>
-            <a:fillRect/>
-          </a:stretch>
-        </p:blipFill>
-        <p:spPr>
-          <a:xfrm>
-            <a:off x="2895600" y="4562580"/>
-            <a:ext cx="316096" cy="320082"/>
-          </a:xfrm>
-          <a:prstGeom prst="rect">
-            <a:avLst/>
-          </a:prstGeom>
-        </p:spPr>
-      </p:pic>
-      <p:pic>
-        <p:nvPicPr>
-          <p:cNvPr id="132" name="sensor" descr="Uma imagem contendo Ícone&#10;&#10;Descrição gerada automaticamente">
-            <a:extLst>
-              <a:ext uri="{FF2B5EF4-FFF2-40B4-BE49-F238E27FC236}">
-                <a16:creationId xmlns:a16="http://schemas.microsoft.com/office/drawing/2014/main" id="{AB7478B9-5944-4C4B-9AD2-ACD192C8167D}"/>
-              </a:ext>
-            </a:extLst>
-          </p:cNvPr>
-          <p:cNvPicPr>
-            <a:picLocks noChangeAspect="1"/>
-          </p:cNvPicPr>
-          <p:nvPr/>
-        </p:nvPicPr>
-        <p:blipFill>
-          <a:blip r:embed="rId16">
-            <a:extLst>
-              <a:ext uri="{28A0092B-C50C-407E-A947-70E740481C1C}">
-                <a14:useLocalDpi xmlns:a14="http://schemas.microsoft.com/office/drawing/2010/main" val="0"/>
-              </a:ext>
-            </a:extLst>
-          </a:blip>
-          <a:stretch>
-            <a:fillRect/>
-          </a:stretch>
-        </p:blipFill>
-        <p:spPr>
-          <a:xfrm>
-            <a:off x="3848624" y="4502882"/>
-            <a:ext cx="316096" cy="320082"/>
-          </a:xfrm>
-          <a:prstGeom prst="rect">
-            <a:avLst/>
-          </a:prstGeom>
-        </p:spPr>
-      </p:pic>
-      <p:pic>
-        <p:nvPicPr>
-          <p:cNvPr id="136" name="unidade" descr="Desenho de bandeira&#10;&#10;Descrição gerada automaticamente com confiança média">
-            <a:extLst>
-              <a:ext uri="{FF2B5EF4-FFF2-40B4-BE49-F238E27FC236}">
-                <a16:creationId xmlns:a16="http://schemas.microsoft.com/office/drawing/2014/main" id="{8D74D369-A42F-4A69-A02D-77D97BA5AA15}"/>
-              </a:ext>
-            </a:extLst>
-          </p:cNvPr>
-          <p:cNvPicPr>
-            <a:picLocks noChangeAspect="1"/>
-          </p:cNvPicPr>
-          <p:nvPr/>
-        </p:nvPicPr>
-        <p:blipFill>
-          <a:blip r:embed="rId17">
-            <a:extLst>
-              <a:ext uri="{28A0092B-C50C-407E-A947-70E740481C1C}">
-                <a14:useLocalDpi xmlns:a14="http://schemas.microsoft.com/office/drawing/2010/main" val="0"/>
-              </a:ext>
-            </a:extLst>
-          </a:blip>
-          <a:stretch>
-            <a:fillRect/>
-          </a:stretch>
-        </p:blipFill>
-        <p:spPr>
-          <a:xfrm>
-            <a:off x="278839" y="4430366"/>
-            <a:ext cx="640164" cy="640165"/>
-          </a:xfrm>
-          <a:prstGeom prst="rect">
-            <a:avLst/>
-          </a:prstGeom>
-        </p:spPr>
-      </p:pic>
-      <p:pic>
-        <p:nvPicPr>
-          <p:cNvPr id="137" name="roteador_omni" descr="Ícone&#10;&#10;Descrição gerada automaticamente">
-            <a:extLst>
-              <a:ext uri="{FF2B5EF4-FFF2-40B4-BE49-F238E27FC236}">
-                <a16:creationId xmlns:a16="http://schemas.microsoft.com/office/drawing/2014/main" id="{1BF8DB9A-661B-41EE-A78A-63F21A27B707}"/>
-              </a:ext>
-            </a:extLst>
-          </p:cNvPr>
-          <p:cNvPicPr>
-            <a:picLocks noChangeAspect="1"/>
-          </p:cNvPicPr>
-          <p:nvPr/>
-        </p:nvPicPr>
-        <p:blipFill>
-          <a:blip r:embed="rId18">
-            <a:extLst>
-              <a:ext uri="{28A0092B-C50C-407E-A947-70E740481C1C}">
-                <a14:useLocalDpi xmlns:a14="http://schemas.microsoft.com/office/drawing/2010/main" val="0"/>
-              </a:ext>
-            </a:extLst>
-          </a:blip>
-          <a:stretch>
-            <a:fillRect/>
-          </a:stretch>
-        </p:blipFill>
-        <p:spPr>
-          <a:xfrm>
-            <a:off x="8278260" y="2358719"/>
-            <a:ext cx="426777" cy="426777"/>
-          </a:xfrm>
-          <a:prstGeom prst="rect">
-            <a:avLst/>
-          </a:prstGeom>
-        </p:spPr>
-      </p:pic>
-      <p:pic>
-        <p:nvPicPr>
-          <p:cNvPr id="361" name="wifi_cliente" descr="Ícone&#10;&#10;Descrição gerada automaticamente">
-            <a:extLst>
-              <a:ext uri="{FF2B5EF4-FFF2-40B4-BE49-F238E27FC236}">
-                <a16:creationId xmlns:a16="http://schemas.microsoft.com/office/drawing/2014/main" id="{FBFB2CE3-B26F-4DDD-B74F-F868709FB0AE}"/>
-              </a:ext>
-            </a:extLst>
-          </p:cNvPr>
-          <p:cNvPicPr>
-            <a:picLocks noChangeAspect="1"/>
-          </p:cNvPicPr>
-          <p:nvPr/>
-        </p:nvPicPr>
-        <p:blipFill>
-          <a:blip r:embed="rId11">
-            <a:extLst>
-              <a:ext uri="{28A0092B-C50C-407E-A947-70E740481C1C}">
-                <a14:useLocalDpi xmlns:a14="http://schemas.microsoft.com/office/drawing/2010/main" val="0"/>
-              </a:ext>
-            </a:extLst>
-          </a:blip>
-          <a:stretch>
-            <a:fillRect/>
-          </a:stretch>
-        </p:blipFill>
-        <p:spPr>
-          <a:xfrm>
-            <a:off x="450752" y="3939313"/>
-            <a:ext cx="288000" cy="288000"/>
-          </a:xfrm>
-          <a:prstGeom prst="rect">
-            <a:avLst/>
-          </a:prstGeom>
-        </p:spPr>
-      </p:pic>
+        </p:grpSpPr>
+        <p:pic>
+          <p:nvPicPr>
+            <p:cNvPr id="92" name="NUVEM" descr="Ícone&#10;&#10;Descrição gerada automaticamente">
+              <a:extLst>
+                <a:ext uri="{FF2B5EF4-FFF2-40B4-BE49-F238E27FC236}">
+                  <a16:creationId xmlns:a16="http://schemas.microsoft.com/office/drawing/2014/main" id="{83D92FD9-FE57-4048-8DCC-AAC6A5187F31}"/>
+                </a:ext>
+              </a:extLst>
+            </p:cNvPr>
+            <p:cNvPicPr>
+              <a:picLocks noGrp="1" noRot="1" noChangeAspect="1" noMove="1" noResize="1" noEditPoints="1" noAdjustHandles="1" noChangeArrowheads="1" noChangeShapeType="1" noCrop="1"/>
+            </p:cNvPicPr>
+            <p:nvPr/>
+          </p:nvPicPr>
+          <p:blipFill>
+            <a:blip r:embed="rId2">
+              <a:extLst>
+                <a:ext uri="{28A0092B-C50C-407E-A947-70E740481C1C}">
+                  <a14:useLocalDpi xmlns:a14="http://schemas.microsoft.com/office/drawing/2010/main" val="0"/>
+                </a:ext>
+              </a:extLst>
+            </a:blip>
+            <a:stretch>
+              <a:fillRect/>
+            </a:stretch>
+          </p:blipFill>
+          <p:spPr>
+            <a:xfrm>
+              <a:off x="4260666" y="2504736"/>
+              <a:ext cx="1066941" cy="1066942"/>
+            </a:xfrm>
+            <a:prstGeom prst="rect">
+              <a:avLst/>
+            </a:prstGeom>
+          </p:spPr>
+        </p:pic>
+        <p:pic>
+          <p:nvPicPr>
+            <p:cNvPr id="54" name="azure logo">
+              <a:extLst>
+                <a:ext uri="{FF2B5EF4-FFF2-40B4-BE49-F238E27FC236}">
+                  <a16:creationId xmlns:a16="http://schemas.microsoft.com/office/drawing/2014/main" id="{DD974875-B6B9-48C0-8CC6-1AD6F572DD2D}"/>
+                </a:ext>
+              </a:extLst>
+            </p:cNvPr>
+            <p:cNvPicPr>
+              <a:picLocks noGrp="1" noRot="1" noChangeAspect="1" noMove="1" noResize="1" noEditPoints="1" noAdjustHandles="1" noChangeArrowheads="1" noChangeShapeType="1" noCrop="1"/>
+            </p:cNvPicPr>
+            <p:nvPr/>
+          </p:nvPicPr>
+          <p:blipFill>
+            <a:blip r:embed="rId3">
+              <a:extLst>
+                <a:ext uri="{28A0092B-C50C-407E-A947-70E740481C1C}">
+                  <a14:useLocalDpi xmlns:a14="http://schemas.microsoft.com/office/drawing/2010/main" val="0"/>
+                </a:ext>
+              </a:extLst>
+            </a:blip>
+            <a:srcRect/>
+            <a:stretch/>
+          </p:blipFill>
+          <p:spPr>
+            <a:xfrm>
+              <a:off x="4669067" y="2613889"/>
+              <a:ext cx="378056" cy="378056"/>
+            </a:xfrm>
+            <a:prstGeom prst="rect">
+              <a:avLst/>
+            </a:prstGeom>
+            <a:ln>
+              <a:noFill/>
+            </a:ln>
+          </p:spPr>
+        </p:pic>
+        <p:pic>
+          <p:nvPicPr>
+            <p:cNvPr id="96" name="SaaS" descr="Ícone&#10;&#10;Descrição gerada automaticamente">
+              <a:extLst>
+                <a:ext uri="{FF2B5EF4-FFF2-40B4-BE49-F238E27FC236}">
+                  <a16:creationId xmlns:a16="http://schemas.microsoft.com/office/drawing/2014/main" id="{F4C989F1-D793-4C69-AA43-39CDEC2CEA93}"/>
+                </a:ext>
+              </a:extLst>
+            </p:cNvPr>
+            <p:cNvPicPr>
+              <a:picLocks noGrp="1" noRot="1" noChangeAspect="1" noMove="1" noResize="1" noEditPoints="1" noAdjustHandles="1" noChangeArrowheads="1" noChangeShapeType="1" noCrop="1"/>
+            </p:cNvPicPr>
+            <p:nvPr/>
+          </p:nvPicPr>
+          <p:blipFill>
+            <a:blip r:embed="rId4">
+              <a:extLst>
+                <a:ext uri="{28A0092B-C50C-407E-A947-70E740481C1C}">
+                  <a14:useLocalDpi xmlns:a14="http://schemas.microsoft.com/office/drawing/2010/main" val="0"/>
+                </a:ext>
+              </a:extLst>
+            </a:blip>
+            <a:stretch>
+              <a:fillRect/>
+            </a:stretch>
+          </p:blipFill>
+          <p:spPr>
+            <a:xfrm>
+              <a:off x="4474053" y="1356063"/>
+              <a:ext cx="640164" cy="640165"/>
+            </a:xfrm>
+            <a:prstGeom prst="rect">
+              <a:avLst/>
+            </a:prstGeom>
+          </p:spPr>
+        </p:pic>
+        <p:pic>
+          <p:nvPicPr>
+            <p:cNvPr id="104" name="bd" descr="Ícone&#10;&#10;Descrição gerada automaticamente">
+              <a:extLst>
+                <a:ext uri="{FF2B5EF4-FFF2-40B4-BE49-F238E27FC236}">
+                  <a16:creationId xmlns:a16="http://schemas.microsoft.com/office/drawing/2014/main" id="{607AB2CB-3D83-4480-A09B-6B6CB86FB629}"/>
+                </a:ext>
+              </a:extLst>
+            </p:cNvPr>
+            <p:cNvPicPr>
+              <a:picLocks noGrp="1" noRot="1" noChangeAspect="1" noMove="1" noResize="1" noEditPoints="1" noAdjustHandles="1" noChangeArrowheads="1" noChangeShapeType="1" noCrop="1"/>
+            </p:cNvPicPr>
+            <p:nvPr/>
+          </p:nvPicPr>
+          <p:blipFill>
+            <a:blip r:embed="rId5">
+              <a:extLst>
+                <a:ext uri="{28A0092B-C50C-407E-A947-70E740481C1C}">
+                  <a14:useLocalDpi xmlns:a14="http://schemas.microsoft.com/office/drawing/2010/main" val="0"/>
+                </a:ext>
+              </a:extLst>
+            </a:blip>
+            <a:stretch>
+              <a:fillRect/>
+            </a:stretch>
+          </p:blipFill>
+          <p:spPr>
+            <a:xfrm>
+              <a:off x="5220605" y="433252"/>
+              <a:ext cx="426777" cy="426777"/>
+            </a:xfrm>
+            <a:prstGeom prst="rect">
+              <a:avLst/>
+            </a:prstGeom>
+          </p:spPr>
+        </p:pic>
+        <p:pic>
+          <p:nvPicPr>
+            <p:cNvPr id="100" name="site" descr="Uma imagem contendo Forma&#10;&#10;Descrição gerada automaticamente">
+              <a:extLst>
+                <a:ext uri="{FF2B5EF4-FFF2-40B4-BE49-F238E27FC236}">
+                  <a16:creationId xmlns:a16="http://schemas.microsoft.com/office/drawing/2014/main" id="{F95E5FAB-FA10-4CEF-8B0B-386ED11EB37F}"/>
+                </a:ext>
+              </a:extLst>
+            </p:cNvPr>
+            <p:cNvPicPr>
+              <a:picLocks noGrp="1" noRot="1" noChangeAspect="1" noMove="1" noResize="1" noEditPoints="1" noAdjustHandles="1" noChangeArrowheads="1" noChangeShapeType="1" noCrop="1"/>
+            </p:cNvPicPr>
+            <p:nvPr/>
+          </p:nvPicPr>
+          <p:blipFill>
+            <a:blip r:embed="rId6">
+              <a:extLst>
+                <a:ext uri="{28A0092B-C50C-407E-A947-70E740481C1C}">
+                  <a14:useLocalDpi xmlns:a14="http://schemas.microsoft.com/office/drawing/2010/main" val="0"/>
+                </a:ext>
+              </a:extLst>
+            </a:blip>
+            <a:stretch>
+              <a:fillRect/>
+            </a:stretch>
+          </p:blipFill>
+          <p:spPr>
+            <a:xfrm>
+              <a:off x="3858974" y="436358"/>
+              <a:ext cx="426777" cy="426777"/>
+            </a:xfrm>
+            <a:prstGeom prst="rect">
+              <a:avLst/>
+            </a:prstGeom>
+          </p:spPr>
+        </p:pic>
+        <p:pic>
+          <p:nvPicPr>
+            <p:cNvPr id="112" name="js" descr="Logotipo&#10;&#10;Descrição gerada automaticamente">
+              <a:extLst>
+                <a:ext uri="{FF2B5EF4-FFF2-40B4-BE49-F238E27FC236}">
+                  <a16:creationId xmlns:a16="http://schemas.microsoft.com/office/drawing/2014/main" id="{D5C5CED0-95D6-4ECD-AC20-151510096B8E}"/>
+                </a:ext>
+              </a:extLst>
+            </p:cNvPr>
+            <p:cNvPicPr>
+              <a:picLocks noGrp="1" noRot="1" noChangeAspect="1" noMove="1" noResize="1" noEditPoints="1" noAdjustHandles="1" noChangeArrowheads="1" noChangeShapeType="1" noCrop="1"/>
+            </p:cNvPicPr>
+            <p:nvPr/>
+          </p:nvPicPr>
+          <p:blipFill>
+            <a:blip r:embed="rId7">
+              <a:extLst>
+                <a:ext uri="{28A0092B-C50C-407E-A947-70E740481C1C}">
+                  <a14:useLocalDpi xmlns:a14="http://schemas.microsoft.com/office/drawing/2010/main" val="0"/>
+                </a:ext>
+              </a:extLst>
+            </a:blip>
+            <a:stretch>
+              <a:fillRect/>
+            </a:stretch>
+          </p:blipFill>
+          <p:spPr>
+            <a:xfrm>
+              <a:off x="3061653" y="26513"/>
+              <a:ext cx="320082" cy="320082"/>
+            </a:xfrm>
+            <a:prstGeom prst="rect">
+              <a:avLst/>
+            </a:prstGeom>
+          </p:spPr>
+        </p:pic>
+        <p:pic>
+          <p:nvPicPr>
+            <p:cNvPr id="108" name="html" descr="Logotipo, Ícone&#10;&#10;Descrição gerada automaticamente">
+              <a:extLst>
+                <a:ext uri="{FF2B5EF4-FFF2-40B4-BE49-F238E27FC236}">
+                  <a16:creationId xmlns:a16="http://schemas.microsoft.com/office/drawing/2014/main" id="{FD83FBF9-61B4-4EF5-B1A6-86F394321671}"/>
+                </a:ext>
+              </a:extLst>
+            </p:cNvPr>
+            <p:cNvPicPr>
+              <a:picLocks noGrp="1" noRot="1" noChangeAspect="1" noMove="1" noResize="1" noEditPoints="1" noAdjustHandles="1" noChangeArrowheads="1" noChangeShapeType="1" noCrop="1"/>
+            </p:cNvPicPr>
+            <p:nvPr/>
+          </p:nvPicPr>
+          <p:blipFill>
+            <a:blip r:embed="rId8">
+              <a:extLst>
+                <a:ext uri="{28A0092B-C50C-407E-A947-70E740481C1C}">
+                  <a14:useLocalDpi xmlns:a14="http://schemas.microsoft.com/office/drawing/2010/main" val="0"/>
+                </a:ext>
+              </a:extLst>
+            </a:blip>
+            <a:stretch>
+              <a:fillRect/>
+            </a:stretch>
+          </p:blipFill>
+          <p:spPr>
+            <a:xfrm>
+              <a:off x="3061884" y="489770"/>
+              <a:ext cx="320082" cy="320082"/>
+            </a:xfrm>
+            <a:prstGeom prst="rect">
+              <a:avLst/>
+            </a:prstGeom>
+          </p:spPr>
+        </p:pic>
+        <p:pic>
+          <p:nvPicPr>
+            <p:cNvPr id="116" name="css" descr="Ícone&#10;&#10;Descrição gerada automaticamente">
+              <a:extLst>
+                <a:ext uri="{FF2B5EF4-FFF2-40B4-BE49-F238E27FC236}">
+                  <a16:creationId xmlns:a16="http://schemas.microsoft.com/office/drawing/2014/main" id="{E2BDC217-F524-4C89-9A13-7F69B3311B83}"/>
+                </a:ext>
+              </a:extLst>
+            </p:cNvPr>
+            <p:cNvPicPr>
+              <a:picLocks noGrp="1" noRot="1" noChangeAspect="1" noMove="1" noResize="1" noEditPoints="1" noAdjustHandles="1" noChangeArrowheads="1" noChangeShapeType="1" noCrop="1"/>
+            </p:cNvPicPr>
+            <p:nvPr/>
+          </p:nvPicPr>
+          <p:blipFill>
+            <a:blip r:embed="rId9">
+              <a:extLst>
+                <a:ext uri="{28A0092B-C50C-407E-A947-70E740481C1C}">
+                  <a14:useLocalDpi xmlns:a14="http://schemas.microsoft.com/office/drawing/2010/main" val="0"/>
+                </a:ext>
+              </a:extLst>
+            </a:blip>
+            <a:stretch>
+              <a:fillRect/>
+            </a:stretch>
+          </p:blipFill>
+          <p:spPr>
+            <a:xfrm>
+              <a:off x="3054718" y="972773"/>
+              <a:ext cx="320082" cy="320082"/>
+            </a:xfrm>
+            <a:prstGeom prst="rect">
+              <a:avLst/>
+            </a:prstGeom>
+          </p:spPr>
+        </p:pic>
+        <p:pic>
+          <p:nvPicPr>
+            <p:cNvPr id="226" name="pc_cliente" descr="Ícone&#10;&#10;Descrição gerada automaticamente">
+              <a:extLst>
+                <a:ext uri="{FF2B5EF4-FFF2-40B4-BE49-F238E27FC236}">
+                  <a16:creationId xmlns:a16="http://schemas.microsoft.com/office/drawing/2014/main" id="{8D9172A7-DCFD-454E-966D-A64EFF128E2E}"/>
+                </a:ext>
+              </a:extLst>
+            </p:cNvPr>
+            <p:cNvPicPr>
+              <a:picLocks noGrp="1" noRot="1" noChangeAspect="1" noMove="1" noResize="1" noEditPoints="1" noAdjustHandles="1" noChangeArrowheads="1" noChangeShapeType="1" noCrop="1"/>
+            </p:cNvPicPr>
+            <p:nvPr/>
+          </p:nvPicPr>
+          <p:blipFill>
+            <a:blip r:embed="rId10">
+              <a:extLst>
+                <a:ext uri="{28A0092B-C50C-407E-A947-70E740481C1C}">
+                  <a14:useLocalDpi xmlns:a14="http://schemas.microsoft.com/office/drawing/2010/main" val="0"/>
+                </a:ext>
+              </a:extLst>
+            </a:blip>
+            <a:stretch>
+              <a:fillRect/>
+            </a:stretch>
+          </p:blipFill>
+          <p:spPr>
+            <a:xfrm>
+              <a:off x="8499536" y="4612644"/>
+              <a:ext cx="640164" cy="640165"/>
+            </a:xfrm>
+            <a:prstGeom prst="rect">
+              <a:avLst/>
+            </a:prstGeom>
+          </p:spPr>
+        </p:pic>
+        <p:pic>
+          <p:nvPicPr>
+            <p:cNvPr id="224" name="wifi_cliente" descr="Ícone&#10;&#10;Descrição gerada automaticamente">
+              <a:extLst>
+                <a:ext uri="{FF2B5EF4-FFF2-40B4-BE49-F238E27FC236}">
+                  <a16:creationId xmlns:a16="http://schemas.microsoft.com/office/drawing/2014/main" id="{1002B21D-B4EE-473B-9D88-A48B15241FB6}"/>
+                </a:ext>
+              </a:extLst>
+            </p:cNvPr>
+            <p:cNvPicPr>
+              <a:picLocks noGrp="1" noRot="1" noChangeAspect="1" noMove="1" noResize="1" noEditPoints="1" noAdjustHandles="1" noChangeArrowheads="1" noChangeShapeType="1" noCrop="1"/>
+            </p:cNvPicPr>
+            <p:nvPr/>
+          </p:nvPicPr>
+          <p:blipFill>
+            <a:blip r:embed="rId11">
+              <a:extLst>
+                <a:ext uri="{28A0092B-C50C-407E-A947-70E740481C1C}">
+                  <a14:useLocalDpi xmlns:a14="http://schemas.microsoft.com/office/drawing/2010/main" val="0"/>
+                </a:ext>
+              </a:extLst>
+            </a:blip>
+            <a:stretch>
+              <a:fillRect/>
+            </a:stretch>
+          </p:blipFill>
+          <p:spPr>
+            <a:xfrm>
+              <a:off x="8612118" y="3055154"/>
+              <a:ext cx="426777" cy="426777"/>
+            </a:xfrm>
+            <a:prstGeom prst="rect">
+              <a:avLst/>
+            </a:prstGeom>
+          </p:spPr>
+        </p:pic>
+        <p:pic>
+          <p:nvPicPr>
+            <p:cNvPr id="137" name="roteador_cliente" descr="Ícone&#10;&#10;Descrição gerada automaticamente">
+              <a:extLst>
+                <a:ext uri="{FF2B5EF4-FFF2-40B4-BE49-F238E27FC236}">
+                  <a16:creationId xmlns:a16="http://schemas.microsoft.com/office/drawing/2014/main" id="{1BF8DB9A-661B-41EE-A78A-63F21A27B707}"/>
+                </a:ext>
+              </a:extLst>
+            </p:cNvPr>
+            <p:cNvPicPr>
+              <a:picLocks noGrp="1" noRot="1" noChangeAspect="1" noMove="1" noResize="1" noEditPoints="1" noAdjustHandles="1" noChangeArrowheads="1" noChangeShapeType="1" noCrop="1"/>
+            </p:cNvPicPr>
+            <p:nvPr/>
+          </p:nvPicPr>
+          <p:blipFill>
+            <a:blip r:embed="rId12">
+              <a:extLst>
+                <a:ext uri="{28A0092B-C50C-407E-A947-70E740481C1C}">
+                  <a14:useLocalDpi xmlns:a14="http://schemas.microsoft.com/office/drawing/2010/main" val="0"/>
+                </a:ext>
+              </a:extLst>
+            </a:blip>
+            <a:stretch>
+              <a:fillRect/>
+            </a:stretch>
+          </p:blipFill>
+          <p:spPr>
+            <a:xfrm>
+              <a:off x="8612117" y="1952493"/>
+              <a:ext cx="426777" cy="426777"/>
+            </a:xfrm>
+            <a:prstGeom prst="rect">
+              <a:avLst/>
+            </a:prstGeom>
+          </p:spPr>
+        </p:pic>
+        <p:pic>
+          <p:nvPicPr>
+            <p:cNvPr id="103" name="firewall_cliente" descr="Logotipo&#10;&#10;Descrição gerada automaticamente com confiança média">
+              <a:extLst>
+                <a:ext uri="{FF2B5EF4-FFF2-40B4-BE49-F238E27FC236}">
+                  <a16:creationId xmlns:a16="http://schemas.microsoft.com/office/drawing/2014/main" id="{872ACEB3-B5AB-438D-9DCF-46C7A1D2FCA7}"/>
+                </a:ext>
+              </a:extLst>
+            </p:cNvPr>
+            <p:cNvPicPr>
+              <a:picLocks noGrp="1" noRot="1" noChangeAspect="1" noMove="1" noResize="1" noEditPoints="1" noAdjustHandles="1" noChangeArrowheads="1" noChangeShapeType="1" noCrop="1"/>
+            </p:cNvPicPr>
+            <p:nvPr/>
+          </p:nvPicPr>
+          <p:blipFill>
+            <a:blip r:embed="rId13">
+              <a:extLst>
+                <a:ext uri="{28A0092B-C50C-407E-A947-70E740481C1C}">
+                  <a14:useLocalDpi xmlns:a14="http://schemas.microsoft.com/office/drawing/2010/main" val="0"/>
+                </a:ext>
+              </a:extLst>
+            </a:blip>
+            <a:stretch>
+              <a:fillRect/>
+            </a:stretch>
+          </p:blipFill>
+          <p:spPr>
+            <a:xfrm>
+              <a:off x="6826857" y="2361599"/>
+              <a:ext cx="425031" cy="425031"/>
+            </a:xfrm>
+            <a:prstGeom prst="rect">
+              <a:avLst/>
+            </a:prstGeom>
+          </p:spPr>
+        </p:pic>
+        <p:pic>
+          <p:nvPicPr>
+            <p:cNvPr id="132" name="sensor" descr="Uma imagem contendo Ícone&#10;&#10;Descrição gerada automaticamente">
+              <a:extLst>
+                <a:ext uri="{FF2B5EF4-FFF2-40B4-BE49-F238E27FC236}">
+                  <a16:creationId xmlns:a16="http://schemas.microsoft.com/office/drawing/2014/main" id="{AB7478B9-5944-4C4B-9AD2-ACD192C8167D}"/>
+                </a:ext>
+              </a:extLst>
+            </p:cNvPr>
+            <p:cNvPicPr>
+              <a:picLocks noGrp="1" noRot="1" noChangeAspect="1" noMove="1" noResize="1" noEditPoints="1" noAdjustHandles="1" noChangeArrowheads="1" noChangeShapeType="1" noCrop="1"/>
+            </p:cNvPicPr>
+            <p:nvPr/>
+          </p:nvPicPr>
+          <p:blipFill>
+            <a:blip r:embed="rId14">
+              <a:extLst>
+                <a:ext uri="{28A0092B-C50C-407E-A947-70E740481C1C}">
+                  <a14:useLocalDpi xmlns:a14="http://schemas.microsoft.com/office/drawing/2010/main" val="0"/>
+                </a:ext>
+              </a:extLst>
+            </a:blip>
+            <a:stretch>
+              <a:fillRect/>
+            </a:stretch>
+          </p:blipFill>
+          <p:spPr>
+            <a:xfrm>
+              <a:off x="3097711" y="4241076"/>
+              <a:ext cx="316096" cy="320082"/>
+            </a:xfrm>
+            <a:prstGeom prst="rect">
+              <a:avLst/>
+            </a:prstGeom>
+          </p:spPr>
+        </p:pic>
+        <p:pic>
+          <p:nvPicPr>
+            <p:cNvPr id="128" name="protoboard" descr="Ícone&#10;&#10;Descrição gerada automaticamente com confiança média">
+              <a:extLst>
+                <a:ext uri="{FF2B5EF4-FFF2-40B4-BE49-F238E27FC236}">
+                  <a16:creationId xmlns:a16="http://schemas.microsoft.com/office/drawing/2014/main" id="{ECB0AD55-8383-481E-8FC3-BED6B4630C34}"/>
+                </a:ext>
+              </a:extLst>
+            </p:cNvPr>
+            <p:cNvPicPr>
+              <a:picLocks noGrp="1" noRot="1" noChangeAspect="1" noMove="1" noResize="1" noEditPoints="1" noAdjustHandles="1" noChangeArrowheads="1" noChangeShapeType="1" noCrop="1"/>
+            </p:cNvPicPr>
+            <p:nvPr/>
+          </p:nvPicPr>
+          <p:blipFill>
+            <a:blip r:embed="rId15">
+              <a:extLst>
+                <a:ext uri="{28A0092B-C50C-407E-A947-70E740481C1C}">
+                  <a14:useLocalDpi xmlns:a14="http://schemas.microsoft.com/office/drawing/2010/main" val="0"/>
+                </a:ext>
+              </a:extLst>
+            </a:blip>
+            <a:stretch>
+              <a:fillRect/>
+            </a:stretch>
+          </p:blipFill>
+          <p:spPr>
+            <a:xfrm>
+              <a:off x="2421206" y="4242544"/>
+              <a:ext cx="316096" cy="320082"/>
+            </a:xfrm>
+            <a:prstGeom prst="rect">
+              <a:avLst/>
+            </a:prstGeom>
+          </p:spPr>
+        </p:pic>
+        <p:pic>
+          <p:nvPicPr>
+            <p:cNvPr id="124" name="arduino" descr="Esquemático, Ícone, Código QR&#10;&#10;Descrição gerada automaticamente">
+              <a:extLst>
+                <a:ext uri="{FF2B5EF4-FFF2-40B4-BE49-F238E27FC236}">
+                  <a16:creationId xmlns:a16="http://schemas.microsoft.com/office/drawing/2014/main" id="{56DB52C5-5EDE-492F-A762-45C863D66EA0}"/>
+                </a:ext>
+              </a:extLst>
+            </p:cNvPr>
+            <p:cNvPicPr>
+              <a:picLocks noGrp="1" noRot="1" noChangeAspect="1" noMove="1" noResize="1" noEditPoints="1" noAdjustHandles="1" noChangeArrowheads="1" noChangeShapeType="1" noCrop="1"/>
+            </p:cNvPicPr>
+            <p:nvPr/>
+          </p:nvPicPr>
+          <p:blipFill>
+            <a:blip r:embed="rId16">
+              <a:extLst>
+                <a:ext uri="{28A0092B-C50C-407E-A947-70E740481C1C}">
+                  <a14:useLocalDpi xmlns:a14="http://schemas.microsoft.com/office/drawing/2010/main" val="0"/>
+                </a:ext>
+              </a:extLst>
+            </a:blip>
+            <a:stretch>
+              <a:fillRect/>
+            </a:stretch>
+          </p:blipFill>
+          <p:spPr>
+            <a:xfrm>
+              <a:off x="1695753" y="4241158"/>
+              <a:ext cx="316096" cy="320082"/>
+            </a:xfrm>
+            <a:prstGeom prst="rect">
+              <a:avLst/>
+            </a:prstGeom>
+          </p:spPr>
+        </p:pic>
+        <p:pic>
+          <p:nvPicPr>
+            <p:cNvPr id="136" name="unidade" descr="Desenho de bandeira&#10;&#10;Descrição gerada automaticamente com confiança média">
+              <a:extLst>
+                <a:ext uri="{FF2B5EF4-FFF2-40B4-BE49-F238E27FC236}">
+                  <a16:creationId xmlns:a16="http://schemas.microsoft.com/office/drawing/2014/main" id="{8D74D369-A42F-4A69-A02D-77D97BA5AA15}"/>
+                </a:ext>
+              </a:extLst>
+            </p:cNvPr>
+            <p:cNvPicPr>
+              <a:picLocks noGrp="1" noRot="1" noChangeAspect="1" noMove="1" noResize="1" noEditPoints="1" noAdjustHandles="1" noChangeArrowheads="1" noChangeShapeType="1" noCrop="1"/>
+            </p:cNvPicPr>
+            <p:nvPr/>
+          </p:nvPicPr>
+          <p:blipFill>
+            <a:blip r:embed="rId17">
+              <a:extLst>
+                <a:ext uri="{28A0092B-C50C-407E-A947-70E740481C1C}">
+                  <a14:useLocalDpi xmlns:a14="http://schemas.microsoft.com/office/drawing/2010/main" val="0"/>
+                </a:ext>
+              </a:extLst>
+            </a:blip>
+            <a:stretch>
+              <a:fillRect/>
+            </a:stretch>
+          </p:blipFill>
+          <p:spPr>
+            <a:xfrm>
+              <a:off x="456179" y="4430366"/>
+              <a:ext cx="640164" cy="640165"/>
+            </a:xfrm>
+            <a:prstGeom prst="rect">
+              <a:avLst/>
+            </a:prstGeom>
+          </p:spPr>
+        </p:pic>
+        <p:pic>
+          <p:nvPicPr>
+            <p:cNvPr id="361" name="wifi_unidade" descr="Ícone&#10;&#10;Descrição gerada automaticamente">
+              <a:extLst>
+                <a:ext uri="{FF2B5EF4-FFF2-40B4-BE49-F238E27FC236}">
+                  <a16:creationId xmlns:a16="http://schemas.microsoft.com/office/drawing/2014/main" id="{FBFB2CE3-B26F-4DDD-B74F-F868709FB0AE}"/>
+                </a:ext>
+              </a:extLst>
+            </p:cNvPr>
+            <p:cNvPicPr>
+              <a:picLocks noGrp="1" noRot="1" noChangeAspect="1" noMove="1" noResize="1" noEditPoints="1" noAdjustHandles="1" noChangeArrowheads="1" noChangeShapeType="1" noCrop="1"/>
+            </p:cNvPicPr>
+            <p:nvPr/>
+          </p:nvPicPr>
+          <p:blipFill>
+            <a:blip r:embed="rId11">
+              <a:extLst>
+                <a:ext uri="{28A0092B-C50C-407E-A947-70E740481C1C}">
+                  <a14:useLocalDpi xmlns:a14="http://schemas.microsoft.com/office/drawing/2010/main" val="0"/>
+                </a:ext>
+              </a:extLst>
+            </a:blip>
+            <a:stretch>
+              <a:fillRect/>
+            </a:stretch>
+          </p:blipFill>
+          <p:spPr>
+            <a:xfrm>
+              <a:off x="631693" y="3838087"/>
+              <a:ext cx="288000" cy="288000"/>
+            </a:xfrm>
+            <a:prstGeom prst="rect">
+              <a:avLst/>
+            </a:prstGeom>
+          </p:spPr>
+        </p:pic>
+        <p:pic>
+          <p:nvPicPr>
+            <p:cNvPr id="230" name="servidor" descr="Uma imagem contendo Interface gráfica do usuário&#10;&#10;Descrição gerada automaticamente">
+              <a:extLst>
+                <a:ext uri="{FF2B5EF4-FFF2-40B4-BE49-F238E27FC236}">
+                  <a16:creationId xmlns:a16="http://schemas.microsoft.com/office/drawing/2014/main" id="{90426419-7CCE-4786-93E0-CE58956138A4}"/>
+                </a:ext>
+              </a:extLst>
+            </p:cNvPr>
+            <p:cNvPicPr>
+              <a:picLocks noGrp="1" noRot="1" noChangeAspect="1" noMove="1" noResize="1" noEditPoints="1" noAdjustHandles="1" noChangeArrowheads="1" noChangeShapeType="1" noCrop="1"/>
+            </p:cNvPicPr>
+            <p:nvPr/>
+          </p:nvPicPr>
+          <p:blipFill>
+            <a:blip r:embed="rId18">
+              <a:extLst>
+                <a:ext uri="{28A0092B-C50C-407E-A947-70E740481C1C}">
+                  <a14:useLocalDpi xmlns:a14="http://schemas.microsoft.com/office/drawing/2010/main" val="0"/>
+                </a:ext>
+              </a:extLst>
+            </a:blip>
+            <a:stretch>
+              <a:fillRect/>
+            </a:stretch>
+          </p:blipFill>
+          <p:spPr>
+            <a:xfrm>
+              <a:off x="562305" y="3057354"/>
+              <a:ext cx="426777" cy="426777"/>
+            </a:xfrm>
+            <a:prstGeom prst="rect">
+              <a:avLst/>
+            </a:prstGeom>
+          </p:spPr>
+        </p:pic>
+        <p:pic>
+          <p:nvPicPr>
+            <p:cNvPr id="97" name="roteador_unidade" descr="Ícone&#10;&#10;Descrição gerada automaticamente">
+              <a:extLst>
+                <a:ext uri="{FF2B5EF4-FFF2-40B4-BE49-F238E27FC236}">
+                  <a16:creationId xmlns:a16="http://schemas.microsoft.com/office/drawing/2014/main" id="{8E4D95BC-FA09-4EB4-BA6D-8E10D832437A}"/>
+                </a:ext>
+              </a:extLst>
+            </p:cNvPr>
+            <p:cNvPicPr>
+              <a:picLocks noGrp="1" noRot="1" noChangeAspect="1" noMove="1" noResize="1" noEditPoints="1" noAdjustHandles="1" noChangeArrowheads="1" noChangeShapeType="1" noCrop="1"/>
+            </p:cNvPicPr>
+            <p:nvPr/>
+          </p:nvPicPr>
+          <p:blipFill>
+            <a:blip r:embed="rId12">
+              <a:extLst>
+                <a:ext uri="{28A0092B-C50C-407E-A947-70E740481C1C}">
+                  <a14:useLocalDpi xmlns:a14="http://schemas.microsoft.com/office/drawing/2010/main" val="0"/>
+                </a:ext>
+              </a:extLst>
+            </a:blip>
+            <a:stretch>
+              <a:fillRect/>
+            </a:stretch>
+          </p:blipFill>
+          <p:spPr>
+            <a:xfrm>
+              <a:off x="562306" y="1942910"/>
+              <a:ext cx="426777" cy="426777"/>
+            </a:xfrm>
+            <a:prstGeom prst="rect">
+              <a:avLst/>
+            </a:prstGeom>
+          </p:spPr>
+        </p:pic>
+        <p:pic>
+          <p:nvPicPr>
+            <p:cNvPr id="98" name="firewall_unidade" descr="Logotipo&#10;&#10;Descrição gerada automaticamente com confiança média">
+              <a:extLst>
+                <a:ext uri="{FF2B5EF4-FFF2-40B4-BE49-F238E27FC236}">
+                  <a16:creationId xmlns:a16="http://schemas.microsoft.com/office/drawing/2014/main" id="{A35D7E72-2B20-4809-A4A0-D0BEA6A81605}"/>
+                </a:ext>
+              </a:extLst>
+            </p:cNvPr>
+            <p:cNvPicPr>
+              <a:picLocks noGrp="1" noRot="1" noChangeAspect="1" noMove="1" noResize="1" noEditPoints="1" noAdjustHandles="1" noChangeArrowheads="1" noChangeShapeType="1" noCrop="1"/>
+            </p:cNvPicPr>
+            <p:nvPr/>
+          </p:nvPicPr>
+          <p:blipFill>
+            <a:blip r:embed="rId13">
+              <a:extLst>
+                <a:ext uri="{28A0092B-C50C-407E-A947-70E740481C1C}">
+                  <a14:useLocalDpi xmlns:a14="http://schemas.microsoft.com/office/drawing/2010/main" val="0"/>
+                </a:ext>
+              </a:extLst>
+            </a:blip>
+            <a:stretch>
+              <a:fillRect/>
+            </a:stretch>
+          </p:blipFill>
+          <p:spPr>
+            <a:xfrm>
+              <a:off x="2341934" y="2359591"/>
+              <a:ext cx="425031" cy="425031"/>
+            </a:xfrm>
+            <a:prstGeom prst="rect">
+              <a:avLst/>
+            </a:prstGeom>
+          </p:spPr>
+        </p:pic>
+      </p:grpSp>
       <p:cxnSp>
         <p:nvCxnSpPr>
-          <p:cNvPr id="552" name="5">
-            <a:extLst>
-              <a:ext uri="{FF2B5EF4-FFF2-40B4-BE49-F238E27FC236}">
-                <a16:creationId xmlns:a16="http://schemas.microsoft.com/office/drawing/2014/main" id="{E9318CB9-7F2F-4D1E-A7B6-0FB9105BC06A}"/>
-              </a:ext>
-            </a:extLst>
-          </p:cNvPr>
-          <p:cNvCxnSpPr>
-            <a:cxnSpLocks/>
-          </p:cNvCxnSpPr>
-          <p:nvPr/>
-        </p:nvCxnSpPr>
-        <p:spPr>
-          <a:xfrm rot="10800000" flipV="1">
-            <a:off x="5327607" y="2576829"/>
-            <a:ext cx="1506286" cy="464092"/>
-          </a:xfrm>
-          <a:prstGeom prst="bentConnector3">
-            <a:avLst/>
-          </a:prstGeom>
-          <a:ln w="28575">
-            <a:solidFill>
-              <a:srgbClr val="F56413"/>
-            </a:solidFill>
-            <a:prstDash val="sysDot"/>
-          </a:ln>
-        </p:spPr>
-        <p:style>
-          <a:lnRef idx="1">
-            <a:schemeClr val="accent1"/>
-          </a:lnRef>
-          <a:fillRef idx="0">
-            <a:schemeClr val="accent1"/>
-          </a:fillRef>
-          <a:effectRef idx="0">
-            <a:schemeClr val="accent1"/>
-          </a:effectRef>
-          <a:fontRef idx="minor">
-            <a:schemeClr val="tx1"/>
-          </a:fontRef>
-        </p:style>
-      </p:cxnSp>
-      <p:cxnSp>
-        <p:nvCxnSpPr>
-          <p:cNvPr id="248" name="6">
-            <a:extLst>
-              <a:ext uri="{FF2B5EF4-FFF2-40B4-BE49-F238E27FC236}">
-                <a16:creationId xmlns:a16="http://schemas.microsoft.com/office/drawing/2014/main" id="{B4843F2B-2872-4F12-9048-B9283F255E47}"/>
-              </a:ext>
-            </a:extLst>
-          </p:cNvPr>
-          <p:cNvCxnSpPr>
-            <a:cxnSpLocks/>
-          </p:cNvCxnSpPr>
-          <p:nvPr/>
-        </p:nvCxnSpPr>
-        <p:spPr>
-          <a:xfrm flipH="1">
-            <a:off x="7258924" y="2574822"/>
-            <a:ext cx="1019336" cy="2007"/>
-          </a:xfrm>
-          <a:prstGeom prst="line">
-            <a:avLst/>
-          </a:prstGeom>
-          <a:ln w="28575">
-            <a:solidFill>
-              <a:srgbClr val="F56413"/>
-            </a:solidFill>
-            <a:prstDash val="sysDot"/>
-          </a:ln>
-        </p:spPr>
-        <p:style>
-          <a:lnRef idx="1">
-            <a:schemeClr val="accent1"/>
-          </a:lnRef>
-          <a:fillRef idx="0">
-            <a:schemeClr val="accent1"/>
-          </a:fillRef>
-          <a:effectRef idx="0">
-            <a:schemeClr val="accent1"/>
-          </a:effectRef>
-          <a:fontRef idx="minor">
-            <a:schemeClr val="tx1"/>
-          </a:fontRef>
-        </p:style>
-      </p:cxnSp>
-      <p:cxnSp>
-        <p:nvCxnSpPr>
-          <p:cNvPr id="110" name="7">
-            <a:extLst>
-              <a:ext uri="{FF2B5EF4-FFF2-40B4-BE49-F238E27FC236}">
-                <a16:creationId xmlns:a16="http://schemas.microsoft.com/office/drawing/2014/main" id="{7D0162C3-9969-4187-974A-90B00303406F}"/>
-              </a:ext>
-            </a:extLst>
-          </p:cNvPr>
-          <p:cNvCxnSpPr>
-            <a:cxnSpLocks/>
-          </p:cNvCxnSpPr>
-          <p:nvPr/>
-        </p:nvCxnSpPr>
-        <p:spPr>
-          <a:xfrm flipH="1">
-            <a:off x="8491649" y="2007951"/>
-            <a:ext cx="1" cy="353482"/>
-          </a:xfrm>
-          <a:prstGeom prst="line">
-            <a:avLst/>
-          </a:prstGeom>
-          <a:ln w="28575">
-            <a:solidFill>
-              <a:srgbClr val="F56413"/>
-            </a:solidFill>
-            <a:prstDash val="sysDot"/>
-          </a:ln>
-        </p:spPr>
-        <p:style>
-          <a:lnRef idx="1">
-            <a:schemeClr val="accent1"/>
-          </a:lnRef>
-          <a:fillRef idx="0">
-            <a:schemeClr val="accent1"/>
-          </a:fillRef>
-          <a:effectRef idx="0">
-            <a:schemeClr val="accent1"/>
-          </a:effectRef>
-          <a:fontRef idx="minor">
-            <a:schemeClr val="tx1"/>
-          </a:fontRef>
-        </p:style>
-      </p:cxnSp>
-      <p:cxnSp>
-        <p:nvCxnSpPr>
-          <p:cNvPr id="107" name="8">
-            <a:extLst>
-              <a:ext uri="{FF2B5EF4-FFF2-40B4-BE49-F238E27FC236}">
-                <a16:creationId xmlns:a16="http://schemas.microsoft.com/office/drawing/2014/main" id="{8152DA3F-0FBB-4212-93E1-6A24C4DD8429}"/>
-              </a:ext>
-            </a:extLst>
-          </p:cNvPr>
-          <p:cNvCxnSpPr>
-            <a:cxnSpLocks/>
-          </p:cNvCxnSpPr>
-          <p:nvPr/>
-        </p:nvCxnSpPr>
-        <p:spPr>
-          <a:xfrm rot="5400000">
-            <a:off x="8235119" y="1326832"/>
-            <a:ext cx="508686" cy="1"/>
-          </a:xfrm>
-          <a:prstGeom prst="bentConnector3">
-            <a:avLst/>
-          </a:prstGeom>
-          <a:ln w="28575">
-            <a:solidFill>
-              <a:srgbClr val="F56413"/>
-            </a:solidFill>
-            <a:prstDash val="sysDot"/>
-          </a:ln>
-        </p:spPr>
-        <p:style>
-          <a:lnRef idx="1">
-            <a:schemeClr val="accent1"/>
-          </a:lnRef>
-          <a:fillRef idx="0">
-            <a:schemeClr val="accent1"/>
-          </a:fillRef>
-          <a:effectRef idx="0">
-            <a:schemeClr val="accent1"/>
-          </a:effectRef>
-          <a:fontRef idx="minor">
-            <a:schemeClr val="tx1"/>
-          </a:fontRef>
-        </p:style>
-      </p:cxnSp>
-      <p:cxnSp>
-        <p:nvCxnSpPr>
-          <p:cNvPr id="114" name="9">
-            <a:extLst>
-              <a:ext uri="{FF2B5EF4-FFF2-40B4-BE49-F238E27FC236}">
-                <a16:creationId xmlns:a16="http://schemas.microsoft.com/office/drawing/2014/main" id="{D43DA2F8-46C2-4D3C-987F-D0D295F04A16}"/>
-              </a:ext>
-            </a:extLst>
-          </p:cNvPr>
-          <p:cNvCxnSpPr>
-            <a:cxnSpLocks/>
-          </p:cNvCxnSpPr>
-          <p:nvPr/>
-        </p:nvCxnSpPr>
-        <p:spPr>
-          <a:xfrm>
-            <a:off x="8491649" y="2788210"/>
-            <a:ext cx="0" cy="473330"/>
-          </a:xfrm>
-          <a:prstGeom prst="line">
-            <a:avLst/>
-          </a:prstGeom>
-          <a:ln w="28575">
-            <a:solidFill>
-              <a:srgbClr val="F56413"/>
-            </a:solidFill>
-            <a:prstDash val="sysDot"/>
-          </a:ln>
-        </p:spPr>
-        <p:style>
-          <a:lnRef idx="1">
-            <a:schemeClr val="accent1"/>
-          </a:lnRef>
-          <a:fillRef idx="0">
-            <a:schemeClr val="accent1"/>
-          </a:fillRef>
-          <a:effectRef idx="0">
-            <a:schemeClr val="accent1"/>
-          </a:effectRef>
-          <a:fontRef idx="minor">
-            <a:schemeClr val="tx1"/>
-          </a:fontRef>
-        </p:style>
-      </p:cxnSp>
-      <p:cxnSp>
-        <p:nvCxnSpPr>
-          <p:cNvPr id="102" name="15">
+          <p:cNvPr id="102" name="1">
             <a:extLst>
               <a:ext uri="{FF2B5EF4-FFF2-40B4-BE49-F238E27FC236}">
                 <a16:creationId xmlns:a16="http://schemas.microsoft.com/office/drawing/2014/main" id="{B295D783-8D79-4A34-BED9-D47651D601E3}"/>
@@ -5032,7 +4908,7 @@
       </p:cxnSp>
       <p:cxnSp>
         <p:nvCxnSpPr>
-          <p:cNvPr id="473" name="16">
+          <p:cNvPr id="473" name="2">
             <a:extLst>
               <a:ext uri="{FF2B5EF4-FFF2-40B4-BE49-F238E27FC236}">
                 <a16:creationId xmlns:a16="http://schemas.microsoft.com/office/drawing/2014/main" id="{6A5E7C87-EF3D-45A0-A735-8D3E0209ED7A}"/>
@@ -5078,7 +4954,7 @@
       </p:cxnSp>
       <p:cxnSp>
         <p:nvCxnSpPr>
-          <p:cNvPr id="475" name="17">
+          <p:cNvPr id="475" name="3">
             <a:extLst>
               <a:ext uri="{FF2B5EF4-FFF2-40B4-BE49-F238E27FC236}">
                 <a16:creationId xmlns:a16="http://schemas.microsoft.com/office/drawing/2014/main" id="{BCA0C5D1-2CD1-4274-8E88-4D1C81409A36}"/>
@@ -5124,7 +5000,7 @@
       </p:cxnSp>
       <p:cxnSp>
         <p:nvCxnSpPr>
-          <p:cNvPr id="471" name="18">
+          <p:cNvPr id="471" name="4">
             <a:extLst>
               <a:ext uri="{FF2B5EF4-FFF2-40B4-BE49-F238E27FC236}">
                 <a16:creationId xmlns:a16="http://schemas.microsoft.com/office/drawing/2014/main" id="{AB1FF230-B611-4B8F-A552-BDC44499076C}"/>
@@ -5170,7 +5046,7 @@
       </p:cxnSp>
       <p:cxnSp>
         <p:nvCxnSpPr>
-          <p:cNvPr id="463" name="19">
+          <p:cNvPr id="463" name="5">
             <a:extLst>
               <a:ext uri="{FF2B5EF4-FFF2-40B4-BE49-F238E27FC236}">
                 <a16:creationId xmlns:a16="http://schemas.microsoft.com/office/drawing/2014/main" id="{472166DA-AD18-4004-B03E-EAF65B1406CC}"/>
@@ -5216,7 +5092,7 @@
       </p:cxnSp>
       <p:cxnSp>
         <p:nvCxnSpPr>
-          <p:cNvPr id="465" name="20">
+          <p:cNvPr id="465" name="6">
             <a:extLst>
               <a:ext uri="{FF2B5EF4-FFF2-40B4-BE49-F238E27FC236}">
                 <a16:creationId xmlns:a16="http://schemas.microsoft.com/office/drawing/2014/main" id="{94021463-426D-4E83-8AE7-21E582AA2449}"/>
@@ -5262,7 +5138,7 @@
       </p:cxnSp>
       <p:cxnSp>
         <p:nvCxnSpPr>
-          <p:cNvPr id="467" name="21">
+          <p:cNvPr id="467" name="7">
             <a:extLst>
               <a:ext uri="{FF2B5EF4-FFF2-40B4-BE49-F238E27FC236}">
                 <a16:creationId xmlns:a16="http://schemas.microsoft.com/office/drawing/2014/main" id="{55DCA934-CBD5-4BCE-9A1D-731A5EB143EF}"/>
@@ -5306,78 +5182,545 @@
           </a:fontRef>
         </p:style>
       </p:cxnSp>
-      <p:pic>
-        <p:nvPicPr>
-          <p:cNvPr id="97" name="roteador_omni" descr="Ícone&#10;&#10;Descrição gerada automaticamente">
+      <p:cxnSp>
+        <p:nvCxnSpPr>
+          <p:cNvPr id="4" name="8">
             <a:extLst>
               <a:ext uri="{FF2B5EF4-FFF2-40B4-BE49-F238E27FC236}">
-                <a16:creationId xmlns:a16="http://schemas.microsoft.com/office/drawing/2014/main" id="{8E4D95BC-FA09-4EB4-BA6D-8E10D832437A}"/>
+                <a16:creationId xmlns:a16="http://schemas.microsoft.com/office/drawing/2014/main" id="{F401DA95-5987-4F8F-A2DB-1D94F8EEA402}"/>
               </a:ext>
             </a:extLst>
           </p:cNvPr>
-          <p:cNvPicPr>
-            <a:picLocks noChangeAspect="1"/>
-          </p:cNvPicPr>
+          <p:cNvCxnSpPr>
+            <a:cxnSpLocks/>
+            <a:stCxn id="98" idx="3"/>
+            <a:endCxn id="92" idx="1"/>
+          </p:cNvCxnSpPr>
           <p:nvPr/>
-        </p:nvPicPr>
-        <p:blipFill>
-          <a:blip r:embed="rId18">
-            <a:extLst>
-              <a:ext uri="{28A0092B-C50C-407E-A947-70E740481C1C}">
-                <a14:useLocalDpi xmlns:a14="http://schemas.microsoft.com/office/drawing/2010/main" val="0"/>
-              </a:ext>
-            </a:extLst>
-          </a:blip>
-          <a:stretch>
-            <a:fillRect/>
-          </a:stretch>
-        </p:blipFill>
+        </p:nvCxnSpPr>
         <p:spPr>
           <a:xfrm>
-            <a:off x="562306" y="2220163"/>
-            <a:ext cx="426777" cy="426777"/>
+            <a:off x="2766965" y="2572107"/>
+            <a:ext cx="1493701" cy="466100"/>
           </a:xfrm>
-          <a:prstGeom prst="rect">
+          <a:prstGeom prst="bentConnector3">
             <a:avLst/>
           </a:prstGeom>
+          <a:ln w="28575">
+            <a:solidFill>
+              <a:srgbClr val="7030A0"/>
+            </a:solidFill>
+            <a:prstDash val="sysDot"/>
+          </a:ln>
         </p:spPr>
-      </p:pic>
-      <p:pic>
-        <p:nvPicPr>
-          <p:cNvPr id="98" name="firewall2" descr="Logotipo&#10;&#10;Descrição gerada automaticamente com confiança média">
+        <p:style>
+          <a:lnRef idx="1">
+            <a:schemeClr val="accent1"/>
+          </a:lnRef>
+          <a:fillRef idx="0">
+            <a:schemeClr val="accent1"/>
+          </a:fillRef>
+          <a:effectRef idx="0">
+            <a:schemeClr val="accent1"/>
+          </a:effectRef>
+          <a:fontRef idx="minor">
+            <a:schemeClr val="tx1"/>
+          </a:fontRef>
+        </p:style>
+      </p:cxnSp>
+      <p:cxnSp>
+        <p:nvCxnSpPr>
+          <p:cNvPr id="11" name="9">
             <a:extLst>
               <a:ext uri="{FF2B5EF4-FFF2-40B4-BE49-F238E27FC236}">
-                <a16:creationId xmlns:a16="http://schemas.microsoft.com/office/drawing/2014/main" id="{A35D7E72-2B20-4809-A4A0-D0BEA6A81605}"/>
+                <a16:creationId xmlns:a16="http://schemas.microsoft.com/office/drawing/2014/main" id="{8090A106-0349-48DB-A967-C7FDACCD54CC}"/>
               </a:ext>
             </a:extLst>
           </p:cNvPr>
-          <p:cNvPicPr>
-            <a:picLocks noChangeAspect="1"/>
-          </p:cNvPicPr>
+          <p:cNvCxnSpPr>
+            <a:stCxn id="97" idx="3"/>
+            <a:endCxn id="98" idx="1"/>
+          </p:cNvCxnSpPr>
           <p:nvPr/>
-        </p:nvPicPr>
-        <p:blipFill>
-          <a:blip r:embed="rId10">
+        </p:nvCxnSpPr>
+        <p:spPr>
+          <a:xfrm>
+            <a:off x="989083" y="2156299"/>
+            <a:ext cx="1352851" cy="415808"/>
+          </a:xfrm>
+          <a:prstGeom prst="bentConnector3">
+            <a:avLst/>
+          </a:prstGeom>
+          <a:ln w="28575">
+            <a:solidFill>
+              <a:srgbClr val="7030A0"/>
+            </a:solidFill>
+            <a:prstDash val="sysDot"/>
+          </a:ln>
+        </p:spPr>
+        <p:style>
+          <a:lnRef idx="1">
+            <a:schemeClr val="accent1"/>
+          </a:lnRef>
+          <a:fillRef idx="0">
+            <a:schemeClr val="accent1"/>
+          </a:fillRef>
+          <a:effectRef idx="0">
+            <a:schemeClr val="accent1"/>
+          </a:effectRef>
+          <a:fontRef idx="minor">
+            <a:schemeClr val="tx1"/>
+          </a:fontRef>
+        </p:style>
+      </p:cxnSp>
+      <p:cxnSp>
+        <p:nvCxnSpPr>
+          <p:cNvPr id="13" name="10">
             <a:extLst>
-              <a:ext uri="{28A0092B-C50C-407E-A947-70E740481C1C}">
-                <a14:useLocalDpi xmlns:a14="http://schemas.microsoft.com/office/drawing/2010/main" val="0"/>
+              <a:ext uri="{FF2B5EF4-FFF2-40B4-BE49-F238E27FC236}">
+                <a16:creationId xmlns:a16="http://schemas.microsoft.com/office/drawing/2014/main" id="{64536AA5-9065-4B95-B787-CD8A2DD57382}"/>
               </a:ext>
             </a:extLst>
-          </a:blip>
-          <a:stretch>
-            <a:fillRect/>
-          </a:stretch>
-        </p:blipFill>
+          </p:cNvPr>
+          <p:cNvCxnSpPr>
+            <a:stCxn id="230" idx="0"/>
+            <a:endCxn id="97" idx="2"/>
+          </p:cNvCxnSpPr>
+          <p:nvPr/>
+        </p:nvCxnSpPr>
+        <p:spPr>
+          <a:xfrm rot="5400000" flipH="1" flipV="1">
+            <a:off x="431861" y="2713521"/>
+            <a:ext cx="687667" cy="1"/>
+          </a:xfrm>
+          <a:prstGeom prst="bentConnector3">
+            <a:avLst/>
+          </a:prstGeom>
+          <a:ln w="28575">
+            <a:solidFill>
+              <a:srgbClr val="7030A0"/>
+            </a:solidFill>
+            <a:prstDash val="sysDot"/>
+          </a:ln>
+        </p:spPr>
+        <p:style>
+          <a:lnRef idx="1">
+            <a:schemeClr val="accent1"/>
+          </a:lnRef>
+          <a:fillRef idx="0">
+            <a:schemeClr val="accent1"/>
+          </a:fillRef>
+          <a:effectRef idx="0">
+            <a:schemeClr val="accent1"/>
+          </a:effectRef>
+          <a:fontRef idx="minor">
+            <a:schemeClr val="tx1"/>
+          </a:fontRef>
+        </p:style>
+      </p:cxnSp>
+      <p:cxnSp>
+        <p:nvCxnSpPr>
+          <p:cNvPr id="15" name="11">
+            <a:extLst>
+              <a:ext uri="{FF2B5EF4-FFF2-40B4-BE49-F238E27FC236}">
+                <a16:creationId xmlns:a16="http://schemas.microsoft.com/office/drawing/2014/main" id="{D9109F0E-7C2A-4047-A760-A3221B3B551D}"/>
+              </a:ext>
+            </a:extLst>
+          </p:cNvPr>
+          <p:cNvCxnSpPr>
+            <a:cxnSpLocks/>
+          </p:cNvCxnSpPr>
+          <p:nvPr/>
+        </p:nvCxnSpPr>
+        <p:spPr>
+          <a:xfrm rot="5400000" flipH="1" flipV="1">
+            <a:off x="598716" y="3661109"/>
+            <a:ext cx="353956" cy="1"/>
+          </a:xfrm>
+          <a:prstGeom prst="bentConnector3">
+            <a:avLst/>
+          </a:prstGeom>
+          <a:ln w="28575">
+            <a:solidFill>
+              <a:srgbClr val="7030A0"/>
+            </a:solidFill>
+            <a:prstDash val="sysDot"/>
+          </a:ln>
+        </p:spPr>
+        <p:style>
+          <a:lnRef idx="1">
+            <a:schemeClr val="accent1"/>
+          </a:lnRef>
+          <a:fillRef idx="0">
+            <a:schemeClr val="accent1"/>
+          </a:fillRef>
+          <a:effectRef idx="0">
+            <a:schemeClr val="accent1"/>
+          </a:effectRef>
+          <a:fontRef idx="minor">
+            <a:schemeClr val="tx1"/>
+          </a:fontRef>
+        </p:style>
+      </p:cxnSp>
+      <p:cxnSp>
+        <p:nvCxnSpPr>
+          <p:cNvPr id="17" name="12">
+            <a:extLst>
+              <a:ext uri="{FF2B5EF4-FFF2-40B4-BE49-F238E27FC236}">
+                <a16:creationId xmlns:a16="http://schemas.microsoft.com/office/drawing/2014/main" id="{075A6C28-5E46-42F0-86F7-0BF4B5BF10A5}"/>
+              </a:ext>
+            </a:extLst>
+          </p:cNvPr>
+          <p:cNvCxnSpPr>
+            <a:cxnSpLocks/>
+          </p:cNvCxnSpPr>
+          <p:nvPr/>
+        </p:nvCxnSpPr>
+        <p:spPr>
+          <a:xfrm rot="16200000" flipH="1">
+            <a:off x="623840" y="4277943"/>
+            <a:ext cx="304279" cy="568"/>
+          </a:xfrm>
+          <a:prstGeom prst="bentConnector3">
+            <a:avLst/>
+          </a:prstGeom>
+          <a:ln w="28575">
+            <a:solidFill>
+              <a:srgbClr val="7030A0"/>
+            </a:solidFill>
+            <a:prstDash val="sysDot"/>
+          </a:ln>
+        </p:spPr>
+        <p:style>
+          <a:lnRef idx="1">
+            <a:schemeClr val="accent1"/>
+          </a:lnRef>
+          <a:fillRef idx="0">
+            <a:schemeClr val="accent1"/>
+          </a:fillRef>
+          <a:effectRef idx="0">
+            <a:schemeClr val="accent1"/>
+          </a:effectRef>
+          <a:fontRef idx="minor">
+            <a:schemeClr val="tx1"/>
+          </a:fontRef>
+        </p:style>
+      </p:cxnSp>
+      <p:cxnSp>
+        <p:nvCxnSpPr>
+          <p:cNvPr id="19" name="13">
+            <a:extLst>
+              <a:ext uri="{FF2B5EF4-FFF2-40B4-BE49-F238E27FC236}">
+                <a16:creationId xmlns:a16="http://schemas.microsoft.com/office/drawing/2014/main" id="{24FC1499-2D2F-42EB-B408-975EC86A4D15}"/>
+              </a:ext>
+            </a:extLst>
+          </p:cNvPr>
+          <p:cNvCxnSpPr>
+            <a:cxnSpLocks/>
+          </p:cNvCxnSpPr>
+          <p:nvPr/>
+        </p:nvCxnSpPr>
+        <p:spPr>
+          <a:xfrm flipV="1">
+            <a:off x="1096345" y="4401200"/>
+            <a:ext cx="599410" cy="349250"/>
+          </a:xfrm>
+          <a:prstGeom prst="bentConnector3">
+            <a:avLst/>
+          </a:prstGeom>
+          <a:ln w="28575">
+            <a:solidFill>
+              <a:srgbClr val="7030A0"/>
+            </a:solidFill>
+            <a:prstDash val="sysDot"/>
+          </a:ln>
+        </p:spPr>
+        <p:style>
+          <a:lnRef idx="1">
+            <a:schemeClr val="accent1"/>
+          </a:lnRef>
+          <a:fillRef idx="0">
+            <a:schemeClr val="accent1"/>
+          </a:fillRef>
+          <a:effectRef idx="0">
+            <a:schemeClr val="accent1"/>
+          </a:effectRef>
+          <a:fontRef idx="minor">
+            <a:schemeClr val="tx1"/>
+          </a:fontRef>
+        </p:style>
+      </p:cxnSp>
+      <p:cxnSp>
+        <p:nvCxnSpPr>
+          <p:cNvPr id="21" name="14">
+            <a:extLst>
+              <a:ext uri="{FF2B5EF4-FFF2-40B4-BE49-F238E27FC236}">
+                <a16:creationId xmlns:a16="http://schemas.microsoft.com/office/drawing/2014/main" id="{E8C723EC-5F45-4DA3-962C-D0D46CB038D8}"/>
+              </a:ext>
+            </a:extLst>
+          </p:cNvPr>
+          <p:cNvCxnSpPr>
+            <a:cxnSpLocks/>
+          </p:cNvCxnSpPr>
+          <p:nvPr/>
+        </p:nvCxnSpPr>
         <p:spPr>
           <a:xfrm>
-            <a:off x="2498910" y="2359591"/>
-            <a:ext cx="425031" cy="425031"/>
+            <a:off x="2011851" y="4401200"/>
+            <a:ext cx="409357" cy="1386"/>
           </a:xfrm>
-          <a:prstGeom prst="rect">
+          <a:prstGeom prst="bentConnector3">
             <a:avLst/>
           </a:prstGeom>
+          <a:ln w="28575">
+            <a:solidFill>
+              <a:srgbClr val="7030A0"/>
+            </a:solidFill>
+            <a:prstDash val="sysDot"/>
+          </a:ln>
         </p:spPr>
-      </p:pic>
+        <p:style>
+          <a:lnRef idx="1">
+            <a:schemeClr val="accent1"/>
+          </a:lnRef>
+          <a:fillRef idx="0">
+            <a:schemeClr val="accent1"/>
+          </a:fillRef>
+          <a:effectRef idx="0">
+            <a:schemeClr val="accent1"/>
+          </a:effectRef>
+          <a:fontRef idx="minor">
+            <a:schemeClr val="tx1"/>
+          </a:fontRef>
+        </p:style>
+      </p:cxnSp>
+      <p:cxnSp>
+        <p:nvCxnSpPr>
+          <p:cNvPr id="23" name="15">
+            <a:extLst>
+              <a:ext uri="{FF2B5EF4-FFF2-40B4-BE49-F238E27FC236}">
+                <a16:creationId xmlns:a16="http://schemas.microsoft.com/office/drawing/2014/main" id="{89842922-CE19-435B-AB99-F18AA42C21A2}"/>
+              </a:ext>
+            </a:extLst>
+          </p:cNvPr>
+          <p:cNvCxnSpPr>
+            <a:cxnSpLocks/>
+          </p:cNvCxnSpPr>
+          <p:nvPr/>
+        </p:nvCxnSpPr>
+        <p:spPr>
+          <a:xfrm flipV="1">
+            <a:off x="2737304" y="4401118"/>
+            <a:ext cx="360409" cy="1468"/>
+          </a:xfrm>
+          <a:prstGeom prst="bentConnector3">
+            <a:avLst/>
+          </a:prstGeom>
+          <a:ln w="28575">
+            <a:solidFill>
+              <a:srgbClr val="7030A0"/>
+            </a:solidFill>
+            <a:prstDash val="sysDot"/>
+          </a:ln>
+        </p:spPr>
+        <p:style>
+          <a:lnRef idx="1">
+            <a:schemeClr val="accent1"/>
+          </a:lnRef>
+          <a:fillRef idx="0">
+            <a:schemeClr val="accent1"/>
+          </a:fillRef>
+          <a:effectRef idx="0">
+            <a:schemeClr val="accent1"/>
+          </a:effectRef>
+          <a:fontRef idx="minor">
+            <a:schemeClr val="tx1"/>
+          </a:fontRef>
+        </p:style>
+      </p:cxnSp>
+      <p:cxnSp>
+        <p:nvCxnSpPr>
+          <p:cNvPr id="7" name="16">
+            <a:extLst>
+              <a:ext uri="{FF2B5EF4-FFF2-40B4-BE49-F238E27FC236}">
+                <a16:creationId xmlns:a16="http://schemas.microsoft.com/office/drawing/2014/main" id="{226F66FF-445E-47C0-8503-9C64E806AA43}"/>
+              </a:ext>
+            </a:extLst>
+          </p:cNvPr>
+          <p:cNvCxnSpPr>
+            <a:stCxn id="103" idx="1"/>
+            <a:endCxn id="92" idx="3"/>
+          </p:cNvCxnSpPr>
+          <p:nvPr/>
+        </p:nvCxnSpPr>
+        <p:spPr>
+          <a:xfrm rot="10800000" flipV="1">
+            <a:off x="5327607" y="2574115"/>
+            <a:ext cx="1499250" cy="464092"/>
+          </a:xfrm>
+          <a:prstGeom prst="bentConnector3">
+            <a:avLst/>
+          </a:prstGeom>
+          <a:ln w="28575">
+            <a:solidFill>
+              <a:srgbClr val="7030A0"/>
+            </a:solidFill>
+            <a:prstDash val="sysDot"/>
+          </a:ln>
+        </p:spPr>
+        <p:style>
+          <a:lnRef idx="1">
+            <a:schemeClr val="accent1"/>
+          </a:lnRef>
+          <a:fillRef idx="0">
+            <a:schemeClr val="accent1"/>
+          </a:fillRef>
+          <a:effectRef idx="0">
+            <a:schemeClr val="accent1"/>
+          </a:effectRef>
+          <a:fontRef idx="minor">
+            <a:schemeClr val="tx1"/>
+          </a:fontRef>
+        </p:style>
+      </p:cxnSp>
+      <p:cxnSp>
+        <p:nvCxnSpPr>
+          <p:cNvPr id="94" name="17">
+            <a:extLst>
+              <a:ext uri="{FF2B5EF4-FFF2-40B4-BE49-F238E27FC236}">
+                <a16:creationId xmlns:a16="http://schemas.microsoft.com/office/drawing/2014/main" id="{F2160027-E9E9-405B-A25A-4C499A625673}"/>
+              </a:ext>
+            </a:extLst>
+          </p:cNvPr>
+          <p:cNvCxnSpPr>
+            <a:stCxn id="137" idx="1"/>
+            <a:endCxn id="103" idx="3"/>
+          </p:cNvCxnSpPr>
+          <p:nvPr/>
+        </p:nvCxnSpPr>
+        <p:spPr>
+          <a:xfrm rot="10800000" flipV="1">
+            <a:off x="7251889" y="2165881"/>
+            <a:ext cx="1360229" cy="408233"/>
+          </a:xfrm>
+          <a:prstGeom prst="bentConnector3">
+            <a:avLst/>
+          </a:prstGeom>
+          <a:ln w="28575">
+            <a:solidFill>
+              <a:srgbClr val="7030A0"/>
+            </a:solidFill>
+            <a:prstDash val="sysDot"/>
+          </a:ln>
+        </p:spPr>
+        <p:style>
+          <a:lnRef idx="1">
+            <a:schemeClr val="accent1"/>
+          </a:lnRef>
+          <a:fillRef idx="0">
+            <a:schemeClr val="accent1"/>
+          </a:fillRef>
+          <a:effectRef idx="0">
+            <a:schemeClr val="accent1"/>
+          </a:effectRef>
+          <a:fontRef idx="minor">
+            <a:schemeClr val="tx1"/>
+          </a:fontRef>
+        </p:style>
+      </p:cxnSp>
+      <p:cxnSp>
+        <p:nvCxnSpPr>
+          <p:cNvPr id="476" name="18">
+            <a:extLst>
+              <a:ext uri="{FF2B5EF4-FFF2-40B4-BE49-F238E27FC236}">
+                <a16:creationId xmlns:a16="http://schemas.microsoft.com/office/drawing/2014/main" id="{8B39677E-805E-4CC2-A50D-04F0676B339F}"/>
+              </a:ext>
+            </a:extLst>
+          </p:cNvPr>
+          <p:cNvCxnSpPr>
+            <a:stCxn id="224" idx="0"/>
+            <a:endCxn id="137" idx="2"/>
+          </p:cNvCxnSpPr>
+          <p:nvPr/>
+        </p:nvCxnSpPr>
+        <p:spPr>
+          <a:xfrm rot="16200000" flipV="1">
+            <a:off x="8487565" y="2717211"/>
+            <a:ext cx="675884" cy="1"/>
+          </a:xfrm>
+          <a:prstGeom prst="bentConnector3">
+            <a:avLst/>
+          </a:prstGeom>
+          <a:ln w="28575">
+            <a:solidFill>
+              <a:srgbClr val="7030A0"/>
+            </a:solidFill>
+            <a:prstDash val="sysDot"/>
+          </a:ln>
+        </p:spPr>
+        <p:style>
+          <a:lnRef idx="1">
+            <a:schemeClr val="accent1"/>
+          </a:lnRef>
+          <a:fillRef idx="0">
+            <a:schemeClr val="accent1"/>
+          </a:fillRef>
+          <a:effectRef idx="0">
+            <a:schemeClr val="accent1"/>
+          </a:effectRef>
+          <a:fontRef idx="minor">
+            <a:schemeClr val="tx1"/>
+          </a:fontRef>
+        </p:style>
+      </p:cxnSp>
+      <p:cxnSp>
+        <p:nvCxnSpPr>
+          <p:cNvPr id="478" name="19">
+            <a:extLst>
+              <a:ext uri="{FF2B5EF4-FFF2-40B4-BE49-F238E27FC236}">
+                <a16:creationId xmlns:a16="http://schemas.microsoft.com/office/drawing/2014/main" id="{DCF23C46-7130-4BF0-AA10-F513178EE2E9}"/>
+              </a:ext>
+            </a:extLst>
+          </p:cNvPr>
+          <p:cNvCxnSpPr>
+            <a:cxnSpLocks/>
+            <a:stCxn id="226" idx="0"/>
+            <a:endCxn id="224" idx="2"/>
+          </p:cNvCxnSpPr>
+          <p:nvPr/>
+        </p:nvCxnSpPr>
+        <p:spPr>
+          <a:xfrm rot="5400000" flipH="1" flipV="1">
+            <a:off x="8257206" y="4044344"/>
+            <a:ext cx="1130713" cy="5889"/>
+          </a:xfrm>
+          <a:prstGeom prst="bentConnector3">
+            <a:avLst>
+              <a:gd name="adj1" fmla="val 50000"/>
+            </a:avLst>
+          </a:prstGeom>
+          <a:ln w="28575">
+            <a:solidFill>
+              <a:srgbClr val="7030A0"/>
+            </a:solidFill>
+            <a:prstDash val="sysDot"/>
+          </a:ln>
+        </p:spPr>
+        <p:style>
+          <a:lnRef idx="1">
+            <a:schemeClr val="accent1"/>
+          </a:lnRef>
+          <a:fillRef idx="0">
+            <a:schemeClr val="accent1"/>
+          </a:fillRef>
+          <a:effectRef idx="0">
+            <a:schemeClr val="accent1"/>
+          </a:effectRef>
+          <a:fontRef idx="minor">
+            <a:schemeClr val="tx1"/>
+          </a:fontRef>
+        </p:style>
+      </p:cxnSp>
     </p:spTree>
     <p:extLst>
       <p:ext uri="{BB962C8B-B14F-4D97-AF65-F5344CB8AC3E}">

</xml_diff>

<commit_message>
docs de arq. comp. + att diagrama de solução
</commit_message>
<xml_diff>
--- a/DOCs de T.I/Diagrama_de_Solucao/Presentation.pptx
+++ b/DOCs de T.I/Diagrama_de_Solucao/Presentation.pptx
@@ -243,7 +243,7 @@
           <a:p>
             <a:fld id="{2FC3D184-0F2B-4D9D-BDB9-3409F15C70D5}" type="datetimeFigureOut">
               <a:rPr lang="pt-BR" smtClean="0"/>
-              <a:t>15/04/2022</a:t>
+              <a:t>19/04/2022</a:t>
             </a:fld>
             <a:endParaRPr lang="pt-BR"/>
           </a:p>
@@ -413,7 +413,7 @@
           <a:p>
             <a:fld id="{2FC3D184-0F2B-4D9D-BDB9-3409F15C70D5}" type="datetimeFigureOut">
               <a:rPr lang="pt-BR" smtClean="0"/>
-              <a:t>15/04/2022</a:t>
+              <a:t>19/04/2022</a:t>
             </a:fld>
             <a:endParaRPr lang="pt-BR"/>
           </a:p>
@@ -593,7 +593,7 @@
           <a:p>
             <a:fld id="{2FC3D184-0F2B-4D9D-BDB9-3409F15C70D5}" type="datetimeFigureOut">
               <a:rPr lang="pt-BR" smtClean="0"/>
-              <a:t>15/04/2022</a:t>
+              <a:t>19/04/2022</a:t>
             </a:fld>
             <a:endParaRPr lang="pt-BR"/>
           </a:p>
@@ -763,7 +763,7 @@
           <a:p>
             <a:fld id="{2FC3D184-0F2B-4D9D-BDB9-3409F15C70D5}" type="datetimeFigureOut">
               <a:rPr lang="pt-BR" smtClean="0"/>
-              <a:t>15/04/2022</a:t>
+              <a:t>19/04/2022</a:t>
             </a:fld>
             <a:endParaRPr lang="pt-BR"/>
           </a:p>
@@ -1009,7 +1009,7 @@
           <a:p>
             <a:fld id="{2FC3D184-0F2B-4D9D-BDB9-3409F15C70D5}" type="datetimeFigureOut">
               <a:rPr lang="pt-BR" smtClean="0"/>
-              <a:t>15/04/2022</a:t>
+              <a:t>19/04/2022</a:t>
             </a:fld>
             <a:endParaRPr lang="pt-BR"/>
           </a:p>
@@ -1241,7 +1241,7 @@
           <a:p>
             <a:fld id="{2FC3D184-0F2B-4D9D-BDB9-3409F15C70D5}" type="datetimeFigureOut">
               <a:rPr lang="pt-BR" smtClean="0"/>
-              <a:t>15/04/2022</a:t>
+              <a:t>19/04/2022</a:t>
             </a:fld>
             <a:endParaRPr lang="pt-BR"/>
           </a:p>
@@ -1608,7 +1608,7 @@
           <a:p>
             <a:fld id="{2FC3D184-0F2B-4D9D-BDB9-3409F15C70D5}" type="datetimeFigureOut">
               <a:rPr lang="pt-BR" smtClean="0"/>
-              <a:t>15/04/2022</a:t>
+              <a:t>19/04/2022</a:t>
             </a:fld>
             <a:endParaRPr lang="pt-BR"/>
           </a:p>
@@ -1726,7 +1726,7 @@
           <a:p>
             <a:fld id="{2FC3D184-0F2B-4D9D-BDB9-3409F15C70D5}" type="datetimeFigureOut">
               <a:rPr lang="pt-BR" smtClean="0"/>
-              <a:t>15/04/2022</a:t>
+              <a:t>19/04/2022</a:t>
             </a:fld>
             <a:endParaRPr lang="pt-BR"/>
           </a:p>
@@ -1821,7 +1821,7 @@
           <a:p>
             <a:fld id="{2FC3D184-0F2B-4D9D-BDB9-3409F15C70D5}" type="datetimeFigureOut">
               <a:rPr lang="pt-BR" smtClean="0"/>
-              <a:t>15/04/2022</a:t>
+              <a:t>19/04/2022</a:t>
             </a:fld>
             <a:endParaRPr lang="pt-BR"/>
           </a:p>
@@ -2098,7 +2098,7 @@
           <a:p>
             <a:fld id="{2FC3D184-0F2B-4D9D-BDB9-3409F15C70D5}" type="datetimeFigureOut">
               <a:rPr lang="pt-BR" smtClean="0"/>
-              <a:t>15/04/2022</a:t>
+              <a:t>19/04/2022</a:t>
             </a:fld>
             <a:endParaRPr lang="pt-BR"/>
           </a:p>
@@ -2355,7 +2355,7 @@
           <a:p>
             <a:fld id="{2FC3D184-0F2B-4D9D-BDB9-3409F15C70D5}" type="datetimeFigureOut">
               <a:rPr lang="pt-BR" smtClean="0"/>
-              <a:t>15/04/2022</a:t>
+              <a:t>19/04/2022</a:t>
             </a:fld>
             <a:endParaRPr lang="pt-BR"/>
           </a:p>
@@ -2568,7 +2568,7 @@
           <a:p>
             <a:fld id="{2FC3D184-0F2B-4D9D-BDB9-3409F15C70D5}" type="datetimeFigureOut">
               <a:rPr lang="pt-BR" smtClean="0"/>
-              <a:t>15/04/2022</a:t>
+              <a:t>19/04/2022</a:t>
             </a:fld>
             <a:endParaRPr lang="pt-BR"/>
           </a:p>
@@ -3626,7 +3626,7 @@
           </p:nvSpPr>
           <p:spPr>
             <a:xfrm>
-              <a:off x="2325873" y="4529719"/>
+              <a:off x="3000669" y="4570116"/>
               <a:ext cx="513146" cy="311111"/>
             </a:xfrm>
             <a:prstGeom prst="rect">
@@ -3686,7 +3686,7 @@
           </p:nvSpPr>
           <p:spPr>
             <a:xfrm>
-              <a:off x="1507634" y="4570050"/>
+              <a:off x="2233085" y="4499147"/>
               <a:ext cx="692338" cy="311111"/>
             </a:xfrm>
             <a:prstGeom prst="rect">
@@ -3746,7 +3746,7 @@
           </p:nvSpPr>
           <p:spPr>
             <a:xfrm>
-              <a:off x="2959924" y="4581265"/>
+              <a:off x="1541156" y="4547329"/>
               <a:ext cx="595191" cy="311111"/>
             </a:xfrm>
             <a:prstGeom prst="rect">
@@ -4860,867 +4860,895 @@
           </p:spPr>
         </p:pic>
       </p:grpSp>
-      <p:cxnSp>
-        <p:nvCxnSpPr>
-          <p:cNvPr id="102" name="1">
+      <p:grpSp>
+        <p:nvGrpSpPr>
+          <p:cNvPr id="2" name="lines">
             <a:extLst>
               <a:ext uri="{FF2B5EF4-FFF2-40B4-BE49-F238E27FC236}">
-                <a16:creationId xmlns:a16="http://schemas.microsoft.com/office/drawing/2014/main" id="{B295D783-8D79-4A34-BED9-D47651D601E3}"/>
+                <a16:creationId xmlns:a16="http://schemas.microsoft.com/office/drawing/2014/main" id="{1F795628-7BF1-43D8-93B2-FBDC569A5F3F}"/>
               </a:ext>
             </a:extLst>
           </p:cNvPr>
-          <p:cNvCxnSpPr>
-            <a:cxnSpLocks/>
-            <a:stCxn id="92" idx="0"/>
-            <a:endCxn id="96" idx="2"/>
-          </p:cNvCxnSpPr>
+          <p:cNvGrpSpPr>
+            <a:grpSpLocks noGrp="1" noUngrp="1" noRot="1" noMove="1" noResize="1"/>
+          </p:cNvGrpSpPr>
           <p:nvPr/>
-        </p:nvCxnSpPr>
-        <p:spPr>
-          <a:xfrm rot="16200000" flipV="1">
-            <a:off x="4539034" y="2253195"/>
-            <a:ext cx="508508" cy="2"/>
+        </p:nvGrpSpPr>
+        <p:grpSpPr>
+          <a:xfrm>
+            <a:off x="775693" y="189268"/>
+            <a:ext cx="8049814" cy="4561182"/>
+            <a:chOff x="775693" y="189268"/>
+            <a:chExt cx="8049814" cy="4561182"/>
           </a:xfrm>
-          <a:prstGeom prst="bentConnector3">
-            <a:avLst/>
-          </a:prstGeom>
-          <a:ln w="28575">
-            <a:solidFill>
-              <a:srgbClr val="13C1F7"/>
-            </a:solidFill>
-            <a:prstDash val="sysDot"/>
-          </a:ln>
-        </p:spPr>
-        <p:style>
-          <a:lnRef idx="1">
-            <a:schemeClr val="accent1"/>
-          </a:lnRef>
-          <a:fillRef idx="0">
-            <a:schemeClr val="accent1"/>
-          </a:fillRef>
-          <a:effectRef idx="0">
-            <a:schemeClr val="accent1"/>
-          </a:effectRef>
-          <a:fontRef idx="minor">
-            <a:schemeClr val="tx1"/>
-          </a:fontRef>
-        </p:style>
-      </p:cxnSp>
-      <p:cxnSp>
-        <p:nvCxnSpPr>
-          <p:cNvPr id="473" name="2">
-            <a:extLst>
-              <a:ext uri="{FF2B5EF4-FFF2-40B4-BE49-F238E27FC236}">
-                <a16:creationId xmlns:a16="http://schemas.microsoft.com/office/drawing/2014/main" id="{6A5E7C87-EF3D-45A0-A735-8D3E0209ED7A}"/>
-              </a:ext>
-            </a:extLst>
-          </p:cNvPr>
-          <p:cNvCxnSpPr>
-            <a:cxnSpLocks/>
-            <a:stCxn id="100" idx="3"/>
-            <a:endCxn id="96" idx="0"/>
-          </p:cNvCxnSpPr>
-          <p:nvPr/>
-        </p:nvCxnSpPr>
-        <p:spPr>
-          <a:xfrm>
-            <a:off x="4284903" y="652461"/>
-            <a:ext cx="508384" cy="706316"/>
-          </a:xfrm>
-          <a:prstGeom prst="line">
-            <a:avLst/>
-          </a:prstGeom>
-          <a:ln w="28575">
-            <a:solidFill>
-              <a:srgbClr val="13C1F7"/>
-            </a:solidFill>
-            <a:prstDash val="sysDot"/>
-          </a:ln>
-        </p:spPr>
-        <p:style>
-          <a:lnRef idx="1">
-            <a:schemeClr val="accent1"/>
-          </a:lnRef>
-          <a:fillRef idx="0">
-            <a:schemeClr val="accent1"/>
-          </a:fillRef>
-          <a:effectRef idx="0">
-            <a:schemeClr val="accent1"/>
-          </a:effectRef>
-          <a:fontRef idx="minor">
-            <a:schemeClr val="tx1"/>
-          </a:fontRef>
-        </p:style>
-      </p:cxnSp>
-      <p:cxnSp>
-        <p:nvCxnSpPr>
-          <p:cNvPr id="475" name="3">
-            <a:extLst>
-              <a:ext uri="{FF2B5EF4-FFF2-40B4-BE49-F238E27FC236}">
-                <a16:creationId xmlns:a16="http://schemas.microsoft.com/office/drawing/2014/main" id="{BCA0C5D1-2CD1-4274-8E88-4D1C81409A36}"/>
-              </a:ext>
-            </a:extLst>
-          </p:cNvPr>
-          <p:cNvCxnSpPr>
-            <a:cxnSpLocks/>
-            <a:stCxn id="104" idx="1"/>
-            <a:endCxn id="96" idx="0"/>
-          </p:cNvCxnSpPr>
-          <p:nvPr/>
-        </p:nvCxnSpPr>
-        <p:spPr>
-          <a:xfrm flipH="1">
-            <a:off x="4793287" y="649355"/>
-            <a:ext cx="426470" cy="709422"/>
-          </a:xfrm>
-          <a:prstGeom prst="line">
-            <a:avLst/>
-          </a:prstGeom>
-          <a:ln w="28575">
-            <a:solidFill>
-              <a:srgbClr val="13C1F7"/>
-            </a:solidFill>
-            <a:prstDash val="sysDot"/>
-          </a:ln>
-        </p:spPr>
-        <p:style>
-          <a:lnRef idx="1">
-            <a:schemeClr val="accent1"/>
-          </a:lnRef>
-          <a:fillRef idx="0">
-            <a:schemeClr val="accent1"/>
-          </a:fillRef>
-          <a:effectRef idx="0">
-            <a:schemeClr val="accent1"/>
-          </a:effectRef>
-          <a:fontRef idx="minor">
-            <a:schemeClr val="tx1"/>
-          </a:fontRef>
-        </p:style>
-      </p:cxnSp>
-      <p:cxnSp>
-        <p:nvCxnSpPr>
-          <p:cNvPr id="471" name="4">
-            <a:extLst>
-              <a:ext uri="{FF2B5EF4-FFF2-40B4-BE49-F238E27FC236}">
-                <a16:creationId xmlns:a16="http://schemas.microsoft.com/office/drawing/2014/main" id="{AB1FF230-B611-4B8F-A552-BDC44499076C}"/>
-              </a:ext>
-            </a:extLst>
-          </p:cNvPr>
-          <p:cNvCxnSpPr>
-            <a:cxnSpLocks/>
-            <a:stCxn id="100" idx="3"/>
-            <a:endCxn id="104" idx="1"/>
-          </p:cNvCxnSpPr>
-          <p:nvPr/>
-        </p:nvCxnSpPr>
-        <p:spPr>
-          <a:xfrm flipV="1">
-            <a:off x="4284903" y="649355"/>
-            <a:ext cx="934854" cy="3106"/>
-          </a:xfrm>
-          <a:prstGeom prst="line">
-            <a:avLst/>
-          </a:prstGeom>
-          <a:ln w="28575">
-            <a:solidFill>
-              <a:srgbClr val="13C1F7"/>
-            </a:solidFill>
-            <a:prstDash val="sysDot"/>
-          </a:ln>
-        </p:spPr>
-        <p:style>
-          <a:lnRef idx="1">
-            <a:schemeClr val="accent1"/>
-          </a:lnRef>
-          <a:fillRef idx="0">
-            <a:schemeClr val="accent1"/>
-          </a:fillRef>
-          <a:effectRef idx="0">
-            <a:schemeClr val="accent1"/>
-          </a:effectRef>
-          <a:fontRef idx="minor">
-            <a:schemeClr val="tx1"/>
-          </a:fontRef>
-        </p:style>
-      </p:cxnSp>
-      <p:cxnSp>
-        <p:nvCxnSpPr>
-          <p:cNvPr id="463" name="5">
-            <a:extLst>
-              <a:ext uri="{FF2B5EF4-FFF2-40B4-BE49-F238E27FC236}">
-                <a16:creationId xmlns:a16="http://schemas.microsoft.com/office/drawing/2014/main" id="{472166DA-AD18-4004-B03E-EAF65B1406CC}"/>
-              </a:ext>
-            </a:extLst>
-          </p:cNvPr>
-          <p:cNvCxnSpPr>
-            <a:cxnSpLocks/>
-            <a:stCxn id="112" idx="3"/>
-            <a:endCxn id="100" idx="1"/>
-          </p:cNvCxnSpPr>
-          <p:nvPr/>
-        </p:nvCxnSpPr>
-        <p:spPr>
-          <a:xfrm>
-            <a:off x="3380887" y="189268"/>
-            <a:ext cx="477239" cy="463193"/>
-          </a:xfrm>
-          <a:prstGeom prst="line">
-            <a:avLst/>
-          </a:prstGeom>
-          <a:ln w="28575">
-            <a:solidFill>
-              <a:srgbClr val="13C1F7"/>
-            </a:solidFill>
-            <a:prstDash val="sysDot"/>
-          </a:ln>
-        </p:spPr>
-        <p:style>
-          <a:lnRef idx="1">
-            <a:schemeClr val="accent1"/>
-          </a:lnRef>
-          <a:fillRef idx="0">
-            <a:schemeClr val="accent1"/>
-          </a:fillRef>
-          <a:effectRef idx="0">
-            <a:schemeClr val="accent1"/>
-          </a:effectRef>
-          <a:fontRef idx="minor">
-            <a:schemeClr val="tx1"/>
-          </a:fontRef>
-        </p:style>
-      </p:cxnSp>
-      <p:cxnSp>
-        <p:nvCxnSpPr>
-          <p:cNvPr id="465" name="6">
-            <a:extLst>
-              <a:ext uri="{FF2B5EF4-FFF2-40B4-BE49-F238E27FC236}">
-                <a16:creationId xmlns:a16="http://schemas.microsoft.com/office/drawing/2014/main" id="{94021463-426D-4E83-8AE7-21E582AA2449}"/>
-              </a:ext>
-            </a:extLst>
-          </p:cNvPr>
-          <p:cNvCxnSpPr>
-            <a:cxnSpLocks/>
-            <a:stCxn id="108" idx="3"/>
-            <a:endCxn id="100" idx="1"/>
-          </p:cNvCxnSpPr>
-          <p:nvPr/>
-        </p:nvCxnSpPr>
-        <p:spPr>
-          <a:xfrm flipV="1">
-            <a:off x="3381118" y="652461"/>
-            <a:ext cx="477008" cy="64"/>
-          </a:xfrm>
-          <a:prstGeom prst="line">
-            <a:avLst/>
-          </a:prstGeom>
-          <a:ln w="28575">
-            <a:solidFill>
-              <a:srgbClr val="13C1F7"/>
-            </a:solidFill>
-            <a:prstDash val="sysDot"/>
-          </a:ln>
-        </p:spPr>
-        <p:style>
-          <a:lnRef idx="1">
-            <a:schemeClr val="accent1"/>
-          </a:lnRef>
-          <a:fillRef idx="0">
-            <a:schemeClr val="accent1"/>
-          </a:fillRef>
-          <a:effectRef idx="0">
-            <a:schemeClr val="accent1"/>
-          </a:effectRef>
-          <a:fontRef idx="minor">
-            <a:schemeClr val="tx1"/>
-          </a:fontRef>
-        </p:style>
-      </p:cxnSp>
-      <p:cxnSp>
-        <p:nvCxnSpPr>
-          <p:cNvPr id="467" name="7">
-            <a:extLst>
-              <a:ext uri="{FF2B5EF4-FFF2-40B4-BE49-F238E27FC236}">
-                <a16:creationId xmlns:a16="http://schemas.microsoft.com/office/drawing/2014/main" id="{55DCA934-CBD5-4BCE-9A1D-731A5EB143EF}"/>
-              </a:ext>
-            </a:extLst>
-          </p:cNvPr>
-          <p:cNvCxnSpPr>
-            <a:cxnSpLocks/>
-            <a:stCxn id="116" idx="3"/>
-            <a:endCxn id="100" idx="1"/>
-          </p:cNvCxnSpPr>
-          <p:nvPr/>
-        </p:nvCxnSpPr>
-        <p:spPr>
-          <a:xfrm flipV="1">
-            <a:off x="3373952" y="652461"/>
-            <a:ext cx="484174" cy="483067"/>
-          </a:xfrm>
-          <a:prstGeom prst="line">
-            <a:avLst/>
-          </a:prstGeom>
-          <a:ln w="28575">
-            <a:solidFill>
-              <a:srgbClr val="13C1F7"/>
-            </a:solidFill>
-            <a:prstDash val="sysDot"/>
-          </a:ln>
-        </p:spPr>
-        <p:style>
-          <a:lnRef idx="1">
-            <a:schemeClr val="accent1"/>
-          </a:lnRef>
-          <a:fillRef idx="0">
-            <a:schemeClr val="accent1"/>
-          </a:fillRef>
-          <a:effectRef idx="0">
-            <a:schemeClr val="accent1"/>
-          </a:effectRef>
-          <a:fontRef idx="minor">
-            <a:schemeClr val="tx1"/>
-          </a:fontRef>
-        </p:style>
-      </p:cxnSp>
-      <p:cxnSp>
-        <p:nvCxnSpPr>
-          <p:cNvPr id="4" name="8">
-            <a:extLst>
-              <a:ext uri="{FF2B5EF4-FFF2-40B4-BE49-F238E27FC236}">
-                <a16:creationId xmlns:a16="http://schemas.microsoft.com/office/drawing/2014/main" id="{F401DA95-5987-4F8F-A2DB-1D94F8EEA402}"/>
-              </a:ext>
-            </a:extLst>
-          </p:cNvPr>
-          <p:cNvCxnSpPr>
-            <a:cxnSpLocks/>
-            <a:stCxn id="98" idx="3"/>
-            <a:endCxn id="92" idx="1"/>
-          </p:cNvCxnSpPr>
-          <p:nvPr/>
-        </p:nvCxnSpPr>
-        <p:spPr>
-          <a:xfrm>
-            <a:off x="2766965" y="2572107"/>
-            <a:ext cx="1493701" cy="466100"/>
-          </a:xfrm>
-          <a:prstGeom prst="bentConnector3">
-            <a:avLst/>
-          </a:prstGeom>
-          <a:ln w="28575">
-            <a:solidFill>
-              <a:srgbClr val="7030A0"/>
-            </a:solidFill>
-            <a:prstDash val="sysDot"/>
-          </a:ln>
-        </p:spPr>
-        <p:style>
-          <a:lnRef idx="1">
-            <a:schemeClr val="accent1"/>
-          </a:lnRef>
-          <a:fillRef idx="0">
-            <a:schemeClr val="accent1"/>
-          </a:fillRef>
-          <a:effectRef idx="0">
-            <a:schemeClr val="accent1"/>
-          </a:effectRef>
-          <a:fontRef idx="minor">
-            <a:schemeClr val="tx1"/>
-          </a:fontRef>
-        </p:style>
-      </p:cxnSp>
-      <p:cxnSp>
-        <p:nvCxnSpPr>
-          <p:cNvPr id="11" name="9">
-            <a:extLst>
-              <a:ext uri="{FF2B5EF4-FFF2-40B4-BE49-F238E27FC236}">
-                <a16:creationId xmlns:a16="http://schemas.microsoft.com/office/drawing/2014/main" id="{8090A106-0349-48DB-A967-C7FDACCD54CC}"/>
-              </a:ext>
-            </a:extLst>
-          </p:cNvPr>
-          <p:cNvCxnSpPr>
-            <a:stCxn id="97" idx="3"/>
-            <a:endCxn id="98" idx="1"/>
-          </p:cNvCxnSpPr>
-          <p:nvPr/>
-        </p:nvCxnSpPr>
-        <p:spPr>
-          <a:xfrm>
-            <a:off x="989083" y="2156299"/>
-            <a:ext cx="1352851" cy="415808"/>
-          </a:xfrm>
-          <a:prstGeom prst="bentConnector3">
-            <a:avLst/>
-          </a:prstGeom>
-          <a:ln w="28575">
-            <a:solidFill>
-              <a:srgbClr val="7030A0"/>
-            </a:solidFill>
-            <a:prstDash val="sysDot"/>
-          </a:ln>
-        </p:spPr>
-        <p:style>
-          <a:lnRef idx="1">
-            <a:schemeClr val="accent1"/>
-          </a:lnRef>
-          <a:fillRef idx="0">
-            <a:schemeClr val="accent1"/>
-          </a:fillRef>
-          <a:effectRef idx="0">
-            <a:schemeClr val="accent1"/>
-          </a:effectRef>
-          <a:fontRef idx="minor">
-            <a:schemeClr val="tx1"/>
-          </a:fontRef>
-        </p:style>
-      </p:cxnSp>
-      <p:cxnSp>
-        <p:nvCxnSpPr>
-          <p:cNvPr id="13" name="10">
-            <a:extLst>
-              <a:ext uri="{FF2B5EF4-FFF2-40B4-BE49-F238E27FC236}">
-                <a16:creationId xmlns:a16="http://schemas.microsoft.com/office/drawing/2014/main" id="{64536AA5-9065-4B95-B787-CD8A2DD57382}"/>
-              </a:ext>
-            </a:extLst>
-          </p:cNvPr>
-          <p:cNvCxnSpPr>
-            <a:stCxn id="230" idx="0"/>
-            <a:endCxn id="97" idx="2"/>
-          </p:cNvCxnSpPr>
-          <p:nvPr/>
-        </p:nvCxnSpPr>
-        <p:spPr>
-          <a:xfrm rot="5400000" flipH="1" flipV="1">
-            <a:off x="431861" y="2713521"/>
-            <a:ext cx="687667" cy="1"/>
-          </a:xfrm>
-          <a:prstGeom prst="bentConnector3">
-            <a:avLst/>
-          </a:prstGeom>
-          <a:ln w="28575">
-            <a:solidFill>
-              <a:srgbClr val="7030A0"/>
-            </a:solidFill>
-            <a:prstDash val="sysDot"/>
-          </a:ln>
-        </p:spPr>
-        <p:style>
-          <a:lnRef idx="1">
-            <a:schemeClr val="accent1"/>
-          </a:lnRef>
-          <a:fillRef idx="0">
-            <a:schemeClr val="accent1"/>
-          </a:fillRef>
-          <a:effectRef idx="0">
-            <a:schemeClr val="accent1"/>
-          </a:effectRef>
-          <a:fontRef idx="minor">
-            <a:schemeClr val="tx1"/>
-          </a:fontRef>
-        </p:style>
-      </p:cxnSp>
-      <p:cxnSp>
-        <p:nvCxnSpPr>
-          <p:cNvPr id="15" name="11">
-            <a:extLst>
-              <a:ext uri="{FF2B5EF4-FFF2-40B4-BE49-F238E27FC236}">
-                <a16:creationId xmlns:a16="http://schemas.microsoft.com/office/drawing/2014/main" id="{D9109F0E-7C2A-4047-A760-A3221B3B551D}"/>
-              </a:ext>
-            </a:extLst>
-          </p:cNvPr>
-          <p:cNvCxnSpPr>
-            <a:cxnSpLocks/>
-          </p:cNvCxnSpPr>
-          <p:nvPr/>
-        </p:nvCxnSpPr>
-        <p:spPr>
-          <a:xfrm rot="5400000" flipH="1" flipV="1">
-            <a:off x="598716" y="3661109"/>
-            <a:ext cx="353956" cy="1"/>
-          </a:xfrm>
-          <a:prstGeom prst="bentConnector3">
-            <a:avLst/>
-          </a:prstGeom>
-          <a:ln w="28575">
-            <a:solidFill>
-              <a:srgbClr val="7030A0"/>
-            </a:solidFill>
-            <a:prstDash val="sysDot"/>
-          </a:ln>
-        </p:spPr>
-        <p:style>
-          <a:lnRef idx="1">
-            <a:schemeClr val="accent1"/>
-          </a:lnRef>
-          <a:fillRef idx="0">
-            <a:schemeClr val="accent1"/>
-          </a:fillRef>
-          <a:effectRef idx="0">
-            <a:schemeClr val="accent1"/>
-          </a:effectRef>
-          <a:fontRef idx="minor">
-            <a:schemeClr val="tx1"/>
-          </a:fontRef>
-        </p:style>
-      </p:cxnSp>
-      <p:cxnSp>
-        <p:nvCxnSpPr>
-          <p:cNvPr id="17" name="12">
-            <a:extLst>
-              <a:ext uri="{FF2B5EF4-FFF2-40B4-BE49-F238E27FC236}">
-                <a16:creationId xmlns:a16="http://schemas.microsoft.com/office/drawing/2014/main" id="{075A6C28-5E46-42F0-86F7-0BF4B5BF10A5}"/>
-              </a:ext>
-            </a:extLst>
-          </p:cNvPr>
-          <p:cNvCxnSpPr>
-            <a:cxnSpLocks/>
-          </p:cNvCxnSpPr>
-          <p:nvPr/>
-        </p:nvCxnSpPr>
-        <p:spPr>
-          <a:xfrm rot="16200000" flipH="1">
-            <a:off x="623840" y="4277943"/>
-            <a:ext cx="304279" cy="568"/>
-          </a:xfrm>
-          <a:prstGeom prst="bentConnector3">
-            <a:avLst/>
-          </a:prstGeom>
-          <a:ln w="28575">
-            <a:solidFill>
-              <a:srgbClr val="7030A0"/>
-            </a:solidFill>
-            <a:prstDash val="sysDot"/>
-          </a:ln>
-        </p:spPr>
-        <p:style>
-          <a:lnRef idx="1">
-            <a:schemeClr val="accent1"/>
-          </a:lnRef>
-          <a:fillRef idx="0">
-            <a:schemeClr val="accent1"/>
-          </a:fillRef>
-          <a:effectRef idx="0">
-            <a:schemeClr val="accent1"/>
-          </a:effectRef>
-          <a:fontRef idx="minor">
-            <a:schemeClr val="tx1"/>
-          </a:fontRef>
-        </p:style>
-      </p:cxnSp>
-      <p:cxnSp>
-        <p:nvCxnSpPr>
-          <p:cNvPr id="19" name="13">
-            <a:extLst>
-              <a:ext uri="{FF2B5EF4-FFF2-40B4-BE49-F238E27FC236}">
-                <a16:creationId xmlns:a16="http://schemas.microsoft.com/office/drawing/2014/main" id="{24FC1499-2D2F-42EB-B408-975EC86A4D15}"/>
-              </a:ext>
-            </a:extLst>
-          </p:cNvPr>
-          <p:cNvCxnSpPr>
-            <a:cxnSpLocks/>
-          </p:cNvCxnSpPr>
-          <p:nvPr/>
-        </p:nvCxnSpPr>
-        <p:spPr>
-          <a:xfrm flipV="1">
-            <a:off x="1096345" y="4401200"/>
-            <a:ext cx="599410" cy="349250"/>
-          </a:xfrm>
-          <a:prstGeom prst="bentConnector3">
-            <a:avLst/>
-          </a:prstGeom>
-          <a:ln w="28575">
-            <a:solidFill>
-              <a:srgbClr val="7030A0"/>
-            </a:solidFill>
-            <a:prstDash val="sysDot"/>
-          </a:ln>
-        </p:spPr>
-        <p:style>
-          <a:lnRef idx="1">
-            <a:schemeClr val="accent1"/>
-          </a:lnRef>
-          <a:fillRef idx="0">
-            <a:schemeClr val="accent1"/>
-          </a:fillRef>
-          <a:effectRef idx="0">
-            <a:schemeClr val="accent1"/>
-          </a:effectRef>
-          <a:fontRef idx="minor">
-            <a:schemeClr val="tx1"/>
-          </a:fontRef>
-        </p:style>
-      </p:cxnSp>
-      <p:cxnSp>
-        <p:nvCxnSpPr>
-          <p:cNvPr id="21" name="14">
-            <a:extLst>
-              <a:ext uri="{FF2B5EF4-FFF2-40B4-BE49-F238E27FC236}">
-                <a16:creationId xmlns:a16="http://schemas.microsoft.com/office/drawing/2014/main" id="{E8C723EC-5F45-4DA3-962C-D0D46CB038D8}"/>
-              </a:ext>
-            </a:extLst>
-          </p:cNvPr>
-          <p:cNvCxnSpPr>
-            <a:cxnSpLocks/>
-          </p:cNvCxnSpPr>
-          <p:nvPr/>
-        </p:nvCxnSpPr>
-        <p:spPr>
-          <a:xfrm>
-            <a:off x="2011851" y="4401200"/>
-            <a:ext cx="409357" cy="1386"/>
-          </a:xfrm>
-          <a:prstGeom prst="bentConnector3">
-            <a:avLst/>
-          </a:prstGeom>
-          <a:ln w="28575">
-            <a:solidFill>
-              <a:srgbClr val="7030A0"/>
-            </a:solidFill>
-            <a:prstDash val="sysDot"/>
-          </a:ln>
-        </p:spPr>
-        <p:style>
-          <a:lnRef idx="1">
-            <a:schemeClr val="accent1"/>
-          </a:lnRef>
-          <a:fillRef idx="0">
-            <a:schemeClr val="accent1"/>
-          </a:fillRef>
-          <a:effectRef idx="0">
-            <a:schemeClr val="accent1"/>
-          </a:effectRef>
-          <a:fontRef idx="minor">
-            <a:schemeClr val="tx1"/>
-          </a:fontRef>
-        </p:style>
-      </p:cxnSp>
-      <p:cxnSp>
-        <p:nvCxnSpPr>
-          <p:cNvPr id="23" name="15">
-            <a:extLst>
-              <a:ext uri="{FF2B5EF4-FFF2-40B4-BE49-F238E27FC236}">
-                <a16:creationId xmlns:a16="http://schemas.microsoft.com/office/drawing/2014/main" id="{89842922-CE19-435B-AB99-F18AA42C21A2}"/>
-              </a:ext>
-            </a:extLst>
-          </p:cNvPr>
-          <p:cNvCxnSpPr>
-            <a:cxnSpLocks/>
-          </p:cNvCxnSpPr>
-          <p:nvPr/>
-        </p:nvCxnSpPr>
-        <p:spPr>
-          <a:xfrm flipV="1">
-            <a:off x="2737304" y="4401118"/>
-            <a:ext cx="360409" cy="1468"/>
-          </a:xfrm>
-          <a:prstGeom prst="bentConnector3">
-            <a:avLst/>
-          </a:prstGeom>
-          <a:ln w="28575">
-            <a:solidFill>
-              <a:srgbClr val="7030A0"/>
-            </a:solidFill>
-            <a:prstDash val="sysDot"/>
-          </a:ln>
-        </p:spPr>
-        <p:style>
-          <a:lnRef idx="1">
-            <a:schemeClr val="accent1"/>
-          </a:lnRef>
-          <a:fillRef idx="0">
-            <a:schemeClr val="accent1"/>
-          </a:fillRef>
-          <a:effectRef idx="0">
-            <a:schemeClr val="accent1"/>
-          </a:effectRef>
-          <a:fontRef idx="minor">
-            <a:schemeClr val="tx1"/>
-          </a:fontRef>
-        </p:style>
-      </p:cxnSp>
-      <p:cxnSp>
-        <p:nvCxnSpPr>
-          <p:cNvPr id="7" name="16">
-            <a:extLst>
-              <a:ext uri="{FF2B5EF4-FFF2-40B4-BE49-F238E27FC236}">
-                <a16:creationId xmlns:a16="http://schemas.microsoft.com/office/drawing/2014/main" id="{226F66FF-445E-47C0-8503-9C64E806AA43}"/>
-              </a:ext>
-            </a:extLst>
-          </p:cNvPr>
-          <p:cNvCxnSpPr>
-            <a:stCxn id="103" idx="1"/>
-            <a:endCxn id="92" idx="3"/>
-          </p:cNvCxnSpPr>
-          <p:nvPr/>
-        </p:nvCxnSpPr>
-        <p:spPr>
-          <a:xfrm rot="10800000" flipV="1">
-            <a:off x="5327607" y="2574115"/>
-            <a:ext cx="1499250" cy="464092"/>
-          </a:xfrm>
-          <a:prstGeom prst="bentConnector3">
-            <a:avLst/>
-          </a:prstGeom>
-          <a:ln w="28575">
-            <a:solidFill>
-              <a:srgbClr val="7030A0"/>
-            </a:solidFill>
-            <a:prstDash val="sysDot"/>
-          </a:ln>
-        </p:spPr>
-        <p:style>
-          <a:lnRef idx="1">
-            <a:schemeClr val="accent1"/>
-          </a:lnRef>
-          <a:fillRef idx="0">
-            <a:schemeClr val="accent1"/>
-          </a:fillRef>
-          <a:effectRef idx="0">
-            <a:schemeClr val="accent1"/>
-          </a:effectRef>
-          <a:fontRef idx="minor">
-            <a:schemeClr val="tx1"/>
-          </a:fontRef>
-        </p:style>
-      </p:cxnSp>
-      <p:cxnSp>
-        <p:nvCxnSpPr>
-          <p:cNvPr id="94" name="17">
-            <a:extLst>
-              <a:ext uri="{FF2B5EF4-FFF2-40B4-BE49-F238E27FC236}">
-                <a16:creationId xmlns:a16="http://schemas.microsoft.com/office/drawing/2014/main" id="{F2160027-E9E9-405B-A25A-4C499A625673}"/>
-              </a:ext>
-            </a:extLst>
-          </p:cNvPr>
-          <p:cNvCxnSpPr>
-            <a:stCxn id="137" idx="1"/>
-            <a:endCxn id="103" idx="3"/>
-          </p:cNvCxnSpPr>
-          <p:nvPr/>
-        </p:nvCxnSpPr>
-        <p:spPr>
-          <a:xfrm rot="10800000" flipV="1">
-            <a:off x="7251889" y="2165881"/>
-            <a:ext cx="1360229" cy="408233"/>
-          </a:xfrm>
-          <a:prstGeom prst="bentConnector3">
-            <a:avLst/>
-          </a:prstGeom>
-          <a:ln w="28575">
-            <a:solidFill>
-              <a:srgbClr val="7030A0"/>
-            </a:solidFill>
-            <a:prstDash val="sysDot"/>
-          </a:ln>
-        </p:spPr>
-        <p:style>
-          <a:lnRef idx="1">
-            <a:schemeClr val="accent1"/>
-          </a:lnRef>
-          <a:fillRef idx="0">
-            <a:schemeClr val="accent1"/>
-          </a:fillRef>
-          <a:effectRef idx="0">
-            <a:schemeClr val="accent1"/>
-          </a:effectRef>
-          <a:fontRef idx="minor">
-            <a:schemeClr val="tx1"/>
-          </a:fontRef>
-        </p:style>
-      </p:cxnSp>
-      <p:cxnSp>
-        <p:nvCxnSpPr>
-          <p:cNvPr id="476" name="18">
-            <a:extLst>
-              <a:ext uri="{FF2B5EF4-FFF2-40B4-BE49-F238E27FC236}">
-                <a16:creationId xmlns:a16="http://schemas.microsoft.com/office/drawing/2014/main" id="{8B39677E-805E-4CC2-A50D-04F0676B339F}"/>
-              </a:ext>
-            </a:extLst>
-          </p:cNvPr>
-          <p:cNvCxnSpPr>
-            <a:stCxn id="224" idx="0"/>
-            <a:endCxn id="137" idx="2"/>
-          </p:cNvCxnSpPr>
-          <p:nvPr/>
-        </p:nvCxnSpPr>
-        <p:spPr>
-          <a:xfrm rot="16200000" flipV="1">
-            <a:off x="8487565" y="2717211"/>
-            <a:ext cx="675884" cy="1"/>
-          </a:xfrm>
-          <a:prstGeom prst="bentConnector3">
-            <a:avLst/>
-          </a:prstGeom>
-          <a:ln w="28575">
-            <a:solidFill>
-              <a:srgbClr val="7030A0"/>
-            </a:solidFill>
-            <a:prstDash val="sysDot"/>
-          </a:ln>
-        </p:spPr>
-        <p:style>
-          <a:lnRef idx="1">
-            <a:schemeClr val="accent1"/>
-          </a:lnRef>
-          <a:fillRef idx="0">
-            <a:schemeClr val="accent1"/>
-          </a:fillRef>
-          <a:effectRef idx="0">
-            <a:schemeClr val="accent1"/>
-          </a:effectRef>
-          <a:fontRef idx="minor">
-            <a:schemeClr val="tx1"/>
-          </a:fontRef>
-        </p:style>
-      </p:cxnSp>
-      <p:cxnSp>
-        <p:nvCxnSpPr>
-          <p:cNvPr id="478" name="19">
-            <a:extLst>
-              <a:ext uri="{FF2B5EF4-FFF2-40B4-BE49-F238E27FC236}">
-                <a16:creationId xmlns:a16="http://schemas.microsoft.com/office/drawing/2014/main" id="{DCF23C46-7130-4BF0-AA10-F513178EE2E9}"/>
-              </a:ext>
-            </a:extLst>
-          </p:cNvPr>
-          <p:cNvCxnSpPr>
-            <a:cxnSpLocks/>
-            <a:stCxn id="226" idx="0"/>
-            <a:endCxn id="224" idx="2"/>
-          </p:cNvCxnSpPr>
-          <p:nvPr/>
-        </p:nvCxnSpPr>
-        <p:spPr>
-          <a:xfrm rot="5400000" flipH="1" flipV="1">
-            <a:off x="8257206" y="4044344"/>
-            <a:ext cx="1130713" cy="5889"/>
-          </a:xfrm>
-          <a:prstGeom prst="bentConnector3">
-            <a:avLst>
-              <a:gd name="adj1" fmla="val 50000"/>
-            </a:avLst>
-          </a:prstGeom>
-          <a:ln w="28575">
-            <a:solidFill>
-              <a:srgbClr val="7030A0"/>
-            </a:solidFill>
-            <a:prstDash val="sysDot"/>
-          </a:ln>
-        </p:spPr>
-        <p:style>
-          <a:lnRef idx="1">
-            <a:schemeClr val="accent1"/>
-          </a:lnRef>
-          <a:fillRef idx="0">
-            <a:schemeClr val="accent1"/>
-          </a:fillRef>
-          <a:effectRef idx="0">
-            <a:schemeClr val="accent1"/>
-          </a:effectRef>
-          <a:fontRef idx="minor">
-            <a:schemeClr val="tx1"/>
-          </a:fontRef>
-        </p:style>
-      </p:cxnSp>
+        </p:grpSpPr>
+        <p:cxnSp>
+          <p:nvCxnSpPr>
+            <p:cNvPr id="102" name="1">
+              <a:extLst>
+                <a:ext uri="{FF2B5EF4-FFF2-40B4-BE49-F238E27FC236}">
+                  <a16:creationId xmlns:a16="http://schemas.microsoft.com/office/drawing/2014/main" id="{B295D783-8D79-4A34-BED9-D47651D601E3}"/>
+                </a:ext>
+              </a:extLst>
+            </p:cNvPr>
+            <p:cNvCxnSpPr>
+              <a:cxnSpLocks noGrp="1" noRot="1" noMove="1" noResize="1" noEditPoints="1" noAdjustHandles="1" noChangeArrowheads="1" noChangeShapeType="1"/>
+              <a:stCxn id="92" idx="0"/>
+              <a:endCxn id="96" idx="2"/>
+            </p:cNvCxnSpPr>
+            <p:nvPr/>
+          </p:nvCxnSpPr>
+          <p:spPr>
+            <a:xfrm rot="16200000" flipV="1">
+              <a:off x="4539034" y="2253195"/>
+              <a:ext cx="508508" cy="2"/>
+            </a:xfrm>
+            <a:prstGeom prst="bentConnector3">
+              <a:avLst/>
+            </a:prstGeom>
+            <a:ln w="28575">
+              <a:solidFill>
+                <a:srgbClr val="13C1F7"/>
+              </a:solidFill>
+              <a:prstDash val="sysDot"/>
+            </a:ln>
+          </p:spPr>
+          <p:style>
+            <a:lnRef idx="1">
+              <a:schemeClr val="accent1"/>
+            </a:lnRef>
+            <a:fillRef idx="0">
+              <a:schemeClr val="accent1"/>
+            </a:fillRef>
+            <a:effectRef idx="0">
+              <a:schemeClr val="accent1"/>
+            </a:effectRef>
+            <a:fontRef idx="minor">
+              <a:schemeClr val="tx1"/>
+            </a:fontRef>
+          </p:style>
+        </p:cxnSp>
+        <p:cxnSp>
+          <p:nvCxnSpPr>
+            <p:cNvPr id="473" name="2">
+              <a:extLst>
+                <a:ext uri="{FF2B5EF4-FFF2-40B4-BE49-F238E27FC236}">
+                  <a16:creationId xmlns:a16="http://schemas.microsoft.com/office/drawing/2014/main" id="{6A5E7C87-EF3D-45A0-A735-8D3E0209ED7A}"/>
+                </a:ext>
+              </a:extLst>
+            </p:cNvPr>
+            <p:cNvCxnSpPr>
+              <a:cxnSpLocks noGrp="1" noRot="1" noMove="1" noResize="1" noEditPoints="1" noAdjustHandles="1" noChangeArrowheads="1" noChangeShapeType="1"/>
+              <a:stCxn id="100" idx="3"/>
+              <a:endCxn id="96" idx="0"/>
+            </p:cNvCxnSpPr>
+            <p:nvPr/>
+          </p:nvCxnSpPr>
+          <p:spPr>
+            <a:xfrm>
+              <a:off x="4284903" y="652461"/>
+              <a:ext cx="508384" cy="706316"/>
+            </a:xfrm>
+            <a:prstGeom prst="line">
+              <a:avLst/>
+            </a:prstGeom>
+            <a:ln w="28575">
+              <a:solidFill>
+                <a:srgbClr val="13C1F7"/>
+              </a:solidFill>
+              <a:prstDash val="sysDot"/>
+            </a:ln>
+          </p:spPr>
+          <p:style>
+            <a:lnRef idx="1">
+              <a:schemeClr val="accent1"/>
+            </a:lnRef>
+            <a:fillRef idx="0">
+              <a:schemeClr val="accent1"/>
+            </a:fillRef>
+            <a:effectRef idx="0">
+              <a:schemeClr val="accent1"/>
+            </a:effectRef>
+            <a:fontRef idx="minor">
+              <a:schemeClr val="tx1"/>
+            </a:fontRef>
+          </p:style>
+        </p:cxnSp>
+        <p:cxnSp>
+          <p:nvCxnSpPr>
+            <p:cNvPr id="475" name="3">
+              <a:extLst>
+                <a:ext uri="{FF2B5EF4-FFF2-40B4-BE49-F238E27FC236}">
+                  <a16:creationId xmlns:a16="http://schemas.microsoft.com/office/drawing/2014/main" id="{BCA0C5D1-2CD1-4274-8E88-4D1C81409A36}"/>
+                </a:ext>
+              </a:extLst>
+            </p:cNvPr>
+            <p:cNvCxnSpPr>
+              <a:cxnSpLocks noGrp="1" noRot="1" noMove="1" noResize="1" noEditPoints="1" noAdjustHandles="1" noChangeArrowheads="1" noChangeShapeType="1"/>
+              <a:stCxn id="104" idx="1"/>
+              <a:endCxn id="96" idx="0"/>
+            </p:cNvCxnSpPr>
+            <p:nvPr/>
+          </p:nvCxnSpPr>
+          <p:spPr>
+            <a:xfrm flipH="1">
+              <a:off x="4793287" y="649355"/>
+              <a:ext cx="426470" cy="709422"/>
+            </a:xfrm>
+            <a:prstGeom prst="line">
+              <a:avLst/>
+            </a:prstGeom>
+            <a:ln w="28575">
+              <a:solidFill>
+                <a:srgbClr val="13C1F7"/>
+              </a:solidFill>
+              <a:prstDash val="sysDot"/>
+            </a:ln>
+          </p:spPr>
+          <p:style>
+            <a:lnRef idx="1">
+              <a:schemeClr val="accent1"/>
+            </a:lnRef>
+            <a:fillRef idx="0">
+              <a:schemeClr val="accent1"/>
+            </a:fillRef>
+            <a:effectRef idx="0">
+              <a:schemeClr val="accent1"/>
+            </a:effectRef>
+            <a:fontRef idx="minor">
+              <a:schemeClr val="tx1"/>
+            </a:fontRef>
+          </p:style>
+        </p:cxnSp>
+        <p:cxnSp>
+          <p:nvCxnSpPr>
+            <p:cNvPr id="471" name="4">
+              <a:extLst>
+                <a:ext uri="{FF2B5EF4-FFF2-40B4-BE49-F238E27FC236}">
+                  <a16:creationId xmlns:a16="http://schemas.microsoft.com/office/drawing/2014/main" id="{AB1FF230-B611-4B8F-A552-BDC44499076C}"/>
+                </a:ext>
+              </a:extLst>
+            </p:cNvPr>
+            <p:cNvCxnSpPr>
+              <a:cxnSpLocks noGrp="1" noRot="1" noMove="1" noResize="1" noEditPoints="1" noAdjustHandles="1" noChangeArrowheads="1" noChangeShapeType="1"/>
+              <a:stCxn id="100" idx="3"/>
+              <a:endCxn id="104" idx="1"/>
+            </p:cNvCxnSpPr>
+            <p:nvPr/>
+          </p:nvCxnSpPr>
+          <p:spPr>
+            <a:xfrm flipV="1">
+              <a:off x="4284903" y="649355"/>
+              <a:ext cx="934854" cy="3106"/>
+            </a:xfrm>
+            <a:prstGeom prst="line">
+              <a:avLst/>
+            </a:prstGeom>
+            <a:ln w="28575">
+              <a:solidFill>
+                <a:srgbClr val="13C1F7"/>
+              </a:solidFill>
+              <a:prstDash val="sysDot"/>
+            </a:ln>
+          </p:spPr>
+          <p:style>
+            <a:lnRef idx="1">
+              <a:schemeClr val="accent1"/>
+            </a:lnRef>
+            <a:fillRef idx="0">
+              <a:schemeClr val="accent1"/>
+            </a:fillRef>
+            <a:effectRef idx="0">
+              <a:schemeClr val="accent1"/>
+            </a:effectRef>
+            <a:fontRef idx="minor">
+              <a:schemeClr val="tx1"/>
+            </a:fontRef>
+          </p:style>
+        </p:cxnSp>
+        <p:cxnSp>
+          <p:nvCxnSpPr>
+            <p:cNvPr id="463" name="5">
+              <a:extLst>
+                <a:ext uri="{FF2B5EF4-FFF2-40B4-BE49-F238E27FC236}">
+                  <a16:creationId xmlns:a16="http://schemas.microsoft.com/office/drawing/2014/main" id="{472166DA-AD18-4004-B03E-EAF65B1406CC}"/>
+                </a:ext>
+              </a:extLst>
+            </p:cNvPr>
+            <p:cNvCxnSpPr>
+              <a:cxnSpLocks noGrp="1" noRot="1" noMove="1" noResize="1" noEditPoints="1" noAdjustHandles="1" noChangeArrowheads="1" noChangeShapeType="1"/>
+              <a:stCxn id="112" idx="3"/>
+              <a:endCxn id="100" idx="1"/>
+            </p:cNvCxnSpPr>
+            <p:nvPr/>
+          </p:nvCxnSpPr>
+          <p:spPr>
+            <a:xfrm>
+              <a:off x="3380887" y="189268"/>
+              <a:ext cx="477239" cy="463193"/>
+            </a:xfrm>
+            <a:prstGeom prst="line">
+              <a:avLst/>
+            </a:prstGeom>
+            <a:ln w="28575">
+              <a:solidFill>
+                <a:srgbClr val="13C1F7"/>
+              </a:solidFill>
+              <a:prstDash val="sysDot"/>
+            </a:ln>
+          </p:spPr>
+          <p:style>
+            <a:lnRef idx="1">
+              <a:schemeClr val="accent1"/>
+            </a:lnRef>
+            <a:fillRef idx="0">
+              <a:schemeClr val="accent1"/>
+            </a:fillRef>
+            <a:effectRef idx="0">
+              <a:schemeClr val="accent1"/>
+            </a:effectRef>
+            <a:fontRef idx="minor">
+              <a:schemeClr val="tx1"/>
+            </a:fontRef>
+          </p:style>
+        </p:cxnSp>
+        <p:cxnSp>
+          <p:nvCxnSpPr>
+            <p:cNvPr id="465" name="6">
+              <a:extLst>
+                <a:ext uri="{FF2B5EF4-FFF2-40B4-BE49-F238E27FC236}">
+                  <a16:creationId xmlns:a16="http://schemas.microsoft.com/office/drawing/2014/main" id="{94021463-426D-4E83-8AE7-21E582AA2449}"/>
+                </a:ext>
+              </a:extLst>
+            </p:cNvPr>
+            <p:cNvCxnSpPr>
+              <a:cxnSpLocks noGrp="1" noRot="1" noMove="1" noResize="1" noEditPoints="1" noAdjustHandles="1" noChangeArrowheads="1" noChangeShapeType="1"/>
+              <a:stCxn id="108" idx="3"/>
+              <a:endCxn id="100" idx="1"/>
+            </p:cNvCxnSpPr>
+            <p:nvPr/>
+          </p:nvCxnSpPr>
+          <p:spPr>
+            <a:xfrm flipV="1">
+              <a:off x="3381118" y="652461"/>
+              <a:ext cx="477008" cy="64"/>
+            </a:xfrm>
+            <a:prstGeom prst="line">
+              <a:avLst/>
+            </a:prstGeom>
+            <a:ln w="28575">
+              <a:solidFill>
+                <a:srgbClr val="13C1F7"/>
+              </a:solidFill>
+              <a:prstDash val="sysDot"/>
+            </a:ln>
+          </p:spPr>
+          <p:style>
+            <a:lnRef idx="1">
+              <a:schemeClr val="accent1"/>
+            </a:lnRef>
+            <a:fillRef idx="0">
+              <a:schemeClr val="accent1"/>
+            </a:fillRef>
+            <a:effectRef idx="0">
+              <a:schemeClr val="accent1"/>
+            </a:effectRef>
+            <a:fontRef idx="minor">
+              <a:schemeClr val="tx1"/>
+            </a:fontRef>
+          </p:style>
+        </p:cxnSp>
+        <p:cxnSp>
+          <p:nvCxnSpPr>
+            <p:cNvPr id="467" name="7">
+              <a:extLst>
+                <a:ext uri="{FF2B5EF4-FFF2-40B4-BE49-F238E27FC236}">
+                  <a16:creationId xmlns:a16="http://schemas.microsoft.com/office/drawing/2014/main" id="{55DCA934-CBD5-4BCE-9A1D-731A5EB143EF}"/>
+                </a:ext>
+              </a:extLst>
+            </p:cNvPr>
+            <p:cNvCxnSpPr>
+              <a:cxnSpLocks noGrp="1" noRot="1" noMove="1" noResize="1" noEditPoints="1" noAdjustHandles="1" noChangeArrowheads="1" noChangeShapeType="1"/>
+              <a:stCxn id="116" idx="3"/>
+              <a:endCxn id="100" idx="1"/>
+            </p:cNvCxnSpPr>
+            <p:nvPr/>
+          </p:nvCxnSpPr>
+          <p:spPr>
+            <a:xfrm flipV="1">
+              <a:off x="3373952" y="652461"/>
+              <a:ext cx="484174" cy="483067"/>
+            </a:xfrm>
+            <a:prstGeom prst="line">
+              <a:avLst/>
+            </a:prstGeom>
+            <a:ln w="28575">
+              <a:solidFill>
+                <a:srgbClr val="13C1F7"/>
+              </a:solidFill>
+              <a:prstDash val="sysDot"/>
+            </a:ln>
+          </p:spPr>
+          <p:style>
+            <a:lnRef idx="1">
+              <a:schemeClr val="accent1"/>
+            </a:lnRef>
+            <a:fillRef idx="0">
+              <a:schemeClr val="accent1"/>
+            </a:fillRef>
+            <a:effectRef idx="0">
+              <a:schemeClr val="accent1"/>
+            </a:effectRef>
+            <a:fontRef idx="minor">
+              <a:schemeClr val="tx1"/>
+            </a:fontRef>
+          </p:style>
+        </p:cxnSp>
+        <p:cxnSp>
+          <p:nvCxnSpPr>
+            <p:cNvPr id="4" name="8">
+              <a:extLst>
+                <a:ext uri="{FF2B5EF4-FFF2-40B4-BE49-F238E27FC236}">
+                  <a16:creationId xmlns:a16="http://schemas.microsoft.com/office/drawing/2014/main" id="{F401DA95-5987-4F8F-A2DB-1D94F8EEA402}"/>
+                </a:ext>
+              </a:extLst>
+            </p:cNvPr>
+            <p:cNvCxnSpPr>
+              <a:cxnSpLocks noGrp="1" noRot="1" noMove="1" noResize="1" noEditPoints="1" noAdjustHandles="1" noChangeArrowheads="1" noChangeShapeType="1"/>
+              <a:stCxn id="98" idx="3"/>
+              <a:endCxn id="92" idx="1"/>
+            </p:cNvCxnSpPr>
+            <p:nvPr/>
+          </p:nvCxnSpPr>
+          <p:spPr>
+            <a:xfrm>
+              <a:off x="2766965" y="2572107"/>
+              <a:ext cx="1493701" cy="466100"/>
+            </a:xfrm>
+            <a:prstGeom prst="bentConnector3">
+              <a:avLst/>
+            </a:prstGeom>
+            <a:ln w="28575">
+              <a:solidFill>
+                <a:srgbClr val="7030A0"/>
+              </a:solidFill>
+              <a:prstDash val="sysDot"/>
+            </a:ln>
+          </p:spPr>
+          <p:style>
+            <a:lnRef idx="1">
+              <a:schemeClr val="accent1"/>
+            </a:lnRef>
+            <a:fillRef idx="0">
+              <a:schemeClr val="accent1"/>
+            </a:fillRef>
+            <a:effectRef idx="0">
+              <a:schemeClr val="accent1"/>
+            </a:effectRef>
+            <a:fontRef idx="minor">
+              <a:schemeClr val="tx1"/>
+            </a:fontRef>
+          </p:style>
+        </p:cxnSp>
+        <p:cxnSp>
+          <p:nvCxnSpPr>
+            <p:cNvPr id="11" name="9">
+              <a:extLst>
+                <a:ext uri="{FF2B5EF4-FFF2-40B4-BE49-F238E27FC236}">
+                  <a16:creationId xmlns:a16="http://schemas.microsoft.com/office/drawing/2014/main" id="{8090A106-0349-48DB-A967-C7FDACCD54CC}"/>
+                </a:ext>
+              </a:extLst>
+            </p:cNvPr>
+            <p:cNvCxnSpPr>
+              <a:cxnSpLocks noGrp="1" noRot="1" noMove="1" noResize="1" noEditPoints="1" noAdjustHandles="1" noChangeArrowheads="1" noChangeShapeType="1"/>
+              <a:stCxn id="97" idx="3"/>
+              <a:endCxn id="98" idx="1"/>
+            </p:cNvCxnSpPr>
+            <p:nvPr/>
+          </p:nvCxnSpPr>
+          <p:spPr>
+            <a:xfrm>
+              <a:off x="989083" y="2156299"/>
+              <a:ext cx="1352851" cy="415808"/>
+            </a:xfrm>
+            <a:prstGeom prst="bentConnector3">
+              <a:avLst/>
+            </a:prstGeom>
+            <a:ln w="28575">
+              <a:solidFill>
+                <a:srgbClr val="7030A0"/>
+              </a:solidFill>
+              <a:prstDash val="sysDot"/>
+            </a:ln>
+          </p:spPr>
+          <p:style>
+            <a:lnRef idx="1">
+              <a:schemeClr val="accent1"/>
+            </a:lnRef>
+            <a:fillRef idx="0">
+              <a:schemeClr val="accent1"/>
+            </a:fillRef>
+            <a:effectRef idx="0">
+              <a:schemeClr val="accent1"/>
+            </a:effectRef>
+            <a:fontRef idx="minor">
+              <a:schemeClr val="tx1"/>
+            </a:fontRef>
+          </p:style>
+        </p:cxnSp>
+        <p:cxnSp>
+          <p:nvCxnSpPr>
+            <p:cNvPr id="13" name="10">
+              <a:extLst>
+                <a:ext uri="{FF2B5EF4-FFF2-40B4-BE49-F238E27FC236}">
+                  <a16:creationId xmlns:a16="http://schemas.microsoft.com/office/drawing/2014/main" id="{64536AA5-9065-4B95-B787-CD8A2DD57382}"/>
+                </a:ext>
+              </a:extLst>
+            </p:cNvPr>
+            <p:cNvCxnSpPr>
+              <a:cxnSpLocks noGrp="1" noRot="1" noMove="1" noResize="1" noEditPoints="1" noAdjustHandles="1" noChangeArrowheads="1" noChangeShapeType="1"/>
+              <a:stCxn id="230" idx="0"/>
+              <a:endCxn id="97" idx="2"/>
+            </p:cNvCxnSpPr>
+            <p:nvPr/>
+          </p:nvCxnSpPr>
+          <p:spPr>
+            <a:xfrm rot="5400000" flipH="1" flipV="1">
+              <a:off x="431861" y="2713521"/>
+              <a:ext cx="687667" cy="1"/>
+            </a:xfrm>
+            <a:prstGeom prst="bentConnector3">
+              <a:avLst/>
+            </a:prstGeom>
+            <a:ln w="28575">
+              <a:solidFill>
+                <a:srgbClr val="7030A0"/>
+              </a:solidFill>
+              <a:prstDash val="sysDot"/>
+            </a:ln>
+          </p:spPr>
+          <p:style>
+            <a:lnRef idx="1">
+              <a:schemeClr val="accent1"/>
+            </a:lnRef>
+            <a:fillRef idx="0">
+              <a:schemeClr val="accent1"/>
+            </a:fillRef>
+            <a:effectRef idx="0">
+              <a:schemeClr val="accent1"/>
+            </a:effectRef>
+            <a:fontRef idx="minor">
+              <a:schemeClr val="tx1"/>
+            </a:fontRef>
+          </p:style>
+        </p:cxnSp>
+        <p:cxnSp>
+          <p:nvCxnSpPr>
+            <p:cNvPr id="15" name="11">
+              <a:extLst>
+                <a:ext uri="{FF2B5EF4-FFF2-40B4-BE49-F238E27FC236}">
+                  <a16:creationId xmlns:a16="http://schemas.microsoft.com/office/drawing/2014/main" id="{D9109F0E-7C2A-4047-A760-A3221B3B551D}"/>
+                </a:ext>
+              </a:extLst>
+            </p:cNvPr>
+            <p:cNvCxnSpPr>
+              <a:cxnSpLocks noGrp="1" noRot="1" noMove="1" noResize="1" noEditPoints="1" noAdjustHandles="1" noChangeArrowheads="1" noChangeShapeType="1"/>
+            </p:cNvCxnSpPr>
+            <p:nvPr/>
+          </p:nvCxnSpPr>
+          <p:spPr>
+            <a:xfrm rot="5400000" flipH="1" flipV="1">
+              <a:off x="598716" y="3661109"/>
+              <a:ext cx="353956" cy="1"/>
+            </a:xfrm>
+            <a:prstGeom prst="bentConnector3">
+              <a:avLst/>
+            </a:prstGeom>
+            <a:ln w="28575">
+              <a:solidFill>
+                <a:srgbClr val="7030A0"/>
+              </a:solidFill>
+              <a:prstDash val="sysDot"/>
+            </a:ln>
+          </p:spPr>
+          <p:style>
+            <a:lnRef idx="1">
+              <a:schemeClr val="accent1"/>
+            </a:lnRef>
+            <a:fillRef idx="0">
+              <a:schemeClr val="accent1"/>
+            </a:fillRef>
+            <a:effectRef idx="0">
+              <a:schemeClr val="accent1"/>
+            </a:effectRef>
+            <a:fontRef idx="minor">
+              <a:schemeClr val="tx1"/>
+            </a:fontRef>
+          </p:style>
+        </p:cxnSp>
+        <p:cxnSp>
+          <p:nvCxnSpPr>
+            <p:cNvPr id="17" name="12">
+              <a:extLst>
+                <a:ext uri="{FF2B5EF4-FFF2-40B4-BE49-F238E27FC236}">
+                  <a16:creationId xmlns:a16="http://schemas.microsoft.com/office/drawing/2014/main" id="{075A6C28-5E46-42F0-86F7-0BF4B5BF10A5}"/>
+                </a:ext>
+              </a:extLst>
+            </p:cNvPr>
+            <p:cNvCxnSpPr>
+              <a:cxnSpLocks noGrp="1" noRot="1" noMove="1" noResize="1" noEditPoints="1" noAdjustHandles="1" noChangeArrowheads="1" noChangeShapeType="1"/>
+            </p:cNvCxnSpPr>
+            <p:nvPr/>
+          </p:nvCxnSpPr>
+          <p:spPr>
+            <a:xfrm rot="16200000" flipH="1">
+              <a:off x="623840" y="4277943"/>
+              <a:ext cx="304279" cy="568"/>
+            </a:xfrm>
+            <a:prstGeom prst="bentConnector3">
+              <a:avLst/>
+            </a:prstGeom>
+            <a:ln w="28575">
+              <a:solidFill>
+                <a:srgbClr val="7030A0"/>
+              </a:solidFill>
+              <a:prstDash val="sysDot"/>
+            </a:ln>
+          </p:spPr>
+          <p:style>
+            <a:lnRef idx="1">
+              <a:schemeClr val="accent1"/>
+            </a:lnRef>
+            <a:fillRef idx="0">
+              <a:schemeClr val="accent1"/>
+            </a:fillRef>
+            <a:effectRef idx="0">
+              <a:schemeClr val="accent1"/>
+            </a:effectRef>
+            <a:fontRef idx="minor">
+              <a:schemeClr val="tx1"/>
+            </a:fontRef>
+          </p:style>
+        </p:cxnSp>
+        <p:cxnSp>
+          <p:nvCxnSpPr>
+            <p:cNvPr id="19" name="13">
+              <a:extLst>
+                <a:ext uri="{FF2B5EF4-FFF2-40B4-BE49-F238E27FC236}">
+                  <a16:creationId xmlns:a16="http://schemas.microsoft.com/office/drawing/2014/main" id="{24FC1499-2D2F-42EB-B408-975EC86A4D15}"/>
+                </a:ext>
+              </a:extLst>
+            </p:cNvPr>
+            <p:cNvCxnSpPr>
+              <a:cxnSpLocks noGrp="1" noRot="1" noMove="1" noResize="1" noEditPoints="1" noAdjustHandles="1" noChangeArrowheads="1" noChangeShapeType="1"/>
+            </p:cNvCxnSpPr>
+            <p:nvPr/>
+          </p:nvCxnSpPr>
+          <p:spPr>
+            <a:xfrm flipV="1">
+              <a:off x="1096345" y="4401200"/>
+              <a:ext cx="599410" cy="349250"/>
+            </a:xfrm>
+            <a:prstGeom prst="bentConnector3">
+              <a:avLst/>
+            </a:prstGeom>
+            <a:ln w="28575">
+              <a:solidFill>
+                <a:srgbClr val="7030A0"/>
+              </a:solidFill>
+              <a:prstDash val="sysDot"/>
+            </a:ln>
+          </p:spPr>
+          <p:style>
+            <a:lnRef idx="1">
+              <a:schemeClr val="accent1"/>
+            </a:lnRef>
+            <a:fillRef idx="0">
+              <a:schemeClr val="accent1"/>
+            </a:fillRef>
+            <a:effectRef idx="0">
+              <a:schemeClr val="accent1"/>
+            </a:effectRef>
+            <a:fontRef idx="minor">
+              <a:schemeClr val="tx1"/>
+            </a:fontRef>
+          </p:style>
+        </p:cxnSp>
+        <p:cxnSp>
+          <p:nvCxnSpPr>
+            <p:cNvPr id="21" name="14">
+              <a:extLst>
+                <a:ext uri="{FF2B5EF4-FFF2-40B4-BE49-F238E27FC236}">
+                  <a16:creationId xmlns:a16="http://schemas.microsoft.com/office/drawing/2014/main" id="{E8C723EC-5F45-4DA3-962C-D0D46CB038D8}"/>
+                </a:ext>
+              </a:extLst>
+            </p:cNvPr>
+            <p:cNvCxnSpPr>
+              <a:cxnSpLocks noGrp="1" noRot="1" noMove="1" noResize="1" noEditPoints="1" noAdjustHandles="1" noChangeArrowheads="1" noChangeShapeType="1"/>
+            </p:cNvCxnSpPr>
+            <p:nvPr/>
+          </p:nvCxnSpPr>
+          <p:spPr>
+            <a:xfrm>
+              <a:off x="2011851" y="4401200"/>
+              <a:ext cx="409357" cy="1386"/>
+            </a:xfrm>
+            <a:prstGeom prst="bentConnector3">
+              <a:avLst/>
+            </a:prstGeom>
+            <a:ln w="28575">
+              <a:solidFill>
+                <a:srgbClr val="7030A0"/>
+              </a:solidFill>
+              <a:prstDash val="sysDot"/>
+            </a:ln>
+          </p:spPr>
+          <p:style>
+            <a:lnRef idx="1">
+              <a:schemeClr val="accent1"/>
+            </a:lnRef>
+            <a:fillRef idx="0">
+              <a:schemeClr val="accent1"/>
+            </a:fillRef>
+            <a:effectRef idx="0">
+              <a:schemeClr val="accent1"/>
+            </a:effectRef>
+            <a:fontRef idx="minor">
+              <a:schemeClr val="tx1"/>
+            </a:fontRef>
+          </p:style>
+        </p:cxnSp>
+        <p:cxnSp>
+          <p:nvCxnSpPr>
+            <p:cNvPr id="23" name="15">
+              <a:extLst>
+                <a:ext uri="{FF2B5EF4-FFF2-40B4-BE49-F238E27FC236}">
+                  <a16:creationId xmlns:a16="http://schemas.microsoft.com/office/drawing/2014/main" id="{89842922-CE19-435B-AB99-F18AA42C21A2}"/>
+                </a:ext>
+              </a:extLst>
+            </p:cNvPr>
+            <p:cNvCxnSpPr>
+              <a:cxnSpLocks noGrp="1" noRot="1" noMove="1" noResize="1" noEditPoints="1" noAdjustHandles="1" noChangeArrowheads="1" noChangeShapeType="1"/>
+            </p:cNvCxnSpPr>
+            <p:nvPr/>
+          </p:nvCxnSpPr>
+          <p:spPr>
+            <a:xfrm flipV="1">
+              <a:off x="2737304" y="4401118"/>
+              <a:ext cx="360409" cy="1468"/>
+            </a:xfrm>
+            <a:prstGeom prst="bentConnector3">
+              <a:avLst/>
+            </a:prstGeom>
+            <a:ln w="28575">
+              <a:solidFill>
+                <a:srgbClr val="7030A0"/>
+              </a:solidFill>
+              <a:prstDash val="sysDot"/>
+            </a:ln>
+          </p:spPr>
+          <p:style>
+            <a:lnRef idx="1">
+              <a:schemeClr val="accent1"/>
+            </a:lnRef>
+            <a:fillRef idx="0">
+              <a:schemeClr val="accent1"/>
+            </a:fillRef>
+            <a:effectRef idx="0">
+              <a:schemeClr val="accent1"/>
+            </a:effectRef>
+            <a:fontRef idx="minor">
+              <a:schemeClr val="tx1"/>
+            </a:fontRef>
+          </p:style>
+        </p:cxnSp>
+        <p:cxnSp>
+          <p:nvCxnSpPr>
+            <p:cNvPr id="7" name="16">
+              <a:extLst>
+                <a:ext uri="{FF2B5EF4-FFF2-40B4-BE49-F238E27FC236}">
+                  <a16:creationId xmlns:a16="http://schemas.microsoft.com/office/drawing/2014/main" id="{226F66FF-445E-47C0-8503-9C64E806AA43}"/>
+                </a:ext>
+              </a:extLst>
+            </p:cNvPr>
+            <p:cNvCxnSpPr>
+              <a:cxnSpLocks noGrp="1" noRot="1" noMove="1" noResize="1" noEditPoints="1" noAdjustHandles="1" noChangeArrowheads="1" noChangeShapeType="1"/>
+              <a:stCxn id="103" idx="1"/>
+              <a:endCxn id="92" idx="3"/>
+            </p:cNvCxnSpPr>
+            <p:nvPr/>
+          </p:nvCxnSpPr>
+          <p:spPr>
+            <a:xfrm rot="10800000" flipV="1">
+              <a:off x="5327607" y="2574115"/>
+              <a:ext cx="1499250" cy="464092"/>
+            </a:xfrm>
+            <a:prstGeom prst="bentConnector3">
+              <a:avLst/>
+            </a:prstGeom>
+            <a:ln w="28575">
+              <a:solidFill>
+                <a:srgbClr val="7030A0"/>
+              </a:solidFill>
+              <a:prstDash val="sysDot"/>
+            </a:ln>
+          </p:spPr>
+          <p:style>
+            <a:lnRef idx="1">
+              <a:schemeClr val="accent1"/>
+            </a:lnRef>
+            <a:fillRef idx="0">
+              <a:schemeClr val="accent1"/>
+            </a:fillRef>
+            <a:effectRef idx="0">
+              <a:schemeClr val="accent1"/>
+            </a:effectRef>
+            <a:fontRef idx="minor">
+              <a:schemeClr val="tx1"/>
+            </a:fontRef>
+          </p:style>
+        </p:cxnSp>
+        <p:cxnSp>
+          <p:nvCxnSpPr>
+            <p:cNvPr id="94" name="17">
+              <a:extLst>
+                <a:ext uri="{FF2B5EF4-FFF2-40B4-BE49-F238E27FC236}">
+                  <a16:creationId xmlns:a16="http://schemas.microsoft.com/office/drawing/2014/main" id="{F2160027-E9E9-405B-A25A-4C499A625673}"/>
+                </a:ext>
+              </a:extLst>
+            </p:cNvPr>
+            <p:cNvCxnSpPr>
+              <a:cxnSpLocks noGrp="1" noRot="1" noMove="1" noResize="1" noEditPoints="1" noAdjustHandles="1" noChangeArrowheads="1" noChangeShapeType="1"/>
+              <a:stCxn id="137" idx="1"/>
+              <a:endCxn id="103" idx="3"/>
+            </p:cNvCxnSpPr>
+            <p:nvPr/>
+          </p:nvCxnSpPr>
+          <p:spPr>
+            <a:xfrm rot="10800000" flipV="1">
+              <a:off x="7251889" y="2165881"/>
+              <a:ext cx="1360229" cy="408233"/>
+            </a:xfrm>
+            <a:prstGeom prst="bentConnector3">
+              <a:avLst/>
+            </a:prstGeom>
+            <a:ln w="28575">
+              <a:solidFill>
+                <a:srgbClr val="7030A0"/>
+              </a:solidFill>
+              <a:prstDash val="sysDot"/>
+            </a:ln>
+          </p:spPr>
+          <p:style>
+            <a:lnRef idx="1">
+              <a:schemeClr val="accent1"/>
+            </a:lnRef>
+            <a:fillRef idx="0">
+              <a:schemeClr val="accent1"/>
+            </a:fillRef>
+            <a:effectRef idx="0">
+              <a:schemeClr val="accent1"/>
+            </a:effectRef>
+            <a:fontRef idx="minor">
+              <a:schemeClr val="tx1"/>
+            </a:fontRef>
+          </p:style>
+        </p:cxnSp>
+        <p:cxnSp>
+          <p:nvCxnSpPr>
+            <p:cNvPr id="476" name="18">
+              <a:extLst>
+                <a:ext uri="{FF2B5EF4-FFF2-40B4-BE49-F238E27FC236}">
+                  <a16:creationId xmlns:a16="http://schemas.microsoft.com/office/drawing/2014/main" id="{8B39677E-805E-4CC2-A50D-04F0676B339F}"/>
+                </a:ext>
+              </a:extLst>
+            </p:cNvPr>
+            <p:cNvCxnSpPr>
+              <a:cxnSpLocks noGrp="1" noRot="1" noMove="1" noResize="1" noEditPoints="1" noAdjustHandles="1" noChangeArrowheads="1" noChangeShapeType="1"/>
+              <a:stCxn id="224" idx="0"/>
+              <a:endCxn id="137" idx="2"/>
+            </p:cNvCxnSpPr>
+            <p:nvPr/>
+          </p:nvCxnSpPr>
+          <p:spPr>
+            <a:xfrm rot="16200000" flipV="1">
+              <a:off x="8487565" y="2717211"/>
+              <a:ext cx="675884" cy="1"/>
+            </a:xfrm>
+            <a:prstGeom prst="bentConnector3">
+              <a:avLst/>
+            </a:prstGeom>
+            <a:ln w="28575">
+              <a:solidFill>
+                <a:srgbClr val="7030A0"/>
+              </a:solidFill>
+              <a:prstDash val="sysDot"/>
+            </a:ln>
+          </p:spPr>
+          <p:style>
+            <a:lnRef idx="1">
+              <a:schemeClr val="accent1"/>
+            </a:lnRef>
+            <a:fillRef idx="0">
+              <a:schemeClr val="accent1"/>
+            </a:fillRef>
+            <a:effectRef idx="0">
+              <a:schemeClr val="accent1"/>
+            </a:effectRef>
+            <a:fontRef idx="minor">
+              <a:schemeClr val="tx1"/>
+            </a:fontRef>
+          </p:style>
+        </p:cxnSp>
+        <p:cxnSp>
+          <p:nvCxnSpPr>
+            <p:cNvPr id="478" name="19">
+              <a:extLst>
+                <a:ext uri="{FF2B5EF4-FFF2-40B4-BE49-F238E27FC236}">
+                  <a16:creationId xmlns:a16="http://schemas.microsoft.com/office/drawing/2014/main" id="{DCF23C46-7130-4BF0-AA10-F513178EE2E9}"/>
+                </a:ext>
+              </a:extLst>
+            </p:cNvPr>
+            <p:cNvCxnSpPr>
+              <a:cxnSpLocks noGrp="1" noRot="1" noMove="1" noResize="1" noEditPoints="1" noAdjustHandles="1" noChangeArrowheads="1" noChangeShapeType="1"/>
+              <a:stCxn id="226" idx="0"/>
+              <a:endCxn id="224" idx="2"/>
+            </p:cNvCxnSpPr>
+            <p:nvPr/>
+          </p:nvCxnSpPr>
+          <p:spPr>
+            <a:xfrm rot="5400000" flipH="1" flipV="1">
+              <a:off x="8257206" y="4044344"/>
+              <a:ext cx="1130713" cy="5889"/>
+            </a:xfrm>
+            <a:prstGeom prst="bentConnector3">
+              <a:avLst>
+                <a:gd name="adj1" fmla="val 50000"/>
+              </a:avLst>
+            </a:prstGeom>
+            <a:ln w="28575">
+              <a:solidFill>
+                <a:srgbClr val="7030A0"/>
+              </a:solidFill>
+              <a:prstDash val="sysDot"/>
+            </a:ln>
+          </p:spPr>
+          <p:style>
+            <a:lnRef idx="1">
+              <a:schemeClr val="accent1"/>
+            </a:lnRef>
+            <a:fillRef idx="0">
+              <a:schemeClr val="accent1"/>
+            </a:fillRef>
+            <a:effectRef idx="0">
+              <a:schemeClr val="accent1"/>
+            </a:effectRef>
+            <a:fontRef idx="minor">
+              <a:schemeClr val="tx1"/>
+            </a:fontRef>
+          </p:style>
+        </p:cxnSp>
+      </p:grpSp>
     </p:spTree>
     <p:extLst>
       <p:ext uri="{BB962C8B-B14F-4D97-AF65-F5344CB8AC3E}">

</xml_diff>

<commit_message>
att modelagem e script de BD + inicio dos slides
</commit_message>
<xml_diff>
--- a/DOCs de T.I/Diagrama_de_Solucao/Presentation.pptx
+++ b/DOCs de T.I/Diagrama_de_Solucao/Presentation.pptx
@@ -243,7 +243,7 @@
           <a:p>
             <a:fld id="{2FC3D184-0F2B-4D9D-BDB9-3409F15C70D5}" type="datetimeFigureOut">
               <a:rPr lang="pt-BR" smtClean="0"/>
-              <a:t>19/04/2022</a:t>
+              <a:t>21/04/2022</a:t>
             </a:fld>
             <a:endParaRPr lang="pt-BR"/>
           </a:p>
@@ -413,7 +413,7 @@
           <a:p>
             <a:fld id="{2FC3D184-0F2B-4D9D-BDB9-3409F15C70D5}" type="datetimeFigureOut">
               <a:rPr lang="pt-BR" smtClean="0"/>
-              <a:t>19/04/2022</a:t>
+              <a:t>21/04/2022</a:t>
             </a:fld>
             <a:endParaRPr lang="pt-BR"/>
           </a:p>
@@ -593,7 +593,7 @@
           <a:p>
             <a:fld id="{2FC3D184-0F2B-4D9D-BDB9-3409F15C70D5}" type="datetimeFigureOut">
               <a:rPr lang="pt-BR" smtClean="0"/>
-              <a:t>19/04/2022</a:t>
+              <a:t>21/04/2022</a:t>
             </a:fld>
             <a:endParaRPr lang="pt-BR"/>
           </a:p>
@@ -763,7 +763,7 @@
           <a:p>
             <a:fld id="{2FC3D184-0F2B-4D9D-BDB9-3409F15C70D5}" type="datetimeFigureOut">
               <a:rPr lang="pt-BR" smtClean="0"/>
-              <a:t>19/04/2022</a:t>
+              <a:t>21/04/2022</a:t>
             </a:fld>
             <a:endParaRPr lang="pt-BR"/>
           </a:p>
@@ -1009,7 +1009,7 @@
           <a:p>
             <a:fld id="{2FC3D184-0F2B-4D9D-BDB9-3409F15C70D5}" type="datetimeFigureOut">
               <a:rPr lang="pt-BR" smtClean="0"/>
-              <a:t>19/04/2022</a:t>
+              <a:t>21/04/2022</a:t>
             </a:fld>
             <a:endParaRPr lang="pt-BR"/>
           </a:p>
@@ -1241,7 +1241,7 @@
           <a:p>
             <a:fld id="{2FC3D184-0F2B-4D9D-BDB9-3409F15C70D5}" type="datetimeFigureOut">
               <a:rPr lang="pt-BR" smtClean="0"/>
-              <a:t>19/04/2022</a:t>
+              <a:t>21/04/2022</a:t>
             </a:fld>
             <a:endParaRPr lang="pt-BR"/>
           </a:p>
@@ -1608,7 +1608,7 @@
           <a:p>
             <a:fld id="{2FC3D184-0F2B-4D9D-BDB9-3409F15C70D5}" type="datetimeFigureOut">
               <a:rPr lang="pt-BR" smtClean="0"/>
-              <a:t>19/04/2022</a:t>
+              <a:t>21/04/2022</a:t>
             </a:fld>
             <a:endParaRPr lang="pt-BR"/>
           </a:p>
@@ -1726,7 +1726,7 @@
           <a:p>
             <a:fld id="{2FC3D184-0F2B-4D9D-BDB9-3409F15C70D5}" type="datetimeFigureOut">
               <a:rPr lang="pt-BR" smtClean="0"/>
-              <a:t>19/04/2022</a:t>
+              <a:t>21/04/2022</a:t>
             </a:fld>
             <a:endParaRPr lang="pt-BR"/>
           </a:p>
@@ -1821,7 +1821,7 @@
           <a:p>
             <a:fld id="{2FC3D184-0F2B-4D9D-BDB9-3409F15C70D5}" type="datetimeFigureOut">
               <a:rPr lang="pt-BR" smtClean="0"/>
-              <a:t>19/04/2022</a:t>
+              <a:t>21/04/2022</a:t>
             </a:fld>
             <a:endParaRPr lang="pt-BR"/>
           </a:p>
@@ -2098,7 +2098,7 @@
           <a:p>
             <a:fld id="{2FC3D184-0F2B-4D9D-BDB9-3409F15C70D5}" type="datetimeFigureOut">
               <a:rPr lang="pt-BR" smtClean="0"/>
-              <a:t>19/04/2022</a:t>
+              <a:t>21/04/2022</a:t>
             </a:fld>
             <a:endParaRPr lang="pt-BR"/>
           </a:p>
@@ -2355,7 +2355,7 @@
           <a:p>
             <a:fld id="{2FC3D184-0F2B-4D9D-BDB9-3409F15C70D5}" type="datetimeFigureOut">
               <a:rPr lang="pt-BR" smtClean="0"/>
-              <a:t>19/04/2022</a:t>
+              <a:t>21/04/2022</a:t>
             </a:fld>
             <a:endParaRPr lang="pt-BR"/>
           </a:p>
@@ -2568,7 +2568,7 @@
           <a:p>
             <a:fld id="{2FC3D184-0F2B-4D9D-BDB9-3409F15C70D5}" type="datetimeFigureOut">
               <a:rPr lang="pt-BR" smtClean="0"/>
-              <a:t>19/04/2022</a:t>
+              <a:t>21/04/2022</a:t>
             </a:fld>
             <a:endParaRPr lang="pt-BR"/>
           </a:p>
@@ -3163,51 +3163,6 @@
           </a:p>
         </p:txBody>
       </p:sp>
-      <p:sp>
-        <p:nvSpPr>
-          <p:cNvPr id="328" name="grupo">
-            <a:extLst>
-              <a:ext uri="{FF2B5EF4-FFF2-40B4-BE49-F238E27FC236}">
-                <a16:creationId xmlns:a16="http://schemas.microsoft.com/office/drawing/2014/main" id="{56C1A09A-89C0-4625-8CB3-A278F0464DC1}"/>
-              </a:ext>
-            </a:extLst>
-          </p:cNvPr>
-          <p:cNvSpPr txBox="1">
-            <a:spLocks noGrp="1" noRot="1" noMove="1" noResize="1" noEditPoints="1" noAdjustHandles="1" noChangeArrowheads="1" noChangeShapeType="1"/>
-          </p:cNvSpPr>
-          <p:nvPr/>
-        </p:nvSpPr>
-        <p:spPr>
-          <a:xfrm>
-            <a:off x="8561595" y="-8959"/>
-            <a:ext cx="1072919" cy="303913"/>
-          </a:xfrm>
-          <a:prstGeom prst="roundRect">
-            <a:avLst/>
-          </a:prstGeom>
-          <a:solidFill>
-            <a:srgbClr val="7030A0"/>
-          </a:solidFill>
-        </p:spPr>
-        <p:txBody>
-          <a:bodyPr wrap="square" rtlCol="0">
-            <a:spAutoFit/>
-          </a:bodyPr>
-          <a:lstStyle/>
-          <a:p>
-            <a:pPr algn="ctr"/>
-            <a:r>
-              <a:rPr lang="pt-BR" sz="1185" b="1" dirty="0">
-                <a:solidFill>
-                  <a:schemeClr val="bg1"/>
-                </a:solidFill>
-                <a:latin typeface="Quicksand" panose="00000500000000000000" pitchFamily="2" charset="0"/>
-              </a:rPr>
-              <a:t>GRUPO 7</a:t>
-            </a:r>
-          </a:p>
-        </p:txBody>
-      </p:sp>
       <p:grpSp>
         <p:nvGrpSpPr>
           <p:cNvPr id="560" name="txts">
@@ -3403,7 +3358,7 @@
           <p:spPr>
             <a:xfrm>
               <a:off x="2325141" y="330144"/>
-              <a:ext cx="772570" cy="748666"/>
+              <a:ext cx="772570" cy="529889"/>
             </a:xfrm>
             <a:prstGeom prst="rect">
               <a:avLst/>
@@ -3430,30 +3385,6 @@
                   <a:latin typeface="Quicksand" panose="00000500000000000000" pitchFamily="2" charset="0"/>
                 </a:rPr>
                 <a:t>Tecnologias</a:t>
-              </a:r>
-            </a:p>
-            <a:p>
-              <a:pPr algn="ctr"/>
-              <a:r>
-                <a:rPr lang="pt-BR" sz="711" b="1" dirty="0">
-                  <a:solidFill>
-                    <a:srgbClr val="13C1F7"/>
-                  </a:solidFill>
-                  <a:latin typeface="Quicksand" panose="00000500000000000000" pitchFamily="2" charset="0"/>
-                </a:rPr>
-                <a:t>do</a:t>
-              </a:r>
-            </a:p>
-            <a:p>
-              <a:pPr algn="ctr"/>
-              <a:r>
-                <a:rPr lang="pt-BR" sz="711" b="1" dirty="0">
-                  <a:solidFill>
-                    <a:srgbClr val="13C1F7"/>
-                  </a:solidFill>
-                  <a:latin typeface="Quicksand" panose="00000500000000000000" pitchFamily="2" charset="0"/>
-                </a:rPr>
-                <a:t>Site</a:t>
               </a:r>
             </a:p>
             <a:p>
@@ -4117,10 +4048,10 @@
       </p:grpSp>
       <p:grpSp>
         <p:nvGrpSpPr>
-          <p:cNvPr id="556" name="imgs">
+          <p:cNvPr id="10" name="imgs">
             <a:extLst>
               <a:ext uri="{FF2B5EF4-FFF2-40B4-BE49-F238E27FC236}">
-                <a16:creationId xmlns:a16="http://schemas.microsoft.com/office/drawing/2014/main" id="{B28EB852-6999-4E0A-B4EE-981B21D99983}"/>
+                <a16:creationId xmlns:a16="http://schemas.microsoft.com/office/drawing/2014/main" id="{06D3DA6F-25CE-42DF-8B68-2C96ABF45961}"/>
               </a:ext>
             </a:extLst>
           </p:cNvPr>
@@ -4249,10 +4180,10 @@
         </p:pic>
         <p:pic>
           <p:nvPicPr>
-            <p:cNvPr id="104" name="bd" descr="Ícone&#10;&#10;Descrição gerada automaticamente">
+            <p:cNvPr id="5" name="nodeJS" descr="Ícone&#10;&#10;Descrição gerada automaticamente">
               <a:extLst>
                 <a:ext uri="{FF2B5EF4-FFF2-40B4-BE49-F238E27FC236}">
-                  <a16:creationId xmlns:a16="http://schemas.microsoft.com/office/drawing/2014/main" id="{607AB2CB-3D83-4480-A09B-6B6CB86FB629}"/>
+                  <a16:creationId xmlns:a16="http://schemas.microsoft.com/office/drawing/2014/main" id="{82573144-D759-40AC-992B-5FFCDA4C665B}"/>
                 </a:ext>
               </a:extLst>
             </p:cNvPr>
@@ -4263,6 +4194,42 @@
           </p:nvPicPr>
           <p:blipFill>
             <a:blip r:embed="rId5">
+              <a:extLst>
+                <a:ext uri="{28A0092B-C50C-407E-A947-70E740481C1C}">
+                  <a14:useLocalDpi xmlns:a14="http://schemas.microsoft.com/office/drawing/2010/main" val="0"/>
+                </a:ext>
+              </a:extLst>
+            </a:blip>
+            <a:stretch>
+              <a:fillRect/>
+            </a:stretch>
+          </p:blipFill>
+          <p:spPr>
+            <a:xfrm>
+              <a:off x="4559258" y="675032"/>
+              <a:ext cx="426777" cy="426777"/>
+            </a:xfrm>
+            <a:prstGeom prst="rect">
+              <a:avLst/>
+            </a:prstGeom>
+          </p:spPr>
+        </p:pic>
+        <p:pic>
+          <p:nvPicPr>
+            <p:cNvPr id="104" name="bd" descr="Ícone&#10;&#10;Descrição gerada automaticamente">
+              <a:extLst>
+                <a:ext uri="{FF2B5EF4-FFF2-40B4-BE49-F238E27FC236}">
+                  <a16:creationId xmlns:a16="http://schemas.microsoft.com/office/drawing/2014/main" id="{607AB2CB-3D83-4480-A09B-6B6CB86FB629}"/>
+                </a:ext>
+              </a:extLst>
+            </p:cNvPr>
+            <p:cNvPicPr>
+              <a:picLocks noGrp="1" noRot="1" noChangeAspect="1" noMove="1" noResize="1" noEditPoints="1" noAdjustHandles="1" noChangeArrowheads="1" noChangeShapeType="1" noCrop="1"/>
+            </p:cNvPicPr>
+            <p:nvPr/>
+          </p:nvPicPr>
+          <p:blipFill>
+            <a:blip r:embed="rId6">
               <a:extLst>
                 <a:ext uri="{28A0092B-C50C-407E-A947-70E740481C1C}">
                   <a14:useLocalDpi xmlns:a14="http://schemas.microsoft.com/office/drawing/2010/main" val="0"/>
@@ -4298,7 +4265,7 @@
             <p:nvPr/>
           </p:nvPicPr>
           <p:blipFill>
-            <a:blip r:embed="rId6">
+            <a:blip r:embed="rId7">
               <a:extLst>
                 <a:ext uri="{28A0092B-C50C-407E-A947-70E740481C1C}">
                   <a14:useLocalDpi xmlns:a14="http://schemas.microsoft.com/office/drawing/2010/main" val="0"/>
@@ -4334,7 +4301,7 @@
             <p:nvPr/>
           </p:nvPicPr>
           <p:blipFill>
-            <a:blip r:embed="rId7">
+            <a:blip r:embed="rId8">
               <a:extLst>
                 <a:ext uri="{28A0092B-C50C-407E-A947-70E740481C1C}">
                   <a14:useLocalDpi xmlns:a14="http://schemas.microsoft.com/office/drawing/2010/main" val="0"/>
@@ -4370,7 +4337,7 @@
             <p:nvPr/>
           </p:nvPicPr>
           <p:blipFill>
-            <a:blip r:embed="rId8">
+            <a:blip r:embed="rId9">
               <a:extLst>
                 <a:ext uri="{28A0092B-C50C-407E-A947-70E740481C1C}">
                   <a14:useLocalDpi xmlns:a14="http://schemas.microsoft.com/office/drawing/2010/main" val="0"/>
@@ -4406,7 +4373,7 @@
             <p:nvPr/>
           </p:nvPicPr>
           <p:blipFill>
-            <a:blip r:embed="rId9">
+            <a:blip r:embed="rId10">
               <a:extLst>
                 <a:ext uri="{28A0092B-C50C-407E-A947-70E740481C1C}">
                   <a14:useLocalDpi xmlns:a14="http://schemas.microsoft.com/office/drawing/2010/main" val="0"/>
@@ -4442,7 +4409,7 @@
             <p:nvPr/>
           </p:nvPicPr>
           <p:blipFill>
-            <a:blip r:embed="rId10">
+            <a:blip r:embed="rId11">
               <a:extLst>
                 <a:ext uri="{28A0092B-C50C-407E-A947-70E740481C1C}">
                   <a14:useLocalDpi xmlns:a14="http://schemas.microsoft.com/office/drawing/2010/main" val="0"/>
@@ -4478,7 +4445,7 @@
             <p:nvPr/>
           </p:nvPicPr>
           <p:blipFill>
-            <a:blip r:embed="rId11">
+            <a:blip r:embed="rId12">
               <a:extLst>
                 <a:ext uri="{28A0092B-C50C-407E-A947-70E740481C1C}">
                   <a14:useLocalDpi xmlns:a14="http://schemas.microsoft.com/office/drawing/2010/main" val="0"/>
@@ -4514,7 +4481,7 @@
             <p:nvPr/>
           </p:nvPicPr>
           <p:blipFill>
-            <a:blip r:embed="rId12">
+            <a:blip r:embed="rId13">
               <a:extLst>
                 <a:ext uri="{28A0092B-C50C-407E-A947-70E740481C1C}">
                   <a14:useLocalDpi xmlns:a14="http://schemas.microsoft.com/office/drawing/2010/main" val="0"/>
@@ -4550,7 +4517,7 @@
             <p:nvPr/>
           </p:nvPicPr>
           <p:blipFill>
-            <a:blip r:embed="rId13">
+            <a:blip r:embed="rId14">
               <a:extLst>
                 <a:ext uri="{28A0092B-C50C-407E-A947-70E740481C1C}">
                   <a14:useLocalDpi xmlns:a14="http://schemas.microsoft.com/office/drawing/2010/main" val="0"/>
@@ -4586,7 +4553,7 @@
             <p:nvPr/>
           </p:nvPicPr>
           <p:blipFill>
-            <a:blip r:embed="rId14">
+            <a:blip r:embed="rId15">
               <a:extLst>
                 <a:ext uri="{28A0092B-C50C-407E-A947-70E740481C1C}">
                   <a14:useLocalDpi xmlns:a14="http://schemas.microsoft.com/office/drawing/2010/main" val="0"/>
@@ -4622,7 +4589,7 @@
             <p:nvPr/>
           </p:nvPicPr>
           <p:blipFill>
-            <a:blip r:embed="rId15">
+            <a:blip r:embed="rId16">
               <a:extLst>
                 <a:ext uri="{28A0092B-C50C-407E-A947-70E740481C1C}">
                   <a14:useLocalDpi xmlns:a14="http://schemas.microsoft.com/office/drawing/2010/main" val="0"/>
@@ -4658,7 +4625,7 @@
             <p:nvPr/>
           </p:nvPicPr>
           <p:blipFill>
-            <a:blip r:embed="rId16">
+            <a:blip r:embed="rId17">
               <a:extLst>
                 <a:ext uri="{28A0092B-C50C-407E-A947-70E740481C1C}">
                   <a14:useLocalDpi xmlns:a14="http://schemas.microsoft.com/office/drawing/2010/main" val="0"/>
@@ -4694,7 +4661,7 @@
             <p:nvPr/>
           </p:nvPicPr>
           <p:blipFill>
-            <a:blip r:embed="rId17">
+            <a:blip r:embed="rId18">
               <a:extLst>
                 <a:ext uri="{28A0092B-C50C-407E-A947-70E740481C1C}">
                   <a14:useLocalDpi xmlns:a14="http://schemas.microsoft.com/office/drawing/2010/main" val="0"/>
@@ -4730,7 +4697,7 @@
             <p:nvPr/>
           </p:nvPicPr>
           <p:blipFill>
-            <a:blip r:embed="rId11">
+            <a:blip r:embed="rId12">
               <a:extLst>
                 <a:ext uri="{28A0092B-C50C-407E-A947-70E740481C1C}">
                   <a14:useLocalDpi xmlns:a14="http://schemas.microsoft.com/office/drawing/2010/main" val="0"/>
@@ -4766,7 +4733,7 @@
             <p:nvPr/>
           </p:nvPicPr>
           <p:blipFill>
-            <a:blip r:embed="rId18">
+            <a:blip r:embed="rId19">
               <a:extLst>
                 <a:ext uri="{28A0092B-C50C-407E-A947-70E740481C1C}">
                   <a14:useLocalDpi xmlns:a14="http://schemas.microsoft.com/office/drawing/2010/main" val="0"/>
@@ -4802,7 +4769,7 @@
             <p:nvPr/>
           </p:nvPicPr>
           <p:blipFill>
-            <a:blip r:embed="rId12">
+            <a:blip r:embed="rId13">
               <a:extLst>
                 <a:ext uri="{28A0092B-C50C-407E-A947-70E740481C1C}">
                   <a14:useLocalDpi xmlns:a14="http://schemas.microsoft.com/office/drawing/2010/main" val="0"/>
@@ -4838,7 +4805,7 @@
             <p:nvPr/>
           </p:nvPicPr>
           <p:blipFill>
-            <a:blip r:embed="rId13">
+            <a:blip r:embed="rId14">
               <a:extLst>
                 <a:ext uri="{28A0092B-C50C-407E-A947-70E740481C1C}">
                   <a14:useLocalDpi xmlns:a14="http://schemas.microsoft.com/office/drawing/2010/main" val="0"/>

</xml_diff>

<commit_message>
update diagrama de solução: adição de browsers
</commit_message>
<xml_diff>
--- a/DOCs de T.I/Diagrama_de_Solucao/Presentation.pptx
+++ b/DOCs de T.I/Diagrama_de_Solucao/Presentation.pptx
@@ -243,7 +243,7 @@
           <a:p>
             <a:fld id="{2FC3D184-0F2B-4D9D-BDB9-3409F15C70D5}" type="datetimeFigureOut">
               <a:rPr lang="pt-BR" smtClean="0"/>
-              <a:t>21/04/2022</a:t>
+              <a:t>26/04/2022</a:t>
             </a:fld>
             <a:endParaRPr lang="pt-BR"/>
           </a:p>
@@ -413,7 +413,7 @@
           <a:p>
             <a:fld id="{2FC3D184-0F2B-4D9D-BDB9-3409F15C70D5}" type="datetimeFigureOut">
               <a:rPr lang="pt-BR" smtClean="0"/>
-              <a:t>21/04/2022</a:t>
+              <a:t>26/04/2022</a:t>
             </a:fld>
             <a:endParaRPr lang="pt-BR"/>
           </a:p>
@@ -593,7 +593,7 @@
           <a:p>
             <a:fld id="{2FC3D184-0F2B-4D9D-BDB9-3409F15C70D5}" type="datetimeFigureOut">
               <a:rPr lang="pt-BR" smtClean="0"/>
-              <a:t>21/04/2022</a:t>
+              <a:t>26/04/2022</a:t>
             </a:fld>
             <a:endParaRPr lang="pt-BR"/>
           </a:p>
@@ -763,7 +763,7 @@
           <a:p>
             <a:fld id="{2FC3D184-0F2B-4D9D-BDB9-3409F15C70D5}" type="datetimeFigureOut">
               <a:rPr lang="pt-BR" smtClean="0"/>
-              <a:t>21/04/2022</a:t>
+              <a:t>26/04/2022</a:t>
             </a:fld>
             <a:endParaRPr lang="pt-BR"/>
           </a:p>
@@ -1009,7 +1009,7 @@
           <a:p>
             <a:fld id="{2FC3D184-0F2B-4D9D-BDB9-3409F15C70D5}" type="datetimeFigureOut">
               <a:rPr lang="pt-BR" smtClean="0"/>
-              <a:t>21/04/2022</a:t>
+              <a:t>26/04/2022</a:t>
             </a:fld>
             <a:endParaRPr lang="pt-BR"/>
           </a:p>
@@ -1241,7 +1241,7 @@
           <a:p>
             <a:fld id="{2FC3D184-0F2B-4D9D-BDB9-3409F15C70D5}" type="datetimeFigureOut">
               <a:rPr lang="pt-BR" smtClean="0"/>
-              <a:t>21/04/2022</a:t>
+              <a:t>26/04/2022</a:t>
             </a:fld>
             <a:endParaRPr lang="pt-BR"/>
           </a:p>
@@ -1608,7 +1608,7 @@
           <a:p>
             <a:fld id="{2FC3D184-0F2B-4D9D-BDB9-3409F15C70D5}" type="datetimeFigureOut">
               <a:rPr lang="pt-BR" smtClean="0"/>
-              <a:t>21/04/2022</a:t>
+              <a:t>26/04/2022</a:t>
             </a:fld>
             <a:endParaRPr lang="pt-BR"/>
           </a:p>
@@ -1726,7 +1726,7 @@
           <a:p>
             <a:fld id="{2FC3D184-0F2B-4D9D-BDB9-3409F15C70D5}" type="datetimeFigureOut">
               <a:rPr lang="pt-BR" smtClean="0"/>
-              <a:t>21/04/2022</a:t>
+              <a:t>26/04/2022</a:t>
             </a:fld>
             <a:endParaRPr lang="pt-BR"/>
           </a:p>
@@ -1821,7 +1821,7 @@
           <a:p>
             <a:fld id="{2FC3D184-0F2B-4D9D-BDB9-3409F15C70D5}" type="datetimeFigureOut">
               <a:rPr lang="pt-BR" smtClean="0"/>
-              <a:t>21/04/2022</a:t>
+              <a:t>26/04/2022</a:t>
             </a:fld>
             <a:endParaRPr lang="pt-BR"/>
           </a:p>
@@ -2098,7 +2098,7 @@
           <a:p>
             <a:fld id="{2FC3D184-0F2B-4D9D-BDB9-3409F15C70D5}" type="datetimeFigureOut">
               <a:rPr lang="pt-BR" smtClean="0"/>
-              <a:t>21/04/2022</a:t>
+              <a:t>26/04/2022</a:t>
             </a:fld>
             <a:endParaRPr lang="pt-BR"/>
           </a:p>
@@ -2355,7 +2355,7 @@
           <a:p>
             <a:fld id="{2FC3D184-0F2B-4D9D-BDB9-3409F15C70D5}" type="datetimeFigureOut">
               <a:rPr lang="pt-BR" smtClean="0"/>
-              <a:t>21/04/2022</a:t>
+              <a:t>26/04/2022</a:t>
             </a:fld>
             <a:endParaRPr lang="pt-BR"/>
           </a:p>
@@ -2568,7 +2568,7 @@
           <a:p>
             <a:fld id="{2FC3D184-0F2B-4D9D-BDB9-3409F15C70D5}" type="datetimeFigureOut">
               <a:rPr lang="pt-BR" smtClean="0"/>
-              <a:t>21/04/2022</a:t>
+              <a:t>26/04/2022</a:t>
             </a:fld>
             <a:endParaRPr lang="pt-BR"/>
           </a:p>
@@ -4056,16 +4056,16 @@
             </a:extLst>
           </p:cNvPr>
           <p:cNvGrpSpPr>
-            <a:grpSpLocks noGrp="1" noUngrp="1" noRot="1" noMove="1" noResize="1"/>
+            <a:grpSpLocks/>
           </p:cNvGrpSpPr>
           <p:nvPr/>
         </p:nvGrpSpPr>
         <p:grpSpPr>
           <a:xfrm>
-            <a:off x="456179" y="26513"/>
-            <a:ext cx="8683521" cy="5226296"/>
+            <a:off x="456179" y="5248"/>
+            <a:ext cx="8853568" cy="5226296"/>
             <a:chOff x="456179" y="26513"/>
-            <a:chExt cx="8683521" cy="5226296"/>
+            <a:chExt cx="8853568" cy="5226296"/>
           </a:xfrm>
         </p:grpSpPr>
         <p:pic>
@@ -4078,7 +4078,7 @@
               </a:extLst>
             </p:cNvPr>
             <p:cNvPicPr>
-              <a:picLocks noGrp="1" noRot="1" noChangeAspect="1" noMove="1" noResize="1" noEditPoints="1" noAdjustHandles="1" noChangeArrowheads="1" noChangeShapeType="1" noCrop="1"/>
+              <a:picLocks noChangeAspect="1"/>
             </p:cNvPicPr>
             <p:nvPr/>
           </p:nvPicPr>
@@ -4114,7 +4114,7 @@
               </a:extLst>
             </p:cNvPr>
             <p:cNvPicPr>
-              <a:picLocks noGrp="1" noRot="1" noChangeAspect="1" noMove="1" noResize="1" noEditPoints="1" noAdjustHandles="1" noChangeArrowheads="1" noChangeShapeType="1" noCrop="1"/>
+              <a:picLocks noChangeAspect="1"/>
             </p:cNvPicPr>
             <p:nvPr/>
           </p:nvPicPr>
@@ -4152,7 +4152,7 @@
               </a:extLst>
             </p:cNvPr>
             <p:cNvPicPr>
-              <a:picLocks noGrp="1" noRot="1" noChangeAspect="1" noMove="1" noResize="1" noEditPoints="1" noAdjustHandles="1" noChangeArrowheads="1" noChangeShapeType="1" noCrop="1"/>
+              <a:picLocks noChangeAspect="1"/>
             </p:cNvPicPr>
             <p:nvPr/>
           </p:nvPicPr>
@@ -4188,7 +4188,7 @@
               </a:extLst>
             </p:cNvPr>
             <p:cNvPicPr>
-              <a:picLocks noGrp="1" noRot="1" noChangeAspect="1" noMove="1" noResize="1" noEditPoints="1" noAdjustHandles="1" noChangeArrowheads="1" noChangeShapeType="1" noCrop="1"/>
+              <a:picLocks noChangeAspect="1"/>
             </p:cNvPicPr>
             <p:nvPr/>
           </p:nvPicPr>
@@ -4224,7 +4224,7 @@
               </a:extLst>
             </p:cNvPr>
             <p:cNvPicPr>
-              <a:picLocks noGrp="1" noRot="1" noChangeAspect="1" noMove="1" noResize="1" noEditPoints="1" noAdjustHandles="1" noChangeArrowheads="1" noChangeShapeType="1" noCrop="1"/>
+              <a:picLocks noChangeAspect="1"/>
             </p:cNvPicPr>
             <p:nvPr/>
           </p:nvPicPr>
@@ -4260,7 +4260,7 @@
               </a:extLst>
             </p:cNvPr>
             <p:cNvPicPr>
-              <a:picLocks noGrp="1" noRot="1" noChangeAspect="1" noMove="1" noResize="1" noEditPoints="1" noAdjustHandles="1" noChangeArrowheads="1" noChangeShapeType="1" noCrop="1"/>
+              <a:picLocks noChangeAspect="1"/>
             </p:cNvPicPr>
             <p:nvPr/>
           </p:nvPicPr>
@@ -4296,7 +4296,7 @@
               </a:extLst>
             </p:cNvPr>
             <p:cNvPicPr>
-              <a:picLocks noGrp="1" noRot="1" noChangeAspect="1" noMove="1" noResize="1" noEditPoints="1" noAdjustHandles="1" noChangeArrowheads="1" noChangeShapeType="1" noCrop="1"/>
+              <a:picLocks noChangeAspect="1"/>
             </p:cNvPicPr>
             <p:nvPr/>
           </p:nvPicPr>
@@ -4332,7 +4332,7 @@
               </a:extLst>
             </p:cNvPr>
             <p:cNvPicPr>
-              <a:picLocks noGrp="1" noRot="1" noChangeAspect="1" noMove="1" noResize="1" noEditPoints="1" noAdjustHandles="1" noChangeArrowheads="1" noChangeShapeType="1" noCrop="1"/>
+              <a:picLocks noChangeAspect="1"/>
             </p:cNvPicPr>
             <p:nvPr/>
           </p:nvPicPr>
@@ -4368,7 +4368,7 @@
               </a:extLst>
             </p:cNvPr>
             <p:cNvPicPr>
-              <a:picLocks noGrp="1" noRot="1" noChangeAspect="1" noMove="1" noResize="1" noEditPoints="1" noAdjustHandles="1" noChangeArrowheads="1" noChangeShapeType="1" noCrop="1"/>
+              <a:picLocks noChangeAspect="1"/>
             </p:cNvPicPr>
             <p:nvPr/>
           </p:nvPicPr>
@@ -4404,7 +4404,7 @@
               </a:extLst>
             </p:cNvPr>
             <p:cNvPicPr>
-              <a:picLocks noGrp="1" noRot="1" noChangeAspect="1" noMove="1" noResize="1" noEditPoints="1" noAdjustHandles="1" noChangeArrowheads="1" noChangeShapeType="1" noCrop="1"/>
+              <a:picLocks noChangeAspect="1"/>
             </p:cNvPicPr>
             <p:nvPr/>
           </p:nvPicPr>
@@ -4432,20 +4432,90 @@
         </p:pic>
         <p:pic>
           <p:nvPicPr>
-            <p:cNvPr id="224" name="wifi_cliente" descr="Ícone&#10;&#10;Descrição gerada automaticamente">
+            <p:cNvPr id="65" name="browser1">
               <a:extLst>
                 <a:ext uri="{FF2B5EF4-FFF2-40B4-BE49-F238E27FC236}">
-                  <a16:creationId xmlns:a16="http://schemas.microsoft.com/office/drawing/2014/main" id="{1002B21D-B4EE-473B-9D88-A48B15241FB6}"/>
+                  <a16:creationId xmlns:a16="http://schemas.microsoft.com/office/drawing/2014/main" id="{762DA282-2B3E-4A35-A0C2-9B2F2BA04122}"/>
                 </a:ext>
               </a:extLst>
             </p:cNvPr>
             <p:cNvPicPr>
-              <a:picLocks noGrp="1" noRot="1" noChangeAspect="1" noMove="1" noResize="1" noEditPoints="1" noAdjustHandles="1" noChangeArrowheads="1" noChangeShapeType="1" noCrop="1"/>
+              <a:picLocks noChangeAspect="1"/>
             </p:cNvPicPr>
             <p:nvPr/>
           </p:nvPicPr>
           <p:blipFill>
             <a:blip r:embed="rId12">
+              <a:extLst>
+                <a:ext uri="{28A0092B-C50C-407E-A947-70E740481C1C}">
+                  <a14:useLocalDpi xmlns:a14="http://schemas.microsoft.com/office/drawing/2010/main" val="0"/>
+                </a:ext>
+              </a:extLst>
+            </a:blip>
+            <a:srcRect/>
+            <a:stretch/>
+          </p:blipFill>
+          <p:spPr>
+            <a:xfrm>
+              <a:off x="8345278" y="3756761"/>
+              <a:ext cx="288000" cy="288000"/>
+            </a:xfrm>
+            <a:prstGeom prst="rect">
+              <a:avLst/>
+            </a:prstGeom>
+          </p:spPr>
+        </p:pic>
+        <p:pic>
+          <p:nvPicPr>
+            <p:cNvPr id="66" name="browser2">
+              <a:extLst>
+                <a:ext uri="{FF2B5EF4-FFF2-40B4-BE49-F238E27FC236}">
+                  <a16:creationId xmlns:a16="http://schemas.microsoft.com/office/drawing/2014/main" id="{255E76D8-E362-4204-B599-0B4D114F73EE}"/>
+                </a:ext>
+              </a:extLst>
+            </p:cNvPr>
+            <p:cNvPicPr>
+              <a:picLocks noChangeAspect="1"/>
+            </p:cNvPicPr>
+            <p:nvPr/>
+          </p:nvPicPr>
+          <p:blipFill>
+            <a:blip r:embed="rId13">
+              <a:extLst>
+                <a:ext uri="{28A0092B-C50C-407E-A947-70E740481C1C}">
+                  <a14:useLocalDpi xmlns:a14="http://schemas.microsoft.com/office/drawing/2010/main" val="0"/>
+                </a:ext>
+              </a:extLst>
+            </a:blip>
+            <a:srcRect/>
+            <a:stretch/>
+          </p:blipFill>
+          <p:spPr>
+            <a:xfrm>
+              <a:off x="9021747" y="3756762"/>
+              <a:ext cx="288000" cy="288000"/>
+            </a:xfrm>
+            <a:prstGeom prst="rect">
+              <a:avLst/>
+            </a:prstGeom>
+          </p:spPr>
+        </p:pic>
+        <p:pic>
+          <p:nvPicPr>
+            <p:cNvPr id="224" name="wifi_cliente" descr="Ícone&#10;&#10;Descrição gerada automaticamente">
+              <a:extLst>
+                <a:ext uri="{FF2B5EF4-FFF2-40B4-BE49-F238E27FC236}">
+                  <a16:creationId xmlns:a16="http://schemas.microsoft.com/office/drawing/2014/main" id="{1002B21D-B4EE-473B-9D88-A48B15241FB6}"/>
+                </a:ext>
+              </a:extLst>
+            </p:cNvPr>
+            <p:cNvPicPr>
+              <a:picLocks noChangeAspect="1"/>
+            </p:cNvPicPr>
+            <p:nvPr/>
+          </p:nvPicPr>
+          <p:blipFill>
+            <a:blip r:embed="rId14">
               <a:extLst>
                 <a:ext uri="{28A0092B-C50C-407E-A947-70E740481C1C}">
                   <a14:useLocalDpi xmlns:a14="http://schemas.microsoft.com/office/drawing/2010/main" val="0"/>
@@ -4476,12 +4546,12 @@
               </a:extLst>
             </p:cNvPr>
             <p:cNvPicPr>
-              <a:picLocks noGrp="1" noRot="1" noChangeAspect="1" noMove="1" noResize="1" noEditPoints="1" noAdjustHandles="1" noChangeArrowheads="1" noChangeShapeType="1" noCrop="1"/>
+              <a:picLocks noChangeAspect="1"/>
             </p:cNvPicPr>
             <p:nvPr/>
           </p:nvPicPr>
           <p:blipFill>
-            <a:blip r:embed="rId13">
+            <a:blip r:embed="rId15">
               <a:extLst>
                 <a:ext uri="{28A0092B-C50C-407E-A947-70E740481C1C}">
                   <a14:useLocalDpi xmlns:a14="http://schemas.microsoft.com/office/drawing/2010/main" val="0"/>
@@ -4512,12 +4582,12 @@
               </a:extLst>
             </p:cNvPr>
             <p:cNvPicPr>
-              <a:picLocks noGrp="1" noRot="1" noChangeAspect="1" noMove="1" noResize="1" noEditPoints="1" noAdjustHandles="1" noChangeArrowheads="1" noChangeShapeType="1" noCrop="1"/>
+              <a:picLocks noChangeAspect="1"/>
             </p:cNvPicPr>
             <p:nvPr/>
           </p:nvPicPr>
           <p:blipFill>
-            <a:blip r:embed="rId14">
+            <a:blip r:embed="rId16">
               <a:extLst>
                 <a:ext uri="{28A0092B-C50C-407E-A947-70E740481C1C}">
                   <a14:useLocalDpi xmlns:a14="http://schemas.microsoft.com/office/drawing/2010/main" val="0"/>
@@ -4548,12 +4618,12 @@
               </a:extLst>
             </p:cNvPr>
             <p:cNvPicPr>
-              <a:picLocks noGrp="1" noRot="1" noChangeAspect="1" noMove="1" noResize="1" noEditPoints="1" noAdjustHandles="1" noChangeArrowheads="1" noChangeShapeType="1" noCrop="1"/>
+              <a:picLocks noChangeAspect="1"/>
             </p:cNvPicPr>
             <p:nvPr/>
           </p:nvPicPr>
           <p:blipFill>
-            <a:blip r:embed="rId15">
+            <a:blip r:embed="rId17">
               <a:extLst>
                 <a:ext uri="{28A0092B-C50C-407E-A947-70E740481C1C}">
                   <a14:useLocalDpi xmlns:a14="http://schemas.microsoft.com/office/drawing/2010/main" val="0"/>
@@ -4584,12 +4654,12 @@
               </a:extLst>
             </p:cNvPr>
             <p:cNvPicPr>
-              <a:picLocks noGrp="1" noRot="1" noChangeAspect="1" noMove="1" noResize="1" noEditPoints="1" noAdjustHandles="1" noChangeArrowheads="1" noChangeShapeType="1" noCrop="1"/>
+              <a:picLocks noChangeAspect="1"/>
             </p:cNvPicPr>
             <p:nvPr/>
           </p:nvPicPr>
           <p:blipFill>
-            <a:blip r:embed="rId16">
+            <a:blip r:embed="rId18">
               <a:extLst>
                 <a:ext uri="{28A0092B-C50C-407E-A947-70E740481C1C}">
                   <a14:useLocalDpi xmlns:a14="http://schemas.microsoft.com/office/drawing/2010/main" val="0"/>
@@ -4620,12 +4690,12 @@
               </a:extLst>
             </p:cNvPr>
             <p:cNvPicPr>
-              <a:picLocks noGrp="1" noRot="1" noChangeAspect="1" noMove="1" noResize="1" noEditPoints="1" noAdjustHandles="1" noChangeArrowheads="1" noChangeShapeType="1" noCrop="1"/>
+              <a:picLocks noChangeAspect="1"/>
             </p:cNvPicPr>
             <p:nvPr/>
           </p:nvPicPr>
           <p:blipFill>
-            <a:blip r:embed="rId17">
+            <a:blip r:embed="rId19">
               <a:extLst>
                 <a:ext uri="{28A0092B-C50C-407E-A947-70E740481C1C}">
                   <a14:useLocalDpi xmlns:a14="http://schemas.microsoft.com/office/drawing/2010/main" val="0"/>
@@ -4656,12 +4726,12 @@
               </a:extLst>
             </p:cNvPr>
             <p:cNvPicPr>
-              <a:picLocks noGrp="1" noRot="1" noChangeAspect="1" noMove="1" noResize="1" noEditPoints="1" noAdjustHandles="1" noChangeArrowheads="1" noChangeShapeType="1" noCrop="1"/>
+              <a:picLocks noChangeAspect="1"/>
             </p:cNvPicPr>
             <p:nvPr/>
           </p:nvPicPr>
           <p:blipFill>
-            <a:blip r:embed="rId18">
+            <a:blip r:embed="rId20">
               <a:extLst>
                 <a:ext uri="{28A0092B-C50C-407E-A947-70E740481C1C}">
                   <a14:useLocalDpi xmlns:a14="http://schemas.microsoft.com/office/drawing/2010/main" val="0"/>
@@ -4692,12 +4762,12 @@
               </a:extLst>
             </p:cNvPr>
             <p:cNvPicPr>
-              <a:picLocks noGrp="1" noRot="1" noChangeAspect="1" noMove="1" noResize="1" noEditPoints="1" noAdjustHandles="1" noChangeArrowheads="1" noChangeShapeType="1" noCrop="1"/>
+              <a:picLocks noChangeAspect="1"/>
             </p:cNvPicPr>
             <p:nvPr/>
           </p:nvPicPr>
           <p:blipFill>
-            <a:blip r:embed="rId12">
+            <a:blip r:embed="rId14">
               <a:extLst>
                 <a:ext uri="{28A0092B-C50C-407E-A947-70E740481C1C}">
                   <a14:useLocalDpi xmlns:a14="http://schemas.microsoft.com/office/drawing/2010/main" val="0"/>
@@ -4728,12 +4798,12 @@
               </a:extLst>
             </p:cNvPr>
             <p:cNvPicPr>
-              <a:picLocks noGrp="1" noRot="1" noChangeAspect="1" noMove="1" noResize="1" noEditPoints="1" noAdjustHandles="1" noChangeArrowheads="1" noChangeShapeType="1" noCrop="1"/>
+              <a:picLocks noChangeAspect="1"/>
             </p:cNvPicPr>
             <p:nvPr/>
           </p:nvPicPr>
           <p:blipFill>
-            <a:blip r:embed="rId19">
+            <a:blip r:embed="rId21">
               <a:extLst>
                 <a:ext uri="{28A0092B-C50C-407E-A947-70E740481C1C}">
                   <a14:useLocalDpi xmlns:a14="http://schemas.microsoft.com/office/drawing/2010/main" val="0"/>
@@ -4764,12 +4834,12 @@
               </a:extLst>
             </p:cNvPr>
             <p:cNvPicPr>
-              <a:picLocks noGrp="1" noRot="1" noChangeAspect="1" noMove="1" noResize="1" noEditPoints="1" noAdjustHandles="1" noChangeArrowheads="1" noChangeShapeType="1" noCrop="1"/>
+              <a:picLocks noChangeAspect="1"/>
             </p:cNvPicPr>
             <p:nvPr/>
           </p:nvPicPr>
           <p:blipFill>
-            <a:blip r:embed="rId13">
+            <a:blip r:embed="rId15">
               <a:extLst>
                 <a:ext uri="{28A0092B-C50C-407E-A947-70E740481C1C}">
                   <a14:useLocalDpi xmlns:a14="http://schemas.microsoft.com/office/drawing/2010/main" val="0"/>
@@ -4800,12 +4870,12 @@
               </a:extLst>
             </p:cNvPr>
             <p:cNvPicPr>
-              <a:picLocks noGrp="1" noRot="1" noChangeAspect="1" noMove="1" noResize="1" noEditPoints="1" noAdjustHandles="1" noChangeArrowheads="1" noChangeShapeType="1" noCrop="1"/>
+              <a:picLocks noChangeAspect="1"/>
             </p:cNvPicPr>
             <p:nvPr/>
           </p:nvPicPr>
           <p:blipFill>
-            <a:blip r:embed="rId14">
+            <a:blip r:embed="rId16">
               <a:extLst>
                 <a:ext uri="{28A0092B-C50C-407E-A947-70E740481C1C}">
                   <a14:useLocalDpi xmlns:a14="http://schemas.microsoft.com/office/drawing/2010/main" val="0"/>
@@ -4837,16 +4907,16 @@
             </a:extLst>
           </p:cNvPr>
           <p:cNvGrpSpPr>
-            <a:grpSpLocks noGrp="1" noUngrp="1" noRot="1" noMove="1" noResize="1"/>
+            <a:grpSpLocks/>
           </p:cNvGrpSpPr>
           <p:nvPr/>
         </p:nvGrpSpPr>
         <p:grpSpPr>
           <a:xfrm>
-            <a:off x="775693" y="189268"/>
-            <a:ext cx="8049814" cy="4561182"/>
-            <a:chOff x="775693" y="189268"/>
-            <a:chExt cx="8049814" cy="4561182"/>
+            <a:off x="775693" y="165289"/>
+            <a:ext cx="8390055" cy="4585159"/>
+            <a:chOff x="775693" y="165291"/>
+            <a:chExt cx="8390055" cy="4585159"/>
           </a:xfrm>
         </p:grpSpPr>
         <p:cxnSp>
@@ -4859,7 +4929,7 @@
               </a:extLst>
             </p:cNvPr>
             <p:cNvCxnSpPr>
-              <a:cxnSpLocks noGrp="1" noRot="1" noMove="1" noResize="1" noEditPoints="1" noAdjustHandles="1" noChangeArrowheads="1" noChangeShapeType="1"/>
+              <a:cxnSpLocks/>
               <a:stCxn id="92" idx="0"/>
               <a:endCxn id="96" idx="2"/>
             </p:cNvCxnSpPr>
@@ -4867,7 +4937,7 @@
           </p:nvCxnSpPr>
           <p:spPr>
             <a:xfrm rot="16200000" flipV="1">
-              <a:off x="4539034" y="2253195"/>
+              <a:off x="4539882" y="2229218"/>
               <a:ext cx="508508" cy="2"/>
             </a:xfrm>
             <a:prstGeom prst="bentConnector3">
@@ -4905,7 +4975,7 @@
               </a:extLst>
             </p:cNvPr>
             <p:cNvCxnSpPr>
-              <a:cxnSpLocks noGrp="1" noRot="1" noMove="1" noResize="1" noEditPoints="1" noAdjustHandles="1" noChangeArrowheads="1" noChangeShapeType="1"/>
+              <a:cxnSpLocks/>
               <a:stCxn id="100" idx="3"/>
               <a:endCxn id="96" idx="0"/>
             </p:cNvCxnSpPr>
@@ -4913,7 +4983,7 @@
           </p:nvCxnSpPr>
           <p:spPr>
             <a:xfrm>
-              <a:off x="4284903" y="652461"/>
+              <a:off x="4285751" y="628484"/>
               <a:ext cx="508384" cy="706316"/>
             </a:xfrm>
             <a:prstGeom prst="line">
@@ -4951,7 +5021,7 @@
               </a:extLst>
             </p:cNvPr>
             <p:cNvCxnSpPr>
-              <a:cxnSpLocks noGrp="1" noRot="1" noMove="1" noResize="1" noEditPoints="1" noAdjustHandles="1" noChangeArrowheads="1" noChangeShapeType="1"/>
+              <a:cxnSpLocks/>
               <a:stCxn id="104" idx="1"/>
               <a:endCxn id="96" idx="0"/>
             </p:cNvCxnSpPr>
@@ -4959,7 +5029,7 @@
           </p:nvCxnSpPr>
           <p:spPr>
             <a:xfrm flipH="1">
-              <a:off x="4793287" y="649355"/>
+              <a:off x="4794135" y="625378"/>
               <a:ext cx="426470" cy="709422"/>
             </a:xfrm>
             <a:prstGeom prst="line">
@@ -4997,7 +5067,7 @@
               </a:extLst>
             </p:cNvPr>
             <p:cNvCxnSpPr>
-              <a:cxnSpLocks noGrp="1" noRot="1" noMove="1" noResize="1" noEditPoints="1" noAdjustHandles="1" noChangeArrowheads="1" noChangeShapeType="1"/>
+              <a:cxnSpLocks/>
               <a:stCxn id="100" idx="3"/>
               <a:endCxn id="104" idx="1"/>
             </p:cNvCxnSpPr>
@@ -5005,7 +5075,7 @@
           </p:nvCxnSpPr>
           <p:spPr>
             <a:xfrm flipV="1">
-              <a:off x="4284903" y="649355"/>
+              <a:off x="4285751" y="625378"/>
               <a:ext cx="934854" cy="3106"/>
             </a:xfrm>
             <a:prstGeom prst="line">
@@ -5043,7 +5113,7 @@
               </a:extLst>
             </p:cNvPr>
             <p:cNvCxnSpPr>
-              <a:cxnSpLocks noGrp="1" noRot="1" noMove="1" noResize="1" noEditPoints="1" noAdjustHandles="1" noChangeArrowheads="1" noChangeShapeType="1"/>
+              <a:cxnSpLocks/>
               <a:stCxn id="112" idx="3"/>
               <a:endCxn id="100" idx="1"/>
             </p:cNvCxnSpPr>
@@ -5051,7 +5121,7 @@
           </p:nvCxnSpPr>
           <p:spPr>
             <a:xfrm>
-              <a:off x="3380887" y="189268"/>
+              <a:off x="3381735" y="165291"/>
               <a:ext cx="477239" cy="463193"/>
             </a:xfrm>
             <a:prstGeom prst="line">
@@ -5089,7 +5159,7 @@
               </a:extLst>
             </p:cNvPr>
             <p:cNvCxnSpPr>
-              <a:cxnSpLocks noGrp="1" noRot="1" noMove="1" noResize="1" noEditPoints="1" noAdjustHandles="1" noChangeArrowheads="1" noChangeShapeType="1"/>
+              <a:cxnSpLocks/>
               <a:stCxn id="108" idx="3"/>
               <a:endCxn id="100" idx="1"/>
             </p:cNvCxnSpPr>
@@ -5097,7 +5167,7 @@
           </p:nvCxnSpPr>
           <p:spPr>
             <a:xfrm flipV="1">
-              <a:off x="3381118" y="652461"/>
+              <a:off x="3381966" y="628484"/>
               <a:ext cx="477008" cy="64"/>
             </a:xfrm>
             <a:prstGeom prst="line">
@@ -5135,7 +5205,7 @@
               </a:extLst>
             </p:cNvPr>
             <p:cNvCxnSpPr>
-              <a:cxnSpLocks noGrp="1" noRot="1" noMove="1" noResize="1" noEditPoints="1" noAdjustHandles="1" noChangeArrowheads="1" noChangeShapeType="1"/>
+              <a:cxnSpLocks/>
               <a:stCxn id="116" idx="3"/>
               <a:endCxn id="100" idx="1"/>
             </p:cNvCxnSpPr>
@@ -5143,7 +5213,7 @@
           </p:nvCxnSpPr>
           <p:spPr>
             <a:xfrm flipV="1">
-              <a:off x="3373952" y="652461"/>
+              <a:off x="3374800" y="628484"/>
               <a:ext cx="484174" cy="483067"/>
             </a:xfrm>
             <a:prstGeom prst="line">
@@ -5181,7 +5251,7 @@
               </a:extLst>
             </p:cNvPr>
             <p:cNvCxnSpPr>
-              <a:cxnSpLocks noGrp="1" noRot="1" noMove="1" noResize="1" noEditPoints="1" noAdjustHandles="1" noChangeArrowheads="1" noChangeShapeType="1"/>
+              <a:cxnSpLocks/>
               <a:stCxn id="98" idx="3"/>
               <a:endCxn id="92" idx="1"/>
             </p:cNvCxnSpPr>
@@ -5189,7 +5259,7 @@
           </p:nvCxnSpPr>
           <p:spPr>
             <a:xfrm>
-              <a:off x="2766965" y="2572107"/>
+              <a:off x="2766965" y="2550844"/>
               <a:ext cx="1493701" cy="466100"/>
             </a:xfrm>
             <a:prstGeom prst="bentConnector3">
@@ -5227,7 +5297,7 @@
               </a:extLst>
             </p:cNvPr>
             <p:cNvCxnSpPr>
-              <a:cxnSpLocks noGrp="1" noRot="1" noMove="1" noResize="1" noEditPoints="1" noAdjustHandles="1" noChangeArrowheads="1" noChangeShapeType="1"/>
+              <a:cxnSpLocks/>
               <a:stCxn id="97" idx="3"/>
               <a:endCxn id="98" idx="1"/>
             </p:cNvCxnSpPr>
@@ -5235,7 +5305,7 @@
           </p:nvCxnSpPr>
           <p:spPr>
             <a:xfrm>
-              <a:off x="989083" y="2156299"/>
+              <a:off x="989083" y="2135036"/>
               <a:ext cx="1352851" cy="415808"/>
             </a:xfrm>
             <a:prstGeom prst="bentConnector3">
@@ -5273,7 +5343,7 @@
               </a:extLst>
             </p:cNvPr>
             <p:cNvCxnSpPr>
-              <a:cxnSpLocks noGrp="1" noRot="1" noMove="1" noResize="1" noEditPoints="1" noAdjustHandles="1" noChangeArrowheads="1" noChangeShapeType="1"/>
+              <a:cxnSpLocks/>
               <a:stCxn id="230" idx="0"/>
               <a:endCxn id="97" idx="2"/>
             </p:cNvCxnSpPr>
@@ -5281,7 +5351,7 @@
           </p:nvCxnSpPr>
           <p:spPr>
             <a:xfrm rot="5400000" flipH="1" flipV="1">
-              <a:off x="431861" y="2713521"/>
+              <a:off x="431861" y="2692258"/>
               <a:ext cx="687667" cy="1"/>
             </a:xfrm>
             <a:prstGeom prst="bentConnector3">
@@ -5319,7 +5389,7 @@
               </a:extLst>
             </p:cNvPr>
             <p:cNvCxnSpPr>
-              <a:cxnSpLocks noGrp="1" noRot="1" noMove="1" noResize="1" noEditPoints="1" noAdjustHandles="1" noChangeArrowheads="1" noChangeShapeType="1"/>
+              <a:cxnSpLocks/>
             </p:cNvCxnSpPr>
             <p:nvPr/>
           </p:nvCxnSpPr>
@@ -5363,7 +5433,7 @@
               </a:extLst>
             </p:cNvPr>
             <p:cNvCxnSpPr>
-              <a:cxnSpLocks noGrp="1" noRot="1" noMove="1" noResize="1" noEditPoints="1" noAdjustHandles="1" noChangeArrowheads="1" noChangeShapeType="1"/>
+              <a:cxnSpLocks/>
             </p:cNvCxnSpPr>
             <p:nvPr/>
           </p:nvCxnSpPr>
@@ -5407,7 +5477,7 @@
               </a:extLst>
             </p:cNvPr>
             <p:cNvCxnSpPr>
-              <a:cxnSpLocks noGrp="1" noRot="1" noMove="1" noResize="1" noEditPoints="1" noAdjustHandles="1" noChangeArrowheads="1" noChangeShapeType="1"/>
+              <a:cxnSpLocks/>
             </p:cNvCxnSpPr>
             <p:nvPr/>
           </p:nvCxnSpPr>
@@ -5451,7 +5521,7 @@
               </a:extLst>
             </p:cNvPr>
             <p:cNvCxnSpPr>
-              <a:cxnSpLocks noGrp="1" noRot="1" noMove="1" noResize="1" noEditPoints="1" noAdjustHandles="1" noChangeArrowheads="1" noChangeShapeType="1"/>
+              <a:cxnSpLocks/>
             </p:cNvCxnSpPr>
             <p:nvPr/>
           </p:nvCxnSpPr>
@@ -5495,7 +5565,7 @@
               </a:extLst>
             </p:cNvPr>
             <p:cNvCxnSpPr>
-              <a:cxnSpLocks noGrp="1" noRot="1" noMove="1" noResize="1" noEditPoints="1" noAdjustHandles="1" noChangeArrowheads="1" noChangeShapeType="1"/>
+              <a:cxnSpLocks/>
             </p:cNvCxnSpPr>
             <p:nvPr/>
           </p:nvCxnSpPr>
@@ -5539,7 +5609,7 @@
               </a:extLst>
             </p:cNvPr>
             <p:cNvCxnSpPr>
-              <a:cxnSpLocks noGrp="1" noRot="1" noMove="1" noResize="1" noEditPoints="1" noAdjustHandles="1" noChangeArrowheads="1" noChangeShapeType="1"/>
+              <a:cxnSpLocks/>
               <a:stCxn id="103" idx="1"/>
               <a:endCxn id="92" idx="3"/>
             </p:cNvCxnSpPr>
@@ -5547,7 +5617,7 @@
           </p:nvCxnSpPr>
           <p:spPr>
             <a:xfrm rot="10800000" flipV="1">
-              <a:off x="5327607" y="2574115"/>
+              <a:off x="5327607" y="2552852"/>
               <a:ext cx="1499250" cy="464092"/>
             </a:xfrm>
             <a:prstGeom prst="bentConnector3">
@@ -5585,7 +5655,7 @@
               </a:extLst>
             </p:cNvPr>
             <p:cNvCxnSpPr>
-              <a:cxnSpLocks noGrp="1" noRot="1" noMove="1" noResize="1" noEditPoints="1" noAdjustHandles="1" noChangeArrowheads="1" noChangeShapeType="1"/>
+              <a:cxnSpLocks/>
               <a:stCxn id="137" idx="1"/>
               <a:endCxn id="103" idx="3"/>
             </p:cNvCxnSpPr>
@@ -5593,7 +5663,7 @@
           </p:nvCxnSpPr>
           <p:spPr>
             <a:xfrm rot="10800000" flipV="1">
-              <a:off x="7251889" y="2165881"/>
+              <a:off x="7251889" y="2144618"/>
               <a:ext cx="1360229" cy="408233"/>
             </a:xfrm>
             <a:prstGeom prst="bentConnector3">
@@ -5631,7 +5701,7 @@
               </a:extLst>
             </p:cNvPr>
             <p:cNvCxnSpPr>
-              <a:cxnSpLocks noGrp="1" noRot="1" noMove="1" noResize="1" noEditPoints="1" noAdjustHandles="1" noChangeArrowheads="1" noChangeShapeType="1"/>
+              <a:cxnSpLocks/>
               <a:stCxn id="224" idx="0"/>
               <a:endCxn id="137" idx="2"/>
             </p:cNvCxnSpPr>
@@ -5639,7 +5709,7 @@
           </p:nvCxnSpPr>
           <p:spPr>
             <a:xfrm rot="16200000" flipV="1">
-              <a:off x="8487565" y="2717211"/>
+              <a:off x="8487565" y="2695948"/>
               <a:ext cx="675884" cy="1"/>
             </a:xfrm>
             <a:prstGeom prst="bentConnector3">
@@ -5677,16 +5747,160 @@
               </a:extLst>
             </p:cNvPr>
             <p:cNvCxnSpPr>
-              <a:cxnSpLocks noGrp="1" noRot="1" noMove="1" noResize="1" noEditPoints="1" noAdjustHandles="1" noChangeArrowheads="1" noChangeShapeType="1"/>
-              <a:stCxn id="226" idx="0"/>
+              <a:cxnSpLocks/>
+              <a:stCxn id="66" idx="0"/>
+              <a:endCxn id="224" idx="2"/>
+            </p:cNvCxnSpPr>
+            <p:nvPr/>
+          </p:nvCxnSpPr>
+          <p:spPr>
+            <a:xfrm rot="16200000" flipV="1">
+              <a:off x="8858212" y="3427964"/>
+              <a:ext cx="274831" cy="340240"/>
+            </a:xfrm>
+            <a:prstGeom prst="bentConnector3">
+              <a:avLst>
+                <a:gd name="adj1" fmla="val 50000"/>
+              </a:avLst>
+            </a:prstGeom>
+            <a:ln w="28575">
+              <a:solidFill>
+                <a:srgbClr val="7030A0"/>
+              </a:solidFill>
+              <a:prstDash val="sysDot"/>
+            </a:ln>
+          </p:spPr>
+          <p:style>
+            <a:lnRef idx="1">
+              <a:schemeClr val="accent1"/>
+            </a:lnRef>
+            <a:fillRef idx="0">
+              <a:schemeClr val="accent1"/>
+            </a:fillRef>
+            <a:effectRef idx="0">
+              <a:schemeClr val="accent1"/>
+            </a:effectRef>
+            <a:fontRef idx="minor">
+              <a:schemeClr val="tx1"/>
+            </a:fontRef>
+          </p:style>
+        </p:cxnSp>
+        <p:cxnSp>
+          <p:nvCxnSpPr>
+            <p:cNvPr id="60" name="20">
+              <a:extLst>
+                <a:ext uri="{FF2B5EF4-FFF2-40B4-BE49-F238E27FC236}">
+                  <a16:creationId xmlns:a16="http://schemas.microsoft.com/office/drawing/2014/main" id="{9E15EE24-B58C-4082-95DE-13AE351474B1}"/>
+                </a:ext>
+              </a:extLst>
+            </p:cNvPr>
+            <p:cNvCxnSpPr>
+              <a:cxnSpLocks/>
+              <a:stCxn id="65" idx="0"/>
               <a:endCxn id="224" idx="2"/>
             </p:cNvCxnSpPr>
             <p:nvPr/>
           </p:nvCxnSpPr>
           <p:spPr>
             <a:xfrm rot="5400000" flipH="1" flipV="1">
-              <a:off x="8257206" y="4044344"/>
-              <a:ext cx="1130713" cy="5889"/>
+              <a:off x="8519977" y="3429969"/>
+              <a:ext cx="274830" cy="336229"/>
+            </a:xfrm>
+            <a:prstGeom prst="bentConnector3">
+              <a:avLst>
+                <a:gd name="adj1" fmla="val 50000"/>
+              </a:avLst>
+            </a:prstGeom>
+            <a:ln w="28575">
+              <a:solidFill>
+                <a:srgbClr val="7030A0"/>
+              </a:solidFill>
+              <a:prstDash val="sysDot"/>
+            </a:ln>
+          </p:spPr>
+          <p:style>
+            <a:lnRef idx="1">
+              <a:schemeClr val="accent1"/>
+            </a:lnRef>
+            <a:fillRef idx="0">
+              <a:schemeClr val="accent1"/>
+            </a:fillRef>
+            <a:effectRef idx="0">
+              <a:schemeClr val="accent1"/>
+            </a:effectRef>
+            <a:fontRef idx="minor">
+              <a:schemeClr val="tx1"/>
+            </a:fontRef>
+          </p:style>
+        </p:cxnSp>
+        <p:cxnSp>
+          <p:nvCxnSpPr>
+            <p:cNvPr id="70" name="21">
+              <a:extLst>
+                <a:ext uri="{FF2B5EF4-FFF2-40B4-BE49-F238E27FC236}">
+                  <a16:creationId xmlns:a16="http://schemas.microsoft.com/office/drawing/2014/main" id="{EAAE4881-E09B-488C-A7C4-2677FB9C3C12}"/>
+                </a:ext>
+              </a:extLst>
+            </p:cNvPr>
+            <p:cNvCxnSpPr>
+              <a:cxnSpLocks/>
+              <a:stCxn id="226" idx="0"/>
+              <a:endCxn id="65" idx="2"/>
+            </p:cNvCxnSpPr>
+            <p:nvPr/>
+          </p:nvCxnSpPr>
+          <p:spPr>
+            <a:xfrm rot="16200000" flipV="1">
+              <a:off x="8370507" y="4142270"/>
+              <a:ext cx="567883" cy="330340"/>
+            </a:xfrm>
+            <a:prstGeom prst="bentConnector3">
+              <a:avLst>
+                <a:gd name="adj1" fmla="val 50000"/>
+              </a:avLst>
+            </a:prstGeom>
+            <a:ln w="28575">
+              <a:solidFill>
+                <a:srgbClr val="7030A0"/>
+              </a:solidFill>
+              <a:prstDash val="sysDot"/>
+            </a:ln>
+          </p:spPr>
+          <p:style>
+            <a:lnRef idx="1">
+              <a:schemeClr val="accent1"/>
+            </a:lnRef>
+            <a:fillRef idx="0">
+              <a:schemeClr val="accent1"/>
+            </a:fillRef>
+            <a:effectRef idx="0">
+              <a:schemeClr val="accent1"/>
+            </a:effectRef>
+            <a:fontRef idx="minor">
+              <a:schemeClr val="tx1"/>
+            </a:fontRef>
+          </p:style>
+        </p:cxnSp>
+        <p:cxnSp>
+          <p:nvCxnSpPr>
+            <p:cNvPr id="73" name="22">
+              <a:extLst>
+                <a:ext uri="{FF2B5EF4-FFF2-40B4-BE49-F238E27FC236}">
+                  <a16:creationId xmlns:a16="http://schemas.microsoft.com/office/drawing/2014/main" id="{FB1DB598-B352-4900-9957-D2D0F59DBC25}"/>
+                </a:ext>
+              </a:extLst>
+            </p:cNvPr>
+            <p:cNvCxnSpPr>
+              <a:cxnSpLocks/>
+              <a:stCxn id="226" idx="0"/>
+              <a:endCxn id="66" idx="2"/>
+            </p:cNvCxnSpPr>
+            <p:nvPr/>
+          </p:nvCxnSpPr>
+          <p:spPr>
+            <a:xfrm rot="5400000" flipH="1" flipV="1">
+              <a:off x="8708741" y="4134376"/>
+              <a:ext cx="567882" cy="346129"/>
             </a:xfrm>
             <a:prstGeom prst="bentConnector3">
               <a:avLst>

</xml_diff>

<commit_message>
reorganização dos diretórios de BD + inserção da modelagem Vitor com n-m
</commit_message>
<xml_diff>
--- a/DOCs de T.I/Diagrama_de_Solucao/Presentation.pptx
+++ b/DOCs de T.I/Diagrama_de_Solucao/Presentation.pptx
@@ -243,7 +243,7 @@
           <a:p>
             <a:fld id="{2FC3D184-0F2B-4D9D-BDB9-3409F15C70D5}" type="datetimeFigureOut">
               <a:rPr lang="pt-BR" smtClean="0"/>
-              <a:t>26/04/2022</a:t>
+              <a:t>27/04/2022</a:t>
             </a:fld>
             <a:endParaRPr lang="pt-BR"/>
           </a:p>
@@ -413,7 +413,7 @@
           <a:p>
             <a:fld id="{2FC3D184-0F2B-4D9D-BDB9-3409F15C70D5}" type="datetimeFigureOut">
               <a:rPr lang="pt-BR" smtClean="0"/>
-              <a:t>26/04/2022</a:t>
+              <a:t>27/04/2022</a:t>
             </a:fld>
             <a:endParaRPr lang="pt-BR"/>
           </a:p>
@@ -593,7 +593,7 @@
           <a:p>
             <a:fld id="{2FC3D184-0F2B-4D9D-BDB9-3409F15C70D5}" type="datetimeFigureOut">
               <a:rPr lang="pt-BR" smtClean="0"/>
-              <a:t>26/04/2022</a:t>
+              <a:t>27/04/2022</a:t>
             </a:fld>
             <a:endParaRPr lang="pt-BR"/>
           </a:p>
@@ -763,7 +763,7 @@
           <a:p>
             <a:fld id="{2FC3D184-0F2B-4D9D-BDB9-3409F15C70D5}" type="datetimeFigureOut">
               <a:rPr lang="pt-BR" smtClean="0"/>
-              <a:t>26/04/2022</a:t>
+              <a:t>27/04/2022</a:t>
             </a:fld>
             <a:endParaRPr lang="pt-BR"/>
           </a:p>
@@ -1009,7 +1009,7 @@
           <a:p>
             <a:fld id="{2FC3D184-0F2B-4D9D-BDB9-3409F15C70D5}" type="datetimeFigureOut">
               <a:rPr lang="pt-BR" smtClean="0"/>
-              <a:t>26/04/2022</a:t>
+              <a:t>27/04/2022</a:t>
             </a:fld>
             <a:endParaRPr lang="pt-BR"/>
           </a:p>
@@ -1241,7 +1241,7 @@
           <a:p>
             <a:fld id="{2FC3D184-0F2B-4D9D-BDB9-3409F15C70D5}" type="datetimeFigureOut">
               <a:rPr lang="pt-BR" smtClean="0"/>
-              <a:t>26/04/2022</a:t>
+              <a:t>27/04/2022</a:t>
             </a:fld>
             <a:endParaRPr lang="pt-BR"/>
           </a:p>
@@ -1608,7 +1608,7 @@
           <a:p>
             <a:fld id="{2FC3D184-0F2B-4D9D-BDB9-3409F15C70D5}" type="datetimeFigureOut">
               <a:rPr lang="pt-BR" smtClean="0"/>
-              <a:t>26/04/2022</a:t>
+              <a:t>27/04/2022</a:t>
             </a:fld>
             <a:endParaRPr lang="pt-BR"/>
           </a:p>
@@ -1726,7 +1726,7 @@
           <a:p>
             <a:fld id="{2FC3D184-0F2B-4D9D-BDB9-3409F15C70D5}" type="datetimeFigureOut">
               <a:rPr lang="pt-BR" smtClean="0"/>
-              <a:t>26/04/2022</a:t>
+              <a:t>27/04/2022</a:t>
             </a:fld>
             <a:endParaRPr lang="pt-BR"/>
           </a:p>
@@ -1821,7 +1821,7 @@
           <a:p>
             <a:fld id="{2FC3D184-0F2B-4D9D-BDB9-3409F15C70D5}" type="datetimeFigureOut">
               <a:rPr lang="pt-BR" smtClean="0"/>
-              <a:t>26/04/2022</a:t>
+              <a:t>27/04/2022</a:t>
             </a:fld>
             <a:endParaRPr lang="pt-BR"/>
           </a:p>
@@ -2098,7 +2098,7 @@
           <a:p>
             <a:fld id="{2FC3D184-0F2B-4D9D-BDB9-3409F15C70D5}" type="datetimeFigureOut">
               <a:rPr lang="pt-BR" smtClean="0"/>
-              <a:t>26/04/2022</a:t>
+              <a:t>27/04/2022</a:t>
             </a:fld>
             <a:endParaRPr lang="pt-BR"/>
           </a:p>
@@ -2355,7 +2355,7 @@
           <a:p>
             <a:fld id="{2FC3D184-0F2B-4D9D-BDB9-3409F15C70D5}" type="datetimeFigureOut">
               <a:rPr lang="pt-BR" smtClean="0"/>
-              <a:t>26/04/2022</a:t>
+              <a:t>27/04/2022</a:t>
             </a:fld>
             <a:endParaRPr lang="pt-BR"/>
           </a:p>
@@ -2568,7 +2568,7 @@
           <a:p>
             <a:fld id="{2FC3D184-0F2B-4D9D-BDB9-3409F15C70D5}" type="datetimeFigureOut">
               <a:rPr lang="pt-BR" smtClean="0"/>
-              <a:t>26/04/2022</a:t>
+              <a:t>27/04/2022</a:t>
             </a:fld>
             <a:endParaRPr lang="pt-BR"/>
           </a:p>
@@ -3026,6 +3026,165 @@
       </p:sp>
       <p:sp>
         <p:nvSpPr>
+          <p:cNvPr id="39" name="back_input">
+            <a:extLst>
+              <a:ext uri="{FF2B5EF4-FFF2-40B4-BE49-F238E27FC236}">
+                <a16:creationId xmlns:a16="http://schemas.microsoft.com/office/drawing/2014/main" id="{D3EB8915-6A9D-4E34-A128-B1814E70F74D}"/>
+              </a:ext>
+            </a:extLst>
+          </p:cNvPr>
+          <p:cNvSpPr/>
+          <p:nvPr/>
+        </p:nvSpPr>
+        <p:spPr>
+          <a:xfrm rot="10800000">
+            <a:off x="-21097" y="503659"/>
+            <a:ext cx="4951249" cy="4918365"/>
+          </a:xfrm>
+          <a:prstGeom prst="teardrop">
+            <a:avLst/>
+          </a:prstGeom>
+          <a:solidFill>
+            <a:srgbClr val="FFD5D5"/>
+          </a:solidFill>
+          <a:ln>
+            <a:noFill/>
+          </a:ln>
+        </p:spPr>
+        <p:style>
+          <a:lnRef idx="2">
+            <a:schemeClr val="accent1">
+              <a:shade val="50000"/>
+            </a:schemeClr>
+          </a:lnRef>
+          <a:fillRef idx="1">
+            <a:schemeClr val="accent1"/>
+          </a:fillRef>
+          <a:effectRef idx="0">
+            <a:schemeClr val="accent1"/>
+          </a:effectRef>
+          <a:fontRef idx="minor">
+            <a:schemeClr val="lt1"/>
+          </a:fontRef>
+        </p:style>
+        <p:txBody>
+          <a:bodyPr rtlCol="0" anchor="ctr"/>
+          <a:lstStyle/>
+          <a:p>
+            <a:pPr algn="ctr"/>
+            <a:endParaRPr lang="pt-BR" dirty="0"/>
+          </a:p>
+        </p:txBody>
+      </p:sp>
+      <p:sp>
+        <p:nvSpPr>
+          <p:cNvPr id="99" name="back_output">
+            <a:extLst>
+              <a:ext uri="{FF2B5EF4-FFF2-40B4-BE49-F238E27FC236}">
+                <a16:creationId xmlns:a16="http://schemas.microsoft.com/office/drawing/2014/main" id="{9C7E1CAB-2B46-48FF-98DC-A2EE2315C5DD}"/>
+              </a:ext>
+            </a:extLst>
+          </p:cNvPr>
+          <p:cNvSpPr/>
+          <p:nvPr/>
+        </p:nvSpPr>
+        <p:spPr>
+          <a:xfrm rot="16200000">
+            <a:off x="5553874" y="1121010"/>
+            <a:ext cx="4951249" cy="4918365"/>
+          </a:xfrm>
+          <a:prstGeom prst="teardrop">
+            <a:avLst/>
+          </a:prstGeom>
+          <a:solidFill>
+            <a:schemeClr val="accent6">
+              <a:lumMod val="20000"/>
+              <a:lumOff val="80000"/>
+            </a:schemeClr>
+          </a:solidFill>
+          <a:ln>
+            <a:noFill/>
+          </a:ln>
+        </p:spPr>
+        <p:style>
+          <a:lnRef idx="2">
+            <a:schemeClr val="accent1">
+              <a:shade val="50000"/>
+            </a:schemeClr>
+          </a:lnRef>
+          <a:fillRef idx="1">
+            <a:schemeClr val="accent1"/>
+          </a:fillRef>
+          <a:effectRef idx="0">
+            <a:schemeClr val="accent1"/>
+          </a:effectRef>
+          <a:fontRef idx="minor">
+            <a:schemeClr val="lt1"/>
+          </a:fontRef>
+        </p:style>
+        <p:txBody>
+          <a:bodyPr rtlCol="0" anchor="ctr"/>
+          <a:lstStyle/>
+          <a:p>
+            <a:pPr algn="ctr"/>
+            <a:endParaRPr lang="pt-BR" dirty="0"/>
+          </a:p>
+        </p:txBody>
+      </p:sp>
+      <p:sp>
+        <p:nvSpPr>
+          <p:cNvPr id="38" name="back_nuvem">
+            <a:extLst>
+              <a:ext uri="{FF2B5EF4-FFF2-40B4-BE49-F238E27FC236}">
+                <a16:creationId xmlns:a16="http://schemas.microsoft.com/office/drawing/2014/main" id="{C7DE47C0-0FCF-4BEA-99D3-193133109E90}"/>
+              </a:ext>
+            </a:extLst>
+          </p:cNvPr>
+          <p:cNvSpPr/>
+          <p:nvPr/>
+        </p:nvSpPr>
+        <p:spPr>
+          <a:xfrm rot="16713691">
+            <a:off x="2094340" y="-1324615"/>
+            <a:ext cx="5278504" cy="5325503"/>
+          </a:xfrm>
+          <a:prstGeom prst="cloud">
+            <a:avLst/>
+          </a:prstGeom>
+          <a:solidFill>
+            <a:srgbClr val="EBF7FF"/>
+          </a:solidFill>
+          <a:ln>
+            <a:noFill/>
+          </a:ln>
+        </p:spPr>
+        <p:style>
+          <a:lnRef idx="2">
+            <a:schemeClr val="accent1">
+              <a:shade val="50000"/>
+            </a:schemeClr>
+          </a:lnRef>
+          <a:fillRef idx="1">
+            <a:schemeClr val="accent1"/>
+          </a:fillRef>
+          <a:effectRef idx="0">
+            <a:schemeClr val="accent1"/>
+          </a:effectRef>
+          <a:fontRef idx="minor">
+            <a:schemeClr val="lt1"/>
+          </a:fontRef>
+        </p:style>
+        <p:txBody>
+          <a:bodyPr rtlCol="0" anchor="ctr"/>
+          <a:lstStyle/>
+          <a:p>
+            <a:pPr algn="ctr"/>
+            <a:endParaRPr lang="pt-BR" dirty="0"/>
+          </a:p>
+        </p:txBody>
+      </p:sp>
+      <p:sp>
+        <p:nvSpPr>
           <p:cNvPr id="658" name="nuvem">
             <a:extLst>
               <a:ext uri="{FF2B5EF4-FFF2-40B4-BE49-F238E27FC236}">
@@ -3179,7 +3338,7 @@
         </p:nvGrpSpPr>
         <p:grpSpPr>
           <a:xfrm>
-            <a:off x="300842" y="330144"/>
+            <a:off x="300842" y="287614"/>
             <a:ext cx="8999516" cy="4919719"/>
             <a:chOff x="300842" y="330144"/>
             <a:chExt cx="8999516" cy="4919719"/>
@@ -3450,7 +3609,7 @@
           </p:nvSpPr>
           <p:spPr>
             <a:xfrm>
-              <a:off x="4118977" y="3600783"/>
+              <a:off x="4143091" y="3467168"/>
               <a:ext cx="1315017" cy="311111"/>
             </a:xfrm>
             <a:prstGeom prst="rect">
@@ -3717,6 +3876,54 @@
                   <a:latin typeface="Quicksand" panose="00000500000000000000" pitchFamily="2" charset="0"/>
                 </a:rPr>
                 <a:t>(Uno R3)</a:t>
+              </a:r>
+            </a:p>
+          </p:txBody>
+        </p:sp>
+        <p:sp>
+          <p:nvSpPr>
+            <p:cNvPr id="91" name="info-text8.5">
+              <a:extLst>
+                <a:ext uri="{FF2B5EF4-FFF2-40B4-BE49-F238E27FC236}">
+                  <a16:creationId xmlns:a16="http://schemas.microsoft.com/office/drawing/2014/main" id="{E5F682A3-BAEE-40E0-B957-89EF31DF5D32}"/>
+                </a:ext>
+              </a:extLst>
+            </p:cNvPr>
+            <p:cNvSpPr txBox="1">
+              <a:spLocks noGrp="1" noRot="1" noMove="1" noResize="1" noEditPoints="1" noAdjustHandles="1" noChangeArrowheads="1" noChangeShapeType="1"/>
+            </p:cNvSpPr>
+            <p:nvPr/>
+          </p:nvSpPr>
+          <p:spPr>
+            <a:xfrm>
+              <a:off x="1093414" y="4077069"/>
+              <a:ext cx="360001" cy="201722"/>
+            </a:xfrm>
+            <a:prstGeom prst="rect">
+              <a:avLst/>
+            </a:prstGeom>
+            <a:noFill/>
+            <a:ln w="19050">
+              <a:solidFill>
+                <a:srgbClr val="7030A0"/>
+              </a:solidFill>
+            </a:ln>
+          </p:spPr>
+          <p:txBody>
+            <a:bodyPr wrap="square" rtlCol="0">
+              <a:spAutoFit/>
+            </a:bodyPr>
+            <a:lstStyle/>
+            <a:p>
+              <a:pPr algn="ctr"/>
+              <a:r>
+                <a:rPr lang="pt-BR" sz="711" b="1" dirty="0">
+                  <a:solidFill>
+                    <a:srgbClr val="7030A0"/>
+                  </a:solidFill>
+                  <a:latin typeface="Quicksand" panose="00000500000000000000" pitchFamily="2" charset="0"/>
+                </a:rPr>
+                <a:t>USB</a:t>
               </a:r>
             </a:p>
           </p:txBody>
@@ -3965,7 +4172,7 @@
           </p:nvSpPr>
           <p:spPr>
             <a:xfrm>
-              <a:off x="950613" y="2937784"/>
+              <a:off x="938996" y="3254965"/>
               <a:ext cx="1379958" cy="529889"/>
             </a:xfrm>
             <a:prstGeom prst="rect">
@@ -4056,16 +4263,16 @@
             </a:extLst>
           </p:cNvPr>
           <p:cNvGrpSpPr>
-            <a:grpSpLocks/>
+            <a:grpSpLocks noGrp="1" noUngrp="1" noRot="1" noMove="1" noResize="1"/>
           </p:cNvGrpSpPr>
           <p:nvPr/>
         </p:nvGrpSpPr>
         <p:grpSpPr>
           <a:xfrm>
-            <a:off x="456179" y="5248"/>
-            <a:ext cx="8853568" cy="5226296"/>
+            <a:off x="453252" y="-21352"/>
+            <a:ext cx="8853568" cy="5231018"/>
             <a:chOff x="456179" y="26513"/>
-            <a:chExt cx="8853568" cy="5226296"/>
+            <a:chExt cx="8853568" cy="5231018"/>
           </a:xfrm>
         </p:grpSpPr>
         <p:pic>
@@ -4078,7 +4285,7 @@
               </a:extLst>
             </p:cNvPr>
             <p:cNvPicPr>
-              <a:picLocks noChangeAspect="1"/>
+              <a:picLocks noGrp="1" noRot="1" noChangeAspect="1" noMove="1" noResize="1" noEditPoints="1" noAdjustHandles="1" noChangeArrowheads="1" noChangeShapeType="1" noCrop="1"/>
             </p:cNvPicPr>
             <p:nvPr/>
           </p:nvPicPr>
@@ -4114,7 +4321,7 @@
               </a:extLst>
             </p:cNvPr>
             <p:cNvPicPr>
-              <a:picLocks noChangeAspect="1"/>
+              <a:picLocks noGrp="1" noRot="1" noChangeAspect="1" noMove="1" noResize="1" noEditPoints="1" noAdjustHandles="1" noChangeArrowheads="1" noChangeShapeType="1" noCrop="1"/>
             </p:cNvPicPr>
             <p:nvPr/>
           </p:nvPicPr>
@@ -4152,7 +4359,7 @@
               </a:extLst>
             </p:cNvPr>
             <p:cNvPicPr>
-              <a:picLocks noChangeAspect="1"/>
+              <a:picLocks noGrp="1" noRot="1" noChangeAspect="1" noMove="1" noResize="1" noEditPoints="1" noAdjustHandles="1" noChangeArrowheads="1" noChangeShapeType="1" noCrop="1"/>
             </p:cNvPicPr>
             <p:nvPr/>
           </p:nvPicPr>
@@ -4188,7 +4395,7 @@
               </a:extLst>
             </p:cNvPr>
             <p:cNvPicPr>
-              <a:picLocks noChangeAspect="1"/>
+              <a:picLocks noGrp="1" noRot="1" noChangeAspect="1" noMove="1" noResize="1" noEditPoints="1" noAdjustHandles="1" noChangeArrowheads="1" noChangeShapeType="1" noCrop="1"/>
             </p:cNvPicPr>
             <p:nvPr/>
           </p:nvPicPr>
@@ -4224,7 +4431,7 @@
               </a:extLst>
             </p:cNvPr>
             <p:cNvPicPr>
-              <a:picLocks noChangeAspect="1"/>
+              <a:picLocks noGrp="1" noRot="1" noChangeAspect="1" noMove="1" noResize="1" noEditPoints="1" noAdjustHandles="1" noChangeArrowheads="1" noChangeShapeType="1" noCrop="1"/>
             </p:cNvPicPr>
             <p:nvPr/>
           </p:nvPicPr>
@@ -4260,7 +4467,7 @@
               </a:extLst>
             </p:cNvPr>
             <p:cNvPicPr>
-              <a:picLocks noChangeAspect="1"/>
+              <a:picLocks noGrp="1" noRot="1" noChangeAspect="1" noMove="1" noResize="1" noEditPoints="1" noAdjustHandles="1" noChangeArrowheads="1" noChangeShapeType="1" noCrop="1"/>
             </p:cNvPicPr>
             <p:nvPr/>
           </p:nvPicPr>
@@ -4296,7 +4503,7 @@
               </a:extLst>
             </p:cNvPr>
             <p:cNvPicPr>
-              <a:picLocks noChangeAspect="1"/>
+              <a:picLocks noGrp="1" noRot="1" noChangeAspect="1" noMove="1" noResize="1" noEditPoints="1" noAdjustHandles="1" noChangeArrowheads="1" noChangeShapeType="1" noCrop="1"/>
             </p:cNvPicPr>
             <p:nvPr/>
           </p:nvPicPr>
@@ -4332,7 +4539,7 @@
               </a:extLst>
             </p:cNvPr>
             <p:cNvPicPr>
-              <a:picLocks noChangeAspect="1"/>
+              <a:picLocks noGrp="1" noRot="1" noChangeAspect="1" noMove="1" noResize="1" noEditPoints="1" noAdjustHandles="1" noChangeArrowheads="1" noChangeShapeType="1" noCrop="1"/>
             </p:cNvPicPr>
             <p:nvPr/>
           </p:nvPicPr>
@@ -4368,7 +4575,7 @@
               </a:extLst>
             </p:cNvPr>
             <p:cNvPicPr>
-              <a:picLocks noChangeAspect="1"/>
+              <a:picLocks noGrp="1" noRot="1" noChangeAspect="1" noMove="1" noResize="1" noEditPoints="1" noAdjustHandles="1" noChangeArrowheads="1" noChangeShapeType="1" noCrop="1"/>
             </p:cNvPicPr>
             <p:nvPr/>
           </p:nvPicPr>
@@ -4404,7 +4611,7 @@
               </a:extLst>
             </p:cNvPr>
             <p:cNvPicPr>
-              <a:picLocks noChangeAspect="1"/>
+              <a:picLocks noGrp="1" noRot="1" noChangeAspect="1" noMove="1" noResize="1" noEditPoints="1" noAdjustHandles="1" noChangeArrowheads="1" noChangeShapeType="1" noCrop="1"/>
             </p:cNvPicPr>
             <p:nvPr/>
           </p:nvPicPr>
@@ -4440,7 +4647,7 @@
               </a:extLst>
             </p:cNvPr>
             <p:cNvPicPr>
-              <a:picLocks noChangeAspect="1"/>
+              <a:picLocks noGrp="1" noRot="1" noChangeAspect="1" noMove="1" noResize="1" noEditPoints="1" noAdjustHandles="1" noChangeArrowheads="1" noChangeShapeType="1" noCrop="1"/>
             </p:cNvPicPr>
             <p:nvPr/>
           </p:nvPicPr>
@@ -4475,7 +4682,7 @@
               </a:extLst>
             </p:cNvPr>
             <p:cNvPicPr>
-              <a:picLocks noChangeAspect="1"/>
+              <a:picLocks noGrp="1" noRot="1" noChangeAspect="1" noMove="1" noResize="1" noEditPoints="1" noAdjustHandles="1" noChangeArrowheads="1" noChangeShapeType="1" noCrop="1"/>
             </p:cNvPicPr>
             <p:nvPr/>
           </p:nvPicPr>
@@ -4510,7 +4717,7 @@
               </a:extLst>
             </p:cNvPr>
             <p:cNvPicPr>
-              <a:picLocks noChangeAspect="1"/>
+              <a:picLocks noGrp="1" noRot="1" noChangeAspect="1" noMove="1" noResize="1" noEditPoints="1" noAdjustHandles="1" noChangeArrowheads="1" noChangeShapeType="1" noCrop="1"/>
             </p:cNvPicPr>
             <p:nvPr/>
           </p:nvPicPr>
@@ -4546,7 +4753,7 @@
               </a:extLst>
             </p:cNvPr>
             <p:cNvPicPr>
-              <a:picLocks noChangeAspect="1"/>
+              <a:picLocks noGrp="1" noRot="1" noChangeAspect="1" noMove="1" noResize="1" noEditPoints="1" noAdjustHandles="1" noChangeArrowheads="1" noChangeShapeType="1" noCrop="1"/>
             </p:cNvPicPr>
             <p:nvPr/>
           </p:nvPicPr>
@@ -4582,7 +4789,7 @@
               </a:extLst>
             </p:cNvPr>
             <p:cNvPicPr>
-              <a:picLocks noChangeAspect="1"/>
+              <a:picLocks noGrp="1" noRot="1" noChangeAspect="1" noMove="1" noResize="1" noEditPoints="1" noAdjustHandles="1" noChangeArrowheads="1" noChangeShapeType="1" noCrop="1"/>
             </p:cNvPicPr>
             <p:nvPr/>
           </p:nvPicPr>
@@ -4618,7 +4825,7 @@
               </a:extLst>
             </p:cNvPr>
             <p:cNvPicPr>
-              <a:picLocks noChangeAspect="1"/>
+              <a:picLocks noGrp="1" noRot="1" noChangeAspect="1" noMove="1" noResize="1" noEditPoints="1" noAdjustHandles="1" noChangeArrowheads="1" noChangeShapeType="1" noCrop="1"/>
             </p:cNvPicPr>
             <p:nvPr/>
           </p:nvPicPr>
@@ -4654,7 +4861,7 @@
               </a:extLst>
             </p:cNvPr>
             <p:cNvPicPr>
-              <a:picLocks noChangeAspect="1"/>
+              <a:picLocks noGrp="1" noRot="1" noChangeAspect="1" noMove="1" noResize="1" noEditPoints="1" noAdjustHandles="1" noChangeArrowheads="1" noChangeShapeType="1" noCrop="1"/>
             </p:cNvPicPr>
             <p:nvPr/>
           </p:nvPicPr>
@@ -4682,20 +4889,90 @@
         </p:pic>
         <p:pic>
           <p:nvPicPr>
-            <p:cNvPr id="124" name="arduino" descr="Esquemático, Ícone, Código QR&#10;&#10;Descrição gerada automaticamente">
+            <p:cNvPr id="93" name="IDE">
               <a:extLst>
                 <a:ext uri="{FF2B5EF4-FFF2-40B4-BE49-F238E27FC236}">
-                  <a16:creationId xmlns:a16="http://schemas.microsoft.com/office/drawing/2014/main" id="{56DB52C5-5EDE-492F-A762-45C863D66EA0}"/>
+                  <a16:creationId xmlns:a16="http://schemas.microsoft.com/office/drawing/2014/main" id="{A3203F2A-AB6B-4D9C-BD96-5F4F60797641}"/>
                 </a:ext>
               </a:extLst>
             </p:cNvPr>
             <p:cNvPicPr>
-              <a:picLocks noChangeAspect="1"/>
+              <a:picLocks noGrp="1" noRot="1" noChangeAspect="1" noMove="1" noResize="1" noEditPoints="1" noAdjustHandles="1" noChangeArrowheads="1" noChangeShapeType="1" noCrop="1"/>
+            </p:cNvPicPr>
+            <p:nvPr/>
+          </p:nvPicPr>
+          <p:blipFill>
+            <a:blip r:embed="rId5">
+              <a:extLst>
+                <a:ext uri="{28A0092B-C50C-407E-A947-70E740481C1C}">
+                  <a14:useLocalDpi xmlns:a14="http://schemas.microsoft.com/office/drawing/2010/main" val="0"/>
+                </a:ext>
+              </a:extLst>
+            </a:blip>
+            <a:srcRect/>
+            <a:stretch/>
+          </p:blipFill>
+          <p:spPr>
+            <a:xfrm>
+              <a:off x="1473854" y="4914589"/>
+              <a:ext cx="316096" cy="316096"/>
+            </a:xfrm>
+            <a:prstGeom prst="rect">
+              <a:avLst/>
+            </a:prstGeom>
+          </p:spPr>
+        </p:pic>
+        <p:pic>
+          <p:nvPicPr>
+            <p:cNvPr id="95" name="node">
+              <a:extLst>
+                <a:ext uri="{FF2B5EF4-FFF2-40B4-BE49-F238E27FC236}">
+                  <a16:creationId xmlns:a16="http://schemas.microsoft.com/office/drawing/2014/main" id="{DB38A6B7-43D8-4B66-B249-AC289681E800}"/>
+                </a:ext>
+              </a:extLst>
+            </p:cNvPr>
+            <p:cNvPicPr>
+              <a:picLocks noGrp="1" noRot="1" noChangeAspect="1" noMove="1" noResize="1" noEditPoints="1" noAdjustHandles="1" noChangeArrowheads="1" noChangeShapeType="1" noCrop="1"/>
             </p:cNvPicPr>
             <p:nvPr/>
           </p:nvPicPr>
           <p:blipFill>
             <a:blip r:embed="rId19">
+              <a:extLst>
+                <a:ext uri="{28A0092B-C50C-407E-A947-70E740481C1C}">
+                  <a14:useLocalDpi xmlns:a14="http://schemas.microsoft.com/office/drawing/2010/main" val="0"/>
+                </a:ext>
+              </a:extLst>
+            </a:blip>
+            <a:srcRect/>
+            <a:stretch/>
+          </p:blipFill>
+          <p:spPr>
+            <a:xfrm>
+              <a:off x="1798151" y="4897531"/>
+              <a:ext cx="529048" cy="360000"/>
+            </a:xfrm>
+            <a:prstGeom prst="rect">
+              <a:avLst/>
+            </a:prstGeom>
+          </p:spPr>
+        </p:pic>
+        <p:pic>
+          <p:nvPicPr>
+            <p:cNvPr id="124" name="arduino" descr="Esquemático, Ícone, Código QR&#10;&#10;Descrição gerada automaticamente">
+              <a:extLst>
+                <a:ext uri="{FF2B5EF4-FFF2-40B4-BE49-F238E27FC236}">
+                  <a16:creationId xmlns:a16="http://schemas.microsoft.com/office/drawing/2014/main" id="{56DB52C5-5EDE-492F-A762-45C863D66EA0}"/>
+                </a:ext>
+              </a:extLst>
+            </p:cNvPr>
+            <p:cNvPicPr>
+              <a:picLocks noGrp="1" noRot="1" noChangeAspect="1" noMove="1" noResize="1" noEditPoints="1" noAdjustHandles="1" noChangeArrowheads="1" noChangeShapeType="1" noCrop="1"/>
+            </p:cNvPicPr>
+            <p:nvPr/>
+          </p:nvPicPr>
+          <p:blipFill>
+            <a:blip r:embed="rId20">
               <a:extLst>
                 <a:ext uri="{28A0092B-C50C-407E-A947-70E740481C1C}">
                   <a14:useLocalDpi xmlns:a14="http://schemas.microsoft.com/office/drawing/2010/main" val="0"/>
@@ -4718,20 +4995,55 @@
         </p:pic>
         <p:pic>
           <p:nvPicPr>
-            <p:cNvPr id="136" name="unidade" descr="Desenho de bandeira&#10;&#10;Descrição gerada automaticamente com confiança média">
+            <p:cNvPr id="90" name="usb">
               <a:extLst>
                 <a:ext uri="{FF2B5EF4-FFF2-40B4-BE49-F238E27FC236}">
-                  <a16:creationId xmlns:a16="http://schemas.microsoft.com/office/drawing/2014/main" id="{8D74D369-A42F-4A69-A02D-77D97BA5AA15}"/>
+                  <a16:creationId xmlns:a16="http://schemas.microsoft.com/office/drawing/2014/main" id="{82E43E5F-DB7E-4321-9887-92AC99A24B0A}"/>
                 </a:ext>
               </a:extLst>
             </p:cNvPr>
             <p:cNvPicPr>
-              <a:picLocks noChangeAspect="1"/>
+              <a:picLocks noGrp="1" noRot="1" noChangeAspect="1" noMove="1" noResize="1" noEditPoints="1" noAdjustHandles="1" noChangeArrowheads="1" noChangeShapeType="1" noCrop="1"/>
             </p:cNvPicPr>
             <p:nvPr/>
           </p:nvPicPr>
           <p:blipFill>
-            <a:blip r:embed="rId20">
+            <a:blip r:embed="rId21">
+              <a:extLst>
+                <a:ext uri="{28A0092B-C50C-407E-A947-70E740481C1C}">
+                  <a14:useLocalDpi xmlns:a14="http://schemas.microsoft.com/office/drawing/2010/main" val="0"/>
+                </a:ext>
+              </a:extLst>
+            </a:blip>
+            <a:srcRect/>
+            <a:stretch/>
+          </p:blipFill>
+          <p:spPr>
+            <a:xfrm rot="16200000">
+              <a:off x="1079412" y="3846814"/>
+              <a:ext cx="360000" cy="360000"/>
+            </a:xfrm>
+            <a:prstGeom prst="rect">
+              <a:avLst/>
+            </a:prstGeom>
+          </p:spPr>
+        </p:pic>
+        <p:pic>
+          <p:nvPicPr>
+            <p:cNvPr id="136" name="unidade" descr="Desenho de bandeira&#10;&#10;Descrição gerada automaticamente com confiança média">
+              <a:extLst>
+                <a:ext uri="{FF2B5EF4-FFF2-40B4-BE49-F238E27FC236}">
+                  <a16:creationId xmlns:a16="http://schemas.microsoft.com/office/drawing/2014/main" id="{8D74D369-A42F-4A69-A02D-77D97BA5AA15}"/>
+                </a:ext>
+              </a:extLst>
+            </p:cNvPr>
+            <p:cNvPicPr>
+              <a:picLocks noGrp="1" noRot="1" noChangeAspect="1" noMove="1" noResize="1" noEditPoints="1" noAdjustHandles="1" noChangeArrowheads="1" noChangeShapeType="1" noCrop="1"/>
+            </p:cNvPicPr>
+            <p:nvPr/>
+          </p:nvPicPr>
+          <p:blipFill>
+            <a:blip r:embed="rId22">
               <a:extLst>
                 <a:ext uri="{28A0092B-C50C-407E-A947-70E740481C1C}">
                   <a14:useLocalDpi xmlns:a14="http://schemas.microsoft.com/office/drawing/2010/main" val="0"/>
@@ -4762,7 +5074,7 @@
               </a:extLst>
             </p:cNvPr>
             <p:cNvPicPr>
-              <a:picLocks noChangeAspect="1"/>
+              <a:picLocks noGrp="1" noRot="1" noChangeAspect="1" noMove="1" noResize="1" noEditPoints="1" noAdjustHandles="1" noChangeArrowheads="1" noChangeShapeType="1" noCrop="1"/>
             </p:cNvPicPr>
             <p:nvPr/>
           </p:nvPicPr>
@@ -4780,7 +5092,7 @@
           </p:blipFill>
           <p:spPr>
             <a:xfrm>
-              <a:off x="631693" y="3838087"/>
+              <a:off x="624316" y="2675169"/>
               <a:ext cx="288000" cy="288000"/>
             </a:xfrm>
             <a:prstGeom prst="rect">
@@ -4798,12 +5110,12 @@
               </a:extLst>
             </p:cNvPr>
             <p:cNvPicPr>
-              <a:picLocks noChangeAspect="1"/>
+              <a:picLocks noGrp="1" noRot="1" noChangeAspect="1" noMove="1" noResize="1" noEditPoints="1" noAdjustHandles="1" noChangeArrowheads="1" noChangeShapeType="1" noCrop="1"/>
             </p:cNvPicPr>
             <p:nvPr/>
           </p:nvPicPr>
           <p:blipFill>
-            <a:blip r:embed="rId21">
+            <a:blip r:embed="rId23">
               <a:extLst>
                 <a:ext uri="{28A0092B-C50C-407E-A947-70E740481C1C}">
                   <a14:useLocalDpi xmlns:a14="http://schemas.microsoft.com/office/drawing/2010/main" val="0"/>
@@ -4816,7 +5128,7 @@
           </p:blipFill>
           <p:spPr>
             <a:xfrm>
-              <a:off x="562305" y="3057354"/>
+              <a:off x="562144" y="3377720"/>
               <a:ext cx="426777" cy="426777"/>
             </a:xfrm>
             <a:prstGeom prst="rect">
@@ -4834,7 +5146,7 @@
               </a:extLst>
             </p:cNvPr>
             <p:cNvPicPr>
-              <a:picLocks noChangeAspect="1"/>
+              <a:picLocks noGrp="1" noRot="1" noChangeAspect="1" noMove="1" noResize="1" noEditPoints="1" noAdjustHandles="1" noChangeArrowheads="1" noChangeShapeType="1" noCrop="1"/>
             </p:cNvPicPr>
             <p:nvPr/>
           </p:nvPicPr>
@@ -4870,7 +5182,7 @@
               </a:extLst>
             </p:cNvPr>
             <p:cNvPicPr>
-              <a:picLocks noChangeAspect="1"/>
+              <a:picLocks noGrp="1" noRot="1" noChangeAspect="1" noMove="1" noResize="1" noEditPoints="1" noAdjustHandles="1" noChangeArrowheads="1" noChangeShapeType="1" noCrop="1"/>
             </p:cNvPicPr>
             <p:nvPr/>
           </p:nvPicPr>
@@ -4907,16 +5219,16 @@
             </a:extLst>
           </p:cNvPr>
           <p:cNvGrpSpPr>
-            <a:grpSpLocks/>
+            <a:grpSpLocks noGrp="1" noUngrp="1" noRot="1" noMove="1" noResize="1"/>
           </p:cNvGrpSpPr>
           <p:nvPr/>
         </p:nvGrpSpPr>
         <p:grpSpPr>
           <a:xfrm>
-            <a:off x="775693" y="165289"/>
-            <a:ext cx="8390055" cy="4585159"/>
-            <a:chOff x="775693" y="165291"/>
-            <a:chExt cx="8390055" cy="4585159"/>
+            <a:off x="559216" y="138689"/>
+            <a:ext cx="8603605" cy="4563895"/>
+            <a:chOff x="559216" y="159956"/>
+            <a:chExt cx="8603605" cy="4563895"/>
           </a:xfrm>
         </p:grpSpPr>
         <p:cxnSp>
@@ -4929,7 +5241,7 @@
               </a:extLst>
             </p:cNvPr>
             <p:cNvCxnSpPr>
-              <a:cxnSpLocks/>
+              <a:cxnSpLocks noGrp="1" noRot="1" noMove="1" noResize="1" noEditPoints="1" noAdjustHandles="1" noChangeArrowheads="1" noChangeShapeType="1"/>
               <a:stCxn id="92" idx="0"/>
               <a:endCxn id="96" idx="2"/>
             </p:cNvCxnSpPr>
@@ -4937,7 +5249,7 @@
           </p:nvCxnSpPr>
           <p:spPr>
             <a:xfrm rot="16200000" flipV="1">
-              <a:off x="4539882" y="2229218"/>
+              <a:off x="4536955" y="2223883"/>
               <a:ext cx="508508" cy="2"/>
             </a:xfrm>
             <a:prstGeom prst="bentConnector3">
@@ -4975,7 +5287,7 @@
               </a:extLst>
             </p:cNvPr>
             <p:cNvCxnSpPr>
-              <a:cxnSpLocks/>
+              <a:cxnSpLocks noGrp="1" noRot="1" noMove="1" noResize="1" noEditPoints="1" noAdjustHandles="1" noChangeArrowheads="1" noChangeShapeType="1"/>
               <a:stCxn id="100" idx="3"/>
               <a:endCxn id="96" idx="0"/>
             </p:cNvCxnSpPr>
@@ -4983,7 +5295,7 @@
           </p:nvCxnSpPr>
           <p:spPr>
             <a:xfrm>
-              <a:off x="4285751" y="628484"/>
+              <a:off x="4282824" y="623149"/>
               <a:ext cx="508384" cy="706316"/>
             </a:xfrm>
             <a:prstGeom prst="line">
@@ -5021,7 +5333,7 @@
               </a:extLst>
             </p:cNvPr>
             <p:cNvCxnSpPr>
-              <a:cxnSpLocks/>
+              <a:cxnSpLocks noGrp="1" noRot="1" noMove="1" noResize="1" noEditPoints="1" noAdjustHandles="1" noChangeArrowheads="1" noChangeShapeType="1"/>
               <a:stCxn id="104" idx="1"/>
               <a:endCxn id="96" idx="0"/>
             </p:cNvCxnSpPr>
@@ -5029,7 +5341,7 @@
           </p:nvCxnSpPr>
           <p:spPr>
             <a:xfrm flipH="1">
-              <a:off x="4794135" y="625378"/>
+              <a:off x="4791208" y="620043"/>
               <a:ext cx="426470" cy="709422"/>
             </a:xfrm>
             <a:prstGeom prst="line">
@@ -5067,7 +5379,7 @@
               </a:extLst>
             </p:cNvPr>
             <p:cNvCxnSpPr>
-              <a:cxnSpLocks/>
+              <a:cxnSpLocks noGrp="1" noRot="1" noMove="1" noResize="1" noEditPoints="1" noAdjustHandles="1" noChangeArrowheads="1" noChangeShapeType="1"/>
               <a:stCxn id="100" idx="3"/>
               <a:endCxn id="104" idx="1"/>
             </p:cNvCxnSpPr>
@@ -5075,7 +5387,7 @@
           </p:nvCxnSpPr>
           <p:spPr>
             <a:xfrm flipV="1">
-              <a:off x="4285751" y="625378"/>
+              <a:off x="4282824" y="620043"/>
               <a:ext cx="934854" cy="3106"/>
             </a:xfrm>
             <a:prstGeom prst="line">
@@ -5113,7 +5425,7 @@
               </a:extLst>
             </p:cNvPr>
             <p:cNvCxnSpPr>
-              <a:cxnSpLocks/>
+              <a:cxnSpLocks noGrp="1" noRot="1" noMove="1" noResize="1" noEditPoints="1" noAdjustHandles="1" noChangeArrowheads="1" noChangeShapeType="1"/>
               <a:stCxn id="112" idx="3"/>
               <a:endCxn id="100" idx="1"/>
             </p:cNvCxnSpPr>
@@ -5121,7 +5433,7 @@
           </p:nvCxnSpPr>
           <p:spPr>
             <a:xfrm>
-              <a:off x="3381735" y="165291"/>
+              <a:off x="3378808" y="159956"/>
               <a:ext cx="477239" cy="463193"/>
             </a:xfrm>
             <a:prstGeom prst="line">
@@ -5159,7 +5471,7 @@
               </a:extLst>
             </p:cNvPr>
             <p:cNvCxnSpPr>
-              <a:cxnSpLocks/>
+              <a:cxnSpLocks noGrp="1" noRot="1" noMove="1" noResize="1" noEditPoints="1" noAdjustHandles="1" noChangeArrowheads="1" noChangeShapeType="1"/>
               <a:stCxn id="108" idx="3"/>
               <a:endCxn id="100" idx="1"/>
             </p:cNvCxnSpPr>
@@ -5167,7 +5479,7 @@
           </p:nvCxnSpPr>
           <p:spPr>
             <a:xfrm flipV="1">
-              <a:off x="3381966" y="628484"/>
+              <a:off x="3379039" y="623149"/>
               <a:ext cx="477008" cy="64"/>
             </a:xfrm>
             <a:prstGeom prst="line">
@@ -5205,7 +5517,7 @@
               </a:extLst>
             </p:cNvPr>
             <p:cNvCxnSpPr>
-              <a:cxnSpLocks/>
+              <a:cxnSpLocks noGrp="1" noRot="1" noMove="1" noResize="1" noEditPoints="1" noAdjustHandles="1" noChangeArrowheads="1" noChangeShapeType="1"/>
               <a:stCxn id="116" idx="3"/>
               <a:endCxn id="100" idx="1"/>
             </p:cNvCxnSpPr>
@@ -5213,7 +5525,7 @@
           </p:nvCxnSpPr>
           <p:spPr>
             <a:xfrm flipV="1">
-              <a:off x="3374800" y="628484"/>
+              <a:off x="3371873" y="623149"/>
               <a:ext cx="484174" cy="483067"/>
             </a:xfrm>
             <a:prstGeom prst="line">
@@ -5251,7 +5563,7 @@
               </a:extLst>
             </p:cNvPr>
             <p:cNvCxnSpPr>
-              <a:cxnSpLocks/>
+              <a:cxnSpLocks noGrp="1" noRot="1" noMove="1" noResize="1" noEditPoints="1" noAdjustHandles="1" noChangeArrowheads="1" noChangeShapeType="1"/>
               <a:stCxn id="98" idx="3"/>
               <a:endCxn id="92" idx="1"/>
             </p:cNvCxnSpPr>
@@ -5259,7 +5571,7 @@
           </p:nvCxnSpPr>
           <p:spPr>
             <a:xfrm>
-              <a:off x="2766965" y="2550844"/>
+              <a:off x="2764038" y="2545509"/>
               <a:ext cx="1493701" cy="466100"/>
             </a:xfrm>
             <a:prstGeom prst="bentConnector3">
@@ -5297,7 +5609,7 @@
               </a:extLst>
             </p:cNvPr>
             <p:cNvCxnSpPr>
-              <a:cxnSpLocks/>
+              <a:cxnSpLocks noGrp="1" noRot="1" noMove="1" noResize="1" noEditPoints="1" noAdjustHandles="1" noChangeArrowheads="1" noChangeShapeType="1"/>
               <a:stCxn id="97" idx="3"/>
               <a:endCxn id="98" idx="1"/>
             </p:cNvCxnSpPr>
@@ -5305,7 +5617,7 @@
           </p:nvCxnSpPr>
           <p:spPr>
             <a:xfrm>
-              <a:off x="989083" y="2135036"/>
+              <a:off x="986156" y="2129701"/>
               <a:ext cx="1352851" cy="415808"/>
             </a:xfrm>
             <a:prstGeom prst="bentConnector3">
@@ -5343,16 +5655,16 @@
               </a:extLst>
             </p:cNvPr>
             <p:cNvCxnSpPr>
-              <a:cxnSpLocks/>
-              <a:stCxn id="230" idx="0"/>
+              <a:cxnSpLocks noGrp="1" noRot="1" noMove="1" noResize="1" noEditPoints="1" noAdjustHandles="1" noChangeArrowheads="1" noChangeShapeType="1"/>
+              <a:stCxn id="361" idx="0"/>
               <a:endCxn id="97" idx="2"/>
             </p:cNvCxnSpPr>
             <p:nvPr/>
           </p:nvCxnSpPr>
           <p:spPr>
             <a:xfrm rot="5400000" flipH="1" flipV="1">
-              <a:off x="431861" y="2692258"/>
-              <a:ext cx="687667" cy="1"/>
+              <a:off x="616337" y="2492141"/>
+              <a:ext cx="305482" cy="7379"/>
             </a:xfrm>
             <a:prstGeom prst="bentConnector3">
               <a:avLst/>
@@ -5389,14 +5701,16 @@
               </a:extLst>
             </p:cNvPr>
             <p:cNvCxnSpPr>
-              <a:cxnSpLocks/>
+              <a:cxnSpLocks noGrp="1" noRot="1" noMove="1" noResize="1" noEditPoints="1" noAdjustHandles="1" noChangeArrowheads="1" noChangeShapeType="1"/>
+              <a:stCxn id="230" idx="0"/>
+              <a:endCxn id="361" idx="2"/>
             </p:cNvCxnSpPr>
             <p:nvPr/>
           </p:nvCxnSpPr>
           <p:spPr>
-            <a:xfrm rot="5400000" flipH="1" flipV="1">
-              <a:off x="598716" y="3661109"/>
-              <a:ext cx="353956" cy="1"/>
+            <a:xfrm rot="16200000" flipV="1">
+              <a:off x="561723" y="3140238"/>
+              <a:ext cx="414551" cy="7217"/>
             </a:xfrm>
             <a:prstGeom prst="bentConnector3">
               <a:avLst/>
@@ -5433,17 +5747,22 @@
               </a:extLst>
             </p:cNvPr>
             <p:cNvCxnSpPr>
-              <a:cxnSpLocks/>
+              <a:cxnSpLocks noGrp="1" noRot="1" noMove="1" noResize="1" noEditPoints="1" noAdjustHandles="1" noChangeArrowheads="1" noChangeShapeType="1"/>
+              <a:stCxn id="230" idx="1"/>
+              <a:endCxn id="136" idx="0"/>
             </p:cNvCxnSpPr>
             <p:nvPr/>
           </p:nvCxnSpPr>
           <p:spPr>
-            <a:xfrm rot="16200000" flipH="1">
-              <a:off x="623840" y="4277943"/>
-              <a:ext cx="304279" cy="568"/>
+            <a:xfrm rot="10800000" flipH="1" flipV="1">
+              <a:off x="559216" y="3564510"/>
+              <a:ext cx="214117" cy="839257"/>
             </a:xfrm>
-            <a:prstGeom prst="bentConnector3">
-              <a:avLst/>
+            <a:prstGeom prst="bentConnector4">
+              <a:avLst>
+                <a:gd name="adj1" fmla="val -106764"/>
+                <a:gd name="adj2" fmla="val 62713"/>
+              </a:avLst>
             </a:prstGeom>
             <a:ln w="28575">
               <a:solidFill>
@@ -5477,13 +5796,15 @@
               </a:extLst>
             </p:cNvPr>
             <p:cNvCxnSpPr>
-              <a:cxnSpLocks/>
+              <a:cxnSpLocks noGrp="1" noRot="1" noMove="1" noResize="1" noEditPoints="1" noAdjustHandles="1" noChangeArrowheads="1" noChangeShapeType="1"/>
+              <a:stCxn id="136" idx="3"/>
+              <a:endCxn id="124" idx="1"/>
             </p:cNvCxnSpPr>
             <p:nvPr/>
           </p:nvCxnSpPr>
           <p:spPr>
             <a:xfrm flipV="1">
-              <a:off x="1096345" y="4401200"/>
+              <a:off x="1093416" y="4374601"/>
               <a:ext cx="599410" cy="349250"/>
             </a:xfrm>
             <a:prstGeom prst="bentConnector3">
@@ -5521,7 +5842,7 @@
               </a:extLst>
             </p:cNvPr>
             <p:cNvCxnSpPr>
-              <a:cxnSpLocks/>
+              <a:cxnSpLocks noGrp="1" noRot="1" noMove="1" noResize="1" noEditPoints="1" noAdjustHandles="1" noChangeArrowheads="1" noChangeShapeType="1"/>
             </p:cNvCxnSpPr>
             <p:nvPr/>
           </p:nvCxnSpPr>
@@ -5565,7 +5886,7 @@
               </a:extLst>
             </p:cNvPr>
             <p:cNvCxnSpPr>
-              <a:cxnSpLocks/>
+              <a:cxnSpLocks noGrp="1" noRot="1" noMove="1" noResize="1" noEditPoints="1" noAdjustHandles="1" noChangeArrowheads="1" noChangeShapeType="1"/>
             </p:cNvCxnSpPr>
             <p:nvPr/>
           </p:nvCxnSpPr>
@@ -5609,7 +5930,7 @@
               </a:extLst>
             </p:cNvPr>
             <p:cNvCxnSpPr>
-              <a:cxnSpLocks/>
+              <a:cxnSpLocks noGrp="1" noRot="1" noMove="1" noResize="1" noEditPoints="1" noAdjustHandles="1" noChangeArrowheads="1" noChangeShapeType="1"/>
               <a:stCxn id="103" idx="1"/>
               <a:endCxn id="92" idx="3"/>
             </p:cNvCxnSpPr>
@@ -5617,7 +5938,7 @@
           </p:nvCxnSpPr>
           <p:spPr>
             <a:xfrm rot="10800000" flipV="1">
-              <a:off x="5327607" y="2552852"/>
+              <a:off x="5324680" y="2547517"/>
               <a:ext cx="1499250" cy="464092"/>
             </a:xfrm>
             <a:prstGeom prst="bentConnector3">
@@ -5655,7 +5976,7 @@
               </a:extLst>
             </p:cNvPr>
             <p:cNvCxnSpPr>
-              <a:cxnSpLocks/>
+              <a:cxnSpLocks noGrp="1" noRot="1" noMove="1" noResize="1" noEditPoints="1" noAdjustHandles="1" noChangeArrowheads="1" noChangeShapeType="1"/>
               <a:stCxn id="137" idx="1"/>
               <a:endCxn id="103" idx="3"/>
             </p:cNvCxnSpPr>
@@ -5663,7 +5984,7 @@
           </p:nvCxnSpPr>
           <p:spPr>
             <a:xfrm rot="10800000" flipV="1">
-              <a:off x="7251889" y="2144618"/>
+              <a:off x="7248962" y="2139283"/>
               <a:ext cx="1360229" cy="408233"/>
             </a:xfrm>
             <a:prstGeom prst="bentConnector3">
@@ -5701,7 +6022,7 @@
               </a:extLst>
             </p:cNvPr>
             <p:cNvCxnSpPr>
-              <a:cxnSpLocks/>
+              <a:cxnSpLocks noGrp="1" noRot="1" noMove="1" noResize="1" noEditPoints="1" noAdjustHandles="1" noChangeArrowheads="1" noChangeShapeType="1"/>
               <a:stCxn id="224" idx="0"/>
               <a:endCxn id="137" idx="2"/>
             </p:cNvCxnSpPr>
@@ -5709,7 +6030,7 @@
           </p:nvCxnSpPr>
           <p:spPr>
             <a:xfrm rot="16200000" flipV="1">
-              <a:off x="8487565" y="2695948"/>
+              <a:off x="8484638" y="2690613"/>
               <a:ext cx="675884" cy="1"/>
             </a:xfrm>
             <a:prstGeom prst="bentConnector3">
@@ -5747,7 +6068,7 @@
               </a:extLst>
             </p:cNvPr>
             <p:cNvCxnSpPr>
-              <a:cxnSpLocks/>
+              <a:cxnSpLocks noGrp="1" noRot="1" noMove="1" noResize="1" noEditPoints="1" noAdjustHandles="1" noChangeArrowheads="1" noChangeShapeType="1"/>
               <a:stCxn id="66" idx="0"/>
               <a:endCxn id="224" idx="2"/>
             </p:cNvCxnSpPr>
@@ -5755,7 +6076,7 @@
           </p:nvCxnSpPr>
           <p:spPr>
             <a:xfrm rot="16200000" flipV="1">
-              <a:off x="8858212" y="3427964"/>
+              <a:off x="8855285" y="3422629"/>
               <a:ext cx="274831" cy="340240"/>
             </a:xfrm>
             <a:prstGeom prst="bentConnector3">
@@ -5795,7 +6116,7 @@
               </a:extLst>
             </p:cNvPr>
             <p:cNvCxnSpPr>
-              <a:cxnSpLocks/>
+              <a:cxnSpLocks noGrp="1" noRot="1" noMove="1" noResize="1" noEditPoints="1" noAdjustHandles="1" noChangeArrowheads="1" noChangeShapeType="1"/>
               <a:stCxn id="65" idx="0"/>
               <a:endCxn id="224" idx="2"/>
             </p:cNvCxnSpPr>
@@ -5803,7 +6124,7 @@
           </p:nvCxnSpPr>
           <p:spPr>
             <a:xfrm rot="5400000" flipH="1" flipV="1">
-              <a:off x="8519977" y="3429969"/>
+              <a:off x="8517050" y="3424634"/>
               <a:ext cx="274830" cy="336229"/>
             </a:xfrm>
             <a:prstGeom prst="bentConnector3">
@@ -5843,7 +6164,7 @@
               </a:extLst>
             </p:cNvPr>
             <p:cNvCxnSpPr>
-              <a:cxnSpLocks/>
+              <a:cxnSpLocks noGrp="1" noRot="1" noMove="1" noResize="1" noEditPoints="1" noAdjustHandles="1" noChangeArrowheads="1" noChangeShapeType="1"/>
               <a:stCxn id="226" idx="0"/>
               <a:endCxn id="65" idx="2"/>
             </p:cNvCxnSpPr>
@@ -5851,7 +6172,7 @@
           </p:nvCxnSpPr>
           <p:spPr>
             <a:xfrm rot="16200000" flipV="1">
-              <a:off x="8370507" y="4142270"/>
+              <a:off x="8367580" y="4136935"/>
               <a:ext cx="567883" cy="330340"/>
             </a:xfrm>
             <a:prstGeom prst="bentConnector3">
@@ -5891,7 +6212,7 @@
               </a:extLst>
             </p:cNvPr>
             <p:cNvCxnSpPr>
-              <a:cxnSpLocks/>
+              <a:cxnSpLocks noGrp="1" noRot="1" noMove="1" noResize="1" noEditPoints="1" noAdjustHandles="1" noChangeArrowheads="1" noChangeShapeType="1"/>
               <a:stCxn id="226" idx="0"/>
               <a:endCxn id="66" idx="2"/>
             </p:cNvCxnSpPr>
@@ -5899,8 +6220,56 @@
           </p:nvCxnSpPr>
           <p:spPr>
             <a:xfrm rot="5400000" flipH="1" flipV="1">
-              <a:off x="8708741" y="4134376"/>
+              <a:off x="8705814" y="4129041"/>
               <a:ext cx="567882" cy="346129"/>
+            </a:xfrm>
+            <a:prstGeom prst="bentConnector3">
+              <a:avLst>
+                <a:gd name="adj1" fmla="val 50000"/>
+              </a:avLst>
+            </a:prstGeom>
+            <a:ln w="28575">
+              <a:solidFill>
+                <a:srgbClr val="7030A0"/>
+              </a:solidFill>
+              <a:prstDash val="sysDot"/>
+            </a:ln>
+          </p:spPr>
+          <p:style>
+            <a:lnRef idx="1">
+              <a:schemeClr val="accent1"/>
+            </a:lnRef>
+            <a:fillRef idx="0">
+              <a:schemeClr val="accent1"/>
+            </a:fillRef>
+            <a:effectRef idx="0">
+              <a:schemeClr val="accent1"/>
+            </a:effectRef>
+            <a:fontRef idx="minor">
+              <a:schemeClr val="tx1"/>
+            </a:fontRef>
+          </p:style>
+        </p:cxnSp>
+        <p:cxnSp>
+          <p:nvCxnSpPr>
+            <p:cNvPr id="81" name="13">
+              <a:extLst>
+                <a:ext uri="{FF2B5EF4-FFF2-40B4-BE49-F238E27FC236}">
+                  <a16:creationId xmlns:a16="http://schemas.microsoft.com/office/drawing/2014/main" id="{5BD46A48-7064-42AC-A28E-0A337587C216}"/>
+                </a:ext>
+              </a:extLst>
+            </p:cNvPr>
+            <p:cNvCxnSpPr>
+              <a:cxnSpLocks noGrp="1" noRot="1" noMove="1" noResize="1" noEditPoints="1" noAdjustHandles="1" noChangeArrowheads="1" noChangeShapeType="1"/>
+              <a:stCxn id="230" idx="2"/>
+              <a:endCxn id="124" idx="0"/>
+            </p:cNvCxnSpPr>
+            <p:nvPr/>
+          </p:nvCxnSpPr>
+          <p:spPr>
+            <a:xfrm rot="16200000" flipH="1">
+              <a:off x="1093410" y="3457095"/>
+              <a:ext cx="436661" cy="1078268"/>
             </a:xfrm>
             <a:prstGeom prst="bentConnector3">
               <a:avLst>

</xml_diff>